<commit_message>
Added System Diagram to FinalYearProject/KavishReport/images
</commit_message>
<xml_diff>
--- a/Kaavish Evaluation I/Evaluation I.pptx
+++ b/Kaavish Evaluation I/Evaluation I.pptx
@@ -9,18 +9,17 @@
     <p:sldId id="257" r:id="rId3"/>
     <p:sldId id="258" r:id="rId4"/>
     <p:sldId id="259" r:id="rId5"/>
-    <p:sldId id="261" r:id="rId6"/>
-    <p:sldId id="260" r:id="rId7"/>
-    <p:sldId id="262" r:id="rId8"/>
-    <p:sldId id="263" r:id="rId9"/>
-    <p:sldId id="267" r:id="rId10"/>
-    <p:sldId id="268" r:id="rId11"/>
-    <p:sldId id="269" r:id="rId12"/>
-    <p:sldId id="270" r:id="rId13"/>
-    <p:sldId id="271" r:id="rId14"/>
-    <p:sldId id="272" r:id="rId15"/>
-    <p:sldId id="273" r:id="rId16"/>
-    <p:sldId id="264" r:id="rId17"/>
+    <p:sldId id="260" r:id="rId6"/>
+    <p:sldId id="262" r:id="rId7"/>
+    <p:sldId id="263" r:id="rId8"/>
+    <p:sldId id="267" r:id="rId9"/>
+    <p:sldId id="268" r:id="rId10"/>
+    <p:sldId id="269" r:id="rId11"/>
+    <p:sldId id="270" r:id="rId12"/>
+    <p:sldId id="271" r:id="rId13"/>
+    <p:sldId id="272" r:id="rId14"/>
+    <p:sldId id="273" r:id="rId15"/>
+    <p:sldId id="264" r:id="rId16"/>
   </p:sldIdLst>
   <p:sldSz cx="12192000" cy="6858000"/>
   <p:notesSz cx="6858000" cy="9144000"/>
@@ -119,6 +118,11 @@
       </a:defRPr>
     </a:lvl9pPr>
   </p:defaultTextStyle>
+  <p:extLst>
+    <p:ext uri="{EFAFB233-063F-42B5-8137-9DF3F51BA10A}">
+      <p15:sldGuideLst xmlns:p15="http://schemas.microsoft.com/office/powerpoint/2012/main"/>
+    </p:ext>
+  </p:extLst>
 </p:presentation>
 </file>
 
@@ -255,7 +259,7 @@
           <a:p>
             <a:fld id="{964B77FC-11F0-435C-BF58-30F6E93FA138}" type="datetimeFigureOut">
               <a:rPr lang="en-US" smtClean="0"/>
-              <a:t>10/16/2019</a:t>
+              <a:t>10/17/2019</a:t>
             </a:fld>
             <a:endParaRPr lang="en-US"/>
           </a:p>
@@ -542,7 +546,7 @@
           <a:p>
             <a:fld id="{964B77FC-11F0-435C-BF58-30F6E93FA138}" type="datetimeFigureOut">
               <a:rPr lang="en-US" smtClean="0"/>
-              <a:t>10/16/2019</a:t>
+              <a:t>10/17/2019</a:t>
             </a:fld>
             <a:endParaRPr lang="en-US"/>
           </a:p>
@@ -734,7 +738,7 @@
           <a:p>
             <a:fld id="{964B77FC-11F0-435C-BF58-30F6E93FA138}" type="datetimeFigureOut">
               <a:rPr lang="en-US" smtClean="0"/>
-              <a:t>10/16/2019</a:t>
+              <a:t>10/17/2019</a:t>
             </a:fld>
             <a:endParaRPr lang="en-US"/>
           </a:p>
@@ -995,7 +999,7 @@
           <a:p>
             <a:fld id="{964B77FC-11F0-435C-BF58-30F6E93FA138}" type="datetimeFigureOut">
               <a:rPr lang="en-US" smtClean="0"/>
-              <a:t>10/16/2019</a:t>
+              <a:t>10/17/2019</a:t>
             </a:fld>
             <a:endParaRPr lang="en-US"/>
           </a:p>
@@ -1419,7 +1423,7 @@
           <a:p>
             <a:fld id="{964B77FC-11F0-435C-BF58-30F6E93FA138}" type="datetimeFigureOut">
               <a:rPr lang="en-US" smtClean="0"/>
-              <a:t>10/16/2019</a:t>
+              <a:t>10/17/2019</a:t>
             </a:fld>
             <a:endParaRPr lang="en-US"/>
           </a:p>
@@ -1965,7 +1969,7 @@
           <a:p>
             <a:fld id="{964B77FC-11F0-435C-BF58-30F6E93FA138}" type="datetimeFigureOut">
               <a:rPr lang="en-US" smtClean="0"/>
-              <a:t>10/16/2019</a:t>
+              <a:t>10/17/2019</a:t>
             </a:fld>
             <a:endParaRPr lang="en-US"/>
           </a:p>
@@ -2805,7 +2809,7 @@
           <a:p>
             <a:fld id="{964B77FC-11F0-435C-BF58-30F6E93FA138}" type="datetimeFigureOut">
               <a:rPr lang="en-US" smtClean="0"/>
-              <a:t>10/16/2019</a:t>
+              <a:t>10/17/2019</a:t>
             </a:fld>
             <a:endParaRPr lang="en-US"/>
           </a:p>
@@ -2975,7 +2979,7 @@
           <a:p>
             <a:fld id="{964B77FC-11F0-435C-BF58-30F6E93FA138}" type="datetimeFigureOut">
               <a:rPr lang="en-US" smtClean="0"/>
-              <a:t>10/16/2019</a:t>
+              <a:t>10/17/2019</a:t>
             </a:fld>
             <a:endParaRPr lang="en-US"/>
           </a:p>
@@ -3159,7 +3163,7 @@
           <a:p>
             <a:fld id="{964B77FC-11F0-435C-BF58-30F6E93FA138}" type="datetimeFigureOut">
               <a:rPr lang="en-US" smtClean="0"/>
-              <a:t>10/16/2019</a:t>
+              <a:t>10/17/2019</a:t>
             </a:fld>
             <a:endParaRPr lang="en-US"/>
           </a:p>
@@ -3329,7 +3333,7 @@
           <a:p>
             <a:fld id="{964B77FC-11F0-435C-BF58-30F6E93FA138}" type="datetimeFigureOut">
               <a:rPr lang="en-US" smtClean="0"/>
-              <a:t>10/16/2019</a:t>
+              <a:t>10/17/2019</a:t>
             </a:fld>
             <a:endParaRPr lang="en-US"/>
           </a:p>
@@ -3577,7 +3581,7 @@
           <a:p>
             <a:fld id="{964B77FC-11F0-435C-BF58-30F6E93FA138}" type="datetimeFigureOut">
               <a:rPr lang="en-US" smtClean="0"/>
-              <a:t>10/16/2019</a:t>
+              <a:t>10/17/2019</a:t>
             </a:fld>
             <a:endParaRPr lang="en-US"/>
           </a:p>
@@ -3814,7 +3818,7 @@
           <a:p>
             <a:fld id="{964B77FC-11F0-435C-BF58-30F6E93FA138}" type="datetimeFigureOut">
               <a:rPr lang="en-US" smtClean="0"/>
-              <a:t>10/16/2019</a:t>
+              <a:t>10/17/2019</a:t>
             </a:fld>
             <a:endParaRPr lang="en-US"/>
           </a:p>
@@ -4187,7 +4191,7 @@
           <a:p>
             <a:fld id="{964B77FC-11F0-435C-BF58-30F6E93FA138}" type="datetimeFigureOut">
               <a:rPr lang="en-US" smtClean="0"/>
-              <a:t>10/16/2019</a:t>
+              <a:t>10/17/2019</a:t>
             </a:fld>
             <a:endParaRPr lang="en-US"/>
           </a:p>
@@ -4305,7 +4309,7 @@
           <a:p>
             <a:fld id="{964B77FC-11F0-435C-BF58-30F6E93FA138}" type="datetimeFigureOut">
               <a:rPr lang="en-US" smtClean="0"/>
-              <a:t>10/16/2019</a:t>
+              <a:t>10/17/2019</a:t>
             </a:fld>
             <a:endParaRPr lang="en-US"/>
           </a:p>
@@ -4400,7 +4404,7 @@
           <a:p>
             <a:fld id="{964B77FC-11F0-435C-BF58-30F6E93FA138}" type="datetimeFigureOut">
               <a:rPr lang="en-US" smtClean="0"/>
-              <a:t>10/16/2019</a:t>
+              <a:t>10/17/2019</a:t>
             </a:fld>
             <a:endParaRPr lang="en-US"/>
           </a:p>
@@ -4651,7 +4655,7 @@
           <a:p>
             <a:fld id="{964B77FC-11F0-435C-BF58-30F6E93FA138}" type="datetimeFigureOut">
               <a:rPr lang="en-US" smtClean="0"/>
-              <a:t>10/16/2019</a:t>
+              <a:t>10/17/2019</a:t>
             </a:fld>
             <a:endParaRPr lang="en-US"/>
           </a:p>
@@ -4938,7 +4942,7 @@
           <a:p>
             <a:fld id="{964B77FC-11F0-435C-BF58-30F6E93FA138}" type="datetimeFigureOut">
               <a:rPr lang="en-US" smtClean="0"/>
-              <a:t>10/16/2019</a:t>
+              <a:t>10/17/2019</a:t>
             </a:fld>
             <a:endParaRPr lang="en-US"/>
           </a:p>
@@ -5151,7 +5155,7 @@
           <a:p>
             <a:fld id="{964B77FC-11F0-435C-BF58-30F6E93FA138}" type="datetimeFigureOut">
               <a:rPr lang="en-US" smtClean="0"/>
-              <a:t>10/16/2019</a:t>
+              <a:t>10/17/2019</a:t>
             </a:fld>
             <a:endParaRPr lang="en-US"/>
           </a:p>
@@ -5928,7 +5932,7 @@
           <p:cNvPr id="2" name="Title 1">
             <a:extLst>
               <a:ext uri="{FF2B5EF4-FFF2-40B4-BE49-F238E27FC236}">
-                <a16:creationId xmlns:a16="http://schemas.microsoft.com/office/drawing/2014/main" id="{62EF31A1-7452-4EF4-B263-015677E34336}"/>
+                <a16:creationId xmlns:a16="http://schemas.microsoft.com/office/drawing/2014/main" id="{14703E39-E430-4B50-A2DB-D169662EB9EC}"/>
               </a:ext>
             </a:extLst>
           </p:cNvPr>
@@ -5946,7 +5950,7 @@
           <a:p>
             <a:r>
               <a:rPr lang="en-US" dirty="0"/>
-              <a:t>Feedback taken into account</a:t>
+              <a:t>Project Backlog</a:t>
             </a:r>
           </a:p>
         </p:txBody>
@@ -5956,7 +5960,7 @@
           <p:cNvPr id="3" name="Content Placeholder 2">
             <a:extLst>
               <a:ext uri="{FF2B5EF4-FFF2-40B4-BE49-F238E27FC236}">
-                <a16:creationId xmlns:a16="http://schemas.microsoft.com/office/drawing/2014/main" id="{2068CF96-761E-4149-89D8-F481FDC9090C}"/>
+                <a16:creationId xmlns:a16="http://schemas.microsoft.com/office/drawing/2014/main" id="{3CE9087A-016F-42D0-BAF3-8C3AEB5B9E01}"/>
               </a:ext>
             </a:extLst>
           </p:cNvPr>
@@ -5972,14 +5976,14 @@
           <a:bodyPr/>
           <a:lstStyle/>
           <a:p>
-            <a:endParaRPr lang="en-US"/>
+            <a:endParaRPr lang="en-US" dirty="0"/>
           </a:p>
         </p:txBody>
       </p:sp>
     </p:spTree>
     <p:extLst>
       <p:ext uri="{BB962C8B-B14F-4D97-AF65-F5344CB8AC3E}">
-        <p14:creationId xmlns:p14="http://schemas.microsoft.com/office/powerpoint/2010/main" val="845203596"/>
+        <p14:creationId xmlns:p14="http://schemas.microsoft.com/office/powerpoint/2010/main" val="386003673"/>
       </p:ext>
     </p:extLst>
   </p:cSld>
@@ -6011,7 +6015,7 @@
           <p:cNvPr id="2" name="Title 1">
             <a:extLst>
               <a:ext uri="{FF2B5EF4-FFF2-40B4-BE49-F238E27FC236}">
-                <a16:creationId xmlns:a16="http://schemas.microsoft.com/office/drawing/2014/main" id="{14703E39-E430-4B50-A2DB-D169662EB9EC}"/>
+                <a16:creationId xmlns:a16="http://schemas.microsoft.com/office/drawing/2014/main" id="{FD9A3C93-AAF9-4379-B580-E7B76D0CA9E4}"/>
               </a:ext>
             </a:extLst>
           </p:cNvPr>
@@ -6029,7 +6033,7 @@
           <a:p>
             <a:r>
               <a:rPr lang="en-US" dirty="0"/>
-              <a:t>Project Backlog</a:t>
+              <a:t>Task distribution</a:t>
             </a:r>
           </a:p>
         </p:txBody>
@@ -6039,7 +6043,7 @@
           <p:cNvPr id="3" name="Content Placeholder 2">
             <a:extLst>
               <a:ext uri="{FF2B5EF4-FFF2-40B4-BE49-F238E27FC236}">
-                <a16:creationId xmlns:a16="http://schemas.microsoft.com/office/drawing/2014/main" id="{3CE9087A-016F-42D0-BAF3-8C3AEB5B9E01}"/>
+                <a16:creationId xmlns:a16="http://schemas.microsoft.com/office/drawing/2014/main" id="{A9362301-CE76-4F78-84AE-565D0ED9B88D}"/>
               </a:ext>
             </a:extLst>
           </p:cNvPr>
@@ -6055,14 +6059,14 @@
           <a:bodyPr/>
           <a:lstStyle/>
           <a:p>
-            <a:endParaRPr lang="en-US" dirty="0"/>
+            <a:endParaRPr lang="en-US"/>
           </a:p>
         </p:txBody>
       </p:sp>
     </p:spTree>
     <p:extLst>
       <p:ext uri="{BB962C8B-B14F-4D97-AF65-F5344CB8AC3E}">
-        <p14:creationId xmlns:p14="http://schemas.microsoft.com/office/powerpoint/2010/main" val="386003673"/>
+        <p14:creationId xmlns:p14="http://schemas.microsoft.com/office/powerpoint/2010/main" val="238338035"/>
       </p:ext>
     </p:extLst>
   </p:cSld>
@@ -6094,7 +6098,7 @@
           <p:cNvPr id="2" name="Title 1">
             <a:extLst>
               <a:ext uri="{FF2B5EF4-FFF2-40B4-BE49-F238E27FC236}">
-                <a16:creationId xmlns:a16="http://schemas.microsoft.com/office/drawing/2014/main" id="{FD9A3C93-AAF9-4379-B580-E7B76D0CA9E4}"/>
+                <a16:creationId xmlns:a16="http://schemas.microsoft.com/office/drawing/2014/main" id="{6748CC33-9C1D-4FB2-B9A8-AF259B02C14A}"/>
               </a:ext>
             </a:extLst>
           </p:cNvPr>
@@ -6105,47 +6109,108 @@
             <p:ph type="title"/>
           </p:nvPr>
         </p:nvSpPr>
-        <p:spPr/>
+        <p:spPr>
+          <a:xfrm>
+            <a:off x="919119" y="201185"/>
+            <a:ext cx="10353761" cy="851535"/>
+          </a:xfrm>
+        </p:spPr>
         <p:txBody>
           <a:bodyPr/>
           <a:lstStyle/>
           <a:p>
             <a:r>
               <a:rPr lang="en-US" dirty="0"/>
-              <a:t>Task distribution</a:t>
-            </a:r>
-          </a:p>
-        </p:txBody>
-      </p:sp>
-      <p:sp>
-        <p:nvSpPr>
-          <p:cNvPr id="3" name="Content Placeholder 2">
+              <a:t>System diagram</a:t>
+            </a:r>
+          </a:p>
+        </p:txBody>
+      </p:sp>
+      <p:sp>
+        <p:nvSpPr>
+          <p:cNvPr id="5" name="AutoShape 4">
             <a:extLst>
               <a:ext uri="{FF2B5EF4-FFF2-40B4-BE49-F238E27FC236}">
-                <a16:creationId xmlns:a16="http://schemas.microsoft.com/office/drawing/2014/main" id="{A9362301-CE76-4F78-84AE-565D0ED9B88D}"/>
+                <a16:creationId xmlns:a16="http://schemas.microsoft.com/office/drawing/2014/main" id="{68C32F7E-693C-4FD4-9F3C-C0D62B7E2F0B}"/>
               </a:ext>
             </a:extLst>
           </p:cNvPr>
           <p:cNvSpPr>
-            <a:spLocks noGrp="1"/>
-          </p:cNvSpPr>
-          <p:nvPr>
-            <p:ph idx="1"/>
-          </p:nvPr>
-        </p:nvSpPr>
-        <p:spPr/>
-        <p:txBody>
-          <a:bodyPr/>
+            <a:spLocks noChangeAspect="1" noChangeArrowheads="1"/>
+          </p:cNvSpPr>
+          <p:nvPr/>
+        </p:nvSpPr>
+        <p:spPr bwMode="auto">
+          <a:xfrm>
+            <a:off x="2138289" y="-570915"/>
+            <a:ext cx="6766560" cy="6766560"/>
+          </a:xfrm>
+          <a:prstGeom prst="rect">
+            <a:avLst/>
+          </a:prstGeom>
+          <a:noFill/>
+          <a:extLst>
+            <a:ext uri="{909E8E84-426E-40DD-AFC4-6F175D3DCCD1}">
+              <a14:hiddenFill xmlns:a14="http://schemas.microsoft.com/office/drawing/2010/main">
+                <a:solidFill>
+                  <a:srgbClr val="FFFFFF"/>
+                </a:solidFill>
+              </a14:hiddenFill>
+            </a:ext>
+          </a:extLst>
+        </p:spPr>
+        <p:txBody>
+          <a:bodyPr vert="horz" wrap="square" lIns="91440" tIns="45720" rIns="91440" bIns="45720" numCol="1" anchor="t" anchorCtr="0" compatLnSpc="1">
+            <a:prstTxWarp prst="textNoShape">
+              <a:avLst/>
+            </a:prstTxWarp>
+          </a:bodyPr>
           <a:lstStyle/>
           <a:p>
             <a:endParaRPr lang="en-US"/>
           </a:p>
         </p:txBody>
       </p:sp>
+      <p:pic>
+        <p:nvPicPr>
+          <p:cNvPr id="7" name="Picture 6">
+            <a:extLst>
+              <a:ext uri="{FF2B5EF4-FFF2-40B4-BE49-F238E27FC236}">
+                <a16:creationId xmlns:a16="http://schemas.microsoft.com/office/drawing/2014/main" id="{799FA854-6304-4C2B-9AD0-4BB4B9915682}"/>
+              </a:ext>
+            </a:extLst>
+          </p:cNvPr>
+          <p:cNvPicPr>
+            <a:picLocks noChangeAspect="1"/>
+          </p:cNvPicPr>
+          <p:nvPr/>
+        </p:nvPicPr>
+        <p:blipFill>
+          <a:blip r:embed="rId2">
+            <a:extLst>
+              <a:ext uri="{28A0092B-C50C-407E-A947-70E740481C1C}">
+                <a14:useLocalDpi xmlns:a14="http://schemas.microsoft.com/office/drawing/2010/main" val="0"/>
+              </a:ext>
+            </a:extLst>
+          </a:blip>
+          <a:stretch>
+            <a:fillRect/>
+          </a:stretch>
+        </p:blipFill>
+        <p:spPr>
+          <a:xfrm>
+            <a:off x="2799471" y="1052720"/>
+            <a:ext cx="6469379" cy="5498972"/>
+          </a:xfrm>
+          <a:prstGeom prst="rect">
+            <a:avLst/>
+          </a:prstGeom>
+        </p:spPr>
+      </p:pic>
     </p:spTree>
     <p:extLst>
       <p:ext uri="{BB962C8B-B14F-4D97-AF65-F5344CB8AC3E}">
-        <p14:creationId xmlns:p14="http://schemas.microsoft.com/office/powerpoint/2010/main" val="238338035"/>
+        <p14:creationId xmlns:p14="http://schemas.microsoft.com/office/powerpoint/2010/main" val="1176727767"/>
       </p:ext>
     </p:extLst>
   </p:cSld>
@@ -6177,7 +6242,7 @@
           <p:cNvPr id="2" name="Title 1">
             <a:extLst>
               <a:ext uri="{FF2B5EF4-FFF2-40B4-BE49-F238E27FC236}">
-                <a16:creationId xmlns:a16="http://schemas.microsoft.com/office/drawing/2014/main" id="{6748CC33-9C1D-4FB2-B9A8-AF259B02C14A}"/>
+                <a16:creationId xmlns:a16="http://schemas.microsoft.com/office/drawing/2014/main" id="{EE154EAA-EDB8-4C95-B696-92D63E36F1AE}"/>
               </a:ext>
             </a:extLst>
           </p:cNvPr>
@@ -6195,7 +6260,7 @@
           <a:p>
             <a:r>
               <a:rPr lang="en-US" dirty="0"/>
-              <a:t>System diagram</a:t>
+              <a:t>GUI mockups</a:t>
             </a:r>
           </a:p>
         </p:txBody>
@@ -6205,7 +6270,7 @@
           <p:cNvPr id="3" name="Content Placeholder 2">
             <a:extLst>
               <a:ext uri="{FF2B5EF4-FFF2-40B4-BE49-F238E27FC236}">
-                <a16:creationId xmlns:a16="http://schemas.microsoft.com/office/drawing/2014/main" id="{44497F8C-C04B-4D42-B602-5982213B1F36}"/>
+                <a16:creationId xmlns:a16="http://schemas.microsoft.com/office/drawing/2014/main" id="{F33A8E25-98D3-4658-93DF-BBA19F792977}"/>
               </a:ext>
             </a:extLst>
           </p:cNvPr>
@@ -6228,7 +6293,7 @@
     </p:spTree>
     <p:extLst>
       <p:ext uri="{BB962C8B-B14F-4D97-AF65-F5344CB8AC3E}">
-        <p14:creationId xmlns:p14="http://schemas.microsoft.com/office/powerpoint/2010/main" val="1176727767"/>
+        <p14:creationId xmlns:p14="http://schemas.microsoft.com/office/powerpoint/2010/main" val="3368211307"/>
       </p:ext>
     </p:extLst>
   </p:cSld>
@@ -6260,89 +6325,6 @@
           <p:cNvPr id="2" name="Title 1">
             <a:extLst>
               <a:ext uri="{FF2B5EF4-FFF2-40B4-BE49-F238E27FC236}">
-                <a16:creationId xmlns:a16="http://schemas.microsoft.com/office/drawing/2014/main" id="{EE154EAA-EDB8-4C95-B696-92D63E36F1AE}"/>
-              </a:ext>
-            </a:extLst>
-          </p:cNvPr>
-          <p:cNvSpPr>
-            <a:spLocks noGrp="1"/>
-          </p:cNvSpPr>
-          <p:nvPr>
-            <p:ph type="title"/>
-          </p:nvPr>
-        </p:nvSpPr>
-        <p:spPr/>
-        <p:txBody>
-          <a:bodyPr/>
-          <a:lstStyle/>
-          <a:p>
-            <a:r>
-              <a:rPr lang="en-US" dirty="0"/>
-              <a:t>GUI mockups</a:t>
-            </a:r>
-          </a:p>
-        </p:txBody>
-      </p:sp>
-      <p:sp>
-        <p:nvSpPr>
-          <p:cNvPr id="3" name="Content Placeholder 2">
-            <a:extLst>
-              <a:ext uri="{FF2B5EF4-FFF2-40B4-BE49-F238E27FC236}">
-                <a16:creationId xmlns:a16="http://schemas.microsoft.com/office/drawing/2014/main" id="{F33A8E25-98D3-4658-93DF-BBA19F792977}"/>
-              </a:ext>
-            </a:extLst>
-          </p:cNvPr>
-          <p:cNvSpPr>
-            <a:spLocks noGrp="1"/>
-          </p:cNvSpPr>
-          <p:nvPr>
-            <p:ph idx="1"/>
-          </p:nvPr>
-        </p:nvSpPr>
-        <p:spPr/>
-        <p:txBody>
-          <a:bodyPr/>
-          <a:lstStyle/>
-          <a:p>
-            <a:endParaRPr lang="en-US"/>
-          </a:p>
-        </p:txBody>
-      </p:sp>
-    </p:spTree>
-    <p:extLst>
-      <p:ext uri="{BB962C8B-B14F-4D97-AF65-F5344CB8AC3E}">
-        <p14:creationId xmlns:p14="http://schemas.microsoft.com/office/powerpoint/2010/main" val="3368211307"/>
-      </p:ext>
-    </p:extLst>
-  </p:cSld>
-  <p:clrMapOvr>
-    <a:masterClrMapping/>
-  </p:clrMapOvr>
-</p:sld>
-</file>
-
-<file path=ppt/slides/slide15.xml><?xml version="1.0" encoding="utf-8"?>
-<p:sld xmlns:a="http://schemas.openxmlformats.org/drawingml/2006/main" xmlns:r="http://schemas.openxmlformats.org/officeDocument/2006/relationships" xmlns:p="http://schemas.openxmlformats.org/presentationml/2006/main">
-  <p:cSld>
-    <p:spTree>
-      <p:nvGrpSpPr>
-        <p:cNvPr id="1" name=""/>
-        <p:cNvGrpSpPr/>
-        <p:nvPr/>
-      </p:nvGrpSpPr>
-      <p:grpSpPr>
-        <a:xfrm>
-          <a:off x="0" y="0"/>
-          <a:ext cx="0" cy="0"/>
-          <a:chOff x="0" y="0"/>
-          <a:chExt cx="0" cy="0"/>
-        </a:xfrm>
-      </p:grpSpPr>
-      <p:sp>
-        <p:nvSpPr>
-          <p:cNvPr id="2" name="Title 1">
-            <a:extLst>
-              <a:ext uri="{FF2B5EF4-FFF2-40B4-BE49-F238E27FC236}">
                 <a16:creationId xmlns:a16="http://schemas.microsoft.com/office/drawing/2014/main" id="{CC28C357-CB72-47E1-9055-AC690CFB2696}"/>
               </a:ext>
             </a:extLst>
@@ -6404,7 +6386,7 @@
 </p:sld>
 </file>
 
-<file path=ppt/slides/slide16.xml><?xml version="1.0" encoding="utf-8"?>
+<file path=ppt/slides/slide15.xml><?xml version="1.0" encoding="utf-8"?>
 <p:sld xmlns:a="http://schemas.openxmlformats.org/drawingml/2006/main" xmlns:r="http://schemas.openxmlformats.org/officeDocument/2006/relationships" xmlns:p="http://schemas.openxmlformats.org/presentationml/2006/main">
   <p:cSld>
     <p:spTree>
@@ -8837,22 +8819,21 @@
               <a:buNone/>
             </a:pPr>
             <a:r>
-              <a:rPr lang="en-US"/>
+              <a:rPr lang="en-US" dirty="0"/>
               <a:t>To </a:t>
             </a:r>
             <a:r>
-              <a:rPr lang="en-US" b="1" i="1"/>
+              <a:rPr lang="en-US" b="1" i="1" dirty="0"/>
               <a:t>deliver</a:t>
             </a:r>
             <a:r>
-              <a:rPr lang="en-US" i="1"/>
+              <a:rPr lang="en-US" i="1" dirty="0"/>
               <a:t> </a:t>
             </a:r>
             <a:r>
-              <a:rPr lang="en-US"/>
-              <a:t>an intelligent E-Commerce site with a running AI system to recognize the image object and categorize them accordingly. This Web Application will support artists and artisans to promote their work &amp; skills and earn a respectable living, regardless of any biases.</a:t>
-            </a:r>
-            <a:endParaRPr lang="en-US" dirty="0"/>
+              <a:rPr lang="en-US" dirty="0"/>
+              <a:t>an This Web Application will support artists and artisans to promote their work &amp; skills and earn a respectable living, regardless of any biases.</a:t>
+            </a:r>
           </a:p>
         </p:txBody>
       </p:sp>
@@ -9011,527 +8992,6 @@
 </file>
 
 <file path=ppt/slides/slide5.xml><?xml version="1.0" encoding="utf-8"?>
-<p:sld xmlns:a="http://schemas.openxmlformats.org/drawingml/2006/main" xmlns:r="http://schemas.openxmlformats.org/officeDocument/2006/relationships" xmlns:p="http://schemas.openxmlformats.org/presentationml/2006/main">
-  <p:cSld>
-    <p:spTree>
-      <p:nvGrpSpPr>
-        <p:cNvPr id="1" name=""/>
-        <p:cNvGrpSpPr/>
-        <p:nvPr/>
-      </p:nvGrpSpPr>
-      <p:grpSpPr>
-        <a:xfrm>
-          <a:off x="0" y="0"/>
-          <a:ext cx="0" cy="0"/>
-          <a:chOff x="0" y="0"/>
-          <a:chExt cx="0" cy="0"/>
-        </a:xfrm>
-      </p:grpSpPr>
-      <p:sp>
-        <p:nvSpPr>
-          <p:cNvPr id="2" name="Title 1">
-            <a:extLst>
-              <a:ext uri="{FF2B5EF4-FFF2-40B4-BE49-F238E27FC236}">
-                <a16:creationId xmlns:a16="http://schemas.microsoft.com/office/drawing/2014/main" id="{5FB3C540-F4F3-4D96-9912-249B4259CB94}"/>
-              </a:ext>
-            </a:extLst>
-          </p:cNvPr>
-          <p:cNvSpPr txBox="1">
-            <a:spLocks/>
-          </p:cNvSpPr>
-          <p:nvPr/>
-        </p:nvSpPr>
-        <p:spPr>
-          <a:xfrm>
-            <a:off x="1522414" y="274638"/>
-            <a:ext cx="9143998" cy="1020762"/>
-          </a:xfrm>
-          <a:prstGeom prst="rect">
-            <a:avLst/>
-          </a:prstGeom>
-        </p:spPr>
-        <p:txBody>
-          <a:bodyPr/>
-          <a:lstStyle>
-            <a:lvl1pPr algn="ctr" defTabSz="914400" rtl="0" eaLnBrk="1" latinLnBrk="0" hangingPunct="1">
-              <a:lnSpc>
-                <a:spcPct val="90000"/>
-              </a:lnSpc>
-              <a:spcBef>
-                <a:spcPct val="0"/>
-              </a:spcBef>
-              <a:buNone/>
-              <a:defRPr sz="3400" b="1" i="0" kern="1200" cap="all">
-                <a:solidFill>
-                  <a:schemeClr val="tx1"/>
-                </a:solidFill>
-                <a:effectLst>
-                  <a:outerShdw blurRad="50800" dist="63500" dir="2700000" algn="tl" rotWithShape="0">
-                    <a:srgbClr val="000000">
-                      <a:alpha val="48000"/>
-                    </a:srgbClr>
-                  </a:outerShdw>
-                </a:effectLst>
-                <a:latin typeface="+mj-lt"/>
-                <a:ea typeface="+mj-ea"/>
-                <a:cs typeface="+mj-cs"/>
-              </a:defRPr>
-            </a:lvl1pPr>
-          </a:lstStyle>
-          <a:p>
-            <a:r>
-              <a:rPr lang="en-US"/>
-              <a:t>Similar ideas around the world</a:t>
-            </a:r>
-            <a:endParaRPr lang="en-US" dirty="0"/>
-          </a:p>
-        </p:txBody>
-      </p:sp>
-      <p:pic>
-        <p:nvPicPr>
-          <p:cNvPr id="3" name="Picture 2" descr="Image result for vceela">
-            <a:extLst>
-              <a:ext uri="{FF2B5EF4-FFF2-40B4-BE49-F238E27FC236}">
-                <a16:creationId xmlns:a16="http://schemas.microsoft.com/office/drawing/2014/main" id="{F0A2FC63-0E5F-4CF9-BDB8-CABE26746327}"/>
-              </a:ext>
-            </a:extLst>
-          </p:cNvPr>
-          <p:cNvPicPr>
-            <a:picLocks noChangeAspect="1" noChangeArrowheads="1"/>
-          </p:cNvPicPr>
-          <p:nvPr/>
-        </p:nvPicPr>
-        <p:blipFill>
-          <a:blip r:embed="rId2">
-            <a:extLst>
-              <a:ext uri="{28A0092B-C50C-407E-A947-70E740481C1C}">
-                <a14:useLocalDpi xmlns:a14="http://schemas.microsoft.com/office/drawing/2010/main" val="0"/>
-              </a:ext>
-            </a:extLst>
-          </a:blip>
-          <a:srcRect/>
-          <a:stretch>
-            <a:fillRect/>
-          </a:stretch>
-        </p:blipFill>
-        <p:spPr bwMode="auto">
-          <a:xfrm>
-            <a:off x="9366380" y="2075753"/>
-            <a:ext cx="1905000" cy="1905000"/>
-          </a:xfrm>
-          <a:prstGeom prst="rect">
-            <a:avLst/>
-          </a:prstGeom>
-          <a:noFill/>
-          <a:extLst>
-            <a:ext uri="{909E8E84-426E-40DD-AFC4-6F175D3DCCD1}">
-              <a14:hiddenFill xmlns:a14="http://schemas.microsoft.com/office/drawing/2010/main">
-                <a:solidFill>
-                  <a:srgbClr val="FFFFFF"/>
-                </a:solidFill>
-              </a14:hiddenFill>
-            </a:ext>
-          </a:extLst>
-        </p:spPr>
-      </p:pic>
-      <p:pic>
-        <p:nvPicPr>
-          <p:cNvPr id="4" name="Picture 4" descr="Image result for etsy">
-            <a:extLst>
-              <a:ext uri="{FF2B5EF4-FFF2-40B4-BE49-F238E27FC236}">
-                <a16:creationId xmlns:a16="http://schemas.microsoft.com/office/drawing/2014/main" id="{41552DCC-6763-4A9F-ACD5-1BEFE6347CFF}"/>
-              </a:ext>
-            </a:extLst>
-          </p:cNvPr>
-          <p:cNvPicPr>
-            <a:picLocks noChangeAspect="1" noChangeArrowheads="1"/>
-          </p:cNvPicPr>
-          <p:nvPr/>
-        </p:nvPicPr>
-        <p:blipFill>
-          <a:blip r:embed="rId3" cstate="print">
-            <a:extLst>
-              <a:ext uri="{28A0092B-C50C-407E-A947-70E740481C1C}">
-                <a14:useLocalDpi xmlns:a14="http://schemas.microsoft.com/office/drawing/2010/main" val="0"/>
-              </a:ext>
-            </a:extLst>
-          </a:blip>
-          <a:srcRect/>
-          <a:stretch>
-            <a:fillRect/>
-          </a:stretch>
-        </p:blipFill>
-        <p:spPr bwMode="auto">
-          <a:xfrm>
-            <a:off x="3478456" y="1797346"/>
-            <a:ext cx="2987418" cy="1706563"/>
-          </a:xfrm>
-          <a:prstGeom prst="rect">
-            <a:avLst/>
-          </a:prstGeom>
-          <a:noFill/>
-          <a:extLst>
-            <a:ext uri="{909E8E84-426E-40DD-AFC4-6F175D3DCCD1}">
-              <a14:hiddenFill xmlns:a14="http://schemas.microsoft.com/office/drawing/2010/main">
-                <a:solidFill>
-                  <a:srgbClr val="FFFFFF"/>
-                </a:solidFill>
-              </a14:hiddenFill>
-            </a:ext>
-          </a:extLst>
-        </p:spPr>
-      </p:pic>
-      <p:pic>
-        <p:nvPicPr>
-          <p:cNvPr id="5" name="Picture 6" descr="Image result for ebay">
-            <a:extLst>
-              <a:ext uri="{FF2B5EF4-FFF2-40B4-BE49-F238E27FC236}">
-                <a16:creationId xmlns:a16="http://schemas.microsoft.com/office/drawing/2014/main" id="{36DCA4FF-E3A5-4DB7-8F25-7F6CC6DCC727}"/>
-              </a:ext>
-            </a:extLst>
-          </p:cNvPr>
-          <p:cNvPicPr>
-            <a:picLocks noChangeAspect="1" noChangeArrowheads="1"/>
-          </p:cNvPicPr>
-          <p:nvPr/>
-        </p:nvPicPr>
-        <p:blipFill rotWithShape="1">
-          <a:blip r:embed="rId4">
-            <a:extLst>
-              <a:ext uri="{28A0092B-C50C-407E-A947-70E740481C1C}">
-                <a14:useLocalDpi xmlns:a14="http://schemas.microsoft.com/office/drawing/2010/main" val="0"/>
-              </a:ext>
-            </a:extLst>
-          </a:blip>
-          <a:srcRect l="8146" t="25603" r="9206" b="26488"/>
-          <a:stretch/>
-        </p:blipFill>
-        <p:spPr bwMode="auto">
-          <a:xfrm>
-            <a:off x="667101" y="3682362"/>
-            <a:ext cx="2514600" cy="1078675"/>
-          </a:xfrm>
-          <a:prstGeom prst="rect">
-            <a:avLst/>
-          </a:prstGeom>
-          <a:noFill/>
-          <a:extLst>
-            <a:ext uri="{909E8E84-426E-40DD-AFC4-6F175D3DCCD1}">
-              <a14:hiddenFill xmlns:a14="http://schemas.microsoft.com/office/drawing/2010/main">
-                <a:solidFill>
-                  <a:srgbClr val="FFFFFF"/>
-                </a:solidFill>
-              </a14:hiddenFill>
-            </a:ext>
-          </a:extLst>
-        </p:spPr>
-      </p:pic>
-      <p:pic>
-        <p:nvPicPr>
-          <p:cNvPr id="6" name="Picture 8" descr="Image result for alibaba express logo">
-            <a:extLst>
-              <a:ext uri="{FF2B5EF4-FFF2-40B4-BE49-F238E27FC236}">
-                <a16:creationId xmlns:a16="http://schemas.microsoft.com/office/drawing/2014/main" id="{D7B25389-5E97-4F4B-B4FC-48B798BCE236}"/>
-              </a:ext>
-            </a:extLst>
-          </p:cNvPr>
-          <p:cNvPicPr>
-            <a:picLocks noChangeAspect="1" noChangeArrowheads="1"/>
-          </p:cNvPicPr>
-          <p:nvPr/>
-        </p:nvPicPr>
-        <p:blipFill>
-          <a:blip r:embed="rId5" cstate="print">
-            <a:extLst>
-              <a:ext uri="{28A0092B-C50C-407E-A947-70E740481C1C}">
-                <a14:useLocalDpi xmlns:a14="http://schemas.microsoft.com/office/drawing/2010/main" val="0"/>
-              </a:ext>
-            </a:extLst>
-          </a:blip>
-          <a:srcRect/>
-          <a:stretch>
-            <a:fillRect/>
-          </a:stretch>
-        </p:blipFill>
-        <p:spPr bwMode="auto">
-          <a:xfrm>
-            <a:off x="1034258" y="5236762"/>
-            <a:ext cx="3348037" cy="814123"/>
-          </a:xfrm>
-          <a:prstGeom prst="rect">
-            <a:avLst/>
-          </a:prstGeom>
-          <a:noFill/>
-          <a:extLst>
-            <a:ext uri="{909E8E84-426E-40DD-AFC4-6F175D3DCCD1}">
-              <a14:hiddenFill xmlns:a14="http://schemas.microsoft.com/office/drawing/2010/main">
-                <a:solidFill>
-                  <a:srgbClr val="FFFFFF"/>
-                </a:solidFill>
-              </a14:hiddenFill>
-            </a:ext>
-          </a:extLst>
-        </p:spPr>
-      </p:pic>
-      <p:pic>
-        <p:nvPicPr>
-          <p:cNvPr id="7" name="Picture 10" descr="Image result for artfire logo">
-            <a:extLst>
-              <a:ext uri="{FF2B5EF4-FFF2-40B4-BE49-F238E27FC236}">
-                <a16:creationId xmlns:a16="http://schemas.microsoft.com/office/drawing/2014/main" id="{971B3F10-C0A2-4501-BA13-3FD5944F507E}"/>
-              </a:ext>
-            </a:extLst>
-          </p:cNvPr>
-          <p:cNvPicPr>
-            <a:picLocks noChangeAspect="1" noChangeArrowheads="1"/>
-          </p:cNvPicPr>
-          <p:nvPr/>
-        </p:nvPicPr>
-        <p:blipFill>
-          <a:blip r:embed="rId6">
-            <a:duotone>
-              <a:schemeClr val="accent1">
-                <a:shade val="45000"/>
-                <a:satMod val="135000"/>
-              </a:schemeClr>
-              <a:prstClr val="white"/>
-            </a:duotone>
-            <a:extLst>
-              <a:ext uri="{28A0092B-C50C-407E-A947-70E740481C1C}">
-                <a14:useLocalDpi xmlns:a14="http://schemas.microsoft.com/office/drawing/2010/main" val="0"/>
-              </a:ext>
-            </a:extLst>
-          </a:blip>
-          <a:srcRect/>
-          <a:stretch>
-            <a:fillRect/>
-          </a:stretch>
-        </p:blipFill>
-        <p:spPr bwMode="auto">
-          <a:xfrm>
-            <a:off x="6117338" y="2403222"/>
-            <a:ext cx="2836519" cy="1602633"/>
-          </a:xfrm>
-          <a:prstGeom prst="rect">
-            <a:avLst/>
-          </a:prstGeom>
-          <a:noFill/>
-          <a:extLst>
-            <a:ext uri="{909E8E84-426E-40DD-AFC4-6F175D3DCCD1}">
-              <a14:hiddenFill xmlns:a14="http://schemas.microsoft.com/office/drawing/2010/main">
-                <a:solidFill>
-                  <a:srgbClr val="FFFFFF"/>
-                </a:solidFill>
-              </a14:hiddenFill>
-            </a:ext>
-          </a:extLst>
-        </p:spPr>
-      </p:pic>
-      <p:pic>
-        <p:nvPicPr>
-          <p:cNvPr id="8" name="Picture 14" descr="Image result for zibbet logo">
-            <a:extLst>
-              <a:ext uri="{FF2B5EF4-FFF2-40B4-BE49-F238E27FC236}">
-                <a16:creationId xmlns:a16="http://schemas.microsoft.com/office/drawing/2014/main" id="{245C7F3C-C2BA-4B09-BD96-C8944B52FB31}"/>
-              </a:ext>
-            </a:extLst>
-          </p:cNvPr>
-          <p:cNvPicPr>
-            <a:picLocks noChangeAspect="1" noChangeArrowheads="1"/>
-          </p:cNvPicPr>
-          <p:nvPr/>
-        </p:nvPicPr>
-        <p:blipFill>
-          <a:blip r:embed="rId7" cstate="print">
-            <a:extLst>
-              <a:ext uri="{28A0092B-C50C-407E-A947-70E740481C1C}">
-                <a14:useLocalDpi xmlns:a14="http://schemas.microsoft.com/office/drawing/2010/main" val="0"/>
-              </a:ext>
-            </a:extLst>
-          </a:blip>
-          <a:srcRect/>
-          <a:stretch>
-            <a:fillRect/>
-          </a:stretch>
-        </p:blipFill>
-        <p:spPr bwMode="auto">
-          <a:xfrm>
-            <a:off x="4094960" y="3844172"/>
-            <a:ext cx="3078070" cy="923421"/>
-          </a:xfrm>
-          <a:prstGeom prst="rect">
-            <a:avLst/>
-          </a:prstGeom>
-          <a:noFill/>
-          <a:extLst>
-            <a:ext uri="{909E8E84-426E-40DD-AFC4-6F175D3DCCD1}">
-              <a14:hiddenFill xmlns:a14="http://schemas.microsoft.com/office/drawing/2010/main">
-                <a:solidFill>
-                  <a:srgbClr val="FFFFFF"/>
-                </a:solidFill>
-              </a14:hiddenFill>
-            </a:ext>
-          </a:extLst>
-        </p:spPr>
-      </p:pic>
-      <p:pic>
-        <p:nvPicPr>
-          <p:cNvPr id="9" name="Picture 18" descr="Image result for Yatego">
-            <a:extLst>
-              <a:ext uri="{FF2B5EF4-FFF2-40B4-BE49-F238E27FC236}">
-                <a16:creationId xmlns:a16="http://schemas.microsoft.com/office/drawing/2014/main" id="{D393A258-C061-417A-BE79-6269341F674C}"/>
-              </a:ext>
-            </a:extLst>
-          </p:cNvPr>
-          <p:cNvPicPr>
-            <a:picLocks noChangeAspect="1" noChangeArrowheads="1"/>
-          </p:cNvPicPr>
-          <p:nvPr/>
-        </p:nvPicPr>
-        <p:blipFill>
-          <a:blip r:embed="rId8">
-            <a:extLst>
-              <a:ext uri="{28A0092B-C50C-407E-A947-70E740481C1C}">
-                <a14:useLocalDpi xmlns:a14="http://schemas.microsoft.com/office/drawing/2010/main" val="0"/>
-              </a:ext>
-            </a:extLst>
-          </a:blip>
-          <a:srcRect/>
-          <a:stretch>
-            <a:fillRect/>
-          </a:stretch>
-        </p:blipFill>
-        <p:spPr bwMode="auto">
-          <a:xfrm>
-            <a:off x="4972165" y="5095835"/>
-            <a:ext cx="2723430" cy="754107"/>
-          </a:xfrm>
-          <a:prstGeom prst="rect">
-            <a:avLst/>
-          </a:prstGeom>
-          <a:noFill/>
-          <a:extLst>
-            <a:ext uri="{909E8E84-426E-40DD-AFC4-6F175D3DCCD1}">
-              <a14:hiddenFill xmlns:a14="http://schemas.microsoft.com/office/drawing/2010/main">
-                <a:solidFill>
-                  <a:srgbClr val="FFFFFF"/>
-                </a:solidFill>
-              </a14:hiddenFill>
-            </a:ext>
-          </a:extLst>
-        </p:spPr>
-      </p:pic>
-      <p:pic>
-        <p:nvPicPr>
-          <p:cNvPr id="10" name="Picture 26" descr="Image result for zalando logo">
-            <a:extLst>
-              <a:ext uri="{FF2B5EF4-FFF2-40B4-BE49-F238E27FC236}">
-                <a16:creationId xmlns:a16="http://schemas.microsoft.com/office/drawing/2014/main" id="{9FE8C1FD-AC3A-4551-A85F-CAE3A593541B}"/>
-              </a:ext>
-            </a:extLst>
-          </p:cNvPr>
-          <p:cNvPicPr>
-            <a:picLocks noChangeAspect="1" noChangeArrowheads="1"/>
-          </p:cNvPicPr>
-          <p:nvPr/>
-        </p:nvPicPr>
-        <p:blipFill rotWithShape="1">
-          <a:blip r:embed="rId9" cstate="print">
-            <a:duotone>
-              <a:schemeClr val="accent1">
-                <a:shade val="45000"/>
-                <a:satMod val="135000"/>
-              </a:schemeClr>
-              <a:prstClr val="white"/>
-            </a:duotone>
-            <a:extLst>
-              <a:ext uri="{28A0092B-C50C-407E-A947-70E740481C1C}">
-                <a14:useLocalDpi xmlns:a14="http://schemas.microsoft.com/office/drawing/2010/main" val="0"/>
-              </a:ext>
-            </a:extLst>
-          </a:blip>
-          <a:srcRect l="15772" t="26448" r="16761" b="24516"/>
-          <a:stretch/>
-        </p:blipFill>
-        <p:spPr bwMode="auto">
-          <a:xfrm>
-            <a:off x="285745" y="2418022"/>
-            <a:ext cx="2990130" cy="610231"/>
-          </a:xfrm>
-          <a:prstGeom prst="rect">
-            <a:avLst/>
-          </a:prstGeom>
-          <a:noFill/>
-          <a:extLst>
-            <a:ext uri="{909E8E84-426E-40DD-AFC4-6F175D3DCCD1}">
-              <a14:hiddenFill xmlns:a14="http://schemas.microsoft.com/office/drawing/2010/main">
-                <a:solidFill>
-                  <a:srgbClr val="FFFFFF"/>
-                </a:solidFill>
-              </a14:hiddenFill>
-            </a:ext>
-          </a:extLst>
-        </p:spPr>
-      </p:pic>
-      <p:pic>
-        <p:nvPicPr>
-          <p:cNvPr id="11" name="Picture 30" descr="Image result for kunayah logo">
-            <a:extLst>
-              <a:ext uri="{FF2B5EF4-FFF2-40B4-BE49-F238E27FC236}">
-                <a16:creationId xmlns:a16="http://schemas.microsoft.com/office/drawing/2014/main" id="{E5B96754-5658-4742-9715-ACCC11B2BA26}"/>
-              </a:ext>
-            </a:extLst>
-          </p:cNvPr>
-          <p:cNvPicPr>
-            <a:picLocks noChangeAspect="1" noChangeArrowheads="1"/>
-          </p:cNvPicPr>
-          <p:nvPr/>
-        </p:nvPicPr>
-        <p:blipFill rotWithShape="1">
-          <a:blip r:embed="rId10">
-            <a:extLst>
-              <a:ext uri="{28A0092B-C50C-407E-A947-70E740481C1C}">
-                <a14:useLocalDpi xmlns:a14="http://schemas.microsoft.com/office/drawing/2010/main" val="0"/>
-              </a:ext>
-            </a:extLst>
-          </a:blip>
-          <a:srcRect l="11172" r="12578" b="37031"/>
-          <a:stretch/>
-        </p:blipFill>
-        <p:spPr bwMode="auto">
-          <a:xfrm>
-            <a:off x="8075612" y="4611122"/>
-            <a:ext cx="3486870" cy="1439763"/>
-          </a:xfrm>
-          <a:prstGeom prst="rect">
-            <a:avLst/>
-          </a:prstGeom>
-          <a:noFill/>
-          <a:extLst>
-            <a:ext uri="{909E8E84-426E-40DD-AFC4-6F175D3DCCD1}">
-              <a14:hiddenFill xmlns:a14="http://schemas.microsoft.com/office/drawing/2010/main">
-                <a:solidFill>
-                  <a:srgbClr val="FFFFFF"/>
-                </a:solidFill>
-              </a14:hiddenFill>
-            </a:ext>
-          </a:extLst>
-        </p:spPr>
-      </p:pic>
-    </p:spTree>
-    <p:extLst>
-      <p:ext uri="{BB962C8B-B14F-4D97-AF65-F5344CB8AC3E}">
-        <p14:creationId xmlns:p14="http://schemas.microsoft.com/office/powerpoint/2010/main" val="152172249"/>
-      </p:ext>
-    </p:extLst>
-  </p:cSld>
-  <p:clrMapOvr>
-    <a:masterClrMapping/>
-  </p:clrMapOvr>
-</p:sld>
-</file>
-
-<file path=ppt/slides/slide6.xml><?xml version="1.0" encoding="utf-8"?>
 <p:sld xmlns:a="http://schemas.openxmlformats.org/drawingml/2006/main" xmlns:r="http://schemas.openxmlformats.org/officeDocument/2006/relationships" xmlns:p="http://schemas.openxmlformats.org/presentationml/2006/main">
   <p:cSld>
     <p:spTree>
@@ -10177,7 +9637,7 @@
 </p:sld>
 </file>
 
-<file path=ppt/slides/slide7.xml><?xml version="1.0" encoding="utf-8"?>
+<file path=ppt/slides/slide6.xml><?xml version="1.0" encoding="utf-8"?>
 <p:sld xmlns:a="http://schemas.openxmlformats.org/drawingml/2006/main" xmlns:r="http://schemas.openxmlformats.org/officeDocument/2006/relationships" xmlns:p="http://schemas.openxmlformats.org/presentationml/2006/main">
   <p:cSld>
     <p:spTree>
@@ -10393,104 +9853,6 @@
           </a:extLst>
         </p:spPr>
       </p:pic>
-      <p:sp>
-        <p:nvSpPr>
-          <p:cNvPr id="6" name="Rectangular Callout 3">
-            <a:extLst>
-              <a:ext uri="{FF2B5EF4-FFF2-40B4-BE49-F238E27FC236}">
-                <a16:creationId xmlns:a16="http://schemas.microsoft.com/office/drawing/2014/main" id="{87B466A2-E8A6-4A4C-871D-976DD462088E}"/>
-              </a:ext>
-            </a:extLst>
-          </p:cNvPr>
-          <p:cNvSpPr/>
-          <p:nvPr/>
-        </p:nvSpPr>
-        <p:spPr>
-          <a:xfrm>
-            <a:off x="580153" y="4419600"/>
-            <a:ext cx="2790344" cy="1828800"/>
-          </a:xfrm>
-          <a:prstGeom prst="wedgeRectCallout">
-            <a:avLst>
-              <a:gd name="adj1" fmla="val 21199"/>
-              <a:gd name="adj2" fmla="val -64064"/>
-            </a:avLst>
-          </a:prstGeom>
-          <a:ln>
-            <a:miter lim="800000"/>
-          </a:ln>
-        </p:spPr>
-        <p:style>
-          <a:lnRef idx="2">
-            <a:schemeClr val="accent1">
-              <a:shade val="50000"/>
-            </a:schemeClr>
-          </a:lnRef>
-          <a:fillRef idx="1">
-            <a:schemeClr val="accent1"/>
-          </a:fillRef>
-          <a:effectRef idx="0">
-            <a:schemeClr val="accent1"/>
-          </a:effectRef>
-          <a:fontRef idx="minor">
-            <a:schemeClr val="lt1"/>
-          </a:fontRef>
-        </p:style>
-        <p:txBody>
-          <a:bodyPr rtlCol="0" anchor="ctr"/>
-          <a:lstStyle/>
-          <a:p>
-            <a:pPr marL="285750" indent="-285750" algn="ctr">
-              <a:buFont typeface="Arial" panose="020B0604020202020204" pitchFamily="34" charset="0"/>
-              <a:buChar char="•"/>
-            </a:pPr>
-            <a:r>
-              <a:rPr lang="en-US" sz="1600" dirty="0"/>
-              <a:t>Artificial Intelligence</a:t>
-            </a:r>
-          </a:p>
-          <a:p>
-            <a:pPr marL="285750" indent="-285750" algn="ctr">
-              <a:buFont typeface="Arial" panose="020B0604020202020204" pitchFamily="34" charset="0"/>
-              <a:buChar char="•"/>
-            </a:pPr>
-            <a:r>
-              <a:rPr lang="en-US" sz="1600" dirty="0"/>
-              <a:t>Deep Learning</a:t>
-            </a:r>
-          </a:p>
-          <a:p>
-            <a:pPr marL="285750" indent="-285750" algn="ctr">
-              <a:buFont typeface="Arial" panose="020B0604020202020204" pitchFamily="34" charset="0"/>
-              <a:buChar char="•"/>
-            </a:pPr>
-            <a:r>
-              <a:rPr lang="en-US" sz="1600" dirty="0"/>
-              <a:t>Data science</a:t>
-            </a:r>
-          </a:p>
-          <a:p>
-            <a:pPr marL="285750" indent="-285750" algn="ctr">
-              <a:buFont typeface="Arial" panose="020B0604020202020204" pitchFamily="34" charset="0"/>
-              <a:buChar char="•"/>
-            </a:pPr>
-            <a:r>
-              <a:rPr lang="en-US" sz="1600" dirty="0"/>
-              <a:t>Machine Learning</a:t>
-            </a:r>
-          </a:p>
-          <a:p>
-            <a:pPr marL="285750" indent="-285750" algn="ctr">
-              <a:buFont typeface="Arial" panose="020B0604020202020204" pitchFamily="34" charset="0"/>
-              <a:buChar char="•"/>
-            </a:pPr>
-            <a:r>
-              <a:rPr lang="en-US" sz="1600" dirty="0"/>
-              <a:t>Digital Image Processing</a:t>
-            </a:r>
-          </a:p>
-        </p:txBody>
-      </p:sp>
       <p:pic>
         <p:nvPicPr>
           <p:cNvPr id="7" name="Picture 6">
@@ -10729,6 +10091,104 @@
             <a:r>
               <a:rPr lang="en-US" sz="1600" dirty="0"/>
               <a:t>Entrepreneurship and Management</a:t>
+            </a:r>
+          </a:p>
+        </p:txBody>
+      </p:sp>
+      <p:sp>
+        <p:nvSpPr>
+          <p:cNvPr id="6" name="Rectangular Callout 3">
+            <a:extLst>
+              <a:ext uri="{FF2B5EF4-FFF2-40B4-BE49-F238E27FC236}">
+                <a16:creationId xmlns:a16="http://schemas.microsoft.com/office/drawing/2014/main" id="{87B466A2-E8A6-4A4C-871D-976DD462088E}"/>
+              </a:ext>
+            </a:extLst>
+          </p:cNvPr>
+          <p:cNvSpPr/>
+          <p:nvPr/>
+        </p:nvSpPr>
+        <p:spPr>
+          <a:xfrm>
+            <a:off x="836946" y="4694238"/>
+            <a:ext cx="2790344" cy="1828800"/>
+          </a:xfrm>
+          <a:prstGeom prst="wedgeRectCallout">
+            <a:avLst>
+              <a:gd name="adj1" fmla="val 21199"/>
+              <a:gd name="adj2" fmla="val -64064"/>
+            </a:avLst>
+          </a:prstGeom>
+          <a:ln>
+            <a:miter lim="800000"/>
+          </a:ln>
+        </p:spPr>
+        <p:style>
+          <a:lnRef idx="2">
+            <a:schemeClr val="accent1">
+              <a:shade val="50000"/>
+            </a:schemeClr>
+          </a:lnRef>
+          <a:fillRef idx="1">
+            <a:schemeClr val="accent1"/>
+          </a:fillRef>
+          <a:effectRef idx="0">
+            <a:schemeClr val="accent1"/>
+          </a:effectRef>
+          <a:fontRef idx="minor">
+            <a:schemeClr val="lt1"/>
+          </a:fontRef>
+        </p:style>
+        <p:txBody>
+          <a:bodyPr rtlCol="0" anchor="ctr"/>
+          <a:lstStyle/>
+          <a:p>
+            <a:pPr marL="285750" indent="-285750" algn="ctr">
+              <a:buFont typeface="Arial" panose="020B0604020202020204" pitchFamily="34" charset="0"/>
+              <a:buChar char="•"/>
+            </a:pPr>
+            <a:r>
+              <a:rPr lang="en-US" sz="1600" dirty="0"/>
+              <a:t>Artificial Intelligence</a:t>
+            </a:r>
+          </a:p>
+          <a:p>
+            <a:pPr marL="285750" indent="-285750" algn="ctr">
+              <a:buFont typeface="Arial" panose="020B0604020202020204" pitchFamily="34" charset="0"/>
+              <a:buChar char="•"/>
+            </a:pPr>
+            <a:r>
+              <a:rPr lang="en-US" sz="1600" dirty="0"/>
+              <a:t>Deep Learning</a:t>
+            </a:r>
+          </a:p>
+          <a:p>
+            <a:pPr marL="285750" indent="-285750" algn="ctr">
+              <a:buFont typeface="Arial" panose="020B0604020202020204" pitchFamily="34" charset="0"/>
+              <a:buChar char="•"/>
+            </a:pPr>
+            <a:r>
+              <a:rPr lang="en-US" sz="1600" dirty="0"/>
+              <a:t>Data science</a:t>
+            </a:r>
+          </a:p>
+          <a:p>
+            <a:pPr marL="285750" indent="-285750" algn="ctr">
+              <a:buFont typeface="Arial" panose="020B0604020202020204" pitchFamily="34" charset="0"/>
+              <a:buChar char="•"/>
+            </a:pPr>
+            <a:r>
+              <a:rPr lang="en-US" sz="1600" dirty="0"/>
+              <a:t>Machine Learning</a:t>
+            </a:r>
+          </a:p>
+          <a:p>
+            <a:pPr marL="285750" indent="-285750" algn="ctr">
+              <a:buFont typeface="Arial" panose="020B0604020202020204" pitchFamily="34" charset="0"/>
+              <a:buChar char="•"/>
+            </a:pPr>
+            <a:r>
+              <a:rPr lang="en-US" sz="1600" dirty="0"/>
+              <a:t>Digital Image Processing</a:t>
             </a:r>
           </a:p>
         </p:txBody>
@@ -11107,16 +10567,16 @@
       </p:par>
     </p:tnLst>
     <p:bldLst>
-      <p:bldP spid="6" grpId="0" animBg="1"/>
       <p:bldP spid="8" grpId="0" animBg="1"/>
       <p:bldP spid="9" grpId="0" animBg="1"/>
       <p:bldP spid="10" grpId="0" animBg="1"/>
+      <p:bldP spid="6" grpId="0" animBg="1"/>
     </p:bldLst>
   </p:timing>
 </p:sld>
 </file>
 
-<file path=ppt/slides/slide8.xml><?xml version="1.0" encoding="utf-8"?>
+<file path=ppt/slides/slide7.xml><?xml version="1.0" encoding="utf-8"?>
 <p:sld xmlns:a="http://schemas.openxmlformats.org/drawingml/2006/main" xmlns:r="http://schemas.openxmlformats.org/officeDocument/2006/relationships" xmlns:p="http://schemas.openxmlformats.org/presentationml/2006/main">
   <p:cSld>
     <p:spTree>
@@ -11711,60 +11171,6 @@
       </p:pic>
       <p:pic>
         <p:nvPicPr>
-          <p:cNvPr id="9" name="Picture 14" descr="Image result for tensorflow png">
-            <a:extLst>
-              <a:ext uri="{FF2B5EF4-FFF2-40B4-BE49-F238E27FC236}">
-                <a16:creationId xmlns:a16="http://schemas.microsoft.com/office/drawing/2014/main" id="{42FAEC33-60E9-415F-80F1-7C9492287991}"/>
-              </a:ext>
-            </a:extLst>
-          </p:cNvPr>
-          <p:cNvPicPr>
-            <a:picLocks noChangeAspect="1" noChangeArrowheads="1"/>
-          </p:cNvPicPr>
-          <p:nvPr/>
-        </p:nvPicPr>
-        <p:blipFill>
-          <a:blip r:embed="rId7" cstate="print">
-            <a:duotone>
-              <a:schemeClr val="accent1">
-                <a:shade val="45000"/>
-                <a:satMod val="135000"/>
-              </a:schemeClr>
-              <a:prstClr val="white"/>
-            </a:duotone>
-            <a:extLst>
-              <a:ext uri="{28A0092B-C50C-407E-A947-70E740481C1C}">
-                <a14:useLocalDpi xmlns:a14="http://schemas.microsoft.com/office/drawing/2010/main" val="0"/>
-              </a:ext>
-            </a:extLst>
-          </a:blip>
-          <a:srcRect/>
-          <a:stretch>
-            <a:fillRect/>
-          </a:stretch>
-        </p:blipFill>
-        <p:spPr bwMode="auto">
-          <a:xfrm>
-            <a:off x="7273130" y="4816760"/>
-            <a:ext cx="3393282" cy="1138796"/>
-          </a:xfrm>
-          <a:prstGeom prst="rect">
-            <a:avLst/>
-          </a:prstGeom>
-          <a:noFill/>
-          <a:extLst>
-            <a:ext uri="{909E8E84-426E-40DD-AFC4-6F175D3DCCD1}">
-              <a14:hiddenFill xmlns:a14="http://schemas.microsoft.com/office/drawing/2010/main">
-                <a:solidFill>
-                  <a:srgbClr val="FFFFFF"/>
-                </a:solidFill>
-              </a14:hiddenFill>
-            </a:ext>
-          </a:extLst>
-        </p:spPr>
-      </p:pic>
-      <p:pic>
-        <p:nvPicPr>
           <p:cNvPr id="10" name="Picture 18" descr="Image result for aws png">
             <a:extLst>
               <a:ext uri="{FF2B5EF4-FFF2-40B4-BE49-F238E27FC236}">
@@ -11778,7 +11184,7 @@
           <p:nvPr/>
         </p:nvPicPr>
         <p:blipFill>
-          <a:blip r:embed="rId8" cstate="print">
+          <a:blip r:embed="rId7" cstate="print">
             <a:duotone>
               <a:schemeClr val="accent1">
                 <a:shade val="45000"/>
@@ -12001,7 +11407,7 @@
                                           </p:stCondLst>
                                         </p:cTn>
                                         <p:tgtEl>
-                                          <p:spTgt spid="9"/>
+                                          <p:spTgt spid="7"/>
                                         </p:tgtEl>
                                         <p:attrNameLst>
                                           <p:attrName>style.visibility</p:attrName>
@@ -12015,7 +11421,7 @@
                                       <p:cBhvr>
                                         <p:cTn id="19" dur="500"/>
                                         <p:tgtEl>
-                                          <p:spTgt spid="9"/>
+                                          <p:spTgt spid="7"/>
                                         </p:tgtEl>
                                       </p:cBhvr>
                                     </p:animEffect>
@@ -12036,7 +11442,7 @@
                                           </p:stCondLst>
                                         </p:cTn>
                                         <p:tgtEl>
-                                          <p:spTgt spid="7"/>
+                                          <p:spTgt spid="10"/>
                                         </p:tgtEl>
                                         <p:attrNameLst>
                                           <p:attrName>style.visibility</p:attrName>
@@ -12049,41 +11455,6 @@
                                     <p:animEffect transition="in" filter="fade">
                                       <p:cBhvr>
                                         <p:cTn id="22" dur="500"/>
-                                        <p:tgtEl>
-                                          <p:spTgt spid="7"/>
-                                        </p:tgtEl>
-                                      </p:cBhvr>
-                                    </p:animEffect>
-                                  </p:childTnLst>
-                                </p:cTn>
-                              </p:par>
-                              <p:par>
-                                <p:cTn id="23" presetID="10" presetClass="entr" presetSubtype="0" fill="hold" nodeType="withEffect">
-                                  <p:stCondLst>
-                                    <p:cond delay="0"/>
-                                  </p:stCondLst>
-                                  <p:childTnLst>
-                                    <p:set>
-                                      <p:cBhvr>
-                                        <p:cTn id="24" dur="1" fill="hold">
-                                          <p:stCondLst>
-                                            <p:cond delay="0"/>
-                                          </p:stCondLst>
-                                        </p:cTn>
-                                        <p:tgtEl>
-                                          <p:spTgt spid="10"/>
-                                        </p:tgtEl>
-                                        <p:attrNameLst>
-                                          <p:attrName>style.visibility</p:attrName>
-                                        </p:attrNameLst>
-                                      </p:cBhvr>
-                                      <p:to>
-                                        <p:strVal val="visible"/>
-                                      </p:to>
-                                    </p:set>
-                                    <p:animEffect transition="in" filter="fade">
-                                      <p:cBhvr>
-                                        <p:cTn id="25" dur="500"/>
                                         <p:tgtEl>
                                           <p:spTgt spid="10"/>
                                         </p:tgtEl>
@@ -12123,6 +11494,92 @@
 </p:sld>
 </file>
 
+<file path=ppt/slides/slide8.xml><?xml version="1.0" encoding="utf-8"?>
+<p:sld xmlns:a="http://schemas.openxmlformats.org/drawingml/2006/main" xmlns:r="http://schemas.openxmlformats.org/officeDocument/2006/relationships" xmlns:p="http://schemas.openxmlformats.org/presentationml/2006/main">
+  <p:cSld>
+    <p:spTree>
+      <p:nvGrpSpPr>
+        <p:cNvPr id="1" name=""/>
+        <p:cNvGrpSpPr/>
+        <p:nvPr/>
+      </p:nvGrpSpPr>
+      <p:grpSpPr>
+        <a:xfrm>
+          <a:off x="0" y="0"/>
+          <a:ext cx="0" cy="0"/>
+          <a:chOff x="0" y="0"/>
+          <a:chExt cx="0" cy="0"/>
+        </a:xfrm>
+      </p:grpSpPr>
+      <p:sp>
+        <p:nvSpPr>
+          <p:cNvPr id="2" name="Title 1">
+            <a:extLst>
+              <a:ext uri="{FF2B5EF4-FFF2-40B4-BE49-F238E27FC236}">
+                <a16:creationId xmlns:a16="http://schemas.microsoft.com/office/drawing/2014/main" id="{F79BA665-956C-4436-ADC9-115CB926BF18}"/>
+              </a:ext>
+            </a:extLst>
+          </p:cNvPr>
+          <p:cNvSpPr>
+            <a:spLocks noGrp="1"/>
+          </p:cNvSpPr>
+          <p:nvPr>
+            <p:ph type="title"/>
+          </p:nvPr>
+        </p:nvSpPr>
+        <p:spPr/>
+        <p:txBody>
+          <a:bodyPr/>
+          <a:lstStyle/>
+          <a:p>
+            <a:r>
+              <a:rPr lang="en-US" dirty="0"/>
+              <a:t>Proposal feedback</a:t>
+            </a:r>
+          </a:p>
+        </p:txBody>
+      </p:sp>
+      <p:sp>
+        <p:nvSpPr>
+          <p:cNvPr id="3" name="Content Placeholder 2">
+            <a:extLst>
+              <a:ext uri="{FF2B5EF4-FFF2-40B4-BE49-F238E27FC236}">
+                <a16:creationId xmlns:a16="http://schemas.microsoft.com/office/drawing/2014/main" id="{B963DB0C-CBBA-4451-9BB1-4C4A0ED64775}"/>
+              </a:ext>
+            </a:extLst>
+          </p:cNvPr>
+          <p:cNvSpPr>
+            <a:spLocks noGrp="1"/>
+          </p:cNvSpPr>
+          <p:nvPr>
+            <p:ph idx="1"/>
+          </p:nvPr>
+        </p:nvSpPr>
+        <p:spPr/>
+        <p:txBody>
+          <a:bodyPr/>
+          <a:lstStyle/>
+          <a:p>
+            <a:r>
+              <a:rPr lang="en-US" dirty="0"/>
+              <a:t>When we started off, we wanted to incorporate a module of Artificial Intelligence and Digital Image Processing </a:t>
+            </a:r>
+          </a:p>
+        </p:txBody>
+      </p:sp>
+    </p:spTree>
+    <p:extLst>
+      <p:ext uri="{BB962C8B-B14F-4D97-AF65-F5344CB8AC3E}">
+        <p14:creationId xmlns:p14="http://schemas.microsoft.com/office/powerpoint/2010/main" val="3115972743"/>
+      </p:ext>
+    </p:extLst>
+  </p:cSld>
+  <p:clrMapOvr>
+    <a:masterClrMapping/>
+  </p:clrMapOvr>
+</p:sld>
+</file>
+
 <file path=ppt/slides/slide9.xml><?xml version="1.0" encoding="utf-8"?>
 <p:sld xmlns:a="http://schemas.openxmlformats.org/drawingml/2006/main" xmlns:r="http://schemas.openxmlformats.org/officeDocument/2006/relationships" xmlns:p="http://schemas.openxmlformats.org/presentationml/2006/main">
   <p:cSld>
@@ -12145,7 +11602,7 @@
           <p:cNvPr id="2" name="Title 1">
             <a:extLst>
               <a:ext uri="{FF2B5EF4-FFF2-40B4-BE49-F238E27FC236}">
-                <a16:creationId xmlns:a16="http://schemas.microsoft.com/office/drawing/2014/main" id="{F79BA665-956C-4436-ADC9-115CB926BF18}"/>
+                <a16:creationId xmlns:a16="http://schemas.microsoft.com/office/drawing/2014/main" id="{62EF31A1-7452-4EF4-B263-015677E34336}"/>
               </a:ext>
             </a:extLst>
           </p:cNvPr>
@@ -12163,7 +11620,7 @@
           <a:p>
             <a:r>
               <a:rPr lang="en-US" dirty="0"/>
-              <a:t>Proposal feedback</a:t>
+              <a:t>Feedback taken into account</a:t>
             </a:r>
           </a:p>
         </p:txBody>
@@ -12173,7 +11630,7 @@
           <p:cNvPr id="3" name="Content Placeholder 2">
             <a:extLst>
               <a:ext uri="{FF2B5EF4-FFF2-40B4-BE49-F238E27FC236}">
-                <a16:creationId xmlns:a16="http://schemas.microsoft.com/office/drawing/2014/main" id="{B963DB0C-CBBA-4451-9BB1-4C4A0ED64775}"/>
+                <a16:creationId xmlns:a16="http://schemas.microsoft.com/office/drawing/2014/main" id="{2068CF96-761E-4149-89D8-F481FDC9090C}"/>
               </a:ext>
             </a:extLst>
           </p:cNvPr>
@@ -12189,14 +11646,14 @@
           <a:bodyPr/>
           <a:lstStyle/>
           <a:p>
-            <a:endParaRPr lang="en-US" dirty="0"/>
+            <a:endParaRPr lang="en-US"/>
           </a:p>
         </p:txBody>
       </p:sp>
     </p:spTree>
     <p:extLst>
       <p:ext uri="{BB962C8B-B14F-4D97-AF65-F5344CB8AC3E}">
-        <p14:creationId xmlns:p14="http://schemas.microsoft.com/office/powerpoint/2010/main" val="3115972743"/>
+        <p14:creationId xmlns:p14="http://schemas.microsoft.com/office/powerpoint/2010/main" val="845203596"/>
       </p:ext>
     </p:extLst>
   </p:cSld>

</xml_diff>

<commit_message>
Updated the ppt for Evaluation I
</commit_message>
<xml_diff>
--- a/Kaavish Evaluation I/Evaluation I.pptx
+++ b/Kaavish Evaluation I/Evaluation I.pptx
@@ -10,16 +10,15 @@
     <p:sldId id="258" r:id="rId4"/>
     <p:sldId id="259" r:id="rId5"/>
     <p:sldId id="260" r:id="rId6"/>
-    <p:sldId id="262" r:id="rId7"/>
-    <p:sldId id="263" r:id="rId8"/>
+    <p:sldId id="263" r:id="rId7"/>
+    <p:sldId id="262" r:id="rId8"/>
     <p:sldId id="267" r:id="rId9"/>
-    <p:sldId id="268" r:id="rId10"/>
-    <p:sldId id="269" r:id="rId11"/>
-    <p:sldId id="270" r:id="rId12"/>
-    <p:sldId id="271" r:id="rId13"/>
-    <p:sldId id="272" r:id="rId14"/>
-    <p:sldId id="273" r:id="rId15"/>
-    <p:sldId id="264" r:id="rId16"/>
+    <p:sldId id="269" r:id="rId10"/>
+    <p:sldId id="270" r:id="rId11"/>
+    <p:sldId id="271" r:id="rId12"/>
+    <p:sldId id="272" r:id="rId13"/>
+    <p:sldId id="273" r:id="rId14"/>
+    <p:sldId id="264" r:id="rId15"/>
   </p:sldIdLst>
   <p:sldSz cx="12192000" cy="6858000"/>
   <p:notesSz cx="6858000" cy="9144000"/>
@@ -5932,89 +5931,6 @@
           <p:cNvPr id="2" name="Title 1">
             <a:extLst>
               <a:ext uri="{FF2B5EF4-FFF2-40B4-BE49-F238E27FC236}">
-                <a16:creationId xmlns:a16="http://schemas.microsoft.com/office/drawing/2014/main" id="{14703E39-E430-4B50-A2DB-D169662EB9EC}"/>
-              </a:ext>
-            </a:extLst>
-          </p:cNvPr>
-          <p:cNvSpPr>
-            <a:spLocks noGrp="1"/>
-          </p:cNvSpPr>
-          <p:nvPr>
-            <p:ph type="title"/>
-          </p:nvPr>
-        </p:nvSpPr>
-        <p:spPr/>
-        <p:txBody>
-          <a:bodyPr/>
-          <a:lstStyle/>
-          <a:p>
-            <a:r>
-              <a:rPr lang="en-US" dirty="0"/>
-              <a:t>Project Backlog</a:t>
-            </a:r>
-          </a:p>
-        </p:txBody>
-      </p:sp>
-      <p:sp>
-        <p:nvSpPr>
-          <p:cNvPr id="3" name="Content Placeholder 2">
-            <a:extLst>
-              <a:ext uri="{FF2B5EF4-FFF2-40B4-BE49-F238E27FC236}">
-                <a16:creationId xmlns:a16="http://schemas.microsoft.com/office/drawing/2014/main" id="{3CE9087A-016F-42D0-BAF3-8C3AEB5B9E01}"/>
-              </a:ext>
-            </a:extLst>
-          </p:cNvPr>
-          <p:cNvSpPr>
-            <a:spLocks noGrp="1"/>
-          </p:cNvSpPr>
-          <p:nvPr>
-            <p:ph idx="1"/>
-          </p:nvPr>
-        </p:nvSpPr>
-        <p:spPr/>
-        <p:txBody>
-          <a:bodyPr/>
-          <a:lstStyle/>
-          <a:p>
-            <a:endParaRPr lang="en-US" dirty="0"/>
-          </a:p>
-        </p:txBody>
-      </p:sp>
-    </p:spTree>
-    <p:extLst>
-      <p:ext uri="{BB962C8B-B14F-4D97-AF65-F5344CB8AC3E}">
-        <p14:creationId xmlns:p14="http://schemas.microsoft.com/office/powerpoint/2010/main" val="386003673"/>
-      </p:ext>
-    </p:extLst>
-  </p:cSld>
-  <p:clrMapOvr>
-    <a:masterClrMapping/>
-  </p:clrMapOvr>
-</p:sld>
-</file>
-
-<file path=ppt/slides/slide11.xml><?xml version="1.0" encoding="utf-8"?>
-<p:sld xmlns:a="http://schemas.openxmlformats.org/drawingml/2006/main" xmlns:r="http://schemas.openxmlformats.org/officeDocument/2006/relationships" xmlns:p="http://schemas.openxmlformats.org/presentationml/2006/main">
-  <p:cSld>
-    <p:spTree>
-      <p:nvGrpSpPr>
-        <p:cNvPr id="1" name=""/>
-        <p:cNvGrpSpPr/>
-        <p:nvPr/>
-      </p:nvGrpSpPr>
-      <p:grpSpPr>
-        <a:xfrm>
-          <a:off x="0" y="0"/>
-          <a:ext cx="0" cy="0"/>
-          <a:chOff x="0" y="0"/>
-          <a:chExt cx="0" cy="0"/>
-        </a:xfrm>
-      </p:grpSpPr>
-      <p:sp>
-        <p:nvSpPr>
-          <p:cNvPr id="2" name="Title 1">
-            <a:extLst>
-              <a:ext uri="{FF2B5EF4-FFF2-40B4-BE49-F238E27FC236}">
                 <a16:creationId xmlns:a16="http://schemas.microsoft.com/office/drawing/2014/main" id="{FD9A3C93-AAF9-4379-B580-E7B76D0CA9E4}"/>
               </a:ext>
             </a:extLst>
@@ -6076,7 +5992,7 @@
 </p:sld>
 </file>
 
-<file path=ppt/slides/slide12.xml><?xml version="1.0" encoding="utf-8"?>
+<file path=ppt/slides/slide11.xml><?xml version="1.0" encoding="utf-8"?>
 <p:sld xmlns:a="http://schemas.openxmlformats.org/drawingml/2006/main" xmlns:r="http://schemas.openxmlformats.org/officeDocument/2006/relationships" xmlns:p="http://schemas.openxmlformats.org/presentationml/2006/main">
   <p:cSld>
     <p:spTree>
@@ -6220,6 +6136,89 @@
 </p:sld>
 </file>
 
+<file path=ppt/slides/slide12.xml><?xml version="1.0" encoding="utf-8"?>
+<p:sld xmlns:a="http://schemas.openxmlformats.org/drawingml/2006/main" xmlns:r="http://schemas.openxmlformats.org/officeDocument/2006/relationships" xmlns:p="http://schemas.openxmlformats.org/presentationml/2006/main">
+  <p:cSld>
+    <p:spTree>
+      <p:nvGrpSpPr>
+        <p:cNvPr id="1" name=""/>
+        <p:cNvGrpSpPr/>
+        <p:nvPr/>
+      </p:nvGrpSpPr>
+      <p:grpSpPr>
+        <a:xfrm>
+          <a:off x="0" y="0"/>
+          <a:ext cx="0" cy="0"/>
+          <a:chOff x="0" y="0"/>
+          <a:chExt cx="0" cy="0"/>
+        </a:xfrm>
+      </p:grpSpPr>
+      <p:sp>
+        <p:nvSpPr>
+          <p:cNvPr id="2" name="Title 1">
+            <a:extLst>
+              <a:ext uri="{FF2B5EF4-FFF2-40B4-BE49-F238E27FC236}">
+                <a16:creationId xmlns:a16="http://schemas.microsoft.com/office/drawing/2014/main" id="{EE154EAA-EDB8-4C95-B696-92D63E36F1AE}"/>
+              </a:ext>
+            </a:extLst>
+          </p:cNvPr>
+          <p:cNvSpPr>
+            <a:spLocks noGrp="1"/>
+          </p:cNvSpPr>
+          <p:nvPr>
+            <p:ph type="title"/>
+          </p:nvPr>
+        </p:nvSpPr>
+        <p:spPr/>
+        <p:txBody>
+          <a:bodyPr/>
+          <a:lstStyle/>
+          <a:p>
+            <a:r>
+              <a:rPr lang="en-US" dirty="0"/>
+              <a:t>GUI mockups</a:t>
+            </a:r>
+          </a:p>
+        </p:txBody>
+      </p:sp>
+      <p:sp>
+        <p:nvSpPr>
+          <p:cNvPr id="3" name="Content Placeholder 2">
+            <a:extLst>
+              <a:ext uri="{FF2B5EF4-FFF2-40B4-BE49-F238E27FC236}">
+                <a16:creationId xmlns:a16="http://schemas.microsoft.com/office/drawing/2014/main" id="{F33A8E25-98D3-4658-93DF-BBA19F792977}"/>
+              </a:ext>
+            </a:extLst>
+          </p:cNvPr>
+          <p:cNvSpPr>
+            <a:spLocks noGrp="1"/>
+          </p:cNvSpPr>
+          <p:nvPr>
+            <p:ph idx="1"/>
+          </p:nvPr>
+        </p:nvSpPr>
+        <p:spPr/>
+        <p:txBody>
+          <a:bodyPr/>
+          <a:lstStyle/>
+          <a:p>
+            <a:endParaRPr lang="en-US"/>
+          </a:p>
+        </p:txBody>
+      </p:sp>
+    </p:spTree>
+    <p:extLst>
+      <p:ext uri="{BB962C8B-B14F-4D97-AF65-F5344CB8AC3E}">
+        <p14:creationId xmlns:p14="http://schemas.microsoft.com/office/powerpoint/2010/main" val="3368211307"/>
+      </p:ext>
+    </p:extLst>
+  </p:cSld>
+  <p:clrMapOvr>
+    <a:masterClrMapping/>
+  </p:clrMapOvr>
+</p:sld>
+</file>
+
 <file path=ppt/slides/slide13.xml><?xml version="1.0" encoding="utf-8"?>
 <p:sld xmlns:a="http://schemas.openxmlformats.org/drawingml/2006/main" xmlns:r="http://schemas.openxmlformats.org/officeDocument/2006/relationships" xmlns:p="http://schemas.openxmlformats.org/presentationml/2006/main">
   <p:cSld>
@@ -6242,89 +6241,6 @@
           <p:cNvPr id="2" name="Title 1">
             <a:extLst>
               <a:ext uri="{FF2B5EF4-FFF2-40B4-BE49-F238E27FC236}">
-                <a16:creationId xmlns:a16="http://schemas.microsoft.com/office/drawing/2014/main" id="{EE154EAA-EDB8-4C95-B696-92D63E36F1AE}"/>
-              </a:ext>
-            </a:extLst>
-          </p:cNvPr>
-          <p:cNvSpPr>
-            <a:spLocks noGrp="1"/>
-          </p:cNvSpPr>
-          <p:nvPr>
-            <p:ph type="title"/>
-          </p:nvPr>
-        </p:nvSpPr>
-        <p:spPr/>
-        <p:txBody>
-          <a:bodyPr/>
-          <a:lstStyle/>
-          <a:p>
-            <a:r>
-              <a:rPr lang="en-US" dirty="0"/>
-              <a:t>GUI mockups</a:t>
-            </a:r>
-          </a:p>
-        </p:txBody>
-      </p:sp>
-      <p:sp>
-        <p:nvSpPr>
-          <p:cNvPr id="3" name="Content Placeholder 2">
-            <a:extLst>
-              <a:ext uri="{FF2B5EF4-FFF2-40B4-BE49-F238E27FC236}">
-                <a16:creationId xmlns:a16="http://schemas.microsoft.com/office/drawing/2014/main" id="{F33A8E25-98D3-4658-93DF-BBA19F792977}"/>
-              </a:ext>
-            </a:extLst>
-          </p:cNvPr>
-          <p:cNvSpPr>
-            <a:spLocks noGrp="1"/>
-          </p:cNvSpPr>
-          <p:nvPr>
-            <p:ph idx="1"/>
-          </p:nvPr>
-        </p:nvSpPr>
-        <p:spPr/>
-        <p:txBody>
-          <a:bodyPr/>
-          <a:lstStyle/>
-          <a:p>
-            <a:endParaRPr lang="en-US"/>
-          </a:p>
-        </p:txBody>
-      </p:sp>
-    </p:spTree>
-    <p:extLst>
-      <p:ext uri="{BB962C8B-B14F-4D97-AF65-F5344CB8AC3E}">
-        <p14:creationId xmlns:p14="http://schemas.microsoft.com/office/powerpoint/2010/main" val="3368211307"/>
-      </p:ext>
-    </p:extLst>
-  </p:cSld>
-  <p:clrMapOvr>
-    <a:masterClrMapping/>
-  </p:clrMapOvr>
-</p:sld>
-</file>
-
-<file path=ppt/slides/slide14.xml><?xml version="1.0" encoding="utf-8"?>
-<p:sld xmlns:a="http://schemas.openxmlformats.org/drawingml/2006/main" xmlns:r="http://schemas.openxmlformats.org/officeDocument/2006/relationships" xmlns:p="http://schemas.openxmlformats.org/presentationml/2006/main">
-  <p:cSld>
-    <p:spTree>
-      <p:nvGrpSpPr>
-        <p:cNvPr id="1" name=""/>
-        <p:cNvGrpSpPr/>
-        <p:nvPr/>
-      </p:nvGrpSpPr>
-      <p:grpSpPr>
-        <a:xfrm>
-          <a:off x="0" y="0"/>
-          <a:ext cx="0" cy="0"/>
-          <a:chOff x="0" y="0"/>
-          <a:chExt cx="0" cy="0"/>
-        </a:xfrm>
-      </p:grpSpPr>
-      <p:sp>
-        <p:nvSpPr>
-          <p:cNvPr id="2" name="Title 1">
-            <a:extLst>
-              <a:ext uri="{FF2B5EF4-FFF2-40B4-BE49-F238E27FC236}">
                 <a16:creationId xmlns:a16="http://schemas.microsoft.com/office/drawing/2014/main" id="{CC28C357-CB72-47E1-9055-AC690CFB2696}"/>
               </a:ext>
             </a:extLst>
@@ -6386,7 +6302,7 @@
 </p:sld>
 </file>
 
-<file path=ppt/slides/slide15.xml><?xml version="1.0" encoding="utf-8"?>
+<file path=ppt/slides/slide14.xml><?xml version="1.0" encoding="utf-8"?>
 <p:sld xmlns:a="http://schemas.openxmlformats.org/drawingml/2006/main" xmlns:r="http://schemas.openxmlformats.org/officeDocument/2006/relationships" xmlns:p="http://schemas.openxmlformats.org/presentationml/2006/main">
   <p:cSld>
     <p:spTree>
@@ -9638,6 +9554,1157 @@
 </file>
 
 <file path=ppt/slides/slide6.xml><?xml version="1.0" encoding="utf-8"?>
+<p:sld xmlns:a="http://schemas.openxmlformats.org/drawingml/2006/main" xmlns:r="http://schemas.openxmlformats.org/officeDocument/2006/relationships" xmlns:p="http://schemas.openxmlformats.org/presentationml/2006/main">
+  <p:cSld>
+    <p:spTree>
+      <p:nvGrpSpPr>
+        <p:cNvPr id="1" name=""/>
+        <p:cNvGrpSpPr/>
+        <p:nvPr/>
+      </p:nvGrpSpPr>
+      <p:grpSpPr>
+        <a:xfrm>
+          <a:off x="0" y="0"/>
+          <a:ext cx="0" cy="0"/>
+          <a:chOff x="0" y="0"/>
+          <a:chExt cx="0" cy="0"/>
+        </a:xfrm>
+      </p:grpSpPr>
+      <p:sp>
+        <p:nvSpPr>
+          <p:cNvPr id="2" name="Title 1">
+            <a:extLst>
+              <a:ext uri="{FF2B5EF4-FFF2-40B4-BE49-F238E27FC236}">
+                <a16:creationId xmlns:a16="http://schemas.microsoft.com/office/drawing/2014/main" id="{1528F573-1228-4F47-A896-C17320E88411}"/>
+              </a:ext>
+            </a:extLst>
+          </p:cNvPr>
+          <p:cNvSpPr txBox="1">
+            <a:spLocks/>
+          </p:cNvSpPr>
+          <p:nvPr/>
+        </p:nvSpPr>
+        <p:spPr>
+          <a:xfrm>
+            <a:off x="1522414" y="274638"/>
+            <a:ext cx="9143998" cy="1020762"/>
+          </a:xfrm>
+          <a:prstGeom prst="rect">
+            <a:avLst/>
+          </a:prstGeom>
+        </p:spPr>
+        <p:txBody>
+          <a:bodyPr/>
+          <a:lstStyle>
+            <a:lvl1pPr algn="ctr" defTabSz="914400" rtl="0" eaLnBrk="1" latinLnBrk="0" hangingPunct="1">
+              <a:lnSpc>
+                <a:spcPct val="90000"/>
+              </a:lnSpc>
+              <a:spcBef>
+                <a:spcPct val="0"/>
+              </a:spcBef>
+              <a:buNone/>
+              <a:defRPr sz="3400" b="1" i="0" kern="1200" cap="all">
+                <a:solidFill>
+                  <a:schemeClr val="tx1"/>
+                </a:solidFill>
+                <a:effectLst>
+                  <a:outerShdw blurRad="50800" dist="63500" dir="2700000" algn="tl" rotWithShape="0">
+                    <a:srgbClr val="000000">
+                      <a:alpha val="48000"/>
+                    </a:srgbClr>
+                  </a:outerShdw>
+                </a:effectLst>
+                <a:latin typeface="+mj-lt"/>
+                <a:ea typeface="+mj-ea"/>
+                <a:cs typeface="+mj-cs"/>
+              </a:defRPr>
+            </a:lvl1pPr>
+          </a:lstStyle>
+          <a:p>
+            <a:r>
+              <a:rPr lang="en-US"/>
+              <a:t>Tools and Technologies</a:t>
+            </a:r>
+            <a:endParaRPr lang="en-US" dirty="0"/>
+          </a:p>
+        </p:txBody>
+      </p:sp>
+      <p:sp>
+        <p:nvSpPr>
+          <p:cNvPr id="3" name="Text Placeholder 3">
+            <a:extLst>
+              <a:ext uri="{FF2B5EF4-FFF2-40B4-BE49-F238E27FC236}">
+                <a16:creationId xmlns:a16="http://schemas.microsoft.com/office/drawing/2014/main" id="{F516A39C-82C6-4930-93A0-5A8E24253F54}"/>
+              </a:ext>
+            </a:extLst>
+          </p:cNvPr>
+          <p:cNvSpPr txBox="1">
+            <a:spLocks/>
+          </p:cNvSpPr>
+          <p:nvPr/>
+        </p:nvSpPr>
+        <p:spPr>
+          <a:xfrm>
+            <a:off x="1259853" y="2587222"/>
+            <a:ext cx="3108245" cy="2229538"/>
+          </a:xfrm>
+          <a:prstGeom prst="rect">
+            <a:avLst/>
+          </a:prstGeom>
+        </p:spPr>
+        <p:txBody>
+          <a:bodyPr>
+            <a:normAutofit/>
+          </a:bodyPr>
+          <a:lstStyle>
+            <a:lvl1pPr marL="228600" indent="-228600" algn="l" defTabSz="914400" rtl="0" eaLnBrk="1" latinLnBrk="0" hangingPunct="1">
+              <a:lnSpc>
+                <a:spcPct val="120000"/>
+              </a:lnSpc>
+              <a:spcBef>
+                <a:spcPts val="1000"/>
+              </a:spcBef>
+              <a:buFont typeface="Arial" panose="020B0604020202020204" pitchFamily="34" charset="0"/>
+              <a:buChar char="•"/>
+              <a:defRPr sz="2000" kern="1200">
+                <a:solidFill>
+                  <a:schemeClr val="tx1"/>
+                </a:solidFill>
+                <a:effectLst>
+                  <a:outerShdw blurRad="50800" dist="38100" dir="2700000" algn="tl" rotWithShape="0">
+                    <a:srgbClr val="000000">
+                      <a:alpha val="48000"/>
+                    </a:srgbClr>
+                  </a:outerShdw>
+                </a:effectLst>
+                <a:latin typeface="+mn-lt"/>
+                <a:ea typeface="+mn-ea"/>
+                <a:cs typeface="+mn-cs"/>
+              </a:defRPr>
+            </a:lvl1pPr>
+            <a:lvl2pPr marL="685800" indent="-228600" algn="l" defTabSz="914400" rtl="0" eaLnBrk="1" latinLnBrk="0" hangingPunct="1">
+              <a:lnSpc>
+                <a:spcPct val="120000"/>
+              </a:lnSpc>
+              <a:spcBef>
+                <a:spcPts val="500"/>
+              </a:spcBef>
+              <a:buFont typeface="Arial" panose="020B0604020202020204" pitchFamily="34" charset="0"/>
+              <a:buChar char="•"/>
+              <a:defRPr sz="1800" kern="1200">
+                <a:solidFill>
+                  <a:schemeClr val="tx1"/>
+                </a:solidFill>
+                <a:effectLst>
+                  <a:outerShdw blurRad="50800" dist="38100" dir="2700000" algn="tl" rotWithShape="0">
+                    <a:srgbClr val="000000">
+                      <a:alpha val="48000"/>
+                    </a:srgbClr>
+                  </a:outerShdw>
+                </a:effectLst>
+                <a:latin typeface="+mn-lt"/>
+                <a:ea typeface="+mn-ea"/>
+                <a:cs typeface="+mn-cs"/>
+              </a:defRPr>
+            </a:lvl2pPr>
+            <a:lvl3pPr marL="1143000" indent="-228600" algn="l" defTabSz="914400" rtl="0" eaLnBrk="1" latinLnBrk="0" hangingPunct="1">
+              <a:lnSpc>
+                <a:spcPct val="120000"/>
+              </a:lnSpc>
+              <a:spcBef>
+                <a:spcPts val="500"/>
+              </a:spcBef>
+              <a:buFont typeface="Arial" panose="020B0604020202020204" pitchFamily="34" charset="0"/>
+              <a:buChar char="•"/>
+              <a:defRPr sz="1600" kern="1200">
+                <a:solidFill>
+                  <a:schemeClr val="tx1"/>
+                </a:solidFill>
+                <a:effectLst>
+                  <a:outerShdw blurRad="50800" dist="38100" dir="2700000" algn="tl" rotWithShape="0">
+                    <a:srgbClr val="000000">
+                      <a:alpha val="48000"/>
+                    </a:srgbClr>
+                  </a:outerShdw>
+                </a:effectLst>
+                <a:latin typeface="+mn-lt"/>
+                <a:ea typeface="+mn-ea"/>
+                <a:cs typeface="+mn-cs"/>
+              </a:defRPr>
+            </a:lvl3pPr>
+            <a:lvl4pPr marL="1600200" indent="-228600" algn="l" defTabSz="914400" rtl="0" eaLnBrk="1" latinLnBrk="0" hangingPunct="1">
+              <a:lnSpc>
+                <a:spcPct val="120000"/>
+              </a:lnSpc>
+              <a:spcBef>
+                <a:spcPts val="500"/>
+              </a:spcBef>
+              <a:buFont typeface="Arial" panose="020B0604020202020204" pitchFamily="34" charset="0"/>
+              <a:buChar char="•"/>
+              <a:defRPr sz="1400" kern="1200">
+                <a:solidFill>
+                  <a:schemeClr val="tx1"/>
+                </a:solidFill>
+                <a:effectLst>
+                  <a:outerShdw blurRad="50800" dist="38100" dir="2700000" algn="tl" rotWithShape="0">
+                    <a:srgbClr val="000000">
+                      <a:alpha val="48000"/>
+                    </a:srgbClr>
+                  </a:outerShdw>
+                </a:effectLst>
+                <a:latin typeface="+mn-lt"/>
+                <a:ea typeface="+mn-ea"/>
+                <a:cs typeface="+mn-cs"/>
+              </a:defRPr>
+            </a:lvl4pPr>
+            <a:lvl5pPr marL="2057400" indent="-228600" algn="l" defTabSz="914400" rtl="0" eaLnBrk="1" latinLnBrk="0" hangingPunct="1">
+              <a:lnSpc>
+                <a:spcPct val="120000"/>
+              </a:lnSpc>
+              <a:spcBef>
+                <a:spcPts val="500"/>
+              </a:spcBef>
+              <a:buFont typeface="Arial" panose="020B0604020202020204" pitchFamily="34" charset="0"/>
+              <a:buChar char="•"/>
+              <a:defRPr sz="1200" kern="1200">
+                <a:solidFill>
+                  <a:schemeClr val="tx1"/>
+                </a:solidFill>
+                <a:effectLst>
+                  <a:outerShdw blurRad="50800" dist="38100" dir="2700000" algn="tl" rotWithShape="0">
+                    <a:srgbClr val="000000">
+                      <a:alpha val="48000"/>
+                    </a:srgbClr>
+                  </a:outerShdw>
+                </a:effectLst>
+                <a:latin typeface="+mn-lt"/>
+                <a:ea typeface="+mn-ea"/>
+                <a:cs typeface="+mn-cs"/>
+              </a:defRPr>
+            </a:lvl5pPr>
+            <a:lvl6pPr marL="2514600" indent="-228600" algn="l" defTabSz="914400" rtl="0" eaLnBrk="1" latinLnBrk="0" hangingPunct="1">
+              <a:lnSpc>
+                <a:spcPct val="120000"/>
+              </a:lnSpc>
+              <a:spcBef>
+                <a:spcPts val="500"/>
+              </a:spcBef>
+              <a:buFont typeface="Arial" panose="020B0604020202020204" pitchFamily="34" charset="0"/>
+              <a:buChar char="•"/>
+              <a:defRPr sz="1200" kern="1200">
+                <a:solidFill>
+                  <a:schemeClr val="tx1"/>
+                </a:solidFill>
+                <a:effectLst>
+                  <a:outerShdw blurRad="50800" dist="38100" dir="2700000" algn="tl" rotWithShape="0">
+                    <a:srgbClr val="000000">
+                      <a:alpha val="48000"/>
+                    </a:srgbClr>
+                  </a:outerShdw>
+                </a:effectLst>
+                <a:latin typeface="+mn-lt"/>
+                <a:ea typeface="+mn-ea"/>
+                <a:cs typeface="+mn-cs"/>
+              </a:defRPr>
+            </a:lvl6pPr>
+            <a:lvl7pPr marL="2971800" indent="-228600" algn="l" defTabSz="914400" rtl="0" eaLnBrk="1" latinLnBrk="0" hangingPunct="1">
+              <a:lnSpc>
+                <a:spcPct val="120000"/>
+              </a:lnSpc>
+              <a:spcBef>
+                <a:spcPts val="500"/>
+              </a:spcBef>
+              <a:buFont typeface="Arial" panose="020B0604020202020204" pitchFamily="34" charset="0"/>
+              <a:buChar char="•"/>
+              <a:defRPr sz="1200" kern="1200">
+                <a:solidFill>
+                  <a:schemeClr val="tx1"/>
+                </a:solidFill>
+                <a:effectLst>
+                  <a:outerShdw blurRad="50800" dist="38100" dir="2700000" algn="tl" rotWithShape="0">
+                    <a:srgbClr val="000000">
+                      <a:alpha val="48000"/>
+                    </a:srgbClr>
+                  </a:outerShdw>
+                </a:effectLst>
+                <a:latin typeface="+mn-lt"/>
+                <a:ea typeface="+mn-ea"/>
+                <a:cs typeface="+mn-cs"/>
+              </a:defRPr>
+            </a:lvl7pPr>
+            <a:lvl8pPr marL="3429000" indent="-228600" algn="l" defTabSz="914400" rtl="0" eaLnBrk="1" latinLnBrk="0" hangingPunct="1">
+              <a:lnSpc>
+                <a:spcPct val="120000"/>
+              </a:lnSpc>
+              <a:spcBef>
+                <a:spcPts val="500"/>
+              </a:spcBef>
+              <a:buFont typeface="Arial" panose="020B0604020202020204" pitchFamily="34" charset="0"/>
+              <a:buChar char="•"/>
+              <a:defRPr sz="1200" kern="1200">
+                <a:solidFill>
+                  <a:schemeClr val="tx1"/>
+                </a:solidFill>
+                <a:effectLst>
+                  <a:outerShdw blurRad="50800" dist="38100" dir="2700000" algn="tl" rotWithShape="0">
+                    <a:srgbClr val="000000">
+                      <a:alpha val="48000"/>
+                    </a:srgbClr>
+                  </a:outerShdw>
+                </a:effectLst>
+                <a:latin typeface="+mn-lt"/>
+                <a:ea typeface="+mn-ea"/>
+                <a:cs typeface="+mn-cs"/>
+              </a:defRPr>
+            </a:lvl8pPr>
+            <a:lvl9pPr marL="3886200" indent="-228600" algn="l" defTabSz="914400" rtl="0" eaLnBrk="1" latinLnBrk="0" hangingPunct="1">
+              <a:lnSpc>
+                <a:spcPct val="120000"/>
+              </a:lnSpc>
+              <a:spcBef>
+                <a:spcPts val="500"/>
+              </a:spcBef>
+              <a:buFont typeface="Arial" panose="020B0604020202020204" pitchFamily="34" charset="0"/>
+              <a:buChar char="•"/>
+              <a:defRPr sz="1200" kern="1200">
+                <a:solidFill>
+                  <a:schemeClr val="tx1"/>
+                </a:solidFill>
+                <a:effectLst>
+                  <a:outerShdw blurRad="50800" dist="38100" dir="2700000" algn="tl" rotWithShape="0">
+                    <a:srgbClr val="000000">
+                      <a:alpha val="48000"/>
+                    </a:srgbClr>
+                  </a:outerShdw>
+                </a:effectLst>
+                <a:latin typeface="+mn-lt"/>
+                <a:ea typeface="+mn-ea"/>
+                <a:cs typeface="+mn-cs"/>
+              </a:defRPr>
+            </a:lvl9pPr>
+          </a:lstStyle>
+          <a:p>
+            <a:pPr algn="r"/>
+            <a:r>
+              <a:rPr lang="en-US" sz="1800"/>
+              <a:t>We will be using technologies to train our model, build our website, maintain our repository and design our user interface.</a:t>
+            </a:r>
+            <a:endParaRPr lang="en-US" sz="1800" dirty="0"/>
+          </a:p>
+        </p:txBody>
+      </p:sp>
+      <p:pic>
+        <p:nvPicPr>
+          <p:cNvPr id="4" name="Picture 4" descr="Image result for html png">
+            <a:extLst>
+              <a:ext uri="{FF2B5EF4-FFF2-40B4-BE49-F238E27FC236}">
+                <a16:creationId xmlns:a16="http://schemas.microsoft.com/office/drawing/2014/main" id="{24ABEFE5-C70E-4AA4-9196-8052F8640278}"/>
+              </a:ext>
+            </a:extLst>
+          </p:cNvPr>
+          <p:cNvPicPr>
+            <a:picLocks noChangeAspect="1" noChangeArrowheads="1"/>
+          </p:cNvPicPr>
+          <p:nvPr/>
+        </p:nvPicPr>
+        <p:blipFill>
+          <a:blip r:embed="rId2">
+            <a:duotone>
+              <a:schemeClr val="accent1">
+                <a:shade val="45000"/>
+                <a:satMod val="135000"/>
+              </a:schemeClr>
+              <a:prstClr val="white"/>
+            </a:duotone>
+            <a:extLst>
+              <a:ext uri="{28A0092B-C50C-407E-A947-70E740481C1C}">
+                <a14:useLocalDpi xmlns:a14="http://schemas.microsoft.com/office/drawing/2010/main" val="0"/>
+              </a:ext>
+            </a:extLst>
+          </a:blip>
+          <a:srcRect/>
+          <a:stretch>
+            <a:fillRect/>
+          </a:stretch>
+        </p:blipFill>
+        <p:spPr bwMode="auto">
+          <a:xfrm>
+            <a:off x="4884080" y="911333"/>
+            <a:ext cx="2727614" cy="1600200"/>
+          </a:xfrm>
+          <a:prstGeom prst="rect">
+            <a:avLst/>
+          </a:prstGeom>
+          <a:noFill/>
+          <a:extLst>
+            <a:ext uri="{909E8E84-426E-40DD-AFC4-6F175D3DCCD1}">
+              <a14:hiddenFill xmlns:a14="http://schemas.microsoft.com/office/drawing/2010/main">
+                <a:solidFill>
+                  <a:srgbClr val="FFFFFF"/>
+                </a:solidFill>
+              </a14:hiddenFill>
+            </a:ext>
+          </a:extLst>
+        </p:spPr>
+      </p:pic>
+      <p:pic>
+        <p:nvPicPr>
+          <p:cNvPr id="6" name="Picture 10" descr="Image result for mysql png">
+            <a:extLst>
+              <a:ext uri="{FF2B5EF4-FFF2-40B4-BE49-F238E27FC236}">
+                <a16:creationId xmlns:a16="http://schemas.microsoft.com/office/drawing/2014/main" id="{F63574C0-6872-4D12-A41A-5FA7A5A51105}"/>
+              </a:ext>
+            </a:extLst>
+          </p:cNvPr>
+          <p:cNvPicPr>
+            <a:picLocks noChangeAspect="1" noChangeArrowheads="1"/>
+          </p:cNvPicPr>
+          <p:nvPr/>
+        </p:nvPicPr>
+        <p:blipFill>
+          <a:blip r:embed="rId3" cstate="print">
+            <a:extLst>
+              <a:ext uri="{28A0092B-C50C-407E-A947-70E740481C1C}">
+                <a14:useLocalDpi xmlns:a14="http://schemas.microsoft.com/office/drawing/2010/main" val="0"/>
+              </a:ext>
+            </a:extLst>
+          </a:blip>
+          <a:srcRect/>
+          <a:stretch>
+            <a:fillRect/>
+          </a:stretch>
+        </p:blipFill>
+        <p:spPr bwMode="auto">
+          <a:xfrm>
+            <a:off x="7733934" y="1183824"/>
+            <a:ext cx="1218130" cy="1218130"/>
+          </a:xfrm>
+          <a:prstGeom prst="rect">
+            <a:avLst/>
+          </a:prstGeom>
+          <a:noFill/>
+          <a:extLst>
+            <a:ext uri="{909E8E84-426E-40DD-AFC4-6F175D3DCCD1}">
+              <a14:hiddenFill xmlns:a14="http://schemas.microsoft.com/office/drawing/2010/main">
+                <a:solidFill>
+                  <a:srgbClr val="FFFFFF"/>
+                </a:solidFill>
+              </a14:hiddenFill>
+            </a:ext>
+          </a:extLst>
+        </p:spPr>
+      </p:pic>
+      <p:pic>
+        <p:nvPicPr>
+          <p:cNvPr id="8" name="Picture 7">
+            <a:extLst>
+              <a:ext uri="{FF2B5EF4-FFF2-40B4-BE49-F238E27FC236}">
+                <a16:creationId xmlns:a16="http://schemas.microsoft.com/office/drawing/2014/main" id="{12138E35-6600-4C6D-A924-A4B7868F5382}"/>
+              </a:ext>
+            </a:extLst>
+          </p:cNvPr>
+          <p:cNvPicPr>
+            <a:picLocks noChangeAspect="1"/>
+          </p:cNvPicPr>
+          <p:nvPr/>
+        </p:nvPicPr>
+        <p:blipFill>
+          <a:blip r:embed="rId4" cstate="print">
+            <a:duotone>
+              <a:schemeClr val="accent1">
+                <a:shade val="45000"/>
+                <a:satMod val="135000"/>
+              </a:schemeClr>
+              <a:prstClr val="white"/>
+            </a:duotone>
+            <a:extLst>
+              <a:ext uri="{28A0092B-C50C-407E-A947-70E740481C1C}">
+                <a14:useLocalDpi xmlns:a14="http://schemas.microsoft.com/office/drawing/2010/main" val="0"/>
+              </a:ext>
+            </a:extLst>
+          </a:blip>
+          <a:stretch>
+            <a:fillRect/>
+          </a:stretch>
+        </p:blipFill>
+        <p:spPr>
+          <a:xfrm>
+            <a:off x="8995235" y="1424112"/>
+            <a:ext cx="1336246" cy="1336246"/>
+          </a:xfrm>
+          <a:prstGeom prst="rect">
+            <a:avLst/>
+          </a:prstGeom>
+        </p:spPr>
+      </p:pic>
+      <p:pic>
+        <p:nvPicPr>
+          <p:cNvPr id="10" name="Picture 18" descr="Image result for aws png">
+            <a:extLst>
+              <a:ext uri="{FF2B5EF4-FFF2-40B4-BE49-F238E27FC236}">
+                <a16:creationId xmlns:a16="http://schemas.microsoft.com/office/drawing/2014/main" id="{A4A3F486-D0FC-4EC2-921E-299F838FAE29}"/>
+              </a:ext>
+            </a:extLst>
+          </p:cNvPr>
+          <p:cNvPicPr>
+            <a:picLocks noChangeAspect="1" noChangeArrowheads="1"/>
+          </p:cNvPicPr>
+          <p:nvPr/>
+        </p:nvPicPr>
+        <p:blipFill>
+          <a:blip r:embed="rId5" cstate="print">
+            <a:duotone>
+              <a:schemeClr val="accent1">
+                <a:shade val="45000"/>
+                <a:satMod val="135000"/>
+              </a:schemeClr>
+              <a:prstClr val="white"/>
+            </a:duotone>
+            <a:extLst>
+              <a:ext uri="{28A0092B-C50C-407E-A947-70E740481C1C}">
+                <a14:useLocalDpi xmlns:a14="http://schemas.microsoft.com/office/drawing/2010/main" val="0"/>
+              </a:ext>
+            </a:extLst>
+          </a:blip>
+          <a:srcRect/>
+          <a:stretch>
+            <a:fillRect/>
+          </a:stretch>
+        </p:blipFill>
+        <p:spPr bwMode="auto">
+          <a:xfrm>
+            <a:off x="5838337" y="4438908"/>
+            <a:ext cx="2496834" cy="910355"/>
+          </a:xfrm>
+          <a:prstGeom prst="rect">
+            <a:avLst/>
+          </a:prstGeom>
+          <a:noFill/>
+          <a:extLst>
+            <a:ext uri="{909E8E84-426E-40DD-AFC4-6F175D3DCCD1}">
+              <a14:hiddenFill xmlns:a14="http://schemas.microsoft.com/office/drawing/2010/main">
+                <a:solidFill>
+                  <a:srgbClr val="FFFFFF"/>
+                </a:solidFill>
+              </a14:hiddenFill>
+            </a:ext>
+          </a:extLst>
+        </p:spPr>
+      </p:pic>
+      <p:pic>
+        <p:nvPicPr>
+          <p:cNvPr id="1028" name="Picture 4" descr="Image result for bootstrap png">
+            <a:extLst>
+              <a:ext uri="{FF2B5EF4-FFF2-40B4-BE49-F238E27FC236}">
+                <a16:creationId xmlns:a16="http://schemas.microsoft.com/office/drawing/2014/main" id="{BCC58C82-436B-4002-BE74-F1C75AD95A8C}"/>
+              </a:ext>
+            </a:extLst>
+          </p:cNvPr>
+          <p:cNvPicPr>
+            <a:picLocks noChangeAspect="1" noChangeArrowheads="1"/>
+          </p:cNvPicPr>
+          <p:nvPr/>
+        </p:nvPicPr>
+        <p:blipFill>
+          <a:blip r:embed="rId6">
+            <a:extLst>
+              <a:ext uri="{28A0092B-C50C-407E-A947-70E740481C1C}">
+                <a14:useLocalDpi xmlns:a14="http://schemas.microsoft.com/office/drawing/2010/main" val="0"/>
+              </a:ext>
+            </a:extLst>
+          </a:blip>
+          <a:srcRect/>
+          <a:stretch>
+            <a:fillRect/>
+          </a:stretch>
+        </p:blipFill>
+        <p:spPr bwMode="auto">
+          <a:xfrm>
+            <a:off x="9207785" y="3393968"/>
+            <a:ext cx="1447636" cy="1447636"/>
+          </a:xfrm>
+          <a:prstGeom prst="rect">
+            <a:avLst/>
+          </a:prstGeom>
+          <a:noFill/>
+          <a:extLst>
+            <a:ext uri="{909E8E84-426E-40DD-AFC4-6F175D3DCCD1}">
+              <a14:hiddenFill xmlns:a14="http://schemas.microsoft.com/office/drawing/2010/main">
+                <a:solidFill>
+                  <a:srgbClr val="FFFFFF"/>
+                </a:solidFill>
+              </a14:hiddenFill>
+            </a:ext>
+          </a:extLst>
+        </p:spPr>
+      </p:pic>
+      <p:pic>
+        <p:nvPicPr>
+          <p:cNvPr id="1034" name="Picture 10" descr="Image result for jquery png">
+            <a:extLst>
+              <a:ext uri="{FF2B5EF4-FFF2-40B4-BE49-F238E27FC236}">
+                <a16:creationId xmlns:a16="http://schemas.microsoft.com/office/drawing/2014/main" id="{A36873BE-24EF-4255-BE1E-98681B4495D8}"/>
+              </a:ext>
+            </a:extLst>
+          </p:cNvPr>
+          <p:cNvPicPr>
+            <a:picLocks noChangeAspect="1" noChangeArrowheads="1"/>
+          </p:cNvPicPr>
+          <p:nvPr/>
+        </p:nvPicPr>
+        <p:blipFill>
+          <a:blip r:embed="rId7">
+            <a:extLst>
+              <a:ext uri="{28A0092B-C50C-407E-A947-70E740481C1C}">
+                <a14:useLocalDpi xmlns:a14="http://schemas.microsoft.com/office/drawing/2010/main" val="0"/>
+              </a:ext>
+            </a:extLst>
+          </a:blip>
+          <a:srcRect/>
+          <a:stretch>
+            <a:fillRect/>
+          </a:stretch>
+        </p:blipFill>
+        <p:spPr bwMode="auto">
+          <a:xfrm>
+            <a:off x="4684286" y="1674606"/>
+            <a:ext cx="2422341" cy="2422341"/>
+          </a:xfrm>
+          <a:prstGeom prst="rect">
+            <a:avLst/>
+          </a:prstGeom>
+          <a:noFill/>
+          <a:extLst>
+            <a:ext uri="{909E8E84-426E-40DD-AFC4-6F175D3DCCD1}">
+              <a14:hiddenFill xmlns:a14="http://schemas.microsoft.com/office/drawing/2010/main">
+                <a:solidFill>
+                  <a:srgbClr val="FFFFFF"/>
+                </a:solidFill>
+              </a14:hiddenFill>
+            </a:ext>
+          </a:extLst>
+        </p:spPr>
+      </p:pic>
+      <p:pic>
+        <p:nvPicPr>
+          <p:cNvPr id="1040" name="Picture 16" descr="Image result for express framework  png">
+            <a:extLst>
+              <a:ext uri="{FF2B5EF4-FFF2-40B4-BE49-F238E27FC236}">
+                <a16:creationId xmlns:a16="http://schemas.microsoft.com/office/drawing/2014/main" id="{F8E8744E-D4BD-4808-9333-40DA0062A1E7}"/>
+              </a:ext>
+            </a:extLst>
+          </p:cNvPr>
+          <p:cNvPicPr>
+            <a:picLocks noChangeAspect="1" noChangeArrowheads="1"/>
+          </p:cNvPicPr>
+          <p:nvPr/>
+        </p:nvPicPr>
+        <p:blipFill>
+          <a:blip r:embed="rId8">
+            <a:duotone>
+              <a:schemeClr val="accent6">
+                <a:shade val="45000"/>
+                <a:satMod val="135000"/>
+              </a:schemeClr>
+              <a:prstClr val="white"/>
+            </a:duotone>
+            <a:extLst>
+              <a:ext uri="{28A0092B-C50C-407E-A947-70E740481C1C}">
+                <a14:useLocalDpi xmlns:a14="http://schemas.microsoft.com/office/drawing/2010/main" val="0"/>
+              </a:ext>
+            </a:extLst>
+          </a:blip>
+          <a:srcRect/>
+          <a:stretch>
+            <a:fillRect/>
+          </a:stretch>
+        </p:blipFill>
+        <p:spPr bwMode="auto">
+          <a:xfrm>
+            <a:off x="8541750" y="4797934"/>
+            <a:ext cx="2050884" cy="849998"/>
+          </a:xfrm>
+          <a:prstGeom prst="rect">
+            <a:avLst/>
+          </a:prstGeom>
+          <a:ln>
+            <a:gradFill>
+              <a:gsLst>
+                <a:gs pos="100000">
+                  <a:schemeClr val="accent1">
+                    <a:lumMod val="5000"/>
+                    <a:lumOff val="95000"/>
+                  </a:schemeClr>
+                </a:gs>
+                <a:gs pos="74000">
+                  <a:schemeClr val="accent1">
+                    <a:lumMod val="45000"/>
+                    <a:lumOff val="55000"/>
+                  </a:schemeClr>
+                </a:gs>
+                <a:gs pos="83000">
+                  <a:schemeClr val="accent1">
+                    <a:lumMod val="45000"/>
+                    <a:lumOff val="55000"/>
+                  </a:schemeClr>
+                </a:gs>
+                <a:gs pos="100000">
+                  <a:schemeClr val="accent1">
+                    <a:lumMod val="30000"/>
+                    <a:lumOff val="70000"/>
+                  </a:schemeClr>
+                </a:gs>
+              </a:gsLst>
+              <a:lin ang="5400000" scaled="1"/>
+            </a:gradFill>
+          </a:ln>
+        </p:spPr>
+      </p:pic>
+      <p:pic>
+        <p:nvPicPr>
+          <p:cNvPr id="1046" name="Picture 22" descr="Image result for react framework  png">
+            <a:extLst>
+              <a:ext uri="{FF2B5EF4-FFF2-40B4-BE49-F238E27FC236}">
+                <a16:creationId xmlns:a16="http://schemas.microsoft.com/office/drawing/2014/main" id="{58C94A6F-669B-48FF-93CC-6A9C0A64F6E7}"/>
+              </a:ext>
+            </a:extLst>
+          </p:cNvPr>
+          <p:cNvPicPr>
+            <a:picLocks noChangeAspect="1" noChangeArrowheads="1"/>
+          </p:cNvPicPr>
+          <p:nvPr/>
+        </p:nvPicPr>
+        <p:blipFill>
+          <a:blip r:embed="rId9">
+            <a:extLst>
+              <a:ext uri="{28A0092B-C50C-407E-A947-70E740481C1C}">
+                <a14:useLocalDpi xmlns:a14="http://schemas.microsoft.com/office/drawing/2010/main" val="0"/>
+              </a:ext>
+            </a:extLst>
+          </a:blip>
+          <a:srcRect/>
+          <a:stretch>
+            <a:fillRect/>
+          </a:stretch>
+        </p:blipFill>
+        <p:spPr bwMode="auto">
+          <a:xfrm>
+            <a:off x="5839414" y="3023051"/>
+            <a:ext cx="1408304" cy="1357879"/>
+          </a:xfrm>
+          <a:prstGeom prst="rect">
+            <a:avLst/>
+          </a:prstGeom>
+          <a:noFill/>
+          <a:extLst>
+            <a:ext uri="{909E8E84-426E-40DD-AFC4-6F175D3DCCD1}">
+              <a14:hiddenFill xmlns:a14="http://schemas.microsoft.com/office/drawing/2010/main">
+                <a:solidFill>
+                  <a:srgbClr val="FFFFFF"/>
+                </a:solidFill>
+              </a14:hiddenFill>
+            </a:ext>
+          </a:extLst>
+        </p:spPr>
+      </p:pic>
+      <p:pic>
+        <p:nvPicPr>
+          <p:cNvPr id="1048" name="Picture 24" descr="Image result for passport js png">
+            <a:extLst>
+              <a:ext uri="{FF2B5EF4-FFF2-40B4-BE49-F238E27FC236}">
+                <a16:creationId xmlns:a16="http://schemas.microsoft.com/office/drawing/2014/main" id="{49941F8F-66A1-4A72-A198-830D4C31A3EA}"/>
+              </a:ext>
+            </a:extLst>
+          </p:cNvPr>
+          <p:cNvPicPr>
+            <a:picLocks noChangeAspect="1" noChangeArrowheads="1"/>
+          </p:cNvPicPr>
+          <p:nvPr/>
+        </p:nvPicPr>
+        <p:blipFill>
+          <a:blip r:embed="rId10">
+            <a:extLst>
+              <a:ext uri="{28A0092B-C50C-407E-A947-70E740481C1C}">
+                <a14:useLocalDpi xmlns:a14="http://schemas.microsoft.com/office/drawing/2010/main" val="0"/>
+              </a:ext>
+            </a:extLst>
+          </a:blip>
+          <a:srcRect/>
+          <a:stretch>
+            <a:fillRect/>
+          </a:stretch>
+        </p:blipFill>
+        <p:spPr bwMode="auto">
+          <a:xfrm>
+            <a:off x="4168638" y="3393968"/>
+            <a:ext cx="1905000" cy="1905000"/>
+          </a:xfrm>
+          <a:prstGeom prst="rect">
+            <a:avLst/>
+          </a:prstGeom>
+          <a:noFill/>
+          <a:extLst>
+            <a:ext uri="{909E8E84-426E-40DD-AFC4-6F175D3DCCD1}">
+              <a14:hiddenFill xmlns:a14="http://schemas.microsoft.com/office/drawing/2010/main">
+                <a:solidFill>
+                  <a:srgbClr val="FFFFFF"/>
+                </a:solidFill>
+              </a14:hiddenFill>
+            </a:ext>
+          </a:extLst>
+        </p:spPr>
+      </p:pic>
+      <p:pic>
+        <p:nvPicPr>
+          <p:cNvPr id="1054" name="Picture 30" descr="Image result for react native png">
+            <a:extLst>
+              <a:ext uri="{FF2B5EF4-FFF2-40B4-BE49-F238E27FC236}">
+                <a16:creationId xmlns:a16="http://schemas.microsoft.com/office/drawing/2014/main" id="{D55C1118-8479-49C9-A993-258A7612B3F6}"/>
+              </a:ext>
+            </a:extLst>
+          </p:cNvPr>
+          <p:cNvPicPr>
+            <a:picLocks noChangeAspect="1" noChangeArrowheads="1"/>
+          </p:cNvPicPr>
+          <p:nvPr/>
+        </p:nvPicPr>
+        <p:blipFill>
+          <a:blip r:embed="rId11">
+            <a:duotone>
+              <a:prstClr val="black"/>
+              <a:srgbClr val="D9C3A5">
+                <a:tint val="50000"/>
+                <a:satMod val="180000"/>
+              </a:srgbClr>
+            </a:duotone>
+            <a:extLst>
+              <a:ext uri="{28A0092B-C50C-407E-A947-70E740481C1C}">
+                <a14:useLocalDpi xmlns:a14="http://schemas.microsoft.com/office/drawing/2010/main" val="0"/>
+              </a:ext>
+            </a:extLst>
+          </a:blip>
+          <a:srcRect/>
+          <a:stretch>
+            <a:fillRect/>
+          </a:stretch>
+        </p:blipFill>
+        <p:spPr bwMode="auto">
+          <a:xfrm>
+            <a:off x="7815321" y="3492066"/>
+            <a:ext cx="1523089" cy="1152608"/>
+          </a:xfrm>
+          <a:prstGeom prst="rect">
+            <a:avLst/>
+          </a:prstGeom>
+          <a:noFill/>
+          <a:extLst>
+            <a:ext uri="{909E8E84-426E-40DD-AFC4-6F175D3DCCD1}">
+              <a14:hiddenFill xmlns:a14="http://schemas.microsoft.com/office/drawing/2010/main">
+                <a:solidFill>
+                  <a:srgbClr val="FFFFFF"/>
+                </a:solidFill>
+              </a14:hiddenFill>
+            </a:ext>
+          </a:extLst>
+        </p:spPr>
+      </p:pic>
+      <p:pic>
+        <p:nvPicPr>
+          <p:cNvPr id="1058" name="Picture 34" descr="Image result for javascript png">
+            <a:extLst>
+              <a:ext uri="{FF2B5EF4-FFF2-40B4-BE49-F238E27FC236}">
+                <a16:creationId xmlns:a16="http://schemas.microsoft.com/office/drawing/2014/main" id="{0C4EDEA4-00F4-461D-BB45-5438943896B3}"/>
+              </a:ext>
+            </a:extLst>
+          </p:cNvPr>
+          <p:cNvPicPr>
+            <a:picLocks noChangeAspect="1" noChangeArrowheads="1"/>
+          </p:cNvPicPr>
+          <p:nvPr/>
+        </p:nvPicPr>
+        <p:blipFill>
+          <a:blip r:embed="rId12">
+            <a:extLst>
+              <a:ext uri="{28A0092B-C50C-407E-A947-70E740481C1C}">
+                <a14:useLocalDpi xmlns:a14="http://schemas.microsoft.com/office/drawing/2010/main" val="0"/>
+              </a:ext>
+            </a:extLst>
+          </a:blip>
+          <a:srcRect/>
+          <a:stretch>
+            <a:fillRect/>
+          </a:stretch>
+        </p:blipFill>
+        <p:spPr bwMode="auto">
+          <a:xfrm>
+            <a:off x="6935744" y="2406314"/>
+            <a:ext cx="1419169" cy="1419169"/>
+          </a:xfrm>
+          <a:prstGeom prst="rect">
+            <a:avLst/>
+          </a:prstGeom>
+          <a:noFill/>
+          <a:extLst>
+            <a:ext uri="{909E8E84-426E-40DD-AFC4-6F175D3DCCD1}">
+              <a14:hiddenFill xmlns:a14="http://schemas.microsoft.com/office/drawing/2010/main">
+                <a:solidFill>
+                  <a:srgbClr val="FFFFFF"/>
+                </a:solidFill>
+              </a14:hiddenFill>
+            </a:ext>
+          </a:extLst>
+        </p:spPr>
+      </p:pic>
+      <p:pic>
+        <p:nvPicPr>
+          <p:cNvPr id="1062" name="Picture 38" descr="Image result for google translate api png">
+            <a:extLst>
+              <a:ext uri="{FF2B5EF4-FFF2-40B4-BE49-F238E27FC236}">
+                <a16:creationId xmlns:a16="http://schemas.microsoft.com/office/drawing/2014/main" id="{C0E767CA-D29E-47F1-A8E5-6B955DFF15DF}"/>
+              </a:ext>
+            </a:extLst>
+          </p:cNvPr>
+          <p:cNvPicPr>
+            <a:picLocks noChangeAspect="1" noChangeArrowheads="1"/>
+          </p:cNvPicPr>
+          <p:nvPr/>
+        </p:nvPicPr>
+        <p:blipFill>
+          <a:blip r:embed="rId13">
+            <a:extLst>
+              <a:ext uri="{28A0092B-C50C-407E-A947-70E740481C1C}">
+                <a14:useLocalDpi xmlns:a14="http://schemas.microsoft.com/office/drawing/2010/main" val="0"/>
+              </a:ext>
+            </a:extLst>
+          </a:blip>
+          <a:srcRect/>
+          <a:stretch>
+            <a:fillRect/>
+          </a:stretch>
+        </p:blipFill>
+        <p:spPr bwMode="auto">
+          <a:xfrm>
+            <a:off x="8549226" y="2681595"/>
+            <a:ext cx="1218130" cy="889235"/>
+          </a:xfrm>
+          <a:prstGeom prst="rect">
+            <a:avLst/>
+          </a:prstGeom>
+          <a:noFill/>
+          <a:extLst>
+            <a:ext uri="{909E8E84-426E-40DD-AFC4-6F175D3DCCD1}">
+              <a14:hiddenFill xmlns:a14="http://schemas.microsoft.com/office/drawing/2010/main">
+                <a:solidFill>
+                  <a:srgbClr val="FFFFFF"/>
+                </a:solidFill>
+              </a14:hiddenFill>
+            </a:ext>
+          </a:extLst>
+        </p:spPr>
+      </p:pic>
+    </p:spTree>
+    <p:extLst>
+      <p:ext uri="{BB962C8B-B14F-4D97-AF65-F5344CB8AC3E}">
+        <p14:creationId xmlns:p14="http://schemas.microsoft.com/office/powerpoint/2010/main" val="4286404225"/>
+      </p:ext>
+    </p:extLst>
+  </p:cSld>
+  <p:clrMapOvr>
+    <a:masterClrMapping/>
+  </p:clrMapOvr>
+  <p:timing>
+    <p:tnLst>
+      <p:par>
+        <p:cTn id="1" dur="indefinite" restart="never" nodeType="tmRoot">
+          <p:childTnLst>
+            <p:seq concurrent="1" nextAc="seek">
+              <p:cTn id="2" dur="indefinite" nodeType="mainSeq">
+                <p:childTnLst>
+                  <p:par>
+                    <p:cTn id="3" fill="hold">
+                      <p:stCondLst>
+                        <p:cond delay="indefinite"/>
+                      </p:stCondLst>
+                      <p:childTnLst>
+                        <p:par>
+                          <p:cTn id="4" fill="hold">
+                            <p:stCondLst>
+                              <p:cond delay="0"/>
+                            </p:stCondLst>
+                            <p:childTnLst>
+                              <p:par>
+                                <p:cTn id="5" presetID="10" presetClass="entr" presetSubtype="0" fill="hold" nodeType="clickEffect">
+                                  <p:stCondLst>
+                                    <p:cond delay="0"/>
+                                  </p:stCondLst>
+                                  <p:childTnLst>
+                                    <p:set>
+                                      <p:cBhvr>
+                                        <p:cTn id="6" dur="1" fill="hold">
+                                          <p:stCondLst>
+                                            <p:cond delay="0"/>
+                                          </p:stCondLst>
+                                        </p:cTn>
+                                        <p:tgtEl>
+                                          <p:spTgt spid="4"/>
+                                        </p:tgtEl>
+                                        <p:attrNameLst>
+                                          <p:attrName>style.visibility</p:attrName>
+                                        </p:attrNameLst>
+                                      </p:cBhvr>
+                                      <p:to>
+                                        <p:strVal val="visible"/>
+                                      </p:to>
+                                    </p:set>
+                                    <p:animEffect transition="in" filter="fade">
+                                      <p:cBhvr>
+                                        <p:cTn id="7" dur="500"/>
+                                        <p:tgtEl>
+                                          <p:spTgt spid="4"/>
+                                        </p:tgtEl>
+                                      </p:cBhvr>
+                                    </p:animEffect>
+                                  </p:childTnLst>
+                                </p:cTn>
+                              </p:par>
+                              <p:par>
+                                <p:cTn id="8" presetID="10" presetClass="entr" presetSubtype="0" fill="hold" nodeType="withEffect">
+                                  <p:stCondLst>
+                                    <p:cond delay="0"/>
+                                  </p:stCondLst>
+                                  <p:childTnLst>
+                                    <p:set>
+                                      <p:cBhvr>
+                                        <p:cTn id="9" dur="1" fill="hold">
+                                          <p:stCondLst>
+                                            <p:cond delay="0"/>
+                                          </p:stCondLst>
+                                        </p:cTn>
+                                        <p:tgtEl>
+                                          <p:spTgt spid="6"/>
+                                        </p:tgtEl>
+                                        <p:attrNameLst>
+                                          <p:attrName>style.visibility</p:attrName>
+                                        </p:attrNameLst>
+                                      </p:cBhvr>
+                                      <p:to>
+                                        <p:strVal val="visible"/>
+                                      </p:to>
+                                    </p:set>
+                                    <p:animEffect transition="in" filter="fade">
+                                      <p:cBhvr>
+                                        <p:cTn id="10" dur="500"/>
+                                        <p:tgtEl>
+                                          <p:spTgt spid="6"/>
+                                        </p:tgtEl>
+                                      </p:cBhvr>
+                                    </p:animEffect>
+                                  </p:childTnLst>
+                                </p:cTn>
+                              </p:par>
+                              <p:par>
+                                <p:cTn id="11" presetID="10" presetClass="entr" presetSubtype="0" fill="hold" nodeType="withEffect">
+                                  <p:stCondLst>
+                                    <p:cond delay="0"/>
+                                  </p:stCondLst>
+                                  <p:childTnLst>
+                                    <p:set>
+                                      <p:cBhvr>
+                                        <p:cTn id="12" dur="1" fill="hold">
+                                          <p:stCondLst>
+                                            <p:cond delay="0"/>
+                                          </p:stCondLst>
+                                        </p:cTn>
+                                        <p:tgtEl>
+                                          <p:spTgt spid="8"/>
+                                        </p:tgtEl>
+                                        <p:attrNameLst>
+                                          <p:attrName>style.visibility</p:attrName>
+                                        </p:attrNameLst>
+                                      </p:cBhvr>
+                                      <p:to>
+                                        <p:strVal val="visible"/>
+                                      </p:to>
+                                    </p:set>
+                                    <p:animEffect transition="in" filter="fade">
+                                      <p:cBhvr>
+                                        <p:cTn id="13" dur="500"/>
+                                        <p:tgtEl>
+                                          <p:spTgt spid="8"/>
+                                        </p:tgtEl>
+                                      </p:cBhvr>
+                                    </p:animEffect>
+                                  </p:childTnLst>
+                                </p:cTn>
+                              </p:par>
+                              <p:par>
+                                <p:cTn id="14" presetID="10" presetClass="entr" presetSubtype="0" fill="hold" nodeType="withEffect">
+                                  <p:stCondLst>
+                                    <p:cond delay="0"/>
+                                  </p:stCondLst>
+                                  <p:childTnLst>
+                                    <p:set>
+                                      <p:cBhvr>
+                                        <p:cTn id="15" dur="1" fill="hold">
+                                          <p:stCondLst>
+                                            <p:cond delay="0"/>
+                                          </p:stCondLst>
+                                        </p:cTn>
+                                        <p:tgtEl>
+                                          <p:spTgt spid="10"/>
+                                        </p:tgtEl>
+                                        <p:attrNameLst>
+                                          <p:attrName>style.visibility</p:attrName>
+                                        </p:attrNameLst>
+                                      </p:cBhvr>
+                                      <p:to>
+                                        <p:strVal val="visible"/>
+                                      </p:to>
+                                    </p:set>
+                                    <p:animEffect transition="in" filter="fade">
+                                      <p:cBhvr>
+                                        <p:cTn id="16" dur="500"/>
+                                        <p:tgtEl>
+                                          <p:spTgt spid="10"/>
+                                        </p:tgtEl>
+                                      </p:cBhvr>
+                                    </p:animEffect>
+                                  </p:childTnLst>
+                                </p:cTn>
+                              </p:par>
+                            </p:childTnLst>
+                          </p:cTn>
+                        </p:par>
+                      </p:childTnLst>
+                    </p:cTn>
+                  </p:par>
+                </p:childTnLst>
+              </p:cTn>
+              <p:prevCondLst>
+                <p:cond evt="onPrev" delay="0">
+                  <p:tgtEl>
+                    <p:sldTgt/>
+                  </p:tgtEl>
+                </p:cond>
+              </p:prevCondLst>
+              <p:nextCondLst>
+                <p:cond evt="onNext" delay="0">
+                  <p:tgtEl>
+                    <p:sldTgt/>
+                  </p:tgtEl>
+                </p:cond>
+              </p:nextCondLst>
+            </p:seq>
+          </p:childTnLst>
+        </p:cTn>
+      </p:par>
+    </p:tnLst>
+  </p:timing>
+</p:sld>
+</file>
+
+<file path=ppt/slides/slide7.xml><?xml version="1.0" encoding="utf-8"?>
 <p:sld xmlns:a="http://schemas.openxmlformats.org/drawingml/2006/main" xmlns:r="http://schemas.openxmlformats.org/officeDocument/2006/relationships" xmlns:p="http://schemas.openxmlformats.org/presentationml/2006/main">
   <p:cSld>
     <p:spTree>
@@ -10576,924 +11643,6 @@
 </p:sld>
 </file>
 
-<file path=ppt/slides/slide7.xml><?xml version="1.0" encoding="utf-8"?>
-<p:sld xmlns:a="http://schemas.openxmlformats.org/drawingml/2006/main" xmlns:r="http://schemas.openxmlformats.org/officeDocument/2006/relationships" xmlns:p="http://schemas.openxmlformats.org/presentationml/2006/main">
-  <p:cSld>
-    <p:spTree>
-      <p:nvGrpSpPr>
-        <p:cNvPr id="1" name=""/>
-        <p:cNvGrpSpPr/>
-        <p:nvPr/>
-      </p:nvGrpSpPr>
-      <p:grpSpPr>
-        <a:xfrm>
-          <a:off x="0" y="0"/>
-          <a:ext cx="0" cy="0"/>
-          <a:chOff x="0" y="0"/>
-          <a:chExt cx="0" cy="0"/>
-        </a:xfrm>
-      </p:grpSpPr>
-      <p:sp>
-        <p:nvSpPr>
-          <p:cNvPr id="2" name="Title 1">
-            <a:extLst>
-              <a:ext uri="{FF2B5EF4-FFF2-40B4-BE49-F238E27FC236}">
-                <a16:creationId xmlns:a16="http://schemas.microsoft.com/office/drawing/2014/main" id="{1528F573-1228-4F47-A896-C17320E88411}"/>
-              </a:ext>
-            </a:extLst>
-          </p:cNvPr>
-          <p:cNvSpPr txBox="1">
-            <a:spLocks/>
-          </p:cNvSpPr>
-          <p:nvPr/>
-        </p:nvSpPr>
-        <p:spPr>
-          <a:xfrm>
-            <a:off x="1522414" y="274638"/>
-            <a:ext cx="9143998" cy="1020762"/>
-          </a:xfrm>
-          <a:prstGeom prst="rect">
-            <a:avLst/>
-          </a:prstGeom>
-        </p:spPr>
-        <p:txBody>
-          <a:bodyPr/>
-          <a:lstStyle>
-            <a:lvl1pPr algn="ctr" defTabSz="914400" rtl="0" eaLnBrk="1" latinLnBrk="0" hangingPunct="1">
-              <a:lnSpc>
-                <a:spcPct val="90000"/>
-              </a:lnSpc>
-              <a:spcBef>
-                <a:spcPct val="0"/>
-              </a:spcBef>
-              <a:buNone/>
-              <a:defRPr sz="3400" b="1" i="0" kern="1200" cap="all">
-                <a:solidFill>
-                  <a:schemeClr val="tx1"/>
-                </a:solidFill>
-                <a:effectLst>
-                  <a:outerShdw blurRad="50800" dist="63500" dir="2700000" algn="tl" rotWithShape="0">
-                    <a:srgbClr val="000000">
-                      <a:alpha val="48000"/>
-                    </a:srgbClr>
-                  </a:outerShdw>
-                </a:effectLst>
-                <a:latin typeface="+mj-lt"/>
-                <a:ea typeface="+mj-ea"/>
-                <a:cs typeface="+mj-cs"/>
-              </a:defRPr>
-            </a:lvl1pPr>
-          </a:lstStyle>
-          <a:p>
-            <a:r>
-              <a:rPr lang="en-US"/>
-              <a:t>Tools and Technologies</a:t>
-            </a:r>
-            <a:endParaRPr lang="en-US" dirty="0"/>
-          </a:p>
-        </p:txBody>
-      </p:sp>
-      <p:sp>
-        <p:nvSpPr>
-          <p:cNvPr id="3" name="Text Placeholder 3">
-            <a:extLst>
-              <a:ext uri="{FF2B5EF4-FFF2-40B4-BE49-F238E27FC236}">
-                <a16:creationId xmlns:a16="http://schemas.microsoft.com/office/drawing/2014/main" id="{F516A39C-82C6-4930-93A0-5A8E24253F54}"/>
-              </a:ext>
-            </a:extLst>
-          </p:cNvPr>
-          <p:cNvSpPr txBox="1">
-            <a:spLocks/>
-          </p:cNvSpPr>
-          <p:nvPr/>
-        </p:nvSpPr>
-        <p:spPr>
-          <a:xfrm>
-            <a:off x="1259853" y="2587222"/>
-            <a:ext cx="3108245" cy="2229538"/>
-          </a:xfrm>
-          <a:prstGeom prst="rect">
-            <a:avLst/>
-          </a:prstGeom>
-        </p:spPr>
-        <p:txBody>
-          <a:bodyPr>
-            <a:normAutofit/>
-          </a:bodyPr>
-          <a:lstStyle>
-            <a:lvl1pPr marL="228600" indent="-228600" algn="l" defTabSz="914400" rtl="0" eaLnBrk="1" latinLnBrk="0" hangingPunct="1">
-              <a:lnSpc>
-                <a:spcPct val="120000"/>
-              </a:lnSpc>
-              <a:spcBef>
-                <a:spcPts val="1000"/>
-              </a:spcBef>
-              <a:buFont typeface="Arial" panose="020B0604020202020204" pitchFamily="34" charset="0"/>
-              <a:buChar char="•"/>
-              <a:defRPr sz="2000" kern="1200">
-                <a:solidFill>
-                  <a:schemeClr val="tx1"/>
-                </a:solidFill>
-                <a:effectLst>
-                  <a:outerShdw blurRad="50800" dist="38100" dir="2700000" algn="tl" rotWithShape="0">
-                    <a:srgbClr val="000000">
-                      <a:alpha val="48000"/>
-                    </a:srgbClr>
-                  </a:outerShdw>
-                </a:effectLst>
-                <a:latin typeface="+mn-lt"/>
-                <a:ea typeface="+mn-ea"/>
-                <a:cs typeface="+mn-cs"/>
-              </a:defRPr>
-            </a:lvl1pPr>
-            <a:lvl2pPr marL="685800" indent="-228600" algn="l" defTabSz="914400" rtl="0" eaLnBrk="1" latinLnBrk="0" hangingPunct="1">
-              <a:lnSpc>
-                <a:spcPct val="120000"/>
-              </a:lnSpc>
-              <a:spcBef>
-                <a:spcPts val="500"/>
-              </a:spcBef>
-              <a:buFont typeface="Arial" panose="020B0604020202020204" pitchFamily="34" charset="0"/>
-              <a:buChar char="•"/>
-              <a:defRPr sz="1800" kern="1200">
-                <a:solidFill>
-                  <a:schemeClr val="tx1"/>
-                </a:solidFill>
-                <a:effectLst>
-                  <a:outerShdw blurRad="50800" dist="38100" dir="2700000" algn="tl" rotWithShape="0">
-                    <a:srgbClr val="000000">
-                      <a:alpha val="48000"/>
-                    </a:srgbClr>
-                  </a:outerShdw>
-                </a:effectLst>
-                <a:latin typeface="+mn-lt"/>
-                <a:ea typeface="+mn-ea"/>
-                <a:cs typeface="+mn-cs"/>
-              </a:defRPr>
-            </a:lvl2pPr>
-            <a:lvl3pPr marL="1143000" indent="-228600" algn="l" defTabSz="914400" rtl="0" eaLnBrk="1" latinLnBrk="0" hangingPunct="1">
-              <a:lnSpc>
-                <a:spcPct val="120000"/>
-              </a:lnSpc>
-              <a:spcBef>
-                <a:spcPts val="500"/>
-              </a:spcBef>
-              <a:buFont typeface="Arial" panose="020B0604020202020204" pitchFamily="34" charset="0"/>
-              <a:buChar char="•"/>
-              <a:defRPr sz="1600" kern="1200">
-                <a:solidFill>
-                  <a:schemeClr val="tx1"/>
-                </a:solidFill>
-                <a:effectLst>
-                  <a:outerShdw blurRad="50800" dist="38100" dir="2700000" algn="tl" rotWithShape="0">
-                    <a:srgbClr val="000000">
-                      <a:alpha val="48000"/>
-                    </a:srgbClr>
-                  </a:outerShdw>
-                </a:effectLst>
-                <a:latin typeface="+mn-lt"/>
-                <a:ea typeface="+mn-ea"/>
-                <a:cs typeface="+mn-cs"/>
-              </a:defRPr>
-            </a:lvl3pPr>
-            <a:lvl4pPr marL="1600200" indent="-228600" algn="l" defTabSz="914400" rtl="0" eaLnBrk="1" latinLnBrk="0" hangingPunct="1">
-              <a:lnSpc>
-                <a:spcPct val="120000"/>
-              </a:lnSpc>
-              <a:spcBef>
-                <a:spcPts val="500"/>
-              </a:spcBef>
-              <a:buFont typeface="Arial" panose="020B0604020202020204" pitchFamily="34" charset="0"/>
-              <a:buChar char="•"/>
-              <a:defRPr sz="1400" kern="1200">
-                <a:solidFill>
-                  <a:schemeClr val="tx1"/>
-                </a:solidFill>
-                <a:effectLst>
-                  <a:outerShdw blurRad="50800" dist="38100" dir="2700000" algn="tl" rotWithShape="0">
-                    <a:srgbClr val="000000">
-                      <a:alpha val="48000"/>
-                    </a:srgbClr>
-                  </a:outerShdw>
-                </a:effectLst>
-                <a:latin typeface="+mn-lt"/>
-                <a:ea typeface="+mn-ea"/>
-                <a:cs typeface="+mn-cs"/>
-              </a:defRPr>
-            </a:lvl4pPr>
-            <a:lvl5pPr marL="2057400" indent="-228600" algn="l" defTabSz="914400" rtl="0" eaLnBrk="1" latinLnBrk="0" hangingPunct="1">
-              <a:lnSpc>
-                <a:spcPct val="120000"/>
-              </a:lnSpc>
-              <a:spcBef>
-                <a:spcPts val="500"/>
-              </a:spcBef>
-              <a:buFont typeface="Arial" panose="020B0604020202020204" pitchFamily="34" charset="0"/>
-              <a:buChar char="•"/>
-              <a:defRPr sz="1200" kern="1200">
-                <a:solidFill>
-                  <a:schemeClr val="tx1"/>
-                </a:solidFill>
-                <a:effectLst>
-                  <a:outerShdw blurRad="50800" dist="38100" dir="2700000" algn="tl" rotWithShape="0">
-                    <a:srgbClr val="000000">
-                      <a:alpha val="48000"/>
-                    </a:srgbClr>
-                  </a:outerShdw>
-                </a:effectLst>
-                <a:latin typeface="+mn-lt"/>
-                <a:ea typeface="+mn-ea"/>
-                <a:cs typeface="+mn-cs"/>
-              </a:defRPr>
-            </a:lvl5pPr>
-            <a:lvl6pPr marL="2514600" indent="-228600" algn="l" defTabSz="914400" rtl="0" eaLnBrk="1" latinLnBrk="0" hangingPunct="1">
-              <a:lnSpc>
-                <a:spcPct val="120000"/>
-              </a:lnSpc>
-              <a:spcBef>
-                <a:spcPts val="500"/>
-              </a:spcBef>
-              <a:buFont typeface="Arial" panose="020B0604020202020204" pitchFamily="34" charset="0"/>
-              <a:buChar char="•"/>
-              <a:defRPr sz="1200" kern="1200">
-                <a:solidFill>
-                  <a:schemeClr val="tx1"/>
-                </a:solidFill>
-                <a:effectLst>
-                  <a:outerShdw blurRad="50800" dist="38100" dir="2700000" algn="tl" rotWithShape="0">
-                    <a:srgbClr val="000000">
-                      <a:alpha val="48000"/>
-                    </a:srgbClr>
-                  </a:outerShdw>
-                </a:effectLst>
-                <a:latin typeface="+mn-lt"/>
-                <a:ea typeface="+mn-ea"/>
-                <a:cs typeface="+mn-cs"/>
-              </a:defRPr>
-            </a:lvl6pPr>
-            <a:lvl7pPr marL="2971800" indent="-228600" algn="l" defTabSz="914400" rtl="0" eaLnBrk="1" latinLnBrk="0" hangingPunct="1">
-              <a:lnSpc>
-                <a:spcPct val="120000"/>
-              </a:lnSpc>
-              <a:spcBef>
-                <a:spcPts val="500"/>
-              </a:spcBef>
-              <a:buFont typeface="Arial" panose="020B0604020202020204" pitchFamily="34" charset="0"/>
-              <a:buChar char="•"/>
-              <a:defRPr sz="1200" kern="1200">
-                <a:solidFill>
-                  <a:schemeClr val="tx1"/>
-                </a:solidFill>
-                <a:effectLst>
-                  <a:outerShdw blurRad="50800" dist="38100" dir="2700000" algn="tl" rotWithShape="0">
-                    <a:srgbClr val="000000">
-                      <a:alpha val="48000"/>
-                    </a:srgbClr>
-                  </a:outerShdw>
-                </a:effectLst>
-                <a:latin typeface="+mn-lt"/>
-                <a:ea typeface="+mn-ea"/>
-                <a:cs typeface="+mn-cs"/>
-              </a:defRPr>
-            </a:lvl7pPr>
-            <a:lvl8pPr marL="3429000" indent="-228600" algn="l" defTabSz="914400" rtl="0" eaLnBrk="1" latinLnBrk="0" hangingPunct="1">
-              <a:lnSpc>
-                <a:spcPct val="120000"/>
-              </a:lnSpc>
-              <a:spcBef>
-                <a:spcPts val="500"/>
-              </a:spcBef>
-              <a:buFont typeface="Arial" panose="020B0604020202020204" pitchFamily="34" charset="0"/>
-              <a:buChar char="•"/>
-              <a:defRPr sz="1200" kern="1200">
-                <a:solidFill>
-                  <a:schemeClr val="tx1"/>
-                </a:solidFill>
-                <a:effectLst>
-                  <a:outerShdw blurRad="50800" dist="38100" dir="2700000" algn="tl" rotWithShape="0">
-                    <a:srgbClr val="000000">
-                      <a:alpha val="48000"/>
-                    </a:srgbClr>
-                  </a:outerShdw>
-                </a:effectLst>
-                <a:latin typeface="+mn-lt"/>
-                <a:ea typeface="+mn-ea"/>
-                <a:cs typeface="+mn-cs"/>
-              </a:defRPr>
-            </a:lvl8pPr>
-            <a:lvl9pPr marL="3886200" indent="-228600" algn="l" defTabSz="914400" rtl="0" eaLnBrk="1" latinLnBrk="0" hangingPunct="1">
-              <a:lnSpc>
-                <a:spcPct val="120000"/>
-              </a:lnSpc>
-              <a:spcBef>
-                <a:spcPts val="500"/>
-              </a:spcBef>
-              <a:buFont typeface="Arial" panose="020B0604020202020204" pitchFamily="34" charset="0"/>
-              <a:buChar char="•"/>
-              <a:defRPr sz="1200" kern="1200">
-                <a:solidFill>
-                  <a:schemeClr val="tx1"/>
-                </a:solidFill>
-                <a:effectLst>
-                  <a:outerShdw blurRad="50800" dist="38100" dir="2700000" algn="tl" rotWithShape="0">
-                    <a:srgbClr val="000000">
-                      <a:alpha val="48000"/>
-                    </a:srgbClr>
-                  </a:outerShdw>
-                </a:effectLst>
-                <a:latin typeface="+mn-lt"/>
-                <a:ea typeface="+mn-ea"/>
-                <a:cs typeface="+mn-cs"/>
-              </a:defRPr>
-            </a:lvl9pPr>
-          </a:lstStyle>
-          <a:p>
-            <a:pPr algn="r"/>
-            <a:r>
-              <a:rPr lang="en-US" sz="1800"/>
-              <a:t>We will be using technologies to train our model, build our website, maintain our repository and design our user interface.</a:t>
-            </a:r>
-            <a:endParaRPr lang="en-US" sz="1800" dirty="0"/>
-          </a:p>
-        </p:txBody>
-      </p:sp>
-      <p:pic>
-        <p:nvPicPr>
-          <p:cNvPr id="4" name="Picture 4" descr="Image result for html png">
-            <a:extLst>
-              <a:ext uri="{FF2B5EF4-FFF2-40B4-BE49-F238E27FC236}">
-                <a16:creationId xmlns:a16="http://schemas.microsoft.com/office/drawing/2014/main" id="{24ABEFE5-C70E-4AA4-9196-8052F8640278}"/>
-              </a:ext>
-            </a:extLst>
-          </p:cNvPr>
-          <p:cNvPicPr>
-            <a:picLocks noChangeAspect="1" noChangeArrowheads="1"/>
-          </p:cNvPicPr>
-          <p:nvPr/>
-        </p:nvPicPr>
-        <p:blipFill>
-          <a:blip r:embed="rId2">
-            <a:duotone>
-              <a:schemeClr val="accent1">
-                <a:shade val="45000"/>
-                <a:satMod val="135000"/>
-              </a:schemeClr>
-              <a:prstClr val="white"/>
-            </a:duotone>
-            <a:extLst>
-              <a:ext uri="{28A0092B-C50C-407E-A947-70E740481C1C}">
-                <a14:useLocalDpi xmlns:a14="http://schemas.microsoft.com/office/drawing/2010/main" val="0"/>
-              </a:ext>
-            </a:extLst>
-          </a:blip>
-          <a:srcRect/>
-          <a:stretch>
-            <a:fillRect/>
-          </a:stretch>
-        </p:blipFill>
-        <p:spPr bwMode="auto">
-          <a:xfrm>
-            <a:off x="4899773" y="1948134"/>
-            <a:ext cx="2727614" cy="1600200"/>
-          </a:xfrm>
-          <a:prstGeom prst="rect">
-            <a:avLst/>
-          </a:prstGeom>
-          <a:noFill/>
-          <a:extLst>
-            <a:ext uri="{909E8E84-426E-40DD-AFC4-6F175D3DCCD1}">
-              <a14:hiddenFill xmlns:a14="http://schemas.microsoft.com/office/drawing/2010/main">
-                <a:solidFill>
-                  <a:srgbClr val="FFFFFF"/>
-                </a:solidFill>
-              </a14:hiddenFill>
-            </a:ext>
-          </a:extLst>
-        </p:spPr>
-      </p:pic>
-      <p:pic>
-        <p:nvPicPr>
-          <p:cNvPr id="5" name="Picture 6" descr="Image result for django png">
-            <a:extLst>
-              <a:ext uri="{FF2B5EF4-FFF2-40B4-BE49-F238E27FC236}">
-                <a16:creationId xmlns:a16="http://schemas.microsoft.com/office/drawing/2014/main" id="{E6C1FFF1-6EEE-4B94-A661-AC39DC51EE6E}"/>
-              </a:ext>
-            </a:extLst>
-          </p:cNvPr>
-          <p:cNvPicPr>
-            <a:picLocks noChangeAspect="1" noChangeArrowheads="1"/>
-          </p:cNvPicPr>
-          <p:nvPr/>
-        </p:nvPicPr>
-        <p:blipFill>
-          <a:blip r:embed="rId3">
-            <a:duotone>
-              <a:schemeClr val="accent1">
-                <a:shade val="45000"/>
-                <a:satMod val="135000"/>
-              </a:schemeClr>
-              <a:prstClr val="white"/>
-            </a:duotone>
-            <a:extLst>
-              <a:ext uri="{28A0092B-C50C-407E-A947-70E740481C1C}">
-                <a14:useLocalDpi xmlns:a14="http://schemas.microsoft.com/office/drawing/2010/main" val="0"/>
-              </a:ext>
-            </a:extLst>
-          </a:blip>
-          <a:srcRect/>
-          <a:stretch>
-            <a:fillRect/>
-          </a:stretch>
-        </p:blipFill>
-        <p:spPr bwMode="auto">
-          <a:xfrm>
-            <a:off x="8105285" y="3195059"/>
-            <a:ext cx="1971675" cy="1971676"/>
-          </a:xfrm>
-          <a:prstGeom prst="rect">
-            <a:avLst/>
-          </a:prstGeom>
-          <a:noFill/>
-          <a:extLst>
-            <a:ext uri="{909E8E84-426E-40DD-AFC4-6F175D3DCCD1}">
-              <a14:hiddenFill xmlns:a14="http://schemas.microsoft.com/office/drawing/2010/main">
-                <a:solidFill>
-                  <a:srgbClr val="FFFFFF"/>
-                </a:solidFill>
-              </a14:hiddenFill>
-            </a:ext>
-          </a:extLst>
-        </p:spPr>
-      </p:pic>
-      <p:pic>
-        <p:nvPicPr>
-          <p:cNvPr id="6" name="Picture 10" descr="Image result for mysql png">
-            <a:extLst>
-              <a:ext uri="{FF2B5EF4-FFF2-40B4-BE49-F238E27FC236}">
-                <a16:creationId xmlns:a16="http://schemas.microsoft.com/office/drawing/2014/main" id="{F63574C0-6872-4D12-A41A-5FA7A5A51105}"/>
-              </a:ext>
-            </a:extLst>
-          </p:cNvPr>
-          <p:cNvPicPr>
-            <a:picLocks noChangeAspect="1" noChangeArrowheads="1"/>
-          </p:cNvPicPr>
-          <p:nvPr/>
-        </p:nvPicPr>
-        <p:blipFill>
-          <a:blip r:embed="rId4" cstate="print">
-            <a:extLst>
-              <a:ext uri="{28A0092B-C50C-407E-A947-70E740481C1C}">
-                <a14:useLocalDpi xmlns:a14="http://schemas.microsoft.com/office/drawing/2010/main" val="0"/>
-              </a:ext>
-            </a:extLst>
-          </a:blip>
-          <a:srcRect/>
-          <a:stretch>
-            <a:fillRect/>
-          </a:stretch>
-        </p:blipFill>
-        <p:spPr bwMode="auto">
-          <a:xfrm>
-            <a:off x="7872992" y="1962531"/>
-            <a:ext cx="1218130" cy="1218130"/>
-          </a:xfrm>
-          <a:prstGeom prst="rect">
-            <a:avLst/>
-          </a:prstGeom>
-          <a:noFill/>
-          <a:extLst>
-            <a:ext uri="{909E8E84-426E-40DD-AFC4-6F175D3DCCD1}">
-              <a14:hiddenFill xmlns:a14="http://schemas.microsoft.com/office/drawing/2010/main">
-                <a:solidFill>
-                  <a:srgbClr val="FFFFFF"/>
-                </a:solidFill>
-              </a14:hiddenFill>
-            </a:ext>
-          </a:extLst>
-        </p:spPr>
-      </p:pic>
-      <p:pic>
-        <p:nvPicPr>
-          <p:cNvPr id="7" name="Picture 12" descr="Image result for pytorch logo png">
-            <a:extLst>
-              <a:ext uri="{FF2B5EF4-FFF2-40B4-BE49-F238E27FC236}">
-                <a16:creationId xmlns:a16="http://schemas.microsoft.com/office/drawing/2014/main" id="{BABC30A6-B0F1-4433-8327-F9FB90089E73}"/>
-              </a:ext>
-            </a:extLst>
-          </p:cNvPr>
-          <p:cNvPicPr>
-            <a:picLocks noChangeAspect="1" noChangeArrowheads="1"/>
-          </p:cNvPicPr>
-          <p:nvPr/>
-        </p:nvPicPr>
-        <p:blipFill>
-          <a:blip r:embed="rId5" cstate="print">
-            <a:duotone>
-              <a:schemeClr val="accent1">
-                <a:shade val="45000"/>
-                <a:satMod val="135000"/>
-              </a:schemeClr>
-              <a:prstClr val="white"/>
-            </a:duotone>
-            <a:extLst>
-              <a:ext uri="{28A0092B-C50C-407E-A947-70E740481C1C}">
-                <a14:useLocalDpi xmlns:a14="http://schemas.microsoft.com/office/drawing/2010/main" val="0"/>
-              </a:ext>
-            </a:extLst>
-          </a:blip>
-          <a:srcRect/>
-          <a:stretch>
-            <a:fillRect/>
-          </a:stretch>
-        </p:blipFill>
-        <p:spPr bwMode="auto">
-          <a:xfrm>
-            <a:off x="4452448" y="3847793"/>
-            <a:ext cx="3652837" cy="730567"/>
-          </a:xfrm>
-          <a:prstGeom prst="rect">
-            <a:avLst/>
-          </a:prstGeom>
-          <a:noFill/>
-          <a:extLst>
-            <a:ext uri="{909E8E84-426E-40DD-AFC4-6F175D3DCCD1}">
-              <a14:hiddenFill xmlns:a14="http://schemas.microsoft.com/office/drawing/2010/main">
-                <a:solidFill>
-                  <a:srgbClr val="FFFFFF"/>
-                </a:solidFill>
-              </a14:hiddenFill>
-            </a:ext>
-          </a:extLst>
-        </p:spPr>
-      </p:pic>
-      <p:pic>
-        <p:nvPicPr>
-          <p:cNvPr id="8" name="Picture 7">
-            <a:extLst>
-              <a:ext uri="{FF2B5EF4-FFF2-40B4-BE49-F238E27FC236}">
-                <a16:creationId xmlns:a16="http://schemas.microsoft.com/office/drawing/2014/main" id="{12138E35-6600-4C6D-A924-A4B7868F5382}"/>
-              </a:ext>
-            </a:extLst>
-          </p:cNvPr>
-          <p:cNvPicPr>
-            <a:picLocks noChangeAspect="1"/>
-          </p:cNvPicPr>
-          <p:nvPr/>
-        </p:nvPicPr>
-        <p:blipFill>
-          <a:blip r:embed="rId6" cstate="print">
-            <a:duotone>
-              <a:schemeClr val="accent1">
-                <a:shade val="45000"/>
-                <a:satMod val="135000"/>
-              </a:schemeClr>
-              <a:prstClr val="white"/>
-            </a:duotone>
-            <a:extLst>
-              <a:ext uri="{28A0092B-C50C-407E-A947-70E740481C1C}">
-                <a14:useLocalDpi xmlns:a14="http://schemas.microsoft.com/office/drawing/2010/main" val="0"/>
-              </a:ext>
-            </a:extLst>
-          </a:blip>
-          <a:stretch>
-            <a:fillRect/>
-          </a:stretch>
-        </p:blipFill>
-        <p:spPr>
-          <a:xfrm>
-            <a:off x="9218612" y="2248978"/>
-            <a:ext cx="1336246" cy="1336246"/>
-          </a:xfrm>
-          <a:prstGeom prst="rect">
-            <a:avLst/>
-          </a:prstGeom>
-        </p:spPr>
-      </p:pic>
-      <p:pic>
-        <p:nvPicPr>
-          <p:cNvPr id="10" name="Picture 18" descr="Image result for aws png">
-            <a:extLst>
-              <a:ext uri="{FF2B5EF4-FFF2-40B4-BE49-F238E27FC236}">
-                <a16:creationId xmlns:a16="http://schemas.microsoft.com/office/drawing/2014/main" id="{A4A3F486-D0FC-4EC2-921E-299F838FAE29}"/>
-              </a:ext>
-            </a:extLst>
-          </p:cNvPr>
-          <p:cNvPicPr>
-            <a:picLocks noChangeAspect="1" noChangeArrowheads="1"/>
-          </p:cNvPicPr>
-          <p:nvPr/>
-        </p:nvPicPr>
-        <p:blipFill>
-          <a:blip r:embed="rId7" cstate="print">
-            <a:duotone>
-              <a:schemeClr val="accent1">
-                <a:shade val="45000"/>
-                <a:satMod val="135000"/>
-              </a:schemeClr>
-              <a:prstClr val="white"/>
-            </a:duotone>
-            <a:extLst>
-              <a:ext uri="{28A0092B-C50C-407E-A947-70E740481C1C}">
-                <a14:useLocalDpi xmlns:a14="http://schemas.microsoft.com/office/drawing/2010/main" val="0"/>
-              </a:ext>
-            </a:extLst>
-          </a:blip>
-          <a:srcRect/>
-          <a:stretch>
-            <a:fillRect/>
-          </a:stretch>
-        </p:blipFill>
-        <p:spPr bwMode="auto">
-          <a:xfrm>
-            <a:off x="4845996" y="4816760"/>
-            <a:ext cx="2496834" cy="910355"/>
-          </a:xfrm>
-          <a:prstGeom prst="rect">
-            <a:avLst/>
-          </a:prstGeom>
-          <a:noFill/>
-          <a:extLst>
-            <a:ext uri="{909E8E84-426E-40DD-AFC4-6F175D3DCCD1}">
-              <a14:hiddenFill xmlns:a14="http://schemas.microsoft.com/office/drawing/2010/main">
-                <a:solidFill>
-                  <a:srgbClr val="FFFFFF"/>
-                </a:solidFill>
-              </a14:hiddenFill>
-            </a:ext>
-          </a:extLst>
-        </p:spPr>
-      </p:pic>
-    </p:spTree>
-    <p:extLst>
-      <p:ext uri="{BB962C8B-B14F-4D97-AF65-F5344CB8AC3E}">
-        <p14:creationId xmlns:p14="http://schemas.microsoft.com/office/powerpoint/2010/main" val="4286404225"/>
-      </p:ext>
-    </p:extLst>
-  </p:cSld>
-  <p:clrMapOvr>
-    <a:masterClrMapping/>
-  </p:clrMapOvr>
-  <p:timing>
-    <p:tnLst>
-      <p:par>
-        <p:cTn id="1" dur="indefinite" restart="never" nodeType="tmRoot">
-          <p:childTnLst>
-            <p:seq concurrent="1" nextAc="seek">
-              <p:cTn id="2" dur="indefinite" nodeType="mainSeq">
-                <p:childTnLst>
-                  <p:par>
-                    <p:cTn id="3" fill="hold">
-                      <p:stCondLst>
-                        <p:cond delay="indefinite"/>
-                      </p:stCondLst>
-                      <p:childTnLst>
-                        <p:par>
-                          <p:cTn id="4" fill="hold">
-                            <p:stCondLst>
-                              <p:cond delay="0"/>
-                            </p:stCondLst>
-                            <p:childTnLst>
-                              <p:par>
-                                <p:cTn id="5" presetID="10" presetClass="entr" presetSubtype="0" fill="hold" nodeType="clickEffect">
-                                  <p:stCondLst>
-                                    <p:cond delay="0"/>
-                                  </p:stCondLst>
-                                  <p:childTnLst>
-                                    <p:set>
-                                      <p:cBhvr>
-                                        <p:cTn id="6" dur="1" fill="hold">
-                                          <p:stCondLst>
-                                            <p:cond delay="0"/>
-                                          </p:stCondLst>
-                                        </p:cTn>
-                                        <p:tgtEl>
-                                          <p:spTgt spid="4"/>
-                                        </p:tgtEl>
-                                        <p:attrNameLst>
-                                          <p:attrName>style.visibility</p:attrName>
-                                        </p:attrNameLst>
-                                      </p:cBhvr>
-                                      <p:to>
-                                        <p:strVal val="visible"/>
-                                      </p:to>
-                                    </p:set>
-                                    <p:animEffect transition="in" filter="fade">
-                                      <p:cBhvr>
-                                        <p:cTn id="7" dur="500"/>
-                                        <p:tgtEl>
-                                          <p:spTgt spid="4"/>
-                                        </p:tgtEl>
-                                      </p:cBhvr>
-                                    </p:animEffect>
-                                  </p:childTnLst>
-                                </p:cTn>
-                              </p:par>
-                              <p:par>
-                                <p:cTn id="8" presetID="10" presetClass="entr" presetSubtype="0" fill="hold" nodeType="withEffect">
-                                  <p:stCondLst>
-                                    <p:cond delay="0"/>
-                                  </p:stCondLst>
-                                  <p:childTnLst>
-                                    <p:set>
-                                      <p:cBhvr>
-                                        <p:cTn id="9" dur="1" fill="hold">
-                                          <p:stCondLst>
-                                            <p:cond delay="0"/>
-                                          </p:stCondLst>
-                                        </p:cTn>
-                                        <p:tgtEl>
-                                          <p:spTgt spid="6"/>
-                                        </p:tgtEl>
-                                        <p:attrNameLst>
-                                          <p:attrName>style.visibility</p:attrName>
-                                        </p:attrNameLst>
-                                      </p:cBhvr>
-                                      <p:to>
-                                        <p:strVal val="visible"/>
-                                      </p:to>
-                                    </p:set>
-                                    <p:animEffect transition="in" filter="fade">
-                                      <p:cBhvr>
-                                        <p:cTn id="10" dur="500"/>
-                                        <p:tgtEl>
-                                          <p:spTgt spid="6"/>
-                                        </p:tgtEl>
-                                      </p:cBhvr>
-                                    </p:animEffect>
-                                  </p:childTnLst>
-                                </p:cTn>
-                              </p:par>
-                              <p:par>
-                                <p:cTn id="11" presetID="10" presetClass="entr" presetSubtype="0" fill="hold" nodeType="withEffect">
-                                  <p:stCondLst>
-                                    <p:cond delay="0"/>
-                                  </p:stCondLst>
-                                  <p:childTnLst>
-                                    <p:set>
-                                      <p:cBhvr>
-                                        <p:cTn id="12" dur="1" fill="hold">
-                                          <p:stCondLst>
-                                            <p:cond delay="0"/>
-                                          </p:stCondLst>
-                                        </p:cTn>
-                                        <p:tgtEl>
-                                          <p:spTgt spid="8"/>
-                                        </p:tgtEl>
-                                        <p:attrNameLst>
-                                          <p:attrName>style.visibility</p:attrName>
-                                        </p:attrNameLst>
-                                      </p:cBhvr>
-                                      <p:to>
-                                        <p:strVal val="visible"/>
-                                      </p:to>
-                                    </p:set>
-                                    <p:animEffect transition="in" filter="fade">
-                                      <p:cBhvr>
-                                        <p:cTn id="13" dur="500"/>
-                                        <p:tgtEl>
-                                          <p:spTgt spid="8"/>
-                                        </p:tgtEl>
-                                      </p:cBhvr>
-                                    </p:animEffect>
-                                  </p:childTnLst>
-                                </p:cTn>
-                              </p:par>
-                              <p:par>
-                                <p:cTn id="14" presetID="10" presetClass="entr" presetSubtype="0" fill="hold" nodeType="withEffect">
-                                  <p:stCondLst>
-                                    <p:cond delay="0"/>
-                                  </p:stCondLst>
-                                  <p:childTnLst>
-                                    <p:set>
-                                      <p:cBhvr>
-                                        <p:cTn id="15" dur="1" fill="hold">
-                                          <p:stCondLst>
-                                            <p:cond delay="0"/>
-                                          </p:stCondLst>
-                                        </p:cTn>
-                                        <p:tgtEl>
-                                          <p:spTgt spid="5"/>
-                                        </p:tgtEl>
-                                        <p:attrNameLst>
-                                          <p:attrName>style.visibility</p:attrName>
-                                        </p:attrNameLst>
-                                      </p:cBhvr>
-                                      <p:to>
-                                        <p:strVal val="visible"/>
-                                      </p:to>
-                                    </p:set>
-                                    <p:animEffect transition="in" filter="fade">
-                                      <p:cBhvr>
-                                        <p:cTn id="16" dur="500"/>
-                                        <p:tgtEl>
-                                          <p:spTgt spid="5"/>
-                                        </p:tgtEl>
-                                      </p:cBhvr>
-                                    </p:animEffect>
-                                  </p:childTnLst>
-                                </p:cTn>
-                              </p:par>
-                              <p:par>
-                                <p:cTn id="17" presetID="10" presetClass="entr" presetSubtype="0" fill="hold" nodeType="withEffect">
-                                  <p:stCondLst>
-                                    <p:cond delay="0"/>
-                                  </p:stCondLst>
-                                  <p:childTnLst>
-                                    <p:set>
-                                      <p:cBhvr>
-                                        <p:cTn id="18" dur="1" fill="hold">
-                                          <p:stCondLst>
-                                            <p:cond delay="0"/>
-                                          </p:stCondLst>
-                                        </p:cTn>
-                                        <p:tgtEl>
-                                          <p:spTgt spid="7"/>
-                                        </p:tgtEl>
-                                        <p:attrNameLst>
-                                          <p:attrName>style.visibility</p:attrName>
-                                        </p:attrNameLst>
-                                      </p:cBhvr>
-                                      <p:to>
-                                        <p:strVal val="visible"/>
-                                      </p:to>
-                                    </p:set>
-                                    <p:animEffect transition="in" filter="fade">
-                                      <p:cBhvr>
-                                        <p:cTn id="19" dur="500"/>
-                                        <p:tgtEl>
-                                          <p:spTgt spid="7"/>
-                                        </p:tgtEl>
-                                      </p:cBhvr>
-                                    </p:animEffect>
-                                  </p:childTnLst>
-                                </p:cTn>
-                              </p:par>
-                              <p:par>
-                                <p:cTn id="20" presetID="10" presetClass="entr" presetSubtype="0" fill="hold" nodeType="withEffect">
-                                  <p:stCondLst>
-                                    <p:cond delay="0"/>
-                                  </p:stCondLst>
-                                  <p:childTnLst>
-                                    <p:set>
-                                      <p:cBhvr>
-                                        <p:cTn id="21" dur="1" fill="hold">
-                                          <p:stCondLst>
-                                            <p:cond delay="0"/>
-                                          </p:stCondLst>
-                                        </p:cTn>
-                                        <p:tgtEl>
-                                          <p:spTgt spid="10"/>
-                                        </p:tgtEl>
-                                        <p:attrNameLst>
-                                          <p:attrName>style.visibility</p:attrName>
-                                        </p:attrNameLst>
-                                      </p:cBhvr>
-                                      <p:to>
-                                        <p:strVal val="visible"/>
-                                      </p:to>
-                                    </p:set>
-                                    <p:animEffect transition="in" filter="fade">
-                                      <p:cBhvr>
-                                        <p:cTn id="22" dur="500"/>
-                                        <p:tgtEl>
-                                          <p:spTgt spid="10"/>
-                                        </p:tgtEl>
-                                      </p:cBhvr>
-                                    </p:animEffect>
-                                  </p:childTnLst>
-                                </p:cTn>
-                              </p:par>
-                            </p:childTnLst>
-                          </p:cTn>
-                        </p:par>
-                      </p:childTnLst>
-                    </p:cTn>
-                  </p:par>
-                </p:childTnLst>
-              </p:cTn>
-              <p:prevCondLst>
-                <p:cond evt="onPrev" delay="0">
-                  <p:tgtEl>
-                    <p:sldTgt/>
-                  </p:tgtEl>
-                </p:cond>
-              </p:prevCondLst>
-              <p:nextCondLst>
-                <p:cond evt="onNext" delay="0">
-                  <p:tgtEl>
-                    <p:sldTgt/>
-                  </p:tgtEl>
-                </p:cond>
-              </p:nextCondLst>
-            </p:seq>
-          </p:childTnLst>
-        </p:cTn>
-      </p:par>
-    </p:tnLst>
-  </p:timing>
-</p:sld>
-</file>
-
 <file path=ppt/slides/slide8.xml><?xml version="1.0" encoding="utf-8"?>
 <p:sld xmlns:a="http://schemas.openxmlformats.org/drawingml/2006/main" xmlns:r="http://schemas.openxmlformats.org/officeDocument/2006/relationships" xmlns:p="http://schemas.openxmlformats.org/presentationml/2006/main">
   <p:cSld>
@@ -11602,7 +11751,7 @@
           <p:cNvPr id="2" name="Title 1">
             <a:extLst>
               <a:ext uri="{FF2B5EF4-FFF2-40B4-BE49-F238E27FC236}">
-                <a16:creationId xmlns:a16="http://schemas.microsoft.com/office/drawing/2014/main" id="{62EF31A1-7452-4EF4-B263-015677E34336}"/>
+                <a16:creationId xmlns:a16="http://schemas.microsoft.com/office/drawing/2014/main" id="{14703E39-E430-4B50-A2DB-D169662EB9EC}"/>
               </a:ext>
             </a:extLst>
           </p:cNvPr>
@@ -11620,7 +11769,7 @@
           <a:p>
             <a:r>
               <a:rPr lang="en-US" dirty="0"/>
-              <a:t>Feedback taken into account</a:t>
+              <a:t>Project Backlog</a:t>
             </a:r>
           </a:p>
         </p:txBody>
@@ -11630,7 +11779,7 @@
           <p:cNvPr id="3" name="Content Placeholder 2">
             <a:extLst>
               <a:ext uri="{FF2B5EF4-FFF2-40B4-BE49-F238E27FC236}">
-                <a16:creationId xmlns:a16="http://schemas.microsoft.com/office/drawing/2014/main" id="{2068CF96-761E-4149-89D8-F481FDC9090C}"/>
+                <a16:creationId xmlns:a16="http://schemas.microsoft.com/office/drawing/2014/main" id="{3CE9087A-016F-42D0-BAF3-8C3AEB5B9E01}"/>
               </a:ext>
             </a:extLst>
           </p:cNvPr>
@@ -11641,19 +11790,1028 @@
             <p:ph idx="1"/>
           </p:nvPr>
         </p:nvSpPr>
-        <p:spPr/>
-        <p:txBody>
-          <a:bodyPr/>
+        <p:spPr>
+          <a:xfrm>
+            <a:off x="3133543" y="2246130"/>
+            <a:ext cx="3306511" cy="2365739"/>
+          </a:xfrm>
+        </p:spPr>
+        <p:txBody>
+          <a:bodyPr>
+            <a:normAutofit/>
+          </a:bodyPr>
           <a:lstStyle/>
           <a:p>
-            <a:endParaRPr lang="en-US"/>
+            <a:r>
+              <a:rPr lang="en-US" sz="1600" dirty="0"/>
+              <a:t>Screens for Mobile App:</a:t>
+            </a:r>
+            <a:endParaRPr lang="en-US" sz="1600" dirty="0">
+              <a:effectLst/>
+            </a:endParaRPr>
+          </a:p>
+          <a:p>
+            <a:r>
+              <a:rPr lang="en-US" sz="1600" dirty="0">
+                <a:effectLst/>
+              </a:rPr>
+              <a:t>Login Page</a:t>
+            </a:r>
+          </a:p>
+          <a:p>
+            <a:r>
+              <a:rPr lang="en-US" sz="1600" dirty="0">
+                <a:effectLst/>
+              </a:rPr>
+              <a:t>Home Screen</a:t>
+            </a:r>
+          </a:p>
+          <a:p>
+            <a:r>
+              <a:rPr lang="en-US" sz="1600" dirty="0">
+                <a:effectLst/>
+              </a:rPr>
+              <a:t>Shop Page</a:t>
+            </a:r>
+          </a:p>
+          <a:p>
+            <a:r>
+              <a:rPr lang="en-US" sz="1600" dirty="0">
+                <a:effectLst/>
+              </a:rPr>
+              <a:t>Upload Items Page</a:t>
+            </a:r>
+          </a:p>
+          <a:p>
+            <a:pPr marL="0" indent="0">
+              <a:buNone/>
+            </a:pPr>
+            <a:endParaRPr lang="en-US" sz="1600" dirty="0">
+              <a:effectLst/>
+            </a:endParaRPr>
+          </a:p>
+          <a:p>
+            <a:endParaRPr lang="en-US" sz="1600" dirty="0"/>
+          </a:p>
+          <a:p>
+            <a:endParaRPr lang="en-US" sz="1600" dirty="0"/>
+          </a:p>
+        </p:txBody>
+      </p:sp>
+      <p:sp>
+        <p:nvSpPr>
+          <p:cNvPr id="5" name="Content Placeholder 2">
+            <a:extLst>
+              <a:ext uri="{FF2B5EF4-FFF2-40B4-BE49-F238E27FC236}">
+                <a16:creationId xmlns:a16="http://schemas.microsoft.com/office/drawing/2014/main" id="{05DAFD06-8B9C-4ADE-8FB7-2C564401EE39}"/>
+              </a:ext>
+            </a:extLst>
+          </p:cNvPr>
+          <p:cNvSpPr txBox="1">
+            <a:spLocks/>
+          </p:cNvSpPr>
+          <p:nvPr/>
+        </p:nvSpPr>
+        <p:spPr>
+          <a:xfrm>
+            <a:off x="562973" y="2246130"/>
+            <a:ext cx="3475325" cy="3695136"/>
+          </a:xfrm>
+          <a:prstGeom prst="rect">
+            <a:avLst/>
+          </a:prstGeom>
+        </p:spPr>
+        <p:txBody>
+          <a:bodyPr vert="horz" lIns="91440" tIns="45720" rIns="91440" bIns="45720" rtlCol="0">
+            <a:normAutofit fontScale="77500" lnSpcReduction="20000"/>
+          </a:bodyPr>
+          <a:lstStyle>
+            <a:lvl1pPr marL="228600" indent="-228600" algn="l" defTabSz="914400" rtl="0" eaLnBrk="1" latinLnBrk="0" hangingPunct="1">
+              <a:lnSpc>
+                <a:spcPct val="120000"/>
+              </a:lnSpc>
+              <a:spcBef>
+                <a:spcPts val="1000"/>
+              </a:spcBef>
+              <a:buFont typeface="Arial" panose="020B0604020202020204" pitchFamily="34" charset="0"/>
+              <a:buChar char="•"/>
+              <a:defRPr sz="2000" kern="1200">
+                <a:solidFill>
+                  <a:schemeClr val="tx1"/>
+                </a:solidFill>
+                <a:effectLst>
+                  <a:outerShdw blurRad="50800" dist="38100" dir="2700000" algn="tl" rotWithShape="0">
+                    <a:srgbClr val="000000">
+                      <a:alpha val="48000"/>
+                    </a:srgbClr>
+                  </a:outerShdw>
+                </a:effectLst>
+                <a:latin typeface="+mn-lt"/>
+                <a:ea typeface="+mn-ea"/>
+                <a:cs typeface="+mn-cs"/>
+              </a:defRPr>
+            </a:lvl1pPr>
+            <a:lvl2pPr marL="685800" indent="-228600" algn="l" defTabSz="914400" rtl="0" eaLnBrk="1" latinLnBrk="0" hangingPunct="1">
+              <a:lnSpc>
+                <a:spcPct val="120000"/>
+              </a:lnSpc>
+              <a:spcBef>
+                <a:spcPts val="500"/>
+              </a:spcBef>
+              <a:buFont typeface="Arial" panose="020B0604020202020204" pitchFamily="34" charset="0"/>
+              <a:buChar char="•"/>
+              <a:defRPr sz="1800" kern="1200">
+                <a:solidFill>
+                  <a:schemeClr val="tx1"/>
+                </a:solidFill>
+                <a:effectLst>
+                  <a:outerShdw blurRad="50800" dist="38100" dir="2700000" algn="tl" rotWithShape="0">
+                    <a:srgbClr val="000000">
+                      <a:alpha val="48000"/>
+                    </a:srgbClr>
+                  </a:outerShdw>
+                </a:effectLst>
+                <a:latin typeface="+mn-lt"/>
+                <a:ea typeface="+mn-ea"/>
+                <a:cs typeface="+mn-cs"/>
+              </a:defRPr>
+            </a:lvl2pPr>
+            <a:lvl3pPr marL="1143000" indent="-228600" algn="l" defTabSz="914400" rtl="0" eaLnBrk="1" latinLnBrk="0" hangingPunct="1">
+              <a:lnSpc>
+                <a:spcPct val="120000"/>
+              </a:lnSpc>
+              <a:spcBef>
+                <a:spcPts val="500"/>
+              </a:spcBef>
+              <a:buFont typeface="Arial" panose="020B0604020202020204" pitchFamily="34" charset="0"/>
+              <a:buChar char="•"/>
+              <a:defRPr sz="1600" kern="1200">
+                <a:solidFill>
+                  <a:schemeClr val="tx1"/>
+                </a:solidFill>
+                <a:effectLst>
+                  <a:outerShdw blurRad="50800" dist="38100" dir="2700000" algn="tl" rotWithShape="0">
+                    <a:srgbClr val="000000">
+                      <a:alpha val="48000"/>
+                    </a:srgbClr>
+                  </a:outerShdw>
+                </a:effectLst>
+                <a:latin typeface="+mn-lt"/>
+                <a:ea typeface="+mn-ea"/>
+                <a:cs typeface="+mn-cs"/>
+              </a:defRPr>
+            </a:lvl3pPr>
+            <a:lvl4pPr marL="1600200" indent="-228600" algn="l" defTabSz="914400" rtl="0" eaLnBrk="1" latinLnBrk="0" hangingPunct="1">
+              <a:lnSpc>
+                <a:spcPct val="120000"/>
+              </a:lnSpc>
+              <a:spcBef>
+                <a:spcPts val="500"/>
+              </a:spcBef>
+              <a:buFont typeface="Arial" panose="020B0604020202020204" pitchFamily="34" charset="0"/>
+              <a:buChar char="•"/>
+              <a:defRPr sz="1400" kern="1200">
+                <a:solidFill>
+                  <a:schemeClr val="tx1"/>
+                </a:solidFill>
+                <a:effectLst>
+                  <a:outerShdw blurRad="50800" dist="38100" dir="2700000" algn="tl" rotWithShape="0">
+                    <a:srgbClr val="000000">
+                      <a:alpha val="48000"/>
+                    </a:srgbClr>
+                  </a:outerShdw>
+                </a:effectLst>
+                <a:latin typeface="+mn-lt"/>
+                <a:ea typeface="+mn-ea"/>
+                <a:cs typeface="+mn-cs"/>
+              </a:defRPr>
+            </a:lvl4pPr>
+            <a:lvl5pPr marL="2057400" indent="-228600" algn="l" defTabSz="914400" rtl="0" eaLnBrk="1" latinLnBrk="0" hangingPunct="1">
+              <a:lnSpc>
+                <a:spcPct val="120000"/>
+              </a:lnSpc>
+              <a:spcBef>
+                <a:spcPts val="500"/>
+              </a:spcBef>
+              <a:buFont typeface="Arial" panose="020B0604020202020204" pitchFamily="34" charset="0"/>
+              <a:buChar char="•"/>
+              <a:defRPr sz="1200" kern="1200">
+                <a:solidFill>
+                  <a:schemeClr val="tx1"/>
+                </a:solidFill>
+                <a:effectLst>
+                  <a:outerShdw blurRad="50800" dist="38100" dir="2700000" algn="tl" rotWithShape="0">
+                    <a:srgbClr val="000000">
+                      <a:alpha val="48000"/>
+                    </a:srgbClr>
+                  </a:outerShdw>
+                </a:effectLst>
+                <a:latin typeface="+mn-lt"/>
+                <a:ea typeface="+mn-ea"/>
+                <a:cs typeface="+mn-cs"/>
+              </a:defRPr>
+            </a:lvl5pPr>
+            <a:lvl6pPr marL="2514600" indent="-228600" algn="l" defTabSz="914400" rtl="0" eaLnBrk="1" latinLnBrk="0" hangingPunct="1">
+              <a:lnSpc>
+                <a:spcPct val="120000"/>
+              </a:lnSpc>
+              <a:spcBef>
+                <a:spcPts val="500"/>
+              </a:spcBef>
+              <a:buFont typeface="Arial" panose="020B0604020202020204" pitchFamily="34" charset="0"/>
+              <a:buChar char="•"/>
+              <a:defRPr sz="1200" kern="1200">
+                <a:solidFill>
+                  <a:schemeClr val="tx1"/>
+                </a:solidFill>
+                <a:effectLst>
+                  <a:outerShdw blurRad="50800" dist="38100" dir="2700000" algn="tl" rotWithShape="0">
+                    <a:srgbClr val="000000">
+                      <a:alpha val="48000"/>
+                    </a:srgbClr>
+                  </a:outerShdw>
+                </a:effectLst>
+                <a:latin typeface="+mn-lt"/>
+                <a:ea typeface="+mn-ea"/>
+                <a:cs typeface="+mn-cs"/>
+              </a:defRPr>
+            </a:lvl6pPr>
+            <a:lvl7pPr marL="2971800" indent="-228600" algn="l" defTabSz="914400" rtl="0" eaLnBrk="1" latinLnBrk="0" hangingPunct="1">
+              <a:lnSpc>
+                <a:spcPct val="120000"/>
+              </a:lnSpc>
+              <a:spcBef>
+                <a:spcPts val="500"/>
+              </a:spcBef>
+              <a:buFont typeface="Arial" panose="020B0604020202020204" pitchFamily="34" charset="0"/>
+              <a:buChar char="•"/>
+              <a:defRPr sz="1200" kern="1200">
+                <a:solidFill>
+                  <a:schemeClr val="tx1"/>
+                </a:solidFill>
+                <a:effectLst>
+                  <a:outerShdw blurRad="50800" dist="38100" dir="2700000" algn="tl" rotWithShape="0">
+                    <a:srgbClr val="000000">
+                      <a:alpha val="48000"/>
+                    </a:srgbClr>
+                  </a:outerShdw>
+                </a:effectLst>
+                <a:latin typeface="+mn-lt"/>
+                <a:ea typeface="+mn-ea"/>
+                <a:cs typeface="+mn-cs"/>
+              </a:defRPr>
+            </a:lvl7pPr>
+            <a:lvl8pPr marL="3429000" indent="-228600" algn="l" defTabSz="914400" rtl="0" eaLnBrk="1" latinLnBrk="0" hangingPunct="1">
+              <a:lnSpc>
+                <a:spcPct val="120000"/>
+              </a:lnSpc>
+              <a:spcBef>
+                <a:spcPts val="500"/>
+              </a:spcBef>
+              <a:buFont typeface="Arial" panose="020B0604020202020204" pitchFamily="34" charset="0"/>
+              <a:buChar char="•"/>
+              <a:defRPr sz="1200" kern="1200">
+                <a:solidFill>
+                  <a:schemeClr val="tx1"/>
+                </a:solidFill>
+                <a:effectLst>
+                  <a:outerShdw blurRad="50800" dist="38100" dir="2700000" algn="tl" rotWithShape="0">
+                    <a:srgbClr val="000000">
+                      <a:alpha val="48000"/>
+                    </a:srgbClr>
+                  </a:outerShdw>
+                </a:effectLst>
+                <a:latin typeface="+mn-lt"/>
+                <a:ea typeface="+mn-ea"/>
+                <a:cs typeface="+mn-cs"/>
+              </a:defRPr>
+            </a:lvl8pPr>
+            <a:lvl9pPr marL="3886200" indent="-228600" algn="l" defTabSz="914400" rtl="0" eaLnBrk="1" latinLnBrk="0" hangingPunct="1">
+              <a:lnSpc>
+                <a:spcPct val="120000"/>
+              </a:lnSpc>
+              <a:spcBef>
+                <a:spcPts val="500"/>
+              </a:spcBef>
+              <a:buFont typeface="Arial" panose="020B0604020202020204" pitchFamily="34" charset="0"/>
+              <a:buChar char="•"/>
+              <a:defRPr sz="1200" kern="1200">
+                <a:solidFill>
+                  <a:schemeClr val="tx1"/>
+                </a:solidFill>
+                <a:effectLst>
+                  <a:outerShdw blurRad="50800" dist="38100" dir="2700000" algn="tl" rotWithShape="0">
+                    <a:srgbClr val="000000">
+                      <a:alpha val="48000"/>
+                    </a:srgbClr>
+                  </a:outerShdw>
+                </a:effectLst>
+                <a:latin typeface="+mn-lt"/>
+                <a:ea typeface="+mn-ea"/>
+                <a:cs typeface="+mn-cs"/>
+              </a:defRPr>
+            </a:lvl9pPr>
+          </a:lstStyle>
+          <a:p>
+            <a:r>
+              <a:rPr lang="en-US" dirty="0"/>
+              <a:t>Screens for Website:</a:t>
+            </a:r>
+            <a:endParaRPr lang="en-US" dirty="0">
+              <a:effectLst/>
+            </a:endParaRPr>
+          </a:p>
+          <a:p>
+            <a:r>
+              <a:rPr lang="en-US" dirty="0">
+                <a:effectLst/>
+              </a:rPr>
+              <a:t>Login Page/ Sign Up</a:t>
+            </a:r>
+          </a:p>
+          <a:p>
+            <a:r>
+              <a:rPr lang="en-US" dirty="0">
+                <a:effectLst/>
+              </a:rPr>
+              <a:t>Home Screen</a:t>
+            </a:r>
+          </a:p>
+          <a:p>
+            <a:r>
+              <a:rPr lang="en-US" dirty="0">
+                <a:effectLst/>
+              </a:rPr>
+              <a:t>User Profile</a:t>
+            </a:r>
+          </a:p>
+          <a:p>
+            <a:r>
+              <a:rPr lang="en-US" dirty="0">
+                <a:effectLst/>
+              </a:rPr>
+              <a:t>Shop Page</a:t>
+            </a:r>
+          </a:p>
+          <a:p>
+            <a:r>
+              <a:rPr lang="en-US" dirty="0">
+                <a:effectLst/>
+              </a:rPr>
+              <a:t>Items Page</a:t>
+            </a:r>
+          </a:p>
+          <a:p>
+            <a:r>
+              <a:rPr lang="en-US" dirty="0">
+                <a:effectLst/>
+              </a:rPr>
+              <a:t>Blog Page</a:t>
+            </a:r>
+          </a:p>
+          <a:p>
+            <a:r>
+              <a:rPr lang="en-US" dirty="0">
+                <a:effectLst/>
+              </a:rPr>
+              <a:t>About Page</a:t>
+            </a:r>
+          </a:p>
+          <a:p>
+            <a:r>
+              <a:rPr lang="en-US" dirty="0">
+                <a:effectLst/>
+              </a:rPr>
+              <a:t>Shopping Cart</a:t>
+            </a:r>
+          </a:p>
+          <a:p>
+            <a:r>
+              <a:rPr lang="en-US" dirty="0">
+                <a:effectLst/>
+              </a:rPr>
+              <a:t>User Guide</a:t>
+            </a:r>
+          </a:p>
+          <a:p>
+            <a:endParaRPr lang="en-US" dirty="0"/>
+          </a:p>
+          <a:p>
+            <a:endParaRPr lang="en-US" dirty="0"/>
+          </a:p>
+        </p:txBody>
+      </p:sp>
+      <p:sp>
+        <p:nvSpPr>
+          <p:cNvPr id="6" name="Content Placeholder 2">
+            <a:extLst>
+              <a:ext uri="{FF2B5EF4-FFF2-40B4-BE49-F238E27FC236}">
+                <a16:creationId xmlns:a16="http://schemas.microsoft.com/office/drawing/2014/main" id="{7903F2BE-7579-4945-83AA-38EEC0E21785}"/>
+              </a:ext>
+            </a:extLst>
+          </p:cNvPr>
+          <p:cNvSpPr txBox="1">
+            <a:spLocks/>
+          </p:cNvSpPr>
+          <p:nvPr/>
+        </p:nvSpPr>
+        <p:spPr>
+          <a:xfrm>
+            <a:off x="5975597" y="2246129"/>
+            <a:ext cx="3306511" cy="2365739"/>
+          </a:xfrm>
+          <a:prstGeom prst="rect">
+            <a:avLst/>
+          </a:prstGeom>
+        </p:spPr>
+        <p:txBody>
+          <a:bodyPr vert="horz" lIns="91440" tIns="45720" rIns="91440" bIns="45720" rtlCol="0">
+            <a:normAutofit/>
+          </a:bodyPr>
+          <a:lstStyle>
+            <a:lvl1pPr marL="228600" indent="-228600" algn="l" defTabSz="914400" rtl="0" eaLnBrk="1" latinLnBrk="0" hangingPunct="1">
+              <a:lnSpc>
+                <a:spcPct val="120000"/>
+              </a:lnSpc>
+              <a:spcBef>
+                <a:spcPts val="1000"/>
+              </a:spcBef>
+              <a:buFont typeface="Arial" panose="020B0604020202020204" pitchFamily="34" charset="0"/>
+              <a:buChar char="•"/>
+              <a:defRPr sz="2000" kern="1200">
+                <a:solidFill>
+                  <a:schemeClr val="tx1"/>
+                </a:solidFill>
+                <a:effectLst>
+                  <a:outerShdw blurRad="50800" dist="38100" dir="2700000" algn="tl" rotWithShape="0">
+                    <a:srgbClr val="000000">
+                      <a:alpha val="48000"/>
+                    </a:srgbClr>
+                  </a:outerShdw>
+                </a:effectLst>
+                <a:latin typeface="+mn-lt"/>
+                <a:ea typeface="+mn-ea"/>
+                <a:cs typeface="+mn-cs"/>
+              </a:defRPr>
+            </a:lvl1pPr>
+            <a:lvl2pPr marL="685800" indent="-228600" algn="l" defTabSz="914400" rtl="0" eaLnBrk="1" latinLnBrk="0" hangingPunct="1">
+              <a:lnSpc>
+                <a:spcPct val="120000"/>
+              </a:lnSpc>
+              <a:spcBef>
+                <a:spcPts val="500"/>
+              </a:spcBef>
+              <a:buFont typeface="Arial" panose="020B0604020202020204" pitchFamily="34" charset="0"/>
+              <a:buChar char="•"/>
+              <a:defRPr sz="1800" kern="1200">
+                <a:solidFill>
+                  <a:schemeClr val="tx1"/>
+                </a:solidFill>
+                <a:effectLst>
+                  <a:outerShdw blurRad="50800" dist="38100" dir="2700000" algn="tl" rotWithShape="0">
+                    <a:srgbClr val="000000">
+                      <a:alpha val="48000"/>
+                    </a:srgbClr>
+                  </a:outerShdw>
+                </a:effectLst>
+                <a:latin typeface="+mn-lt"/>
+                <a:ea typeface="+mn-ea"/>
+                <a:cs typeface="+mn-cs"/>
+              </a:defRPr>
+            </a:lvl2pPr>
+            <a:lvl3pPr marL="1143000" indent="-228600" algn="l" defTabSz="914400" rtl="0" eaLnBrk="1" latinLnBrk="0" hangingPunct="1">
+              <a:lnSpc>
+                <a:spcPct val="120000"/>
+              </a:lnSpc>
+              <a:spcBef>
+                <a:spcPts val="500"/>
+              </a:spcBef>
+              <a:buFont typeface="Arial" panose="020B0604020202020204" pitchFamily="34" charset="0"/>
+              <a:buChar char="•"/>
+              <a:defRPr sz="1600" kern="1200">
+                <a:solidFill>
+                  <a:schemeClr val="tx1"/>
+                </a:solidFill>
+                <a:effectLst>
+                  <a:outerShdw blurRad="50800" dist="38100" dir="2700000" algn="tl" rotWithShape="0">
+                    <a:srgbClr val="000000">
+                      <a:alpha val="48000"/>
+                    </a:srgbClr>
+                  </a:outerShdw>
+                </a:effectLst>
+                <a:latin typeface="+mn-lt"/>
+                <a:ea typeface="+mn-ea"/>
+                <a:cs typeface="+mn-cs"/>
+              </a:defRPr>
+            </a:lvl3pPr>
+            <a:lvl4pPr marL="1600200" indent="-228600" algn="l" defTabSz="914400" rtl="0" eaLnBrk="1" latinLnBrk="0" hangingPunct="1">
+              <a:lnSpc>
+                <a:spcPct val="120000"/>
+              </a:lnSpc>
+              <a:spcBef>
+                <a:spcPts val="500"/>
+              </a:spcBef>
+              <a:buFont typeface="Arial" panose="020B0604020202020204" pitchFamily="34" charset="0"/>
+              <a:buChar char="•"/>
+              <a:defRPr sz="1400" kern="1200">
+                <a:solidFill>
+                  <a:schemeClr val="tx1"/>
+                </a:solidFill>
+                <a:effectLst>
+                  <a:outerShdw blurRad="50800" dist="38100" dir="2700000" algn="tl" rotWithShape="0">
+                    <a:srgbClr val="000000">
+                      <a:alpha val="48000"/>
+                    </a:srgbClr>
+                  </a:outerShdw>
+                </a:effectLst>
+                <a:latin typeface="+mn-lt"/>
+                <a:ea typeface="+mn-ea"/>
+                <a:cs typeface="+mn-cs"/>
+              </a:defRPr>
+            </a:lvl4pPr>
+            <a:lvl5pPr marL="2057400" indent="-228600" algn="l" defTabSz="914400" rtl="0" eaLnBrk="1" latinLnBrk="0" hangingPunct="1">
+              <a:lnSpc>
+                <a:spcPct val="120000"/>
+              </a:lnSpc>
+              <a:spcBef>
+                <a:spcPts val="500"/>
+              </a:spcBef>
+              <a:buFont typeface="Arial" panose="020B0604020202020204" pitchFamily="34" charset="0"/>
+              <a:buChar char="•"/>
+              <a:defRPr sz="1200" kern="1200">
+                <a:solidFill>
+                  <a:schemeClr val="tx1"/>
+                </a:solidFill>
+                <a:effectLst>
+                  <a:outerShdw blurRad="50800" dist="38100" dir="2700000" algn="tl" rotWithShape="0">
+                    <a:srgbClr val="000000">
+                      <a:alpha val="48000"/>
+                    </a:srgbClr>
+                  </a:outerShdw>
+                </a:effectLst>
+                <a:latin typeface="+mn-lt"/>
+                <a:ea typeface="+mn-ea"/>
+                <a:cs typeface="+mn-cs"/>
+              </a:defRPr>
+            </a:lvl5pPr>
+            <a:lvl6pPr marL="2514600" indent="-228600" algn="l" defTabSz="914400" rtl="0" eaLnBrk="1" latinLnBrk="0" hangingPunct="1">
+              <a:lnSpc>
+                <a:spcPct val="120000"/>
+              </a:lnSpc>
+              <a:spcBef>
+                <a:spcPts val="500"/>
+              </a:spcBef>
+              <a:buFont typeface="Arial" panose="020B0604020202020204" pitchFamily="34" charset="0"/>
+              <a:buChar char="•"/>
+              <a:defRPr sz="1200" kern="1200">
+                <a:solidFill>
+                  <a:schemeClr val="tx1"/>
+                </a:solidFill>
+                <a:effectLst>
+                  <a:outerShdw blurRad="50800" dist="38100" dir="2700000" algn="tl" rotWithShape="0">
+                    <a:srgbClr val="000000">
+                      <a:alpha val="48000"/>
+                    </a:srgbClr>
+                  </a:outerShdw>
+                </a:effectLst>
+                <a:latin typeface="+mn-lt"/>
+                <a:ea typeface="+mn-ea"/>
+                <a:cs typeface="+mn-cs"/>
+              </a:defRPr>
+            </a:lvl6pPr>
+            <a:lvl7pPr marL="2971800" indent="-228600" algn="l" defTabSz="914400" rtl="0" eaLnBrk="1" latinLnBrk="0" hangingPunct="1">
+              <a:lnSpc>
+                <a:spcPct val="120000"/>
+              </a:lnSpc>
+              <a:spcBef>
+                <a:spcPts val="500"/>
+              </a:spcBef>
+              <a:buFont typeface="Arial" panose="020B0604020202020204" pitchFamily="34" charset="0"/>
+              <a:buChar char="•"/>
+              <a:defRPr sz="1200" kern="1200">
+                <a:solidFill>
+                  <a:schemeClr val="tx1"/>
+                </a:solidFill>
+                <a:effectLst>
+                  <a:outerShdw blurRad="50800" dist="38100" dir="2700000" algn="tl" rotWithShape="0">
+                    <a:srgbClr val="000000">
+                      <a:alpha val="48000"/>
+                    </a:srgbClr>
+                  </a:outerShdw>
+                </a:effectLst>
+                <a:latin typeface="+mn-lt"/>
+                <a:ea typeface="+mn-ea"/>
+                <a:cs typeface="+mn-cs"/>
+              </a:defRPr>
+            </a:lvl7pPr>
+            <a:lvl8pPr marL="3429000" indent="-228600" algn="l" defTabSz="914400" rtl="0" eaLnBrk="1" latinLnBrk="0" hangingPunct="1">
+              <a:lnSpc>
+                <a:spcPct val="120000"/>
+              </a:lnSpc>
+              <a:spcBef>
+                <a:spcPts val="500"/>
+              </a:spcBef>
+              <a:buFont typeface="Arial" panose="020B0604020202020204" pitchFamily="34" charset="0"/>
+              <a:buChar char="•"/>
+              <a:defRPr sz="1200" kern="1200">
+                <a:solidFill>
+                  <a:schemeClr val="tx1"/>
+                </a:solidFill>
+                <a:effectLst>
+                  <a:outerShdw blurRad="50800" dist="38100" dir="2700000" algn="tl" rotWithShape="0">
+                    <a:srgbClr val="000000">
+                      <a:alpha val="48000"/>
+                    </a:srgbClr>
+                  </a:outerShdw>
+                </a:effectLst>
+                <a:latin typeface="+mn-lt"/>
+                <a:ea typeface="+mn-ea"/>
+                <a:cs typeface="+mn-cs"/>
+              </a:defRPr>
+            </a:lvl8pPr>
+            <a:lvl9pPr marL="3886200" indent="-228600" algn="l" defTabSz="914400" rtl="0" eaLnBrk="1" latinLnBrk="0" hangingPunct="1">
+              <a:lnSpc>
+                <a:spcPct val="120000"/>
+              </a:lnSpc>
+              <a:spcBef>
+                <a:spcPts val="500"/>
+              </a:spcBef>
+              <a:buFont typeface="Arial" panose="020B0604020202020204" pitchFamily="34" charset="0"/>
+              <a:buChar char="•"/>
+              <a:defRPr sz="1200" kern="1200">
+                <a:solidFill>
+                  <a:schemeClr val="tx1"/>
+                </a:solidFill>
+                <a:effectLst>
+                  <a:outerShdw blurRad="50800" dist="38100" dir="2700000" algn="tl" rotWithShape="0">
+                    <a:srgbClr val="000000">
+                      <a:alpha val="48000"/>
+                    </a:srgbClr>
+                  </a:outerShdw>
+                </a:effectLst>
+                <a:latin typeface="+mn-lt"/>
+                <a:ea typeface="+mn-ea"/>
+                <a:cs typeface="+mn-cs"/>
+              </a:defRPr>
+            </a:lvl9pPr>
+          </a:lstStyle>
+          <a:p>
+            <a:r>
+              <a:rPr lang="en-US" sz="1600" dirty="0"/>
+              <a:t>Databases:</a:t>
+            </a:r>
+            <a:endParaRPr lang="en-US" sz="1600" dirty="0">
+              <a:effectLst/>
+            </a:endParaRPr>
+          </a:p>
+          <a:p>
+            <a:r>
+              <a:rPr lang="en-US" sz="1600" dirty="0">
+                <a:effectLst/>
+              </a:rPr>
+              <a:t>ERDs</a:t>
+            </a:r>
+          </a:p>
+          <a:p>
+            <a:r>
+              <a:rPr lang="en-US" sz="1600" dirty="0">
+                <a:effectLst/>
+              </a:rPr>
+              <a:t>Normalization of tables</a:t>
+            </a:r>
+          </a:p>
+          <a:p>
+            <a:r>
+              <a:rPr lang="en-US" sz="1600" dirty="0">
+                <a:effectLst/>
+              </a:rPr>
+              <a:t>Dummy data</a:t>
+            </a:r>
+          </a:p>
+          <a:p>
+            <a:pPr marL="0" indent="0">
+              <a:buFont typeface="Arial" panose="020B0604020202020204" pitchFamily="34" charset="0"/>
+              <a:buNone/>
+            </a:pPr>
+            <a:endParaRPr lang="en-US" sz="1600" dirty="0">
+              <a:effectLst/>
+            </a:endParaRPr>
+          </a:p>
+          <a:p>
+            <a:endParaRPr lang="en-US" sz="1600" dirty="0"/>
+          </a:p>
+          <a:p>
+            <a:endParaRPr lang="en-US" sz="1600" dirty="0"/>
+          </a:p>
+        </p:txBody>
+      </p:sp>
+      <p:sp>
+        <p:nvSpPr>
+          <p:cNvPr id="8" name="Content Placeholder 2">
+            <a:extLst>
+              <a:ext uri="{FF2B5EF4-FFF2-40B4-BE49-F238E27FC236}">
+                <a16:creationId xmlns:a16="http://schemas.microsoft.com/office/drawing/2014/main" id="{989DB679-570B-4339-932E-3FAF74A1C94F}"/>
+              </a:ext>
+            </a:extLst>
+          </p:cNvPr>
+          <p:cNvSpPr txBox="1">
+            <a:spLocks/>
+          </p:cNvSpPr>
+          <p:nvPr/>
+        </p:nvSpPr>
+        <p:spPr>
+          <a:xfrm>
+            <a:off x="8885489" y="2246129"/>
+            <a:ext cx="3306511" cy="2365739"/>
+          </a:xfrm>
+          <a:prstGeom prst="rect">
+            <a:avLst/>
+          </a:prstGeom>
+        </p:spPr>
+        <p:txBody>
+          <a:bodyPr vert="horz" lIns="91440" tIns="45720" rIns="91440" bIns="45720" rtlCol="0">
+            <a:normAutofit/>
+          </a:bodyPr>
+          <a:lstStyle>
+            <a:lvl1pPr marL="228600" indent="-228600" algn="l" defTabSz="914400" rtl="0" eaLnBrk="1" latinLnBrk="0" hangingPunct="1">
+              <a:lnSpc>
+                <a:spcPct val="120000"/>
+              </a:lnSpc>
+              <a:spcBef>
+                <a:spcPts val="1000"/>
+              </a:spcBef>
+              <a:buFont typeface="Arial" panose="020B0604020202020204" pitchFamily="34" charset="0"/>
+              <a:buChar char="•"/>
+              <a:defRPr sz="2000" kern="1200">
+                <a:solidFill>
+                  <a:schemeClr val="tx1"/>
+                </a:solidFill>
+                <a:effectLst>
+                  <a:outerShdw blurRad="50800" dist="38100" dir="2700000" algn="tl" rotWithShape="0">
+                    <a:srgbClr val="000000">
+                      <a:alpha val="48000"/>
+                    </a:srgbClr>
+                  </a:outerShdw>
+                </a:effectLst>
+                <a:latin typeface="+mn-lt"/>
+                <a:ea typeface="+mn-ea"/>
+                <a:cs typeface="+mn-cs"/>
+              </a:defRPr>
+            </a:lvl1pPr>
+            <a:lvl2pPr marL="685800" indent="-228600" algn="l" defTabSz="914400" rtl="0" eaLnBrk="1" latinLnBrk="0" hangingPunct="1">
+              <a:lnSpc>
+                <a:spcPct val="120000"/>
+              </a:lnSpc>
+              <a:spcBef>
+                <a:spcPts val="500"/>
+              </a:spcBef>
+              <a:buFont typeface="Arial" panose="020B0604020202020204" pitchFamily="34" charset="0"/>
+              <a:buChar char="•"/>
+              <a:defRPr sz="1800" kern="1200">
+                <a:solidFill>
+                  <a:schemeClr val="tx1"/>
+                </a:solidFill>
+                <a:effectLst>
+                  <a:outerShdw blurRad="50800" dist="38100" dir="2700000" algn="tl" rotWithShape="0">
+                    <a:srgbClr val="000000">
+                      <a:alpha val="48000"/>
+                    </a:srgbClr>
+                  </a:outerShdw>
+                </a:effectLst>
+                <a:latin typeface="+mn-lt"/>
+                <a:ea typeface="+mn-ea"/>
+                <a:cs typeface="+mn-cs"/>
+              </a:defRPr>
+            </a:lvl2pPr>
+            <a:lvl3pPr marL="1143000" indent="-228600" algn="l" defTabSz="914400" rtl="0" eaLnBrk="1" latinLnBrk="0" hangingPunct="1">
+              <a:lnSpc>
+                <a:spcPct val="120000"/>
+              </a:lnSpc>
+              <a:spcBef>
+                <a:spcPts val="500"/>
+              </a:spcBef>
+              <a:buFont typeface="Arial" panose="020B0604020202020204" pitchFamily="34" charset="0"/>
+              <a:buChar char="•"/>
+              <a:defRPr sz="1600" kern="1200">
+                <a:solidFill>
+                  <a:schemeClr val="tx1"/>
+                </a:solidFill>
+                <a:effectLst>
+                  <a:outerShdw blurRad="50800" dist="38100" dir="2700000" algn="tl" rotWithShape="0">
+                    <a:srgbClr val="000000">
+                      <a:alpha val="48000"/>
+                    </a:srgbClr>
+                  </a:outerShdw>
+                </a:effectLst>
+                <a:latin typeface="+mn-lt"/>
+                <a:ea typeface="+mn-ea"/>
+                <a:cs typeface="+mn-cs"/>
+              </a:defRPr>
+            </a:lvl3pPr>
+            <a:lvl4pPr marL="1600200" indent="-228600" algn="l" defTabSz="914400" rtl="0" eaLnBrk="1" latinLnBrk="0" hangingPunct="1">
+              <a:lnSpc>
+                <a:spcPct val="120000"/>
+              </a:lnSpc>
+              <a:spcBef>
+                <a:spcPts val="500"/>
+              </a:spcBef>
+              <a:buFont typeface="Arial" panose="020B0604020202020204" pitchFamily="34" charset="0"/>
+              <a:buChar char="•"/>
+              <a:defRPr sz="1400" kern="1200">
+                <a:solidFill>
+                  <a:schemeClr val="tx1"/>
+                </a:solidFill>
+                <a:effectLst>
+                  <a:outerShdw blurRad="50800" dist="38100" dir="2700000" algn="tl" rotWithShape="0">
+                    <a:srgbClr val="000000">
+                      <a:alpha val="48000"/>
+                    </a:srgbClr>
+                  </a:outerShdw>
+                </a:effectLst>
+                <a:latin typeface="+mn-lt"/>
+                <a:ea typeface="+mn-ea"/>
+                <a:cs typeface="+mn-cs"/>
+              </a:defRPr>
+            </a:lvl4pPr>
+            <a:lvl5pPr marL="2057400" indent="-228600" algn="l" defTabSz="914400" rtl="0" eaLnBrk="1" latinLnBrk="0" hangingPunct="1">
+              <a:lnSpc>
+                <a:spcPct val="120000"/>
+              </a:lnSpc>
+              <a:spcBef>
+                <a:spcPts val="500"/>
+              </a:spcBef>
+              <a:buFont typeface="Arial" panose="020B0604020202020204" pitchFamily="34" charset="0"/>
+              <a:buChar char="•"/>
+              <a:defRPr sz="1200" kern="1200">
+                <a:solidFill>
+                  <a:schemeClr val="tx1"/>
+                </a:solidFill>
+                <a:effectLst>
+                  <a:outerShdw blurRad="50800" dist="38100" dir="2700000" algn="tl" rotWithShape="0">
+                    <a:srgbClr val="000000">
+                      <a:alpha val="48000"/>
+                    </a:srgbClr>
+                  </a:outerShdw>
+                </a:effectLst>
+                <a:latin typeface="+mn-lt"/>
+                <a:ea typeface="+mn-ea"/>
+                <a:cs typeface="+mn-cs"/>
+              </a:defRPr>
+            </a:lvl5pPr>
+            <a:lvl6pPr marL="2514600" indent="-228600" algn="l" defTabSz="914400" rtl="0" eaLnBrk="1" latinLnBrk="0" hangingPunct="1">
+              <a:lnSpc>
+                <a:spcPct val="120000"/>
+              </a:lnSpc>
+              <a:spcBef>
+                <a:spcPts val="500"/>
+              </a:spcBef>
+              <a:buFont typeface="Arial" panose="020B0604020202020204" pitchFamily="34" charset="0"/>
+              <a:buChar char="•"/>
+              <a:defRPr sz="1200" kern="1200">
+                <a:solidFill>
+                  <a:schemeClr val="tx1"/>
+                </a:solidFill>
+                <a:effectLst>
+                  <a:outerShdw blurRad="50800" dist="38100" dir="2700000" algn="tl" rotWithShape="0">
+                    <a:srgbClr val="000000">
+                      <a:alpha val="48000"/>
+                    </a:srgbClr>
+                  </a:outerShdw>
+                </a:effectLst>
+                <a:latin typeface="+mn-lt"/>
+                <a:ea typeface="+mn-ea"/>
+                <a:cs typeface="+mn-cs"/>
+              </a:defRPr>
+            </a:lvl6pPr>
+            <a:lvl7pPr marL="2971800" indent="-228600" algn="l" defTabSz="914400" rtl="0" eaLnBrk="1" latinLnBrk="0" hangingPunct="1">
+              <a:lnSpc>
+                <a:spcPct val="120000"/>
+              </a:lnSpc>
+              <a:spcBef>
+                <a:spcPts val="500"/>
+              </a:spcBef>
+              <a:buFont typeface="Arial" panose="020B0604020202020204" pitchFamily="34" charset="0"/>
+              <a:buChar char="•"/>
+              <a:defRPr sz="1200" kern="1200">
+                <a:solidFill>
+                  <a:schemeClr val="tx1"/>
+                </a:solidFill>
+                <a:effectLst>
+                  <a:outerShdw blurRad="50800" dist="38100" dir="2700000" algn="tl" rotWithShape="0">
+                    <a:srgbClr val="000000">
+                      <a:alpha val="48000"/>
+                    </a:srgbClr>
+                  </a:outerShdw>
+                </a:effectLst>
+                <a:latin typeface="+mn-lt"/>
+                <a:ea typeface="+mn-ea"/>
+                <a:cs typeface="+mn-cs"/>
+              </a:defRPr>
+            </a:lvl7pPr>
+            <a:lvl8pPr marL="3429000" indent="-228600" algn="l" defTabSz="914400" rtl="0" eaLnBrk="1" latinLnBrk="0" hangingPunct="1">
+              <a:lnSpc>
+                <a:spcPct val="120000"/>
+              </a:lnSpc>
+              <a:spcBef>
+                <a:spcPts val="500"/>
+              </a:spcBef>
+              <a:buFont typeface="Arial" panose="020B0604020202020204" pitchFamily="34" charset="0"/>
+              <a:buChar char="•"/>
+              <a:defRPr sz="1200" kern="1200">
+                <a:solidFill>
+                  <a:schemeClr val="tx1"/>
+                </a:solidFill>
+                <a:effectLst>
+                  <a:outerShdw blurRad="50800" dist="38100" dir="2700000" algn="tl" rotWithShape="0">
+                    <a:srgbClr val="000000">
+                      <a:alpha val="48000"/>
+                    </a:srgbClr>
+                  </a:outerShdw>
+                </a:effectLst>
+                <a:latin typeface="+mn-lt"/>
+                <a:ea typeface="+mn-ea"/>
+                <a:cs typeface="+mn-cs"/>
+              </a:defRPr>
+            </a:lvl8pPr>
+            <a:lvl9pPr marL="3886200" indent="-228600" algn="l" defTabSz="914400" rtl="0" eaLnBrk="1" latinLnBrk="0" hangingPunct="1">
+              <a:lnSpc>
+                <a:spcPct val="120000"/>
+              </a:lnSpc>
+              <a:spcBef>
+                <a:spcPts val="500"/>
+              </a:spcBef>
+              <a:buFont typeface="Arial" panose="020B0604020202020204" pitchFamily="34" charset="0"/>
+              <a:buChar char="•"/>
+              <a:defRPr sz="1200" kern="1200">
+                <a:solidFill>
+                  <a:schemeClr val="tx1"/>
+                </a:solidFill>
+                <a:effectLst>
+                  <a:outerShdw blurRad="50800" dist="38100" dir="2700000" algn="tl" rotWithShape="0">
+                    <a:srgbClr val="000000">
+                      <a:alpha val="48000"/>
+                    </a:srgbClr>
+                  </a:outerShdw>
+                </a:effectLst>
+                <a:latin typeface="+mn-lt"/>
+                <a:ea typeface="+mn-ea"/>
+                <a:cs typeface="+mn-cs"/>
+              </a:defRPr>
+            </a:lvl9pPr>
+          </a:lstStyle>
+          <a:p>
+            <a:r>
+              <a:rPr lang="en-US" sz="1600" dirty="0">
+                <a:effectLst/>
+              </a:rPr>
+              <a:t>UML Diagram</a:t>
+            </a:r>
+          </a:p>
+          <a:p>
+            <a:r>
+              <a:rPr lang="en-US" sz="1600" dirty="0">
+                <a:effectLst/>
+              </a:rPr>
+              <a:t>User Stories</a:t>
+            </a:r>
+          </a:p>
+          <a:p>
+            <a:r>
+              <a:rPr lang="en-US" sz="1600" dirty="0">
+                <a:effectLst/>
+              </a:rPr>
+              <a:t>Use Cases</a:t>
+            </a:r>
+          </a:p>
+          <a:p>
+            <a:pPr marL="0" indent="0">
+              <a:buNone/>
+            </a:pPr>
+            <a:endParaRPr lang="en-US" sz="1600" dirty="0">
+              <a:effectLst/>
+            </a:endParaRPr>
+          </a:p>
+          <a:p>
+            <a:pPr marL="0" indent="0">
+              <a:buFont typeface="Arial" panose="020B0604020202020204" pitchFamily="34" charset="0"/>
+              <a:buNone/>
+            </a:pPr>
+            <a:endParaRPr lang="en-US" sz="1600" dirty="0">
+              <a:effectLst/>
+            </a:endParaRPr>
+          </a:p>
+          <a:p>
+            <a:endParaRPr lang="en-US" sz="1600" dirty="0"/>
+          </a:p>
+          <a:p>
+            <a:endParaRPr lang="en-US" sz="1600" dirty="0"/>
           </a:p>
         </p:txBody>
       </p:sp>
     </p:spTree>
     <p:extLst>
       <p:ext uri="{BB962C8B-B14F-4D97-AF65-F5344CB8AC3E}">
-        <p14:creationId xmlns:p14="http://schemas.microsoft.com/office/powerpoint/2010/main" val="845203596"/>
+        <p14:creationId xmlns:p14="http://schemas.microsoft.com/office/powerpoint/2010/main" val="386003673"/>
       </p:ext>
     </p:extLst>
   </p:cSld>

</xml_diff>

<commit_message>
Added final System diagram and updated Evaluation ppt
</commit_message>
<xml_diff>
--- a/Kaavish Evaluation I/Evaluation I.pptx
+++ b/Kaavish Evaluation I/Evaluation I.pptx
@@ -6027,7 +6027,7 @@
         </p:nvSpPr>
         <p:spPr>
           <a:xfrm>
-            <a:off x="919119" y="201185"/>
+            <a:off x="914430" y="113958"/>
             <a:ext cx="10353761" cy="851535"/>
           </a:xfrm>
         </p:spPr>
@@ -6089,10 +6089,10 @@
       </p:sp>
       <p:pic>
         <p:nvPicPr>
-          <p:cNvPr id="7" name="Picture 6">
+          <p:cNvPr id="6" name="Picture 5">
             <a:extLst>
               <a:ext uri="{FF2B5EF4-FFF2-40B4-BE49-F238E27FC236}">
-                <a16:creationId xmlns:a16="http://schemas.microsoft.com/office/drawing/2014/main" id="{799FA854-6304-4C2B-9AD0-4BB4B9915682}"/>
+                <a16:creationId xmlns:a16="http://schemas.microsoft.com/office/drawing/2014/main" id="{F5248483-363D-412D-A0B3-40809AB13185}"/>
               </a:ext>
             </a:extLst>
           </p:cNvPr>
@@ -6115,8 +6115,8 @@
         </p:blipFill>
         <p:spPr>
           <a:xfrm>
-            <a:off x="2799471" y="1052720"/>
-            <a:ext cx="6469379" cy="5498972"/>
+            <a:off x="2855742" y="829994"/>
+            <a:ext cx="6471138" cy="5914048"/>
           </a:xfrm>
           <a:prstGeom prst="rect">
             <a:avLst/>

</xml_diff>

<commit_message>
Updated Evaluation I ppt
</commit_message>
<xml_diff>
--- a/Kaavish Evaluation I/Evaluation I.pptx
+++ b/Kaavish Evaluation I/Evaluation I.pptx
@@ -5949,7 +5949,7 @@
           <a:p>
             <a:r>
               <a:rPr lang="en-US" dirty="0"/>
-              <a:t>Task distribution</a:t>
+              <a:t>Sprint ii backlog</a:t>
             </a:r>
           </a:p>
         </p:txBody>
@@ -5975,7 +5975,40 @@
           <a:bodyPr/>
           <a:lstStyle/>
           <a:p>
-            <a:endParaRPr lang="en-US"/>
+            <a:r>
+              <a:rPr lang="en-US" dirty="0"/>
+              <a:t>Unified Modeling Language (UML) Diagram of the system</a:t>
+            </a:r>
+          </a:p>
+          <a:p>
+            <a:r>
+              <a:rPr lang="en-US" dirty="0"/>
+              <a:t>Entity Relationship Diagram (ERD) of the system</a:t>
+            </a:r>
+          </a:p>
+          <a:p>
+            <a:r>
+              <a:rPr lang="en-US" dirty="0"/>
+              <a:t>Prototype of the System to be designed </a:t>
+            </a:r>
+          </a:p>
+          <a:p>
+            <a:r>
+              <a:rPr lang="en-US" dirty="0"/>
+              <a:t>Literature Review</a:t>
+            </a:r>
+          </a:p>
+          <a:p>
+            <a:r>
+              <a:rPr lang="en-US" dirty="0"/>
+              <a:t>System Design Specification Document to be made</a:t>
+            </a:r>
+          </a:p>
+          <a:p>
+            <a:endParaRPr lang="en-US" dirty="0"/>
+          </a:p>
+          <a:p>
+            <a:endParaRPr lang="en-US" dirty="0"/>
           </a:p>
         </p:txBody>
       </p:sp>
@@ -6259,7 +6292,7 @@
           <a:p>
             <a:r>
               <a:rPr lang="en-US" dirty="0"/>
-              <a:t>We are thirsty by talking too much its your turn now…</a:t>
+              <a:t>Challenges</a:t>
             </a:r>
           </a:p>
         </p:txBody>
@@ -6285,7 +6318,10 @@
           <a:bodyPr/>
           <a:lstStyle/>
           <a:p>
-            <a:endParaRPr lang="en-US"/>
+            <a:pPr marL="0" indent="0">
+              <a:buNone/>
+            </a:pPr>
+            <a:endParaRPr lang="en-US" dirty="0"/>
           </a:p>
         </p:txBody>
       </p:sp>
@@ -6515,7 +6551,7 @@
         <p:spPr>
           <a:xfrm>
             <a:off x="1562454" y="4459469"/>
-            <a:ext cx="2209801" cy="1532727"/>
+            <a:ext cx="2209801" cy="1200329"/>
           </a:xfrm>
           <a:prstGeom prst="rect">
             <a:avLst/>
@@ -6568,19 +6604,6 @@
             <a:r>
               <a:rPr lang="en-US" sz="1200" dirty="0"/>
               <a:t>Server side development of website</a:t>
-            </a:r>
-          </a:p>
-          <a:p>
-            <a:pPr marL="285750" indent="-285750">
-              <a:lnSpc>
-                <a:spcPct val="90000"/>
-              </a:lnSpc>
-              <a:buFont typeface="Arial" panose="020B0604020202020204" pitchFamily="34" charset="0"/>
-              <a:buChar char="•"/>
-            </a:pPr>
-            <a:r>
-              <a:rPr lang="en-US" sz="1200" dirty="0"/>
-              <a:t>Training and implementing AI model</a:t>
             </a:r>
           </a:p>
           <a:p>
@@ -6799,7 +6822,7 @@
             </a:pPr>
             <a:r>
               <a:rPr lang="en-US" sz="1200" dirty="0"/>
-              <a:t>Databases, datasets and UI design</a:t>
+              <a:t>Databases and UI design</a:t>
             </a:r>
           </a:p>
         </p:txBody>
@@ -8032,8 +8055,8 @@
         </p:nvSpPr>
         <p:spPr>
           <a:xfrm>
-            <a:off x="9752012" y="4953000"/>
-            <a:ext cx="1752600" cy="838200"/>
+            <a:off x="9752011" y="4953000"/>
+            <a:ext cx="1910105" cy="838200"/>
           </a:xfrm>
           <a:prstGeom prst="wedgeRectCallout">
             <a:avLst>
@@ -8782,7 +8805,7 @@
         </p:blipFill>
         <p:spPr bwMode="auto">
           <a:xfrm>
-            <a:off x="3579812" y="4191000"/>
+            <a:off x="3732213" y="4102912"/>
             <a:ext cx="4724400" cy="2069288"/>
           </a:xfrm>
           <a:prstGeom prst="rect">
@@ -9646,7 +9669,7 @@
         </p:nvSpPr>
         <p:spPr>
           <a:xfrm>
-            <a:off x="1259853" y="2587222"/>
+            <a:off x="1078813" y="2511533"/>
             <a:ext cx="3108245" cy="2229538"/>
           </a:xfrm>
           <a:prstGeom prst="rect">
@@ -9887,10 +9910,9 @@
           <a:p>
             <a:pPr algn="r"/>
             <a:r>
-              <a:rPr lang="en-US" sz="1800"/>
+              <a:rPr lang="en-US" sz="1800" dirty="0"/>
               <a:t>We will be using technologies to train our model, build our website, maintain our repository and design our user interface.</a:t>
             </a:r>
-            <a:endParaRPr lang="en-US" sz="1800" dirty="0"/>
           </a:p>
         </p:txBody>
       </p:sp>
@@ -11710,9 +11732,30 @@
           <a:lstStyle/>
           <a:p>
             <a:r>
+              <a:rPr lang="en-US" dirty="0" err="1"/>
+              <a:t>Kaavish</a:t>
+            </a:r>
+            <a:r>
               <a:rPr lang="en-US" dirty="0"/>
-              <a:t>When we started off, we wanted to incorporate a module of Artificial Intelligence and Digital Image Processing </a:t>
-            </a:r>
+              <a:t> WG pointed out that our proposal should be more focused towards easing the process.</a:t>
+            </a:r>
+          </a:p>
+          <a:p>
+            <a:r>
+              <a:rPr lang="en-US" dirty="0"/>
+              <a:t>As per the feedback received, we streamlined the scope of our project and included a mobile app in our project which is locally contextualized, and has an </a:t>
+            </a:r>
+            <a:r>
+              <a:rPr lang="en-US"/>
+              <a:t>easy-to-use interface.</a:t>
+            </a:r>
+            <a:endParaRPr lang="en-US" dirty="0"/>
+          </a:p>
+          <a:p>
+            <a:pPr marL="0" indent="0">
+              <a:buNone/>
+            </a:pPr>
+            <a:endParaRPr lang="en-US" dirty="0"/>
           </a:p>
         </p:txBody>
       </p:sp>

</xml_diff>

<commit_message>
updated the evaluation I ppt
</commit_message>
<xml_diff>
--- a/Kaavish Evaluation I/Evaluation I.pptx
+++ b/Kaavish Evaluation I/Evaluation I.pptx
@@ -13,10 +13,10 @@
     <p:sldId id="263" r:id="rId7"/>
     <p:sldId id="262" r:id="rId8"/>
     <p:sldId id="267" r:id="rId9"/>
-    <p:sldId id="269" r:id="rId10"/>
-    <p:sldId id="270" r:id="rId11"/>
-    <p:sldId id="271" r:id="rId12"/>
-    <p:sldId id="272" r:id="rId13"/>
+    <p:sldId id="272" r:id="rId10"/>
+    <p:sldId id="271" r:id="rId11"/>
+    <p:sldId id="270" r:id="rId12"/>
+    <p:sldId id="269" r:id="rId13"/>
     <p:sldId id="273" r:id="rId14"/>
     <p:sldId id="264" r:id="rId15"/>
   </p:sldIdLst>
@@ -258,7 +258,7 @@
           <a:p>
             <a:fld id="{964B77FC-11F0-435C-BF58-30F6E93FA138}" type="datetimeFigureOut">
               <a:rPr lang="en-US" smtClean="0"/>
-              <a:t>10/17/2019</a:t>
+              <a:t>17-Oct-19</a:t>
             </a:fld>
             <a:endParaRPr lang="en-US"/>
           </a:p>
@@ -545,7 +545,7 @@
           <a:p>
             <a:fld id="{964B77FC-11F0-435C-BF58-30F6E93FA138}" type="datetimeFigureOut">
               <a:rPr lang="en-US" smtClean="0"/>
-              <a:t>10/17/2019</a:t>
+              <a:t>17-Oct-19</a:t>
             </a:fld>
             <a:endParaRPr lang="en-US"/>
           </a:p>
@@ -737,7 +737,7 @@
           <a:p>
             <a:fld id="{964B77FC-11F0-435C-BF58-30F6E93FA138}" type="datetimeFigureOut">
               <a:rPr lang="en-US" smtClean="0"/>
-              <a:t>10/17/2019</a:t>
+              <a:t>17-Oct-19</a:t>
             </a:fld>
             <a:endParaRPr lang="en-US"/>
           </a:p>
@@ -998,7 +998,7 @@
           <a:p>
             <a:fld id="{964B77FC-11F0-435C-BF58-30F6E93FA138}" type="datetimeFigureOut">
               <a:rPr lang="en-US" smtClean="0"/>
-              <a:t>10/17/2019</a:t>
+              <a:t>17-Oct-19</a:t>
             </a:fld>
             <a:endParaRPr lang="en-US"/>
           </a:p>
@@ -1422,7 +1422,7 @@
           <a:p>
             <a:fld id="{964B77FC-11F0-435C-BF58-30F6E93FA138}" type="datetimeFigureOut">
               <a:rPr lang="en-US" smtClean="0"/>
-              <a:t>10/17/2019</a:t>
+              <a:t>17-Oct-19</a:t>
             </a:fld>
             <a:endParaRPr lang="en-US"/>
           </a:p>
@@ -1968,7 +1968,7 @@
           <a:p>
             <a:fld id="{964B77FC-11F0-435C-BF58-30F6E93FA138}" type="datetimeFigureOut">
               <a:rPr lang="en-US" smtClean="0"/>
-              <a:t>10/17/2019</a:t>
+              <a:t>17-Oct-19</a:t>
             </a:fld>
             <a:endParaRPr lang="en-US"/>
           </a:p>
@@ -2808,7 +2808,7 @@
           <a:p>
             <a:fld id="{964B77FC-11F0-435C-BF58-30F6E93FA138}" type="datetimeFigureOut">
               <a:rPr lang="en-US" smtClean="0"/>
-              <a:t>10/17/2019</a:t>
+              <a:t>17-Oct-19</a:t>
             </a:fld>
             <a:endParaRPr lang="en-US"/>
           </a:p>
@@ -2978,7 +2978,7 @@
           <a:p>
             <a:fld id="{964B77FC-11F0-435C-BF58-30F6E93FA138}" type="datetimeFigureOut">
               <a:rPr lang="en-US" smtClean="0"/>
-              <a:t>10/17/2019</a:t>
+              <a:t>17-Oct-19</a:t>
             </a:fld>
             <a:endParaRPr lang="en-US"/>
           </a:p>
@@ -3162,7 +3162,7 @@
           <a:p>
             <a:fld id="{964B77FC-11F0-435C-BF58-30F6E93FA138}" type="datetimeFigureOut">
               <a:rPr lang="en-US" smtClean="0"/>
-              <a:t>10/17/2019</a:t>
+              <a:t>17-Oct-19</a:t>
             </a:fld>
             <a:endParaRPr lang="en-US"/>
           </a:p>
@@ -3332,7 +3332,7 @@
           <a:p>
             <a:fld id="{964B77FC-11F0-435C-BF58-30F6E93FA138}" type="datetimeFigureOut">
               <a:rPr lang="en-US" smtClean="0"/>
-              <a:t>10/17/2019</a:t>
+              <a:t>17-Oct-19</a:t>
             </a:fld>
             <a:endParaRPr lang="en-US"/>
           </a:p>
@@ -3580,7 +3580,7 @@
           <a:p>
             <a:fld id="{964B77FC-11F0-435C-BF58-30F6E93FA138}" type="datetimeFigureOut">
               <a:rPr lang="en-US" smtClean="0"/>
-              <a:t>10/17/2019</a:t>
+              <a:t>17-Oct-19</a:t>
             </a:fld>
             <a:endParaRPr lang="en-US"/>
           </a:p>
@@ -3817,7 +3817,7 @@
           <a:p>
             <a:fld id="{964B77FC-11F0-435C-BF58-30F6E93FA138}" type="datetimeFigureOut">
               <a:rPr lang="en-US" smtClean="0"/>
-              <a:t>10/17/2019</a:t>
+              <a:t>17-Oct-19</a:t>
             </a:fld>
             <a:endParaRPr lang="en-US"/>
           </a:p>
@@ -4190,7 +4190,7 @@
           <a:p>
             <a:fld id="{964B77FC-11F0-435C-BF58-30F6E93FA138}" type="datetimeFigureOut">
               <a:rPr lang="en-US" smtClean="0"/>
-              <a:t>10/17/2019</a:t>
+              <a:t>17-Oct-19</a:t>
             </a:fld>
             <a:endParaRPr lang="en-US"/>
           </a:p>
@@ -4308,7 +4308,7 @@
           <a:p>
             <a:fld id="{964B77FC-11F0-435C-BF58-30F6E93FA138}" type="datetimeFigureOut">
               <a:rPr lang="en-US" smtClean="0"/>
-              <a:t>10/17/2019</a:t>
+              <a:t>17-Oct-19</a:t>
             </a:fld>
             <a:endParaRPr lang="en-US"/>
           </a:p>
@@ -4403,7 +4403,7 @@
           <a:p>
             <a:fld id="{964B77FC-11F0-435C-BF58-30F6E93FA138}" type="datetimeFigureOut">
               <a:rPr lang="en-US" smtClean="0"/>
-              <a:t>10/17/2019</a:t>
+              <a:t>17-Oct-19</a:t>
             </a:fld>
             <a:endParaRPr lang="en-US"/>
           </a:p>
@@ -4654,7 +4654,7 @@
           <a:p>
             <a:fld id="{964B77FC-11F0-435C-BF58-30F6E93FA138}" type="datetimeFigureOut">
               <a:rPr lang="en-US" smtClean="0"/>
-              <a:t>10/17/2019</a:t>
+              <a:t>17-Oct-19</a:t>
             </a:fld>
             <a:endParaRPr lang="en-US"/>
           </a:p>
@@ -4941,7 +4941,7 @@
           <a:p>
             <a:fld id="{964B77FC-11F0-435C-BF58-30F6E93FA138}" type="datetimeFigureOut">
               <a:rPr lang="en-US" smtClean="0"/>
-              <a:t>10/17/2019</a:t>
+              <a:t>17-Oct-19</a:t>
             </a:fld>
             <a:endParaRPr lang="en-US"/>
           </a:p>
@@ -5154,7 +5154,7 @@
           <a:p>
             <a:fld id="{964B77FC-11F0-435C-BF58-30F6E93FA138}" type="datetimeFigureOut">
               <a:rPr lang="en-US" smtClean="0"/>
-              <a:t>10/17/2019</a:t>
+              <a:t>17-Oct-19</a:t>
             </a:fld>
             <a:endParaRPr lang="en-US"/>
           </a:p>
@@ -5719,13 +5719,7 @@
         </p:nvPicPr>
         <p:blipFill>
           <a:blip r:embed="rId2">
-            <a:duotone>
-              <a:schemeClr val="accent1">
-                <a:shade val="45000"/>
-                <a:satMod val="135000"/>
-              </a:schemeClr>
-              <a:prstClr val="white"/>
-            </a:duotone>
+            <a:lum bright="70000" contrast="-70000"/>
             <a:extLst>
               <a:ext uri="{28A0092B-C50C-407E-A947-70E740481C1C}">
                 <a14:useLocalDpi xmlns:a14="http://schemas.microsoft.com/office/drawing/2010/main" val="0"/>
@@ -5931,7 +5925,7 @@
           <p:cNvPr id="2" name="Title 1">
             <a:extLst>
               <a:ext uri="{FF2B5EF4-FFF2-40B4-BE49-F238E27FC236}">
-                <a16:creationId xmlns:a16="http://schemas.microsoft.com/office/drawing/2014/main" id="{FD9A3C93-AAF9-4379-B580-E7B76D0CA9E4}"/>
+                <a16:creationId xmlns:a16="http://schemas.microsoft.com/office/drawing/2014/main" id="{6748CC33-9C1D-4FB2-B9A8-AF259B02C14A}"/>
               </a:ext>
             </a:extLst>
           </p:cNvPr>
@@ -5942,80 +5936,107 @@
             <p:ph type="title"/>
           </p:nvPr>
         </p:nvSpPr>
-        <p:spPr/>
+        <p:spPr>
+          <a:xfrm>
+            <a:off x="914430" y="113958"/>
+            <a:ext cx="10353761" cy="851535"/>
+          </a:xfrm>
+        </p:spPr>
         <p:txBody>
           <a:bodyPr/>
           <a:lstStyle/>
           <a:p>
             <a:r>
               <a:rPr lang="en-US" dirty="0"/>
-              <a:t>Sprint ii backlog</a:t>
-            </a:r>
-          </a:p>
-        </p:txBody>
-      </p:sp>
-      <p:sp>
-        <p:nvSpPr>
-          <p:cNvPr id="3" name="Content Placeholder 2">
+              <a:t>System diagram</a:t>
+            </a:r>
+          </a:p>
+        </p:txBody>
+      </p:sp>
+      <p:sp>
+        <p:nvSpPr>
+          <p:cNvPr id="5" name="AutoShape 4">
             <a:extLst>
               <a:ext uri="{FF2B5EF4-FFF2-40B4-BE49-F238E27FC236}">
-                <a16:creationId xmlns:a16="http://schemas.microsoft.com/office/drawing/2014/main" id="{A9362301-CE76-4F78-84AE-565D0ED9B88D}"/>
+                <a16:creationId xmlns:a16="http://schemas.microsoft.com/office/drawing/2014/main" id="{68C32F7E-693C-4FD4-9F3C-C0D62B7E2F0B}"/>
               </a:ext>
             </a:extLst>
           </p:cNvPr>
           <p:cNvSpPr>
-            <a:spLocks noGrp="1"/>
-          </p:cNvSpPr>
-          <p:nvPr>
-            <p:ph idx="1"/>
-          </p:nvPr>
-        </p:nvSpPr>
-        <p:spPr/>
-        <p:txBody>
-          <a:bodyPr/>
+            <a:spLocks noChangeAspect="1" noChangeArrowheads="1"/>
+          </p:cNvSpPr>
+          <p:nvPr/>
+        </p:nvSpPr>
+        <p:spPr bwMode="auto">
+          <a:xfrm>
+            <a:off x="2138289" y="-570915"/>
+            <a:ext cx="6766560" cy="6766560"/>
+          </a:xfrm>
+          <a:prstGeom prst="rect">
+            <a:avLst/>
+          </a:prstGeom>
+          <a:noFill/>
+          <a:extLst>
+            <a:ext uri="{909E8E84-426E-40DD-AFC4-6F175D3DCCD1}">
+              <a14:hiddenFill xmlns:a14="http://schemas.microsoft.com/office/drawing/2010/main">
+                <a:solidFill>
+                  <a:srgbClr val="FFFFFF"/>
+                </a:solidFill>
+              </a14:hiddenFill>
+            </a:ext>
+          </a:extLst>
+        </p:spPr>
+        <p:txBody>
+          <a:bodyPr vert="horz" wrap="square" lIns="91440" tIns="45720" rIns="91440" bIns="45720" numCol="1" anchor="t" anchorCtr="0" compatLnSpc="1">
+            <a:prstTxWarp prst="textNoShape">
+              <a:avLst/>
+            </a:prstTxWarp>
+          </a:bodyPr>
           <a:lstStyle/>
           <a:p>
-            <a:r>
-              <a:rPr lang="en-US" dirty="0"/>
-              <a:t>Unified Modeling Language (UML) Diagram of the system</a:t>
-            </a:r>
-          </a:p>
-          <a:p>
-            <a:r>
-              <a:rPr lang="en-US" dirty="0"/>
-              <a:t>Entity Relationship Diagram (ERD) of the system</a:t>
-            </a:r>
-          </a:p>
-          <a:p>
-            <a:r>
-              <a:rPr lang="en-US" dirty="0"/>
-              <a:t>Prototype of the System to be designed </a:t>
-            </a:r>
-          </a:p>
-          <a:p>
-            <a:r>
-              <a:rPr lang="en-US" dirty="0"/>
-              <a:t>Literature Review</a:t>
-            </a:r>
-          </a:p>
-          <a:p>
-            <a:r>
-              <a:rPr lang="en-US" dirty="0"/>
-              <a:t>System Design Specification Document to be made</a:t>
-            </a:r>
-          </a:p>
-          <a:p>
-            <a:endParaRPr lang="en-US" dirty="0"/>
-          </a:p>
-          <a:p>
-            <a:endParaRPr lang="en-US" dirty="0"/>
-          </a:p>
-        </p:txBody>
-      </p:sp>
+            <a:endParaRPr lang="en-US"/>
+          </a:p>
+        </p:txBody>
+      </p:sp>
+      <p:pic>
+        <p:nvPicPr>
+          <p:cNvPr id="6" name="Picture 5">
+            <a:extLst>
+              <a:ext uri="{FF2B5EF4-FFF2-40B4-BE49-F238E27FC236}">
+                <a16:creationId xmlns:a16="http://schemas.microsoft.com/office/drawing/2014/main" id="{F5248483-363D-412D-A0B3-40809AB13185}"/>
+              </a:ext>
+            </a:extLst>
+          </p:cNvPr>
+          <p:cNvPicPr>
+            <a:picLocks noChangeAspect="1"/>
+          </p:cNvPicPr>
+          <p:nvPr/>
+        </p:nvPicPr>
+        <p:blipFill rotWithShape="1">
+          <a:blip r:embed="rId2">
+            <a:extLst>
+              <a:ext uri="{28A0092B-C50C-407E-A947-70E740481C1C}">
+                <a14:useLocalDpi xmlns:a14="http://schemas.microsoft.com/office/drawing/2010/main" val="0"/>
+              </a:ext>
+            </a:extLst>
+          </a:blip>
+          <a:srcRect t="12045"/>
+          <a:stretch/>
+        </p:blipFill>
+        <p:spPr>
+          <a:xfrm>
+            <a:off x="2587070" y="965493"/>
+            <a:ext cx="7008479" cy="5633611"/>
+          </a:xfrm>
+          <a:prstGeom prst="rect">
+            <a:avLst/>
+          </a:prstGeom>
+        </p:spPr>
+      </p:pic>
     </p:spTree>
     <p:extLst>
       <p:ext uri="{BB962C8B-B14F-4D97-AF65-F5344CB8AC3E}">
-        <p14:creationId xmlns:p14="http://schemas.microsoft.com/office/powerpoint/2010/main" val="238338035"/>
+        <p14:creationId xmlns:p14="http://schemas.microsoft.com/office/powerpoint/2010/main" val="1176727767"/>
       </p:ext>
     </p:extLst>
   </p:cSld>
@@ -6047,7 +6068,7 @@
           <p:cNvPr id="2" name="Title 1">
             <a:extLst>
               <a:ext uri="{FF2B5EF4-FFF2-40B4-BE49-F238E27FC236}">
-                <a16:creationId xmlns:a16="http://schemas.microsoft.com/office/drawing/2014/main" id="{6748CC33-9C1D-4FB2-B9A8-AF259B02C14A}"/>
+                <a16:creationId xmlns:a16="http://schemas.microsoft.com/office/drawing/2014/main" id="{FD9A3C93-AAF9-4379-B580-E7B76D0CA9E4}"/>
               </a:ext>
             </a:extLst>
           </p:cNvPr>
@@ -6058,41 +6079,108 @@
             <p:ph type="title"/>
           </p:nvPr>
         </p:nvSpPr>
-        <p:spPr>
-          <a:xfrm>
-            <a:off x="914430" y="113958"/>
-            <a:ext cx="10353761" cy="851535"/>
-          </a:xfrm>
-        </p:spPr>
+        <p:spPr/>
         <p:txBody>
           <a:bodyPr/>
           <a:lstStyle/>
           <a:p>
             <a:r>
               <a:rPr lang="en-US" dirty="0"/>
-              <a:t>System diagram</a:t>
-            </a:r>
-          </a:p>
-        </p:txBody>
-      </p:sp>
-      <p:sp>
-        <p:nvSpPr>
-          <p:cNvPr id="5" name="AutoShape 4">
+              <a:t>Sprint ii backlog</a:t>
+            </a:r>
+          </a:p>
+        </p:txBody>
+      </p:sp>
+      <p:sp>
+        <p:nvSpPr>
+          <p:cNvPr id="3" name="Content Placeholder 2">
             <a:extLst>
               <a:ext uri="{FF2B5EF4-FFF2-40B4-BE49-F238E27FC236}">
-                <a16:creationId xmlns:a16="http://schemas.microsoft.com/office/drawing/2014/main" id="{68C32F7E-693C-4FD4-9F3C-C0D62B7E2F0B}"/>
+                <a16:creationId xmlns:a16="http://schemas.microsoft.com/office/drawing/2014/main" id="{A9362301-CE76-4F78-84AE-565D0ED9B88D}"/>
               </a:ext>
             </a:extLst>
           </p:cNvPr>
           <p:cNvSpPr>
-            <a:spLocks noChangeAspect="1" noChangeArrowheads="1"/>
-          </p:cNvSpPr>
+            <a:spLocks noGrp="1"/>
+          </p:cNvSpPr>
+          <p:nvPr>
+            <p:ph idx="1"/>
+          </p:nvPr>
+        </p:nvSpPr>
+        <p:spPr/>
+        <p:txBody>
+          <a:bodyPr/>
+          <a:lstStyle/>
+          <a:p>
+            <a:r>
+              <a:rPr lang="en-US" dirty="0"/>
+              <a:t>Unified Modeling Language (UML) Diagram of the system</a:t>
+            </a:r>
+          </a:p>
+          <a:p>
+            <a:r>
+              <a:rPr lang="en-US" dirty="0"/>
+              <a:t>Entity Relationship Diagram (ERD) of the system</a:t>
+            </a:r>
+          </a:p>
+          <a:p>
+            <a:r>
+              <a:rPr lang="en-US" dirty="0"/>
+              <a:t>Prototype of the System to be designed </a:t>
+            </a:r>
+          </a:p>
+          <a:p>
+            <a:r>
+              <a:rPr lang="en-US" dirty="0"/>
+              <a:t>Literature Review</a:t>
+            </a:r>
+          </a:p>
+          <a:p>
+            <a:r>
+              <a:rPr lang="en-US" dirty="0"/>
+              <a:t>System Design Specification Document to be made</a:t>
+            </a:r>
+          </a:p>
+          <a:p>
+            <a:endParaRPr lang="en-US" dirty="0"/>
+          </a:p>
+          <a:p>
+            <a:endParaRPr lang="en-US" dirty="0"/>
+          </a:p>
+        </p:txBody>
+      </p:sp>
+      <p:pic>
+        <p:nvPicPr>
+          <p:cNvPr id="1026" name="Picture 2" descr="Image result for uml diagram logo"/>
+          <p:cNvPicPr>
+            <a:picLocks noChangeAspect="1" noChangeArrowheads="1"/>
+          </p:cNvPicPr>
           <p:nvPr/>
-        </p:nvSpPr>
+        </p:nvPicPr>
+        <p:blipFill>
+          <a:blip r:embed="rId2">
+            <a:duotone>
+              <a:schemeClr val="accent3">
+                <a:shade val="45000"/>
+                <a:satMod val="135000"/>
+              </a:schemeClr>
+              <a:prstClr val="white"/>
+            </a:duotone>
+            <a:extLst>
+              <a:ext uri="{28A0092B-C50C-407E-A947-70E740481C1C}">
+                <a14:useLocalDpi xmlns:a14="http://schemas.microsoft.com/office/drawing/2010/main" val="0"/>
+              </a:ext>
+            </a:extLst>
+          </a:blip>
+          <a:srcRect/>
+          <a:stretch>
+            <a:fillRect/>
+          </a:stretch>
+        </p:blipFill>
         <p:spPr bwMode="auto">
           <a:xfrm>
-            <a:off x="2138289" y="-570915"/>
-            <a:ext cx="6766560" cy="6766560"/>
+            <a:off x="8945697" y="1598999"/>
+            <a:ext cx="2045772" cy="2045772"/>
           </a:xfrm>
           <a:prstGeom prst="rect">
             <a:avLst/>
@@ -6108,58 +6196,59 @@
             </a:ext>
           </a:extLst>
         </p:spPr>
-        <p:txBody>
-          <a:bodyPr vert="horz" wrap="square" lIns="91440" tIns="45720" rIns="91440" bIns="45720" numCol="1" anchor="t" anchorCtr="0" compatLnSpc="1">
-            <a:prstTxWarp prst="textNoShape">
-              <a:avLst/>
-            </a:prstTxWarp>
-          </a:bodyPr>
-          <a:lstStyle/>
-          <a:p>
-            <a:endParaRPr lang="en-US"/>
-          </a:p>
-        </p:txBody>
-      </p:sp>
+      </p:pic>
       <p:pic>
         <p:nvPicPr>
-          <p:cNvPr id="6" name="Picture 5">
-            <a:extLst>
-              <a:ext uri="{FF2B5EF4-FFF2-40B4-BE49-F238E27FC236}">
-                <a16:creationId xmlns:a16="http://schemas.microsoft.com/office/drawing/2014/main" id="{F5248483-363D-412D-A0B3-40809AB13185}"/>
-              </a:ext>
-            </a:extLst>
-          </p:cNvPr>
+          <p:cNvPr id="1036" name="Picture 12" descr="Image result for erd diagram png transparent"/>
           <p:cNvPicPr>
-            <a:picLocks noChangeAspect="1"/>
+            <a:picLocks noChangeAspect="1" noChangeArrowheads="1"/>
           </p:cNvPicPr>
           <p:nvPr/>
         </p:nvPicPr>
         <p:blipFill>
-          <a:blip r:embed="rId2">
+          <a:blip r:embed="rId3" cstate="hqprint">
+            <a:duotone>
+              <a:schemeClr val="accent2">
+                <a:shade val="45000"/>
+                <a:satMod val="135000"/>
+              </a:schemeClr>
+              <a:prstClr val="white"/>
+            </a:duotone>
             <a:extLst>
               <a:ext uri="{28A0092B-C50C-407E-A947-70E740481C1C}">
                 <a14:useLocalDpi xmlns:a14="http://schemas.microsoft.com/office/drawing/2010/main" val="0"/>
               </a:ext>
             </a:extLst>
           </a:blip>
+          <a:srcRect/>
           <a:stretch>
             <a:fillRect/>
           </a:stretch>
         </p:blipFill>
-        <p:spPr>
+        <p:spPr bwMode="auto">
           <a:xfrm>
-            <a:off x="2855742" y="829994"/>
-            <a:ext cx="6471138" cy="5914048"/>
+            <a:off x="8146409" y="3644771"/>
+            <a:ext cx="2332242" cy="2411020"/>
           </a:xfrm>
           <a:prstGeom prst="rect">
             <a:avLst/>
           </a:prstGeom>
+          <a:noFill/>
+          <a:extLst>
+            <a:ext uri="{909E8E84-426E-40DD-AFC4-6F175D3DCCD1}">
+              <a14:hiddenFill xmlns:a14="http://schemas.microsoft.com/office/drawing/2010/main">
+                <a:solidFill>
+                  <a:srgbClr val="FFFFFF"/>
+                </a:solidFill>
+              </a14:hiddenFill>
+            </a:ext>
+          </a:extLst>
         </p:spPr>
       </p:pic>
     </p:spTree>
     <p:extLst>
       <p:ext uri="{BB962C8B-B14F-4D97-AF65-F5344CB8AC3E}">
-        <p14:creationId xmlns:p14="http://schemas.microsoft.com/office/powerpoint/2010/main" val="1176727767"/>
+        <p14:creationId xmlns:p14="http://schemas.microsoft.com/office/powerpoint/2010/main" val="238338035"/>
       </p:ext>
     </p:extLst>
   </p:cSld>
@@ -6191,7 +6280,7 @@
           <p:cNvPr id="2" name="Title 1">
             <a:extLst>
               <a:ext uri="{FF2B5EF4-FFF2-40B4-BE49-F238E27FC236}">
-                <a16:creationId xmlns:a16="http://schemas.microsoft.com/office/drawing/2014/main" id="{EE154EAA-EDB8-4C95-B696-92D63E36F1AE}"/>
+                <a16:creationId xmlns:a16="http://schemas.microsoft.com/office/drawing/2014/main" id="{14703E39-E430-4B50-A2DB-D169662EB9EC}"/>
               </a:ext>
             </a:extLst>
           </p:cNvPr>
@@ -6209,7 +6298,7 @@
           <a:p>
             <a:r>
               <a:rPr lang="en-US" dirty="0"/>
-              <a:t>GUI mockups</a:t>
+              <a:t>Project Backlog</a:t>
             </a:r>
           </a:p>
         </p:txBody>
@@ -6219,7 +6308,7 @@
           <p:cNvPr id="3" name="Content Placeholder 2">
             <a:extLst>
               <a:ext uri="{FF2B5EF4-FFF2-40B4-BE49-F238E27FC236}">
-                <a16:creationId xmlns:a16="http://schemas.microsoft.com/office/drawing/2014/main" id="{F33A8E25-98D3-4658-93DF-BBA19F792977}"/>
+                <a16:creationId xmlns:a16="http://schemas.microsoft.com/office/drawing/2014/main" id="{3CE9087A-016F-42D0-BAF3-8C3AEB5B9E01}"/>
               </a:ext>
             </a:extLst>
           </p:cNvPr>
@@ -6230,19 +6319,1028 @@
             <p:ph idx="1"/>
           </p:nvPr>
         </p:nvSpPr>
-        <p:spPr/>
-        <p:txBody>
-          <a:bodyPr/>
+        <p:spPr>
+          <a:xfrm>
+            <a:off x="3133543" y="2246130"/>
+            <a:ext cx="3306511" cy="2365739"/>
+          </a:xfrm>
+        </p:spPr>
+        <p:txBody>
+          <a:bodyPr>
+            <a:normAutofit/>
+          </a:bodyPr>
           <a:lstStyle/>
           <a:p>
-            <a:endParaRPr lang="en-US"/>
+            <a:r>
+              <a:rPr lang="en-US" sz="1600" dirty="0"/>
+              <a:t>Screens for Mobile App:</a:t>
+            </a:r>
+            <a:endParaRPr lang="en-US" sz="1600" dirty="0">
+              <a:effectLst/>
+            </a:endParaRPr>
+          </a:p>
+          <a:p>
+            <a:r>
+              <a:rPr lang="en-US" sz="1600" dirty="0">
+                <a:effectLst/>
+              </a:rPr>
+              <a:t>Login Page</a:t>
+            </a:r>
+          </a:p>
+          <a:p>
+            <a:r>
+              <a:rPr lang="en-US" sz="1600" dirty="0">
+                <a:effectLst/>
+              </a:rPr>
+              <a:t>Home Screen</a:t>
+            </a:r>
+          </a:p>
+          <a:p>
+            <a:r>
+              <a:rPr lang="en-US" sz="1600" dirty="0">
+                <a:effectLst/>
+              </a:rPr>
+              <a:t>Shop Page</a:t>
+            </a:r>
+          </a:p>
+          <a:p>
+            <a:r>
+              <a:rPr lang="en-US" sz="1600" dirty="0">
+                <a:effectLst/>
+              </a:rPr>
+              <a:t>Upload Items Page</a:t>
+            </a:r>
+          </a:p>
+          <a:p>
+            <a:pPr marL="0" indent="0">
+              <a:buNone/>
+            </a:pPr>
+            <a:endParaRPr lang="en-US" sz="1600" dirty="0">
+              <a:effectLst/>
+            </a:endParaRPr>
+          </a:p>
+          <a:p>
+            <a:endParaRPr lang="en-US" sz="1600" dirty="0"/>
+          </a:p>
+          <a:p>
+            <a:endParaRPr lang="en-US" sz="1600" dirty="0"/>
+          </a:p>
+        </p:txBody>
+      </p:sp>
+      <p:sp>
+        <p:nvSpPr>
+          <p:cNvPr id="5" name="Content Placeholder 2">
+            <a:extLst>
+              <a:ext uri="{FF2B5EF4-FFF2-40B4-BE49-F238E27FC236}">
+                <a16:creationId xmlns:a16="http://schemas.microsoft.com/office/drawing/2014/main" id="{05DAFD06-8B9C-4ADE-8FB7-2C564401EE39}"/>
+              </a:ext>
+            </a:extLst>
+          </p:cNvPr>
+          <p:cNvSpPr txBox="1">
+            <a:spLocks/>
+          </p:cNvSpPr>
+          <p:nvPr/>
+        </p:nvSpPr>
+        <p:spPr>
+          <a:xfrm>
+            <a:off x="562973" y="2246130"/>
+            <a:ext cx="3475325" cy="3695136"/>
+          </a:xfrm>
+          <a:prstGeom prst="rect">
+            <a:avLst/>
+          </a:prstGeom>
+        </p:spPr>
+        <p:txBody>
+          <a:bodyPr vert="horz" lIns="91440" tIns="45720" rIns="91440" bIns="45720" rtlCol="0">
+            <a:normAutofit fontScale="77500" lnSpcReduction="20000"/>
+          </a:bodyPr>
+          <a:lstStyle>
+            <a:lvl1pPr marL="228600" indent="-228600" algn="l" defTabSz="914400" rtl="0" eaLnBrk="1" latinLnBrk="0" hangingPunct="1">
+              <a:lnSpc>
+                <a:spcPct val="120000"/>
+              </a:lnSpc>
+              <a:spcBef>
+                <a:spcPts val="1000"/>
+              </a:spcBef>
+              <a:buFont typeface="Arial" panose="020B0604020202020204" pitchFamily="34" charset="0"/>
+              <a:buChar char="•"/>
+              <a:defRPr sz="2000" kern="1200">
+                <a:solidFill>
+                  <a:schemeClr val="tx1"/>
+                </a:solidFill>
+                <a:effectLst>
+                  <a:outerShdw blurRad="50800" dist="38100" dir="2700000" algn="tl" rotWithShape="0">
+                    <a:srgbClr val="000000">
+                      <a:alpha val="48000"/>
+                    </a:srgbClr>
+                  </a:outerShdw>
+                </a:effectLst>
+                <a:latin typeface="+mn-lt"/>
+                <a:ea typeface="+mn-ea"/>
+                <a:cs typeface="+mn-cs"/>
+              </a:defRPr>
+            </a:lvl1pPr>
+            <a:lvl2pPr marL="685800" indent="-228600" algn="l" defTabSz="914400" rtl="0" eaLnBrk="1" latinLnBrk="0" hangingPunct="1">
+              <a:lnSpc>
+                <a:spcPct val="120000"/>
+              </a:lnSpc>
+              <a:spcBef>
+                <a:spcPts val="500"/>
+              </a:spcBef>
+              <a:buFont typeface="Arial" panose="020B0604020202020204" pitchFamily="34" charset="0"/>
+              <a:buChar char="•"/>
+              <a:defRPr sz="1800" kern="1200">
+                <a:solidFill>
+                  <a:schemeClr val="tx1"/>
+                </a:solidFill>
+                <a:effectLst>
+                  <a:outerShdw blurRad="50800" dist="38100" dir="2700000" algn="tl" rotWithShape="0">
+                    <a:srgbClr val="000000">
+                      <a:alpha val="48000"/>
+                    </a:srgbClr>
+                  </a:outerShdw>
+                </a:effectLst>
+                <a:latin typeface="+mn-lt"/>
+                <a:ea typeface="+mn-ea"/>
+                <a:cs typeface="+mn-cs"/>
+              </a:defRPr>
+            </a:lvl2pPr>
+            <a:lvl3pPr marL="1143000" indent="-228600" algn="l" defTabSz="914400" rtl="0" eaLnBrk="1" latinLnBrk="0" hangingPunct="1">
+              <a:lnSpc>
+                <a:spcPct val="120000"/>
+              </a:lnSpc>
+              <a:spcBef>
+                <a:spcPts val="500"/>
+              </a:spcBef>
+              <a:buFont typeface="Arial" panose="020B0604020202020204" pitchFamily="34" charset="0"/>
+              <a:buChar char="•"/>
+              <a:defRPr sz="1600" kern="1200">
+                <a:solidFill>
+                  <a:schemeClr val="tx1"/>
+                </a:solidFill>
+                <a:effectLst>
+                  <a:outerShdw blurRad="50800" dist="38100" dir="2700000" algn="tl" rotWithShape="0">
+                    <a:srgbClr val="000000">
+                      <a:alpha val="48000"/>
+                    </a:srgbClr>
+                  </a:outerShdw>
+                </a:effectLst>
+                <a:latin typeface="+mn-lt"/>
+                <a:ea typeface="+mn-ea"/>
+                <a:cs typeface="+mn-cs"/>
+              </a:defRPr>
+            </a:lvl3pPr>
+            <a:lvl4pPr marL="1600200" indent="-228600" algn="l" defTabSz="914400" rtl="0" eaLnBrk="1" latinLnBrk="0" hangingPunct="1">
+              <a:lnSpc>
+                <a:spcPct val="120000"/>
+              </a:lnSpc>
+              <a:spcBef>
+                <a:spcPts val="500"/>
+              </a:spcBef>
+              <a:buFont typeface="Arial" panose="020B0604020202020204" pitchFamily="34" charset="0"/>
+              <a:buChar char="•"/>
+              <a:defRPr sz="1400" kern="1200">
+                <a:solidFill>
+                  <a:schemeClr val="tx1"/>
+                </a:solidFill>
+                <a:effectLst>
+                  <a:outerShdw blurRad="50800" dist="38100" dir="2700000" algn="tl" rotWithShape="0">
+                    <a:srgbClr val="000000">
+                      <a:alpha val="48000"/>
+                    </a:srgbClr>
+                  </a:outerShdw>
+                </a:effectLst>
+                <a:latin typeface="+mn-lt"/>
+                <a:ea typeface="+mn-ea"/>
+                <a:cs typeface="+mn-cs"/>
+              </a:defRPr>
+            </a:lvl4pPr>
+            <a:lvl5pPr marL="2057400" indent="-228600" algn="l" defTabSz="914400" rtl="0" eaLnBrk="1" latinLnBrk="0" hangingPunct="1">
+              <a:lnSpc>
+                <a:spcPct val="120000"/>
+              </a:lnSpc>
+              <a:spcBef>
+                <a:spcPts val="500"/>
+              </a:spcBef>
+              <a:buFont typeface="Arial" panose="020B0604020202020204" pitchFamily="34" charset="0"/>
+              <a:buChar char="•"/>
+              <a:defRPr sz="1200" kern="1200">
+                <a:solidFill>
+                  <a:schemeClr val="tx1"/>
+                </a:solidFill>
+                <a:effectLst>
+                  <a:outerShdw blurRad="50800" dist="38100" dir="2700000" algn="tl" rotWithShape="0">
+                    <a:srgbClr val="000000">
+                      <a:alpha val="48000"/>
+                    </a:srgbClr>
+                  </a:outerShdw>
+                </a:effectLst>
+                <a:latin typeface="+mn-lt"/>
+                <a:ea typeface="+mn-ea"/>
+                <a:cs typeface="+mn-cs"/>
+              </a:defRPr>
+            </a:lvl5pPr>
+            <a:lvl6pPr marL="2514600" indent="-228600" algn="l" defTabSz="914400" rtl="0" eaLnBrk="1" latinLnBrk="0" hangingPunct="1">
+              <a:lnSpc>
+                <a:spcPct val="120000"/>
+              </a:lnSpc>
+              <a:spcBef>
+                <a:spcPts val="500"/>
+              </a:spcBef>
+              <a:buFont typeface="Arial" panose="020B0604020202020204" pitchFamily="34" charset="0"/>
+              <a:buChar char="•"/>
+              <a:defRPr sz="1200" kern="1200">
+                <a:solidFill>
+                  <a:schemeClr val="tx1"/>
+                </a:solidFill>
+                <a:effectLst>
+                  <a:outerShdw blurRad="50800" dist="38100" dir="2700000" algn="tl" rotWithShape="0">
+                    <a:srgbClr val="000000">
+                      <a:alpha val="48000"/>
+                    </a:srgbClr>
+                  </a:outerShdw>
+                </a:effectLst>
+                <a:latin typeface="+mn-lt"/>
+                <a:ea typeface="+mn-ea"/>
+                <a:cs typeface="+mn-cs"/>
+              </a:defRPr>
+            </a:lvl6pPr>
+            <a:lvl7pPr marL="2971800" indent="-228600" algn="l" defTabSz="914400" rtl="0" eaLnBrk="1" latinLnBrk="0" hangingPunct="1">
+              <a:lnSpc>
+                <a:spcPct val="120000"/>
+              </a:lnSpc>
+              <a:spcBef>
+                <a:spcPts val="500"/>
+              </a:spcBef>
+              <a:buFont typeface="Arial" panose="020B0604020202020204" pitchFamily="34" charset="0"/>
+              <a:buChar char="•"/>
+              <a:defRPr sz="1200" kern="1200">
+                <a:solidFill>
+                  <a:schemeClr val="tx1"/>
+                </a:solidFill>
+                <a:effectLst>
+                  <a:outerShdw blurRad="50800" dist="38100" dir="2700000" algn="tl" rotWithShape="0">
+                    <a:srgbClr val="000000">
+                      <a:alpha val="48000"/>
+                    </a:srgbClr>
+                  </a:outerShdw>
+                </a:effectLst>
+                <a:latin typeface="+mn-lt"/>
+                <a:ea typeface="+mn-ea"/>
+                <a:cs typeface="+mn-cs"/>
+              </a:defRPr>
+            </a:lvl7pPr>
+            <a:lvl8pPr marL="3429000" indent="-228600" algn="l" defTabSz="914400" rtl="0" eaLnBrk="1" latinLnBrk="0" hangingPunct="1">
+              <a:lnSpc>
+                <a:spcPct val="120000"/>
+              </a:lnSpc>
+              <a:spcBef>
+                <a:spcPts val="500"/>
+              </a:spcBef>
+              <a:buFont typeface="Arial" panose="020B0604020202020204" pitchFamily="34" charset="0"/>
+              <a:buChar char="•"/>
+              <a:defRPr sz="1200" kern="1200">
+                <a:solidFill>
+                  <a:schemeClr val="tx1"/>
+                </a:solidFill>
+                <a:effectLst>
+                  <a:outerShdw blurRad="50800" dist="38100" dir="2700000" algn="tl" rotWithShape="0">
+                    <a:srgbClr val="000000">
+                      <a:alpha val="48000"/>
+                    </a:srgbClr>
+                  </a:outerShdw>
+                </a:effectLst>
+                <a:latin typeface="+mn-lt"/>
+                <a:ea typeface="+mn-ea"/>
+                <a:cs typeface="+mn-cs"/>
+              </a:defRPr>
+            </a:lvl8pPr>
+            <a:lvl9pPr marL="3886200" indent="-228600" algn="l" defTabSz="914400" rtl="0" eaLnBrk="1" latinLnBrk="0" hangingPunct="1">
+              <a:lnSpc>
+                <a:spcPct val="120000"/>
+              </a:lnSpc>
+              <a:spcBef>
+                <a:spcPts val="500"/>
+              </a:spcBef>
+              <a:buFont typeface="Arial" panose="020B0604020202020204" pitchFamily="34" charset="0"/>
+              <a:buChar char="•"/>
+              <a:defRPr sz="1200" kern="1200">
+                <a:solidFill>
+                  <a:schemeClr val="tx1"/>
+                </a:solidFill>
+                <a:effectLst>
+                  <a:outerShdw blurRad="50800" dist="38100" dir="2700000" algn="tl" rotWithShape="0">
+                    <a:srgbClr val="000000">
+                      <a:alpha val="48000"/>
+                    </a:srgbClr>
+                  </a:outerShdw>
+                </a:effectLst>
+                <a:latin typeface="+mn-lt"/>
+                <a:ea typeface="+mn-ea"/>
+                <a:cs typeface="+mn-cs"/>
+              </a:defRPr>
+            </a:lvl9pPr>
+          </a:lstStyle>
+          <a:p>
+            <a:r>
+              <a:rPr lang="en-US" dirty="0"/>
+              <a:t>Screens for Website:</a:t>
+            </a:r>
+            <a:endParaRPr lang="en-US" dirty="0">
+              <a:effectLst/>
+            </a:endParaRPr>
+          </a:p>
+          <a:p>
+            <a:r>
+              <a:rPr lang="en-US" dirty="0">
+                <a:effectLst/>
+              </a:rPr>
+              <a:t>Login Page/ Sign Up</a:t>
+            </a:r>
+          </a:p>
+          <a:p>
+            <a:r>
+              <a:rPr lang="en-US" dirty="0">
+                <a:effectLst/>
+              </a:rPr>
+              <a:t>Home Screen</a:t>
+            </a:r>
+          </a:p>
+          <a:p>
+            <a:r>
+              <a:rPr lang="en-US" dirty="0">
+                <a:effectLst/>
+              </a:rPr>
+              <a:t>User Profile</a:t>
+            </a:r>
+          </a:p>
+          <a:p>
+            <a:r>
+              <a:rPr lang="en-US" dirty="0">
+                <a:effectLst/>
+              </a:rPr>
+              <a:t>Shop Page</a:t>
+            </a:r>
+          </a:p>
+          <a:p>
+            <a:r>
+              <a:rPr lang="en-US" dirty="0">
+                <a:effectLst/>
+              </a:rPr>
+              <a:t>Items Page</a:t>
+            </a:r>
+          </a:p>
+          <a:p>
+            <a:r>
+              <a:rPr lang="en-US" dirty="0">
+                <a:effectLst/>
+              </a:rPr>
+              <a:t>Blog Page</a:t>
+            </a:r>
+          </a:p>
+          <a:p>
+            <a:r>
+              <a:rPr lang="en-US" dirty="0">
+                <a:effectLst/>
+              </a:rPr>
+              <a:t>About Page</a:t>
+            </a:r>
+          </a:p>
+          <a:p>
+            <a:r>
+              <a:rPr lang="en-US" dirty="0">
+                <a:effectLst/>
+              </a:rPr>
+              <a:t>Shopping Cart</a:t>
+            </a:r>
+          </a:p>
+          <a:p>
+            <a:r>
+              <a:rPr lang="en-US" dirty="0">
+                <a:effectLst/>
+              </a:rPr>
+              <a:t>User Guide</a:t>
+            </a:r>
+          </a:p>
+          <a:p>
+            <a:endParaRPr lang="en-US" dirty="0"/>
+          </a:p>
+          <a:p>
+            <a:endParaRPr lang="en-US" dirty="0"/>
+          </a:p>
+        </p:txBody>
+      </p:sp>
+      <p:sp>
+        <p:nvSpPr>
+          <p:cNvPr id="6" name="Content Placeholder 2">
+            <a:extLst>
+              <a:ext uri="{FF2B5EF4-FFF2-40B4-BE49-F238E27FC236}">
+                <a16:creationId xmlns:a16="http://schemas.microsoft.com/office/drawing/2014/main" id="{7903F2BE-7579-4945-83AA-38EEC0E21785}"/>
+              </a:ext>
+            </a:extLst>
+          </p:cNvPr>
+          <p:cNvSpPr txBox="1">
+            <a:spLocks/>
+          </p:cNvSpPr>
+          <p:nvPr/>
+        </p:nvSpPr>
+        <p:spPr>
+          <a:xfrm>
+            <a:off x="5975597" y="2246129"/>
+            <a:ext cx="3306511" cy="2365739"/>
+          </a:xfrm>
+          <a:prstGeom prst="rect">
+            <a:avLst/>
+          </a:prstGeom>
+        </p:spPr>
+        <p:txBody>
+          <a:bodyPr vert="horz" lIns="91440" tIns="45720" rIns="91440" bIns="45720" rtlCol="0">
+            <a:normAutofit/>
+          </a:bodyPr>
+          <a:lstStyle>
+            <a:lvl1pPr marL="228600" indent="-228600" algn="l" defTabSz="914400" rtl="0" eaLnBrk="1" latinLnBrk="0" hangingPunct="1">
+              <a:lnSpc>
+                <a:spcPct val="120000"/>
+              </a:lnSpc>
+              <a:spcBef>
+                <a:spcPts val="1000"/>
+              </a:spcBef>
+              <a:buFont typeface="Arial" panose="020B0604020202020204" pitchFamily="34" charset="0"/>
+              <a:buChar char="•"/>
+              <a:defRPr sz="2000" kern="1200">
+                <a:solidFill>
+                  <a:schemeClr val="tx1"/>
+                </a:solidFill>
+                <a:effectLst>
+                  <a:outerShdw blurRad="50800" dist="38100" dir="2700000" algn="tl" rotWithShape="0">
+                    <a:srgbClr val="000000">
+                      <a:alpha val="48000"/>
+                    </a:srgbClr>
+                  </a:outerShdw>
+                </a:effectLst>
+                <a:latin typeface="+mn-lt"/>
+                <a:ea typeface="+mn-ea"/>
+                <a:cs typeface="+mn-cs"/>
+              </a:defRPr>
+            </a:lvl1pPr>
+            <a:lvl2pPr marL="685800" indent="-228600" algn="l" defTabSz="914400" rtl="0" eaLnBrk="1" latinLnBrk="0" hangingPunct="1">
+              <a:lnSpc>
+                <a:spcPct val="120000"/>
+              </a:lnSpc>
+              <a:spcBef>
+                <a:spcPts val="500"/>
+              </a:spcBef>
+              <a:buFont typeface="Arial" panose="020B0604020202020204" pitchFamily="34" charset="0"/>
+              <a:buChar char="•"/>
+              <a:defRPr sz="1800" kern="1200">
+                <a:solidFill>
+                  <a:schemeClr val="tx1"/>
+                </a:solidFill>
+                <a:effectLst>
+                  <a:outerShdw blurRad="50800" dist="38100" dir="2700000" algn="tl" rotWithShape="0">
+                    <a:srgbClr val="000000">
+                      <a:alpha val="48000"/>
+                    </a:srgbClr>
+                  </a:outerShdw>
+                </a:effectLst>
+                <a:latin typeface="+mn-lt"/>
+                <a:ea typeface="+mn-ea"/>
+                <a:cs typeface="+mn-cs"/>
+              </a:defRPr>
+            </a:lvl2pPr>
+            <a:lvl3pPr marL="1143000" indent="-228600" algn="l" defTabSz="914400" rtl="0" eaLnBrk="1" latinLnBrk="0" hangingPunct="1">
+              <a:lnSpc>
+                <a:spcPct val="120000"/>
+              </a:lnSpc>
+              <a:spcBef>
+                <a:spcPts val="500"/>
+              </a:spcBef>
+              <a:buFont typeface="Arial" panose="020B0604020202020204" pitchFamily="34" charset="0"/>
+              <a:buChar char="•"/>
+              <a:defRPr sz="1600" kern="1200">
+                <a:solidFill>
+                  <a:schemeClr val="tx1"/>
+                </a:solidFill>
+                <a:effectLst>
+                  <a:outerShdw blurRad="50800" dist="38100" dir="2700000" algn="tl" rotWithShape="0">
+                    <a:srgbClr val="000000">
+                      <a:alpha val="48000"/>
+                    </a:srgbClr>
+                  </a:outerShdw>
+                </a:effectLst>
+                <a:latin typeface="+mn-lt"/>
+                <a:ea typeface="+mn-ea"/>
+                <a:cs typeface="+mn-cs"/>
+              </a:defRPr>
+            </a:lvl3pPr>
+            <a:lvl4pPr marL="1600200" indent="-228600" algn="l" defTabSz="914400" rtl="0" eaLnBrk="1" latinLnBrk="0" hangingPunct="1">
+              <a:lnSpc>
+                <a:spcPct val="120000"/>
+              </a:lnSpc>
+              <a:spcBef>
+                <a:spcPts val="500"/>
+              </a:spcBef>
+              <a:buFont typeface="Arial" panose="020B0604020202020204" pitchFamily="34" charset="0"/>
+              <a:buChar char="•"/>
+              <a:defRPr sz="1400" kern="1200">
+                <a:solidFill>
+                  <a:schemeClr val="tx1"/>
+                </a:solidFill>
+                <a:effectLst>
+                  <a:outerShdw blurRad="50800" dist="38100" dir="2700000" algn="tl" rotWithShape="0">
+                    <a:srgbClr val="000000">
+                      <a:alpha val="48000"/>
+                    </a:srgbClr>
+                  </a:outerShdw>
+                </a:effectLst>
+                <a:latin typeface="+mn-lt"/>
+                <a:ea typeface="+mn-ea"/>
+                <a:cs typeface="+mn-cs"/>
+              </a:defRPr>
+            </a:lvl4pPr>
+            <a:lvl5pPr marL="2057400" indent="-228600" algn="l" defTabSz="914400" rtl="0" eaLnBrk="1" latinLnBrk="0" hangingPunct="1">
+              <a:lnSpc>
+                <a:spcPct val="120000"/>
+              </a:lnSpc>
+              <a:spcBef>
+                <a:spcPts val="500"/>
+              </a:spcBef>
+              <a:buFont typeface="Arial" panose="020B0604020202020204" pitchFamily="34" charset="0"/>
+              <a:buChar char="•"/>
+              <a:defRPr sz="1200" kern="1200">
+                <a:solidFill>
+                  <a:schemeClr val="tx1"/>
+                </a:solidFill>
+                <a:effectLst>
+                  <a:outerShdw blurRad="50800" dist="38100" dir="2700000" algn="tl" rotWithShape="0">
+                    <a:srgbClr val="000000">
+                      <a:alpha val="48000"/>
+                    </a:srgbClr>
+                  </a:outerShdw>
+                </a:effectLst>
+                <a:latin typeface="+mn-lt"/>
+                <a:ea typeface="+mn-ea"/>
+                <a:cs typeface="+mn-cs"/>
+              </a:defRPr>
+            </a:lvl5pPr>
+            <a:lvl6pPr marL="2514600" indent="-228600" algn="l" defTabSz="914400" rtl="0" eaLnBrk="1" latinLnBrk="0" hangingPunct="1">
+              <a:lnSpc>
+                <a:spcPct val="120000"/>
+              </a:lnSpc>
+              <a:spcBef>
+                <a:spcPts val="500"/>
+              </a:spcBef>
+              <a:buFont typeface="Arial" panose="020B0604020202020204" pitchFamily="34" charset="0"/>
+              <a:buChar char="•"/>
+              <a:defRPr sz="1200" kern="1200">
+                <a:solidFill>
+                  <a:schemeClr val="tx1"/>
+                </a:solidFill>
+                <a:effectLst>
+                  <a:outerShdw blurRad="50800" dist="38100" dir="2700000" algn="tl" rotWithShape="0">
+                    <a:srgbClr val="000000">
+                      <a:alpha val="48000"/>
+                    </a:srgbClr>
+                  </a:outerShdw>
+                </a:effectLst>
+                <a:latin typeface="+mn-lt"/>
+                <a:ea typeface="+mn-ea"/>
+                <a:cs typeface="+mn-cs"/>
+              </a:defRPr>
+            </a:lvl6pPr>
+            <a:lvl7pPr marL="2971800" indent="-228600" algn="l" defTabSz="914400" rtl="0" eaLnBrk="1" latinLnBrk="0" hangingPunct="1">
+              <a:lnSpc>
+                <a:spcPct val="120000"/>
+              </a:lnSpc>
+              <a:spcBef>
+                <a:spcPts val="500"/>
+              </a:spcBef>
+              <a:buFont typeface="Arial" panose="020B0604020202020204" pitchFamily="34" charset="0"/>
+              <a:buChar char="•"/>
+              <a:defRPr sz="1200" kern="1200">
+                <a:solidFill>
+                  <a:schemeClr val="tx1"/>
+                </a:solidFill>
+                <a:effectLst>
+                  <a:outerShdw blurRad="50800" dist="38100" dir="2700000" algn="tl" rotWithShape="0">
+                    <a:srgbClr val="000000">
+                      <a:alpha val="48000"/>
+                    </a:srgbClr>
+                  </a:outerShdw>
+                </a:effectLst>
+                <a:latin typeface="+mn-lt"/>
+                <a:ea typeface="+mn-ea"/>
+                <a:cs typeface="+mn-cs"/>
+              </a:defRPr>
+            </a:lvl7pPr>
+            <a:lvl8pPr marL="3429000" indent="-228600" algn="l" defTabSz="914400" rtl="0" eaLnBrk="1" latinLnBrk="0" hangingPunct="1">
+              <a:lnSpc>
+                <a:spcPct val="120000"/>
+              </a:lnSpc>
+              <a:spcBef>
+                <a:spcPts val="500"/>
+              </a:spcBef>
+              <a:buFont typeface="Arial" panose="020B0604020202020204" pitchFamily="34" charset="0"/>
+              <a:buChar char="•"/>
+              <a:defRPr sz="1200" kern="1200">
+                <a:solidFill>
+                  <a:schemeClr val="tx1"/>
+                </a:solidFill>
+                <a:effectLst>
+                  <a:outerShdw blurRad="50800" dist="38100" dir="2700000" algn="tl" rotWithShape="0">
+                    <a:srgbClr val="000000">
+                      <a:alpha val="48000"/>
+                    </a:srgbClr>
+                  </a:outerShdw>
+                </a:effectLst>
+                <a:latin typeface="+mn-lt"/>
+                <a:ea typeface="+mn-ea"/>
+                <a:cs typeface="+mn-cs"/>
+              </a:defRPr>
+            </a:lvl8pPr>
+            <a:lvl9pPr marL="3886200" indent="-228600" algn="l" defTabSz="914400" rtl="0" eaLnBrk="1" latinLnBrk="0" hangingPunct="1">
+              <a:lnSpc>
+                <a:spcPct val="120000"/>
+              </a:lnSpc>
+              <a:spcBef>
+                <a:spcPts val="500"/>
+              </a:spcBef>
+              <a:buFont typeface="Arial" panose="020B0604020202020204" pitchFamily="34" charset="0"/>
+              <a:buChar char="•"/>
+              <a:defRPr sz="1200" kern="1200">
+                <a:solidFill>
+                  <a:schemeClr val="tx1"/>
+                </a:solidFill>
+                <a:effectLst>
+                  <a:outerShdw blurRad="50800" dist="38100" dir="2700000" algn="tl" rotWithShape="0">
+                    <a:srgbClr val="000000">
+                      <a:alpha val="48000"/>
+                    </a:srgbClr>
+                  </a:outerShdw>
+                </a:effectLst>
+                <a:latin typeface="+mn-lt"/>
+                <a:ea typeface="+mn-ea"/>
+                <a:cs typeface="+mn-cs"/>
+              </a:defRPr>
+            </a:lvl9pPr>
+          </a:lstStyle>
+          <a:p>
+            <a:r>
+              <a:rPr lang="en-US" sz="1600" dirty="0"/>
+              <a:t>Databases:</a:t>
+            </a:r>
+            <a:endParaRPr lang="en-US" sz="1600" dirty="0">
+              <a:effectLst/>
+            </a:endParaRPr>
+          </a:p>
+          <a:p>
+            <a:r>
+              <a:rPr lang="en-US" sz="1600" dirty="0">
+                <a:effectLst/>
+              </a:rPr>
+              <a:t>ERDs</a:t>
+            </a:r>
+          </a:p>
+          <a:p>
+            <a:r>
+              <a:rPr lang="en-US" sz="1600" dirty="0">
+                <a:effectLst/>
+              </a:rPr>
+              <a:t>Normalization of tables</a:t>
+            </a:r>
+          </a:p>
+          <a:p>
+            <a:r>
+              <a:rPr lang="en-US" sz="1600" dirty="0">
+                <a:effectLst/>
+              </a:rPr>
+              <a:t>Dummy data</a:t>
+            </a:r>
+          </a:p>
+          <a:p>
+            <a:pPr marL="0" indent="0">
+              <a:buFont typeface="Arial" panose="020B0604020202020204" pitchFamily="34" charset="0"/>
+              <a:buNone/>
+            </a:pPr>
+            <a:endParaRPr lang="en-US" sz="1600" dirty="0">
+              <a:effectLst/>
+            </a:endParaRPr>
+          </a:p>
+          <a:p>
+            <a:endParaRPr lang="en-US" sz="1600" dirty="0"/>
+          </a:p>
+          <a:p>
+            <a:endParaRPr lang="en-US" sz="1600" dirty="0"/>
+          </a:p>
+        </p:txBody>
+      </p:sp>
+      <p:sp>
+        <p:nvSpPr>
+          <p:cNvPr id="8" name="Content Placeholder 2">
+            <a:extLst>
+              <a:ext uri="{FF2B5EF4-FFF2-40B4-BE49-F238E27FC236}">
+                <a16:creationId xmlns:a16="http://schemas.microsoft.com/office/drawing/2014/main" id="{989DB679-570B-4339-932E-3FAF74A1C94F}"/>
+              </a:ext>
+            </a:extLst>
+          </p:cNvPr>
+          <p:cNvSpPr txBox="1">
+            <a:spLocks/>
+          </p:cNvSpPr>
+          <p:nvPr/>
+        </p:nvSpPr>
+        <p:spPr>
+          <a:xfrm>
+            <a:off x="8885489" y="2246129"/>
+            <a:ext cx="3306511" cy="2365739"/>
+          </a:xfrm>
+          <a:prstGeom prst="rect">
+            <a:avLst/>
+          </a:prstGeom>
+        </p:spPr>
+        <p:txBody>
+          <a:bodyPr vert="horz" lIns="91440" tIns="45720" rIns="91440" bIns="45720" rtlCol="0">
+            <a:normAutofit/>
+          </a:bodyPr>
+          <a:lstStyle>
+            <a:lvl1pPr marL="228600" indent="-228600" algn="l" defTabSz="914400" rtl="0" eaLnBrk="1" latinLnBrk="0" hangingPunct="1">
+              <a:lnSpc>
+                <a:spcPct val="120000"/>
+              </a:lnSpc>
+              <a:spcBef>
+                <a:spcPts val="1000"/>
+              </a:spcBef>
+              <a:buFont typeface="Arial" panose="020B0604020202020204" pitchFamily="34" charset="0"/>
+              <a:buChar char="•"/>
+              <a:defRPr sz="2000" kern="1200">
+                <a:solidFill>
+                  <a:schemeClr val="tx1"/>
+                </a:solidFill>
+                <a:effectLst>
+                  <a:outerShdw blurRad="50800" dist="38100" dir="2700000" algn="tl" rotWithShape="0">
+                    <a:srgbClr val="000000">
+                      <a:alpha val="48000"/>
+                    </a:srgbClr>
+                  </a:outerShdw>
+                </a:effectLst>
+                <a:latin typeface="+mn-lt"/>
+                <a:ea typeface="+mn-ea"/>
+                <a:cs typeface="+mn-cs"/>
+              </a:defRPr>
+            </a:lvl1pPr>
+            <a:lvl2pPr marL="685800" indent="-228600" algn="l" defTabSz="914400" rtl="0" eaLnBrk="1" latinLnBrk="0" hangingPunct="1">
+              <a:lnSpc>
+                <a:spcPct val="120000"/>
+              </a:lnSpc>
+              <a:spcBef>
+                <a:spcPts val="500"/>
+              </a:spcBef>
+              <a:buFont typeface="Arial" panose="020B0604020202020204" pitchFamily="34" charset="0"/>
+              <a:buChar char="•"/>
+              <a:defRPr sz="1800" kern="1200">
+                <a:solidFill>
+                  <a:schemeClr val="tx1"/>
+                </a:solidFill>
+                <a:effectLst>
+                  <a:outerShdw blurRad="50800" dist="38100" dir="2700000" algn="tl" rotWithShape="0">
+                    <a:srgbClr val="000000">
+                      <a:alpha val="48000"/>
+                    </a:srgbClr>
+                  </a:outerShdw>
+                </a:effectLst>
+                <a:latin typeface="+mn-lt"/>
+                <a:ea typeface="+mn-ea"/>
+                <a:cs typeface="+mn-cs"/>
+              </a:defRPr>
+            </a:lvl2pPr>
+            <a:lvl3pPr marL="1143000" indent="-228600" algn="l" defTabSz="914400" rtl="0" eaLnBrk="1" latinLnBrk="0" hangingPunct="1">
+              <a:lnSpc>
+                <a:spcPct val="120000"/>
+              </a:lnSpc>
+              <a:spcBef>
+                <a:spcPts val="500"/>
+              </a:spcBef>
+              <a:buFont typeface="Arial" panose="020B0604020202020204" pitchFamily="34" charset="0"/>
+              <a:buChar char="•"/>
+              <a:defRPr sz="1600" kern="1200">
+                <a:solidFill>
+                  <a:schemeClr val="tx1"/>
+                </a:solidFill>
+                <a:effectLst>
+                  <a:outerShdw blurRad="50800" dist="38100" dir="2700000" algn="tl" rotWithShape="0">
+                    <a:srgbClr val="000000">
+                      <a:alpha val="48000"/>
+                    </a:srgbClr>
+                  </a:outerShdw>
+                </a:effectLst>
+                <a:latin typeface="+mn-lt"/>
+                <a:ea typeface="+mn-ea"/>
+                <a:cs typeface="+mn-cs"/>
+              </a:defRPr>
+            </a:lvl3pPr>
+            <a:lvl4pPr marL="1600200" indent="-228600" algn="l" defTabSz="914400" rtl="0" eaLnBrk="1" latinLnBrk="0" hangingPunct="1">
+              <a:lnSpc>
+                <a:spcPct val="120000"/>
+              </a:lnSpc>
+              <a:spcBef>
+                <a:spcPts val="500"/>
+              </a:spcBef>
+              <a:buFont typeface="Arial" panose="020B0604020202020204" pitchFamily="34" charset="0"/>
+              <a:buChar char="•"/>
+              <a:defRPr sz="1400" kern="1200">
+                <a:solidFill>
+                  <a:schemeClr val="tx1"/>
+                </a:solidFill>
+                <a:effectLst>
+                  <a:outerShdw blurRad="50800" dist="38100" dir="2700000" algn="tl" rotWithShape="0">
+                    <a:srgbClr val="000000">
+                      <a:alpha val="48000"/>
+                    </a:srgbClr>
+                  </a:outerShdw>
+                </a:effectLst>
+                <a:latin typeface="+mn-lt"/>
+                <a:ea typeface="+mn-ea"/>
+                <a:cs typeface="+mn-cs"/>
+              </a:defRPr>
+            </a:lvl4pPr>
+            <a:lvl5pPr marL="2057400" indent="-228600" algn="l" defTabSz="914400" rtl="0" eaLnBrk="1" latinLnBrk="0" hangingPunct="1">
+              <a:lnSpc>
+                <a:spcPct val="120000"/>
+              </a:lnSpc>
+              <a:spcBef>
+                <a:spcPts val="500"/>
+              </a:spcBef>
+              <a:buFont typeface="Arial" panose="020B0604020202020204" pitchFamily="34" charset="0"/>
+              <a:buChar char="•"/>
+              <a:defRPr sz="1200" kern="1200">
+                <a:solidFill>
+                  <a:schemeClr val="tx1"/>
+                </a:solidFill>
+                <a:effectLst>
+                  <a:outerShdw blurRad="50800" dist="38100" dir="2700000" algn="tl" rotWithShape="0">
+                    <a:srgbClr val="000000">
+                      <a:alpha val="48000"/>
+                    </a:srgbClr>
+                  </a:outerShdw>
+                </a:effectLst>
+                <a:latin typeface="+mn-lt"/>
+                <a:ea typeface="+mn-ea"/>
+                <a:cs typeface="+mn-cs"/>
+              </a:defRPr>
+            </a:lvl5pPr>
+            <a:lvl6pPr marL="2514600" indent="-228600" algn="l" defTabSz="914400" rtl="0" eaLnBrk="1" latinLnBrk="0" hangingPunct="1">
+              <a:lnSpc>
+                <a:spcPct val="120000"/>
+              </a:lnSpc>
+              <a:spcBef>
+                <a:spcPts val="500"/>
+              </a:spcBef>
+              <a:buFont typeface="Arial" panose="020B0604020202020204" pitchFamily="34" charset="0"/>
+              <a:buChar char="•"/>
+              <a:defRPr sz="1200" kern="1200">
+                <a:solidFill>
+                  <a:schemeClr val="tx1"/>
+                </a:solidFill>
+                <a:effectLst>
+                  <a:outerShdw blurRad="50800" dist="38100" dir="2700000" algn="tl" rotWithShape="0">
+                    <a:srgbClr val="000000">
+                      <a:alpha val="48000"/>
+                    </a:srgbClr>
+                  </a:outerShdw>
+                </a:effectLst>
+                <a:latin typeface="+mn-lt"/>
+                <a:ea typeface="+mn-ea"/>
+                <a:cs typeface="+mn-cs"/>
+              </a:defRPr>
+            </a:lvl6pPr>
+            <a:lvl7pPr marL="2971800" indent="-228600" algn="l" defTabSz="914400" rtl="0" eaLnBrk="1" latinLnBrk="0" hangingPunct="1">
+              <a:lnSpc>
+                <a:spcPct val="120000"/>
+              </a:lnSpc>
+              <a:spcBef>
+                <a:spcPts val="500"/>
+              </a:spcBef>
+              <a:buFont typeface="Arial" panose="020B0604020202020204" pitchFamily="34" charset="0"/>
+              <a:buChar char="•"/>
+              <a:defRPr sz="1200" kern="1200">
+                <a:solidFill>
+                  <a:schemeClr val="tx1"/>
+                </a:solidFill>
+                <a:effectLst>
+                  <a:outerShdw blurRad="50800" dist="38100" dir="2700000" algn="tl" rotWithShape="0">
+                    <a:srgbClr val="000000">
+                      <a:alpha val="48000"/>
+                    </a:srgbClr>
+                  </a:outerShdw>
+                </a:effectLst>
+                <a:latin typeface="+mn-lt"/>
+                <a:ea typeface="+mn-ea"/>
+                <a:cs typeface="+mn-cs"/>
+              </a:defRPr>
+            </a:lvl7pPr>
+            <a:lvl8pPr marL="3429000" indent="-228600" algn="l" defTabSz="914400" rtl="0" eaLnBrk="1" latinLnBrk="0" hangingPunct="1">
+              <a:lnSpc>
+                <a:spcPct val="120000"/>
+              </a:lnSpc>
+              <a:spcBef>
+                <a:spcPts val="500"/>
+              </a:spcBef>
+              <a:buFont typeface="Arial" panose="020B0604020202020204" pitchFamily="34" charset="0"/>
+              <a:buChar char="•"/>
+              <a:defRPr sz="1200" kern="1200">
+                <a:solidFill>
+                  <a:schemeClr val="tx1"/>
+                </a:solidFill>
+                <a:effectLst>
+                  <a:outerShdw blurRad="50800" dist="38100" dir="2700000" algn="tl" rotWithShape="0">
+                    <a:srgbClr val="000000">
+                      <a:alpha val="48000"/>
+                    </a:srgbClr>
+                  </a:outerShdw>
+                </a:effectLst>
+                <a:latin typeface="+mn-lt"/>
+                <a:ea typeface="+mn-ea"/>
+                <a:cs typeface="+mn-cs"/>
+              </a:defRPr>
+            </a:lvl8pPr>
+            <a:lvl9pPr marL="3886200" indent="-228600" algn="l" defTabSz="914400" rtl="0" eaLnBrk="1" latinLnBrk="0" hangingPunct="1">
+              <a:lnSpc>
+                <a:spcPct val="120000"/>
+              </a:lnSpc>
+              <a:spcBef>
+                <a:spcPts val="500"/>
+              </a:spcBef>
+              <a:buFont typeface="Arial" panose="020B0604020202020204" pitchFamily="34" charset="0"/>
+              <a:buChar char="•"/>
+              <a:defRPr sz="1200" kern="1200">
+                <a:solidFill>
+                  <a:schemeClr val="tx1"/>
+                </a:solidFill>
+                <a:effectLst>
+                  <a:outerShdw blurRad="50800" dist="38100" dir="2700000" algn="tl" rotWithShape="0">
+                    <a:srgbClr val="000000">
+                      <a:alpha val="48000"/>
+                    </a:srgbClr>
+                  </a:outerShdw>
+                </a:effectLst>
+                <a:latin typeface="+mn-lt"/>
+                <a:ea typeface="+mn-ea"/>
+                <a:cs typeface="+mn-cs"/>
+              </a:defRPr>
+            </a:lvl9pPr>
+          </a:lstStyle>
+          <a:p>
+            <a:r>
+              <a:rPr lang="en-US" sz="1600" dirty="0">
+                <a:effectLst/>
+              </a:rPr>
+              <a:t>UML Diagram</a:t>
+            </a:r>
+          </a:p>
+          <a:p>
+            <a:r>
+              <a:rPr lang="en-US" sz="1600" dirty="0">
+                <a:effectLst/>
+              </a:rPr>
+              <a:t>User Stories</a:t>
+            </a:r>
+          </a:p>
+          <a:p>
+            <a:r>
+              <a:rPr lang="en-US" sz="1600" dirty="0">
+                <a:effectLst/>
+              </a:rPr>
+              <a:t>Use Cases</a:t>
+            </a:r>
+          </a:p>
+          <a:p>
+            <a:pPr marL="0" indent="0">
+              <a:buNone/>
+            </a:pPr>
+            <a:endParaRPr lang="en-US" sz="1600" dirty="0">
+              <a:effectLst/>
+            </a:endParaRPr>
+          </a:p>
+          <a:p>
+            <a:pPr marL="0" indent="0">
+              <a:buFont typeface="Arial" panose="020B0604020202020204" pitchFamily="34" charset="0"/>
+              <a:buNone/>
+            </a:pPr>
+            <a:endParaRPr lang="en-US" sz="1600" dirty="0">
+              <a:effectLst/>
+            </a:endParaRPr>
+          </a:p>
+          <a:p>
+            <a:endParaRPr lang="en-US" sz="1600" dirty="0"/>
+          </a:p>
+          <a:p>
+            <a:endParaRPr lang="en-US" sz="1600" dirty="0"/>
           </a:p>
         </p:txBody>
       </p:sp>
     </p:spTree>
     <p:extLst>
       <p:ext uri="{BB962C8B-B14F-4D97-AF65-F5344CB8AC3E}">
-        <p14:creationId xmlns:p14="http://schemas.microsoft.com/office/powerpoint/2010/main" val="3368211307"/>
+        <p14:creationId xmlns:p14="http://schemas.microsoft.com/office/powerpoint/2010/main" val="386003673"/>
       </p:ext>
     </p:extLst>
   </p:cSld>
@@ -6318,10 +7416,16 @@
           <a:bodyPr/>
           <a:lstStyle/>
           <a:p>
-            <a:pPr marL="0" indent="0">
-              <a:buNone/>
-            </a:pPr>
-            <a:endParaRPr lang="en-US" dirty="0"/>
+            <a:r>
+              <a:rPr lang="en-US" dirty="0" smtClean="0"/>
+              <a:t>Most of the APIs are paid and we need funds (or alternative free APIs) for the execution of our project</a:t>
+            </a:r>
+          </a:p>
+          <a:p>
+            <a:r>
+              <a:rPr lang="en-US" dirty="0" smtClean="0"/>
+              <a:t>To host our website and mobile app, we again need to generate funds or sponsorships. </a:t>
+            </a:r>
           </a:p>
         </p:txBody>
       </p:sp>
@@ -7518,12 +8622,12 @@
         <p:spPr>
           <a:xfrm>
             <a:off x="2234492" y="3589481"/>
-            <a:ext cx="2133598" cy="1472332"/>
+            <a:ext cx="2160084" cy="1513248"/>
           </a:xfrm>
         </p:spPr>
         <p:txBody>
           <a:bodyPr>
-            <a:normAutofit fontScale="92500"/>
+            <a:noAutofit/>
           </a:bodyPr>
           <a:lstStyle/>
           <a:p>
@@ -7531,7 +8635,7 @@
               <a:buNone/>
             </a:pPr>
             <a:r>
-              <a:rPr lang="en-US" sz="1800" dirty="0"/>
+              <a:rPr lang="en-US" sz="1600" dirty="0"/>
               <a:t>Web based platform to facilitate artists and skilled workers</a:t>
             </a:r>
           </a:p>
@@ -7754,8 +8858,8 @@
         </p:blipFill>
         <p:spPr bwMode="auto">
           <a:xfrm>
-            <a:off x="2304635" y="4572000"/>
-            <a:ext cx="2052637" cy="1282898"/>
+            <a:off x="2236048" y="4837528"/>
+            <a:ext cx="2121224" cy="1325765"/>
           </a:xfrm>
           <a:prstGeom prst="rect">
             <a:avLst/>
@@ -7788,6 +8892,13 @@
         </p:nvPicPr>
         <p:blipFill>
           <a:blip r:embed="rId7">
+            <a:duotone>
+              <a:prstClr val="black"/>
+              <a:schemeClr val="accent3">
+                <a:tint val="45000"/>
+                <a:satMod val="400000"/>
+              </a:schemeClr>
+            </a:duotone>
             <a:extLst>
               <a:ext uri="{28A0092B-C50C-407E-A947-70E740481C1C}">
                 <a14:useLocalDpi xmlns:a14="http://schemas.microsoft.com/office/drawing/2010/main" val="0"/>
@@ -8064,6 +9175,11 @@
               <a:gd name="adj2" fmla="val -87871"/>
             </a:avLst>
           </a:prstGeom>
+          <a:solidFill>
+            <a:schemeClr val="bg2">
+              <a:lumMod val="75000"/>
+            </a:schemeClr>
+          </a:solidFill>
           <a:ln>
             <a:miter lim="800000"/>
           </a:ln>
@@ -8456,7 +9572,7 @@
         </p:nvSpPr>
         <p:spPr>
           <a:xfrm>
-            <a:off x="1522414" y="274638"/>
+            <a:off x="1522414" y="512144"/>
             <a:ext cx="9143998" cy="1020762"/>
           </a:xfrm>
           <a:prstGeom prst="rect">
@@ -8493,10 +9609,9 @@
           </a:lstStyle>
           <a:p>
             <a:r>
-              <a:rPr lang="en-US"/>
+              <a:rPr lang="en-US" dirty="0"/>
               <a:t>Our Mission (Deliverables)</a:t>
             </a:r>
-            <a:endParaRPr lang="en-US" dirty="0"/>
           </a:p>
         </p:txBody>
       </p:sp>
@@ -8516,8 +9631,8 @@
         </p:nvSpPr>
         <p:spPr>
           <a:xfrm>
-            <a:off x="1522414" y="2438400"/>
-            <a:ext cx="9144000" cy="3733800"/>
+            <a:off x="1522414" y="1781299"/>
+            <a:ext cx="9144000" cy="4390901"/>
           </a:xfrm>
           <a:prstGeom prst="rect">
             <a:avLst/>
@@ -8770,8 +9885,40 @@
               <a:t> </a:t>
             </a:r>
             <a:r>
+              <a:rPr lang="en-US" dirty="0" smtClean="0"/>
+              <a:t>a Mobile and </a:t>
+            </a:r>
+            <a:r>
               <a:rPr lang="en-US" dirty="0"/>
-              <a:t>an This Web Application will support artists and artisans to promote their work &amp; skills and earn a respectable living, regardless of any biases.</a:t>
+              <a:t>Web Application </a:t>
+            </a:r>
+            <a:r>
+              <a:rPr lang="en-US" dirty="0" smtClean="0"/>
+              <a:t>that will </a:t>
+            </a:r>
+            <a:r>
+              <a:rPr lang="en-US" dirty="0"/>
+              <a:t>support artists and artisans </a:t>
+            </a:r>
+            <a:r>
+              <a:rPr lang="en-US" dirty="0" smtClean="0"/>
+              <a:t>and </a:t>
+            </a:r>
+            <a:r>
+              <a:rPr lang="en-US" dirty="0" smtClean="0"/>
+              <a:t>promote </a:t>
+            </a:r>
+            <a:r>
+              <a:rPr lang="en-US" dirty="0"/>
+              <a:t>their work &amp; </a:t>
+            </a:r>
+            <a:r>
+              <a:rPr lang="en-US" dirty="0" smtClean="0"/>
+              <a:t>skills while also earning  them </a:t>
+            </a:r>
+            <a:r>
+              <a:rPr lang="en-US" dirty="0"/>
+              <a:t>a respectable living, regardless of any biases.</a:t>
             </a:r>
           </a:p>
         </p:txBody>
@@ -9609,7 +10756,7 @@
         </p:nvSpPr>
         <p:spPr>
           <a:xfrm>
-            <a:off x="1522414" y="274638"/>
+            <a:off x="1323457" y="718875"/>
             <a:ext cx="9143998" cy="1020762"/>
           </a:xfrm>
           <a:prstGeom prst="rect">
@@ -9646,8 +10793,12 @@
           </a:lstStyle>
           <a:p>
             <a:r>
-              <a:rPr lang="en-US"/>
-              <a:t>Tools and Technologies</a:t>
+              <a:rPr lang="en-US" dirty="0"/>
+              <a:t>Tools and </a:t>
+            </a:r>
+            <a:r>
+              <a:rPr lang="en-US" dirty="0" smtClean="0"/>
+              <a:t>Technologies*</a:t>
             </a:r>
             <a:endParaRPr lang="en-US" dirty="0"/>
           </a:p>
@@ -9669,8 +10820,8 @@
         </p:nvSpPr>
         <p:spPr>
           <a:xfrm>
-            <a:off x="1078813" y="2511533"/>
-            <a:ext cx="3108245" cy="2229538"/>
+            <a:off x="1518842" y="2243462"/>
+            <a:ext cx="2940149" cy="2841019"/>
           </a:xfrm>
           <a:prstGeom prst="rect">
             <a:avLst/>
@@ -9678,7 +10829,7 @@
         </p:spPr>
         <p:txBody>
           <a:bodyPr>
-            <a:normAutofit/>
+            <a:noAutofit/>
           </a:bodyPr>
           <a:lstStyle>
             <a:lvl1pPr marL="228600" indent="-228600" algn="l" defTabSz="914400" rtl="0" eaLnBrk="1" latinLnBrk="0" hangingPunct="1">
@@ -9908,10 +11059,25 @@
             </a:lvl9pPr>
           </a:lstStyle>
           <a:p>
-            <a:pPr algn="r"/>
-            <a:r>
-              <a:rPr lang="en-US" sz="1800" dirty="0"/>
-              <a:t>We will be using technologies to train our model, build our website, maintain our repository and design our user interface.</a:t>
+            <a:r>
+              <a:rPr lang="en-US" dirty="0"/>
+              <a:t>We will be </a:t>
+            </a:r>
+            <a:r>
+              <a:rPr lang="en-US" dirty="0" smtClean="0"/>
+              <a:t>using these </a:t>
+            </a:r>
+            <a:r>
+              <a:rPr lang="en-US" dirty="0"/>
+              <a:t>technologies to </a:t>
+            </a:r>
+            <a:r>
+              <a:rPr lang="en-US" dirty="0" smtClean="0"/>
+              <a:t>build </a:t>
+            </a:r>
+            <a:r>
+              <a:rPr lang="en-US" dirty="0"/>
+              <a:t>our website, maintain our repository and design our user interface.</a:t>
             </a:r>
           </a:p>
         </p:txBody>
@@ -9933,7 +11099,7 @@
         <p:blipFill>
           <a:blip r:embed="rId2">
             <a:duotone>
-              <a:schemeClr val="accent1">
+              <a:schemeClr val="accent2">
                 <a:shade val="45000"/>
                 <a:satMod val="135000"/>
               </a:schemeClr>
@@ -9952,22 +11118,14 @@
         </p:blipFill>
         <p:spPr bwMode="auto">
           <a:xfrm>
-            <a:off x="4884080" y="911333"/>
+            <a:off x="4884080" y="1540727"/>
             <a:ext cx="2727614" cy="1600200"/>
           </a:xfrm>
           <a:prstGeom prst="rect">
             <a:avLst/>
           </a:prstGeom>
           <a:noFill/>
-          <a:extLst>
-            <a:ext uri="{909E8E84-426E-40DD-AFC4-6F175D3DCCD1}">
-              <a14:hiddenFill xmlns:a14="http://schemas.microsoft.com/office/drawing/2010/main">
-                <a:solidFill>
-                  <a:srgbClr val="FFFFFF"/>
-                </a:solidFill>
-              </a14:hiddenFill>
-            </a:ext>
-          </a:extLst>
+          <a:extLst/>
         </p:spPr>
       </p:pic>
       <p:pic>
@@ -9986,6 +11144,13 @@
         </p:nvPicPr>
         <p:blipFill>
           <a:blip r:embed="rId3" cstate="print">
+            <a:duotone>
+              <a:schemeClr val="accent2">
+                <a:shade val="45000"/>
+                <a:satMod val="135000"/>
+              </a:schemeClr>
+              <a:prstClr val="white"/>
+            </a:duotone>
             <a:extLst>
               <a:ext uri="{28A0092B-C50C-407E-A947-70E740481C1C}">
                 <a14:useLocalDpi xmlns:a14="http://schemas.microsoft.com/office/drawing/2010/main" val="0"/>
@@ -9999,22 +11164,14 @@
         </p:blipFill>
         <p:spPr bwMode="auto">
           <a:xfrm>
-            <a:off x="7733934" y="1183824"/>
+            <a:off x="7733934" y="1813218"/>
             <a:ext cx="1218130" cy="1218130"/>
           </a:xfrm>
           <a:prstGeom prst="rect">
             <a:avLst/>
           </a:prstGeom>
           <a:noFill/>
-          <a:extLst>
-            <a:ext uri="{909E8E84-426E-40DD-AFC4-6F175D3DCCD1}">
-              <a14:hiddenFill xmlns:a14="http://schemas.microsoft.com/office/drawing/2010/main">
-                <a:solidFill>
-                  <a:srgbClr val="FFFFFF"/>
-                </a:solidFill>
-              </a14:hiddenFill>
-            </a:ext>
-          </a:extLst>
+          <a:extLst/>
         </p:spPr>
       </p:pic>
       <p:pic>
@@ -10034,7 +11191,7 @@
         <p:blipFill>
           <a:blip r:embed="rId4" cstate="print">
             <a:duotone>
-              <a:schemeClr val="accent1">
+              <a:schemeClr val="accent2">
                 <a:shade val="45000"/>
                 <a:satMod val="135000"/>
               </a:schemeClr>
@@ -10052,12 +11209,13 @@
         </p:blipFill>
         <p:spPr>
           <a:xfrm>
-            <a:off x="8995235" y="1424112"/>
+            <a:off x="8995235" y="2053506"/>
             <a:ext cx="1336246" cy="1336246"/>
           </a:xfrm>
           <a:prstGeom prst="rect">
             <a:avLst/>
           </a:prstGeom>
+          <a:noFill/>
         </p:spPr>
       </p:pic>
       <p:pic>
@@ -10075,9 +11233,9 @@
           <p:nvPr/>
         </p:nvPicPr>
         <p:blipFill>
-          <a:blip r:embed="rId5" cstate="print">
+          <a:blip r:embed="rId5" cstate="hqprint">
             <a:duotone>
-              <a:schemeClr val="accent1">
+              <a:schemeClr val="accent2">
                 <a:shade val="45000"/>
                 <a:satMod val="135000"/>
               </a:schemeClr>
@@ -10096,22 +11254,14 @@
         </p:blipFill>
         <p:spPr bwMode="auto">
           <a:xfrm>
-            <a:off x="5838337" y="4438908"/>
+            <a:off x="5838337" y="5068302"/>
             <a:ext cx="2496834" cy="910355"/>
           </a:xfrm>
           <a:prstGeom prst="rect">
             <a:avLst/>
           </a:prstGeom>
           <a:noFill/>
-          <a:extLst>
-            <a:ext uri="{909E8E84-426E-40DD-AFC4-6F175D3DCCD1}">
-              <a14:hiddenFill xmlns:a14="http://schemas.microsoft.com/office/drawing/2010/main">
-                <a:solidFill>
-                  <a:srgbClr val="FFFFFF"/>
-                </a:solidFill>
-              </a14:hiddenFill>
-            </a:ext>
-          </a:extLst>
+          <a:extLst/>
         </p:spPr>
       </p:pic>
       <p:pic>
@@ -10130,6 +11280,13 @@
         </p:nvPicPr>
         <p:blipFill>
           <a:blip r:embed="rId6">
+            <a:duotone>
+              <a:schemeClr val="accent2">
+                <a:shade val="45000"/>
+                <a:satMod val="135000"/>
+              </a:schemeClr>
+              <a:prstClr val="white"/>
+            </a:duotone>
             <a:extLst>
               <a:ext uri="{28A0092B-C50C-407E-A947-70E740481C1C}">
                 <a14:useLocalDpi xmlns:a14="http://schemas.microsoft.com/office/drawing/2010/main" val="0"/>
@@ -10143,22 +11300,14 @@
         </p:blipFill>
         <p:spPr bwMode="auto">
           <a:xfrm>
-            <a:off x="9207785" y="3393968"/>
+            <a:off x="9207785" y="4023362"/>
             <a:ext cx="1447636" cy="1447636"/>
           </a:xfrm>
           <a:prstGeom prst="rect">
             <a:avLst/>
           </a:prstGeom>
           <a:noFill/>
-          <a:extLst>
-            <a:ext uri="{909E8E84-426E-40DD-AFC4-6F175D3DCCD1}">
-              <a14:hiddenFill xmlns:a14="http://schemas.microsoft.com/office/drawing/2010/main">
-                <a:solidFill>
-                  <a:srgbClr val="FFFFFF"/>
-                </a:solidFill>
-              </a14:hiddenFill>
-            </a:ext>
-          </a:extLst>
+          <a:extLst/>
         </p:spPr>
       </p:pic>
       <p:pic>
@@ -10177,6 +11326,13 @@
         </p:nvPicPr>
         <p:blipFill>
           <a:blip r:embed="rId7">
+            <a:duotone>
+              <a:schemeClr val="accent2">
+                <a:shade val="45000"/>
+                <a:satMod val="135000"/>
+              </a:schemeClr>
+              <a:prstClr val="white"/>
+            </a:duotone>
             <a:extLst>
               <a:ext uri="{28A0092B-C50C-407E-A947-70E740481C1C}">
                 <a14:useLocalDpi xmlns:a14="http://schemas.microsoft.com/office/drawing/2010/main" val="0"/>
@@ -10190,22 +11346,14 @@
         </p:blipFill>
         <p:spPr bwMode="auto">
           <a:xfrm>
-            <a:off x="4684286" y="1674606"/>
+            <a:off x="4684286" y="2304000"/>
             <a:ext cx="2422341" cy="2422341"/>
           </a:xfrm>
           <a:prstGeom prst="rect">
             <a:avLst/>
           </a:prstGeom>
           <a:noFill/>
-          <a:extLst>
-            <a:ext uri="{909E8E84-426E-40DD-AFC4-6F175D3DCCD1}">
-              <a14:hiddenFill xmlns:a14="http://schemas.microsoft.com/office/drawing/2010/main">
-                <a:solidFill>
-                  <a:srgbClr val="FFFFFF"/>
-                </a:solidFill>
-              </a14:hiddenFill>
-            </a:ext>
-          </a:extLst>
+          <a:extLst/>
         </p:spPr>
       </p:pic>
       <p:pic>
@@ -10225,7 +11373,7 @@
         <p:blipFill>
           <a:blip r:embed="rId8">
             <a:duotone>
-              <a:schemeClr val="accent6">
+              <a:schemeClr val="accent2">
                 <a:shade val="45000"/>
                 <a:satMod val="135000"/>
               </a:schemeClr>
@@ -10244,12 +11392,13 @@
         </p:blipFill>
         <p:spPr bwMode="auto">
           <a:xfrm>
-            <a:off x="8541750" y="4797934"/>
+            <a:off x="8541750" y="5427328"/>
             <a:ext cx="2050884" cy="849998"/>
           </a:xfrm>
           <a:prstGeom prst="rect">
             <a:avLst/>
           </a:prstGeom>
+          <a:noFill/>
           <a:ln>
             <a:gradFill>
               <a:gsLst>
@@ -10299,6 +11448,13 @@
         </p:nvPicPr>
         <p:blipFill>
           <a:blip r:embed="rId9">
+            <a:duotone>
+              <a:schemeClr val="accent2">
+                <a:shade val="45000"/>
+                <a:satMod val="135000"/>
+              </a:schemeClr>
+              <a:prstClr val="white"/>
+            </a:duotone>
             <a:extLst>
               <a:ext uri="{28A0092B-C50C-407E-A947-70E740481C1C}">
                 <a14:useLocalDpi xmlns:a14="http://schemas.microsoft.com/office/drawing/2010/main" val="0"/>
@@ -10312,22 +11468,14 @@
         </p:blipFill>
         <p:spPr bwMode="auto">
           <a:xfrm>
-            <a:off x="5839414" y="3023051"/>
+            <a:off x="5839414" y="3652445"/>
             <a:ext cx="1408304" cy="1357879"/>
           </a:xfrm>
           <a:prstGeom prst="rect">
             <a:avLst/>
           </a:prstGeom>
           <a:noFill/>
-          <a:extLst>
-            <a:ext uri="{909E8E84-426E-40DD-AFC4-6F175D3DCCD1}">
-              <a14:hiddenFill xmlns:a14="http://schemas.microsoft.com/office/drawing/2010/main">
-                <a:solidFill>
-                  <a:srgbClr val="FFFFFF"/>
-                </a:solidFill>
-              </a14:hiddenFill>
-            </a:ext>
-          </a:extLst>
+          <a:extLst/>
         </p:spPr>
       </p:pic>
       <p:pic>
@@ -10346,6 +11494,13 @@
         </p:nvPicPr>
         <p:blipFill>
           <a:blip r:embed="rId10">
+            <a:duotone>
+              <a:prstClr val="black"/>
+              <a:schemeClr val="accent2">
+                <a:tint val="45000"/>
+                <a:satMod val="400000"/>
+              </a:schemeClr>
+            </a:duotone>
             <a:extLst>
               <a:ext uri="{28A0092B-C50C-407E-A947-70E740481C1C}">
                 <a14:useLocalDpi xmlns:a14="http://schemas.microsoft.com/office/drawing/2010/main" val="0"/>
@@ -10359,7 +11514,7 @@
         </p:blipFill>
         <p:spPr bwMode="auto">
           <a:xfrm>
-            <a:off x="4168638" y="3393968"/>
+            <a:off x="4168638" y="4023362"/>
             <a:ext cx="1905000" cy="1905000"/>
           </a:xfrm>
           <a:prstGeom prst="rect">
@@ -10392,13 +11547,13 @@
           <p:nvPr/>
         </p:nvPicPr>
         <p:blipFill>
-          <a:blip r:embed="rId11">
+          <a:blip r:embed="rId11" cstate="hqprint">
             <a:duotone>
-              <a:prstClr val="black"/>
-              <a:srgbClr val="D9C3A5">
-                <a:tint val="50000"/>
-                <a:satMod val="180000"/>
-              </a:srgbClr>
+              <a:schemeClr val="accent2">
+                <a:shade val="45000"/>
+                <a:satMod val="135000"/>
+              </a:schemeClr>
+              <a:prstClr val="white"/>
             </a:duotone>
             <a:extLst>
               <a:ext uri="{28A0092B-C50C-407E-A947-70E740481C1C}">
@@ -10413,22 +11568,14 @@
         </p:blipFill>
         <p:spPr bwMode="auto">
           <a:xfrm>
-            <a:off x="7815321" y="3492066"/>
+            <a:off x="7815321" y="4121460"/>
             <a:ext cx="1523089" cy="1152608"/>
           </a:xfrm>
           <a:prstGeom prst="rect">
             <a:avLst/>
           </a:prstGeom>
           <a:noFill/>
-          <a:extLst>
-            <a:ext uri="{909E8E84-426E-40DD-AFC4-6F175D3DCCD1}">
-              <a14:hiddenFill xmlns:a14="http://schemas.microsoft.com/office/drawing/2010/main">
-                <a:solidFill>
-                  <a:srgbClr val="FFFFFF"/>
-                </a:solidFill>
-              </a14:hiddenFill>
-            </a:ext>
-          </a:extLst>
+          <a:extLst/>
         </p:spPr>
       </p:pic>
       <p:pic>
@@ -10447,6 +11594,13 @@
         </p:nvPicPr>
         <p:blipFill>
           <a:blip r:embed="rId12">
+            <a:duotone>
+              <a:schemeClr val="accent2">
+                <a:shade val="45000"/>
+                <a:satMod val="135000"/>
+              </a:schemeClr>
+              <a:prstClr val="white"/>
+            </a:duotone>
             <a:extLst>
               <a:ext uri="{28A0092B-C50C-407E-A947-70E740481C1C}">
                 <a14:useLocalDpi xmlns:a14="http://schemas.microsoft.com/office/drawing/2010/main" val="0"/>
@@ -10460,22 +11614,14 @@
         </p:blipFill>
         <p:spPr bwMode="auto">
           <a:xfrm>
-            <a:off x="6935744" y="2406314"/>
+            <a:off x="6935744" y="3035708"/>
             <a:ext cx="1419169" cy="1419169"/>
           </a:xfrm>
           <a:prstGeom prst="rect">
             <a:avLst/>
           </a:prstGeom>
           <a:noFill/>
-          <a:extLst>
-            <a:ext uri="{909E8E84-426E-40DD-AFC4-6F175D3DCCD1}">
-              <a14:hiddenFill xmlns:a14="http://schemas.microsoft.com/office/drawing/2010/main">
-                <a:solidFill>
-                  <a:srgbClr val="FFFFFF"/>
-                </a:solidFill>
-              </a14:hiddenFill>
-            </a:ext>
-          </a:extLst>
+          <a:extLst/>
         </p:spPr>
       </p:pic>
       <p:pic>
@@ -10494,6 +11640,13 @@
         </p:nvPicPr>
         <p:blipFill>
           <a:blip r:embed="rId13">
+            <a:duotone>
+              <a:schemeClr val="accent2">
+                <a:shade val="45000"/>
+                <a:satMod val="135000"/>
+              </a:schemeClr>
+              <a:prstClr val="white"/>
+            </a:duotone>
             <a:extLst>
               <a:ext uri="{28A0092B-C50C-407E-A947-70E740481C1C}">
                 <a14:useLocalDpi xmlns:a14="http://schemas.microsoft.com/office/drawing/2010/main" val="0"/>
@@ -10507,24 +11660,46 @@
         </p:blipFill>
         <p:spPr bwMode="auto">
           <a:xfrm>
-            <a:off x="8549226" y="2681595"/>
+            <a:off x="8549226" y="3310989"/>
             <a:ext cx="1218130" cy="889235"/>
           </a:xfrm>
           <a:prstGeom prst="rect">
             <a:avLst/>
           </a:prstGeom>
           <a:noFill/>
-          <a:extLst>
-            <a:ext uri="{909E8E84-426E-40DD-AFC4-6F175D3DCCD1}">
-              <a14:hiddenFill xmlns:a14="http://schemas.microsoft.com/office/drawing/2010/main">
-                <a:solidFill>
-                  <a:srgbClr val="FFFFFF"/>
-                </a:solidFill>
-              </a14:hiddenFill>
-            </a:ext>
-          </a:extLst>
+          <a:extLst/>
         </p:spPr>
       </p:pic>
+      <p:sp>
+        <p:nvSpPr>
+          <p:cNvPr id="17" name="TextBox 16"/>
+          <p:cNvSpPr txBox="1"/>
+          <p:nvPr/>
+        </p:nvSpPr>
+        <p:spPr>
+          <a:xfrm>
+            <a:off x="818793" y="5966916"/>
+            <a:ext cx="1742400" cy="307777"/>
+          </a:xfrm>
+          <a:prstGeom prst="rect">
+            <a:avLst/>
+          </a:prstGeom>
+          <a:noFill/>
+        </p:spPr>
+        <p:txBody>
+          <a:bodyPr wrap="none" rtlCol="0">
+            <a:spAutoFit/>
+          </a:bodyPr>
+          <a:lstStyle/>
+          <a:p>
+            <a:r>
+              <a:rPr lang="en-US" sz="1400" dirty="0" smtClean="0"/>
+              <a:t>*Subject to change</a:t>
+            </a:r>
+            <a:endParaRPr lang="en-US" sz="1400" dirty="0"/>
+          </a:p>
+        </p:txBody>
+      </p:sp>
     </p:spTree>
     <p:extLst>
       <p:ext uri="{BB962C8B-B14F-4D97-AF65-F5344CB8AC3E}">
@@ -10796,10 +11971,9 @@
           </a:lstStyle>
           <a:p>
             <a:r>
-              <a:rPr lang="en-US"/>
+              <a:rPr lang="en-US" dirty="0"/>
               <a:t>Major Components of our Project</a:t>
             </a:r>
-            <a:endParaRPr lang="en-US" dirty="0"/>
           </a:p>
         </p:txBody>
       </p:sp>
@@ -10832,7 +12006,7 @@
         </p:blipFill>
         <p:spPr bwMode="auto">
           <a:xfrm>
-            <a:off x="4258186" y="1426822"/>
+            <a:off x="1771681" y="1110680"/>
             <a:ext cx="5010021" cy="3953945"/>
           </a:xfrm>
           <a:prstGeom prst="rect">
@@ -10879,53 +12053,8 @@
         </p:blipFill>
         <p:spPr bwMode="auto">
           <a:xfrm>
-            <a:off x="9980612" y="2895600"/>
+            <a:off x="7772302" y="2741685"/>
             <a:ext cx="1675116" cy="1675116"/>
-          </a:xfrm>
-          <a:prstGeom prst="rect">
-            <a:avLst/>
-          </a:prstGeom>
-          <a:noFill/>
-          <a:extLst>
-            <a:ext uri="{909E8E84-426E-40DD-AFC4-6F175D3DCCD1}">
-              <a14:hiddenFill xmlns:a14="http://schemas.microsoft.com/office/drawing/2010/main">
-                <a:solidFill>
-                  <a:srgbClr val="FFFFFF"/>
-                </a:solidFill>
-              </a14:hiddenFill>
-            </a:ext>
-          </a:extLst>
-        </p:spPr>
-      </p:pic>
-      <p:pic>
-        <p:nvPicPr>
-          <p:cNvPr id="5" name="Picture 28" descr="Image result for machine learning clip arts">
-            <a:extLst>
-              <a:ext uri="{FF2B5EF4-FFF2-40B4-BE49-F238E27FC236}">
-                <a16:creationId xmlns:a16="http://schemas.microsoft.com/office/drawing/2014/main" id="{173BDD77-64E2-457D-8C1D-0D541D5F949F}"/>
-              </a:ext>
-            </a:extLst>
-          </p:cNvPr>
-          <p:cNvPicPr>
-            <a:picLocks noChangeAspect="1" noChangeArrowheads="1"/>
-          </p:cNvPicPr>
-          <p:nvPr/>
-        </p:nvPicPr>
-        <p:blipFill rotWithShape="1">
-          <a:blip r:embed="rId4">
-            <a:extLst>
-              <a:ext uri="{28A0092B-C50C-407E-A947-70E740481C1C}">
-                <a14:useLocalDpi xmlns:a14="http://schemas.microsoft.com/office/drawing/2010/main" val="0"/>
-              </a:ext>
-            </a:extLst>
-          </a:blip>
-          <a:srcRect l="7813" t="6728" r="5764" b="5829"/>
-          <a:stretch/>
-        </p:blipFill>
-        <p:spPr bwMode="auto">
-          <a:xfrm>
-            <a:off x="578956" y="1676400"/>
-            <a:ext cx="3711640" cy="2589516"/>
           </a:xfrm>
           <a:prstGeom prst="rect">
             <a:avLst/>
@@ -10957,9 +12086,9 @@
           <p:nvPr/>
         </p:nvPicPr>
         <p:blipFill>
-          <a:blip r:embed="rId5">
+          <a:blip r:embed="rId4">
             <a:duotone>
-              <a:schemeClr val="accent1">
+              <a:schemeClr val="accent3">
                 <a:shade val="45000"/>
                 <a:satMod val="135000"/>
               </a:schemeClr>
@@ -10977,7 +12106,7 @@
         </p:blipFill>
         <p:spPr>
           <a:xfrm>
-            <a:off x="7987640" y="4395627"/>
+            <a:off x="5730932" y="4509054"/>
             <a:ext cx="2637994" cy="2143636"/>
           </a:xfrm>
           <a:prstGeom prst="rect">
@@ -10999,7 +12128,7 @@
         </p:nvSpPr>
         <p:spPr>
           <a:xfrm>
-            <a:off x="4037011" y="5257800"/>
+            <a:off x="1543288" y="5168155"/>
             <a:ext cx="3012715" cy="1281462"/>
           </a:xfrm>
           <a:prstGeom prst="wedgeRectCallout">
@@ -11008,7 +12137,15 @@
               <a:gd name="adj2" fmla="val -113362"/>
             </a:avLst>
           </a:prstGeom>
+          <a:solidFill>
+            <a:schemeClr val="bg2">
+              <a:lumMod val="75000"/>
+            </a:schemeClr>
+          </a:solidFill>
           <a:ln>
+            <a:solidFill>
+              <a:srgbClr val="1F445F"/>
+            </a:solidFill>
             <a:miter lim="800000"/>
           </a:ln>
         </p:spPr>
@@ -11054,7 +12191,7 @@
         </p:nvSpPr>
         <p:spPr>
           <a:xfrm>
-            <a:off x="8990012" y="1790700"/>
+            <a:off x="6781702" y="1582560"/>
             <a:ext cx="1981200" cy="609600"/>
           </a:xfrm>
           <a:prstGeom prst="wedgeRectCallout">
@@ -11063,7 +12200,15 @@
               <a:gd name="adj2" fmla="val 150623"/>
             </a:avLst>
           </a:prstGeom>
+          <a:solidFill>
+            <a:schemeClr val="bg2">
+              <a:lumMod val="75000"/>
+            </a:schemeClr>
+          </a:solidFill>
           <a:ln>
+            <a:solidFill>
+              <a:srgbClr val="1F445F"/>
+            </a:solidFill>
             <a:miter lim="800000"/>
           </a:ln>
         </p:spPr>
@@ -11109,8 +12254,8 @@
         </p:nvSpPr>
         <p:spPr>
           <a:xfrm>
-            <a:off x="4037012" y="5257800"/>
-            <a:ext cx="3012715" cy="1281462"/>
+            <a:off x="1509168" y="5168155"/>
+            <a:ext cx="3046835" cy="1465023"/>
           </a:xfrm>
           <a:prstGeom prst="wedgeRectCallout">
             <a:avLst>
@@ -11118,6 +12263,11 @@
               <a:gd name="adj2" fmla="val 22157"/>
             </a:avLst>
           </a:prstGeom>
+          <a:solidFill>
+            <a:schemeClr val="bg2">
+              <a:lumMod val="75000"/>
+            </a:schemeClr>
+          </a:solidFill>
           <a:ln>
             <a:noFill/>
             <a:miter lim="800000"/>
@@ -11180,104 +12330,6 @@
             <a:r>
               <a:rPr lang="en-US" sz="1600" dirty="0"/>
               <a:t>Entrepreneurship and Management</a:t>
-            </a:r>
-          </a:p>
-        </p:txBody>
-      </p:sp>
-      <p:sp>
-        <p:nvSpPr>
-          <p:cNvPr id="6" name="Rectangular Callout 3">
-            <a:extLst>
-              <a:ext uri="{FF2B5EF4-FFF2-40B4-BE49-F238E27FC236}">
-                <a16:creationId xmlns:a16="http://schemas.microsoft.com/office/drawing/2014/main" id="{87B466A2-E8A6-4A4C-871D-976DD462088E}"/>
-              </a:ext>
-            </a:extLst>
-          </p:cNvPr>
-          <p:cNvSpPr/>
-          <p:nvPr/>
-        </p:nvSpPr>
-        <p:spPr>
-          <a:xfrm>
-            <a:off x="836946" y="4694238"/>
-            <a:ext cx="2790344" cy="1828800"/>
-          </a:xfrm>
-          <a:prstGeom prst="wedgeRectCallout">
-            <a:avLst>
-              <a:gd name="adj1" fmla="val 21199"/>
-              <a:gd name="adj2" fmla="val -64064"/>
-            </a:avLst>
-          </a:prstGeom>
-          <a:ln>
-            <a:miter lim="800000"/>
-          </a:ln>
-        </p:spPr>
-        <p:style>
-          <a:lnRef idx="2">
-            <a:schemeClr val="accent1">
-              <a:shade val="50000"/>
-            </a:schemeClr>
-          </a:lnRef>
-          <a:fillRef idx="1">
-            <a:schemeClr val="accent1"/>
-          </a:fillRef>
-          <a:effectRef idx="0">
-            <a:schemeClr val="accent1"/>
-          </a:effectRef>
-          <a:fontRef idx="minor">
-            <a:schemeClr val="lt1"/>
-          </a:fontRef>
-        </p:style>
-        <p:txBody>
-          <a:bodyPr rtlCol="0" anchor="ctr"/>
-          <a:lstStyle/>
-          <a:p>
-            <a:pPr marL="285750" indent="-285750" algn="ctr">
-              <a:buFont typeface="Arial" panose="020B0604020202020204" pitchFamily="34" charset="0"/>
-              <a:buChar char="•"/>
-            </a:pPr>
-            <a:r>
-              <a:rPr lang="en-US" sz="1600" dirty="0"/>
-              <a:t>Artificial Intelligence</a:t>
-            </a:r>
-          </a:p>
-          <a:p>
-            <a:pPr marL="285750" indent="-285750" algn="ctr">
-              <a:buFont typeface="Arial" panose="020B0604020202020204" pitchFamily="34" charset="0"/>
-              <a:buChar char="•"/>
-            </a:pPr>
-            <a:r>
-              <a:rPr lang="en-US" sz="1600" dirty="0"/>
-              <a:t>Deep Learning</a:t>
-            </a:r>
-          </a:p>
-          <a:p>
-            <a:pPr marL="285750" indent="-285750" algn="ctr">
-              <a:buFont typeface="Arial" panose="020B0604020202020204" pitchFamily="34" charset="0"/>
-              <a:buChar char="•"/>
-            </a:pPr>
-            <a:r>
-              <a:rPr lang="en-US" sz="1600" dirty="0"/>
-              <a:t>Data science</a:t>
-            </a:r>
-          </a:p>
-          <a:p>
-            <a:pPr marL="285750" indent="-285750" algn="ctr">
-              <a:buFont typeface="Arial" panose="020B0604020202020204" pitchFamily="34" charset="0"/>
-              <a:buChar char="•"/>
-            </a:pPr>
-            <a:r>
-              <a:rPr lang="en-US" sz="1600" dirty="0"/>
-              <a:t>Machine Learning</a:t>
-            </a:r>
-          </a:p>
-          <a:p>
-            <a:pPr marL="285750" indent="-285750" algn="ctr">
-              <a:buFont typeface="Arial" panose="020B0604020202020204" pitchFamily="34" charset="0"/>
-              <a:buChar char="•"/>
-            </a:pPr>
-            <a:r>
-              <a:rPr lang="en-US" sz="1600" dirty="0"/>
-              <a:t>Digital Image Processing</a:t>
             </a:r>
           </a:p>
         </p:txBody>
@@ -11326,7 +12378,7 @@
                                           </p:stCondLst>
                                         </p:cTn>
                                         <p:tgtEl>
-                                          <p:spTgt spid="5"/>
+                                          <p:spTgt spid="3"/>
                                         </p:tgtEl>
                                         <p:attrNameLst>
                                           <p:attrName>style.visibility</p:attrName>
@@ -11340,7 +12392,7 @@
                                       <p:cBhvr>
                                         <p:cTn id="7" dur="500"/>
                                         <p:tgtEl>
-                                          <p:spTgt spid="5"/>
+                                          <p:spTgt spid="3"/>
                                         </p:tgtEl>
                                       </p:cBhvr>
                                     </p:animEffect>
@@ -11361,7 +12413,7 @@
                                           </p:stCondLst>
                                         </p:cTn>
                                         <p:tgtEl>
-                                          <p:spTgt spid="6"/>
+                                          <p:spTgt spid="10"/>
                                         </p:tgtEl>
                                         <p:attrNameLst>
                                           <p:attrName>style.visibility</p:attrName>
@@ -11375,94 +12427,6 @@
                                       <p:cBhvr>
                                         <p:cTn id="10" dur="500"/>
                                         <p:tgtEl>
-                                          <p:spTgt spid="6"/>
-                                        </p:tgtEl>
-                                      </p:cBhvr>
-                                    </p:animEffect>
-                                  </p:childTnLst>
-                                </p:cTn>
-                              </p:par>
-                            </p:childTnLst>
-                          </p:cTn>
-                        </p:par>
-                      </p:childTnLst>
-                    </p:cTn>
-                  </p:par>
-                  <p:par>
-                    <p:cTn id="11" fill="hold">
-                      <p:stCondLst>
-                        <p:cond delay="indefinite"/>
-                      </p:stCondLst>
-                      <p:childTnLst>
-                        <p:par>
-                          <p:cTn id="12" fill="hold">
-                            <p:stCondLst>
-                              <p:cond delay="0"/>
-                            </p:stCondLst>
-                            <p:childTnLst>
-                              <p:par>
-                                <p:cTn id="13" presetID="10" presetClass="entr" presetSubtype="0" fill="hold" nodeType="clickEffect">
-                                  <p:stCondLst>
-                                    <p:cond delay="0"/>
-                                  </p:stCondLst>
-                                  <p:childTnLst>
-                                    <p:set>
-                                      <p:cBhvr>
-                                        <p:cTn id="14" dur="1" fill="hold">
-                                          <p:stCondLst>
-                                            <p:cond delay="0"/>
-                                          </p:stCondLst>
-                                        </p:cTn>
-                                        <p:tgtEl>
-                                          <p:spTgt spid="3"/>
-                                        </p:tgtEl>
-                                        <p:attrNameLst>
-                                          <p:attrName>style.visibility</p:attrName>
-                                        </p:attrNameLst>
-                                      </p:cBhvr>
-                                      <p:to>
-                                        <p:strVal val="visible"/>
-                                      </p:to>
-                                    </p:set>
-                                    <p:animEffect transition="in" filter="fade">
-                                      <p:cBhvr>
-                                        <p:cTn id="15" dur="500"/>
-                                        <p:tgtEl>
-                                          <p:spTgt spid="3"/>
-                                        </p:tgtEl>
-                                      </p:cBhvr>
-                                    </p:animEffect>
-                                  </p:childTnLst>
-                                </p:cTn>
-                              </p:par>
-                              <p:par>
-                                <p:cTn id="16" presetID="10" presetClass="entr" presetSubtype="0" fill="hold" grpId="0" nodeType="withEffect">
-                                  <p:stCondLst>
-                                    <p:cond delay="0"/>
-                                  </p:stCondLst>
-                                  <p:childTnLst>
-                                    <p:set>
-                                      <p:cBhvr>
-                                        <p:cTn id="17" dur="1" fill="hold">
-                                          <p:stCondLst>
-                                            <p:cond delay="0"/>
-                                          </p:stCondLst>
-                                        </p:cTn>
-                                        <p:tgtEl>
-                                          <p:spTgt spid="10"/>
-                                        </p:tgtEl>
-                                        <p:attrNameLst>
-                                          <p:attrName>style.visibility</p:attrName>
-                                        </p:attrNameLst>
-                                      </p:cBhvr>
-                                      <p:to>
-                                        <p:strVal val="visible"/>
-                                      </p:to>
-                                    </p:set>
-                                    <p:animEffect transition="in" filter="fade">
-                                      <p:cBhvr>
-                                        <p:cTn id="18" dur="500"/>
-                                        <p:tgtEl>
                                           <p:spTgt spid="10"/>
                                         </p:tgtEl>
                                       </p:cBhvr>
@@ -11471,14 +12435,14 @@
                                 </p:cTn>
                               </p:par>
                               <p:par>
-                                <p:cTn id="19" presetID="10" presetClass="entr" presetSubtype="0" fill="hold" nodeType="withEffect">
+                                <p:cTn id="11" presetID="10" presetClass="entr" presetSubtype="0" fill="hold" nodeType="withEffect">
                                   <p:stCondLst>
                                     <p:cond delay="0"/>
                                   </p:stCondLst>
                                   <p:childTnLst>
                                     <p:set>
                                       <p:cBhvr>
-                                        <p:cTn id="20" dur="1" fill="hold">
+                                        <p:cTn id="12" dur="1" fill="hold">
                                           <p:stCondLst>
                                             <p:cond delay="0"/>
                                           </p:stCondLst>
@@ -11496,7 +12460,7 @@
                                     </p:set>
                                     <p:animEffect transition="in" filter="fade">
                                       <p:cBhvr>
-                                        <p:cTn id="21" dur="500"/>
+                                        <p:cTn id="13" dur="500"/>
                                         <p:tgtEl>
                                           <p:spTgt spid="7"/>
                                         </p:tgtEl>
@@ -11506,14 +12470,14 @@
                                 </p:cTn>
                               </p:par>
                               <p:par>
-                                <p:cTn id="22" presetID="10" presetClass="entr" presetSubtype="0" fill="hold" grpId="0" nodeType="withEffect">
+                                <p:cTn id="14" presetID="10" presetClass="entr" presetSubtype="0" fill="hold" grpId="0" nodeType="withEffect">
                                   <p:stCondLst>
                                     <p:cond delay="0"/>
                                   </p:stCondLst>
                                   <p:childTnLst>
                                     <p:set>
                                       <p:cBhvr>
-                                        <p:cTn id="23" dur="1" fill="hold">
+                                        <p:cTn id="15" dur="1" fill="hold">
                                           <p:stCondLst>
                                             <p:cond delay="0"/>
                                           </p:stCondLst>
@@ -11531,7 +12495,7 @@
                                     </p:set>
                                     <p:animEffect transition="in" filter="fade">
                                       <p:cBhvr>
-                                        <p:cTn id="24" dur="500"/>
+                                        <p:cTn id="16" dur="500"/>
                                         <p:tgtEl>
                                           <p:spTgt spid="8"/>
                                         </p:tgtEl>
@@ -11547,26 +12511,26 @@
                     </p:cTn>
                   </p:par>
                   <p:par>
-                    <p:cTn id="25" fill="hold">
+                    <p:cTn id="17" fill="hold">
                       <p:stCondLst>
                         <p:cond delay="indefinite"/>
                       </p:stCondLst>
                       <p:childTnLst>
                         <p:par>
-                          <p:cTn id="26" fill="hold">
+                          <p:cTn id="18" fill="hold">
                             <p:stCondLst>
                               <p:cond delay="0"/>
                             </p:stCondLst>
                             <p:childTnLst>
                               <p:par>
-                                <p:cTn id="27" presetID="10" presetClass="entr" presetSubtype="0" fill="hold" grpId="0" nodeType="clickEffect">
+                                <p:cTn id="19" presetID="10" presetClass="entr" presetSubtype="0" fill="hold" grpId="0" nodeType="clickEffect">
                                   <p:stCondLst>
                                     <p:cond delay="0"/>
                                   </p:stCondLst>
                                   <p:childTnLst>
                                     <p:set>
                                       <p:cBhvr>
-                                        <p:cTn id="28" dur="1" fill="hold">
+                                        <p:cTn id="20" dur="1" fill="hold">
                                           <p:stCondLst>
                                             <p:cond delay="0"/>
                                           </p:stCondLst>
@@ -11584,7 +12548,7 @@
                                     </p:set>
                                     <p:animEffect transition="in" filter="fade">
                                       <p:cBhvr>
-                                        <p:cTn id="29" dur="500"/>
+                                        <p:cTn id="21" dur="500"/>
                                         <p:tgtEl>
                                           <p:spTgt spid="9"/>
                                         </p:tgtEl>
@@ -11594,14 +12558,14 @@
                                 </p:cTn>
                               </p:par>
                               <p:par>
-                                <p:cTn id="30" presetID="10" presetClass="entr" presetSubtype="0" fill="hold" nodeType="withEffect">
+                                <p:cTn id="22" presetID="10" presetClass="entr" presetSubtype="0" fill="hold" nodeType="withEffect">
                                   <p:stCondLst>
                                     <p:cond delay="0"/>
                                   </p:stCondLst>
                                   <p:childTnLst>
                                     <p:set>
                                       <p:cBhvr>
-                                        <p:cTn id="31" dur="1" fill="hold">
+                                        <p:cTn id="23" dur="1" fill="hold">
                                           <p:stCondLst>
                                             <p:cond delay="0"/>
                                           </p:stCondLst>
@@ -11619,7 +12583,7 @@
                                     </p:set>
                                     <p:animEffect transition="in" filter="fade">
                                       <p:cBhvr>
-                                        <p:cTn id="32" dur="500"/>
+                                        <p:cTn id="24" dur="500"/>
                                         <p:tgtEl>
                                           <p:spTgt spid="4"/>
                                         </p:tgtEl>
@@ -11659,7 +12623,6 @@
       <p:bldP spid="8" grpId="0" animBg="1"/>
       <p:bldP spid="9" grpId="0" animBg="1"/>
       <p:bldP spid="10" grpId="0" animBg="1"/>
-      <p:bldP spid="6" grpId="0" animBg="1"/>
     </p:bldLst>
   </p:timing>
 </p:sld>
@@ -11794,7 +12757,7 @@
           <p:cNvPr id="2" name="Title 1">
             <a:extLst>
               <a:ext uri="{FF2B5EF4-FFF2-40B4-BE49-F238E27FC236}">
-                <a16:creationId xmlns:a16="http://schemas.microsoft.com/office/drawing/2014/main" id="{14703E39-E430-4B50-A2DB-D169662EB9EC}"/>
+                <a16:creationId xmlns:a16="http://schemas.microsoft.com/office/drawing/2014/main" id="{EE154EAA-EDB8-4C95-B696-92D63E36F1AE}"/>
               </a:ext>
             </a:extLst>
           </p:cNvPr>
@@ -11812,8 +12775,13 @@
           <a:p>
             <a:r>
               <a:rPr lang="en-US" dirty="0"/>
-              <a:t>Project Backlog</a:t>
-            </a:r>
+              <a:t>GUI </a:t>
+            </a:r>
+            <a:r>
+              <a:rPr lang="en-US" dirty="0" smtClean="0"/>
+              <a:t>mockups*</a:t>
+            </a:r>
+            <a:endParaRPr lang="en-US" dirty="0"/>
           </a:p>
         </p:txBody>
       </p:sp>
@@ -11822,7 +12790,7 @@
           <p:cNvPr id="3" name="Content Placeholder 2">
             <a:extLst>
               <a:ext uri="{FF2B5EF4-FFF2-40B4-BE49-F238E27FC236}">
-                <a16:creationId xmlns:a16="http://schemas.microsoft.com/office/drawing/2014/main" id="{3CE9087A-016F-42D0-BAF3-8C3AEB5B9E01}"/>
+                <a16:creationId xmlns:a16="http://schemas.microsoft.com/office/drawing/2014/main" id="{F33A8E25-98D3-4658-93DF-BBA19F792977}"/>
               </a:ext>
             </a:extLst>
           </p:cNvPr>
@@ -11833,1028 +12801,65 @@
             <p:ph idx="1"/>
           </p:nvPr>
         </p:nvSpPr>
+        <p:spPr/>
+        <p:txBody>
+          <a:bodyPr/>
+          <a:lstStyle/>
+          <a:p>
+            <a:r>
+              <a:rPr lang="en-US" dirty="0" smtClean="0"/>
+              <a:t>For Web Application GUI Mockups: </a:t>
+            </a:r>
+            <a:r>
+              <a:rPr lang="en-US" dirty="0">
+                <a:hlinkClick r:id="rId2"/>
+              </a:rPr>
+              <a:t>https://app.moqups.com/crvs7Jw1Tr/view/page/a2a00afc0</a:t>
+            </a:r>
+            <a:endParaRPr lang="en-US" dirty="0" smtClean="0"/>
+          </a:p>
+          <a:p>
+            <a:r>
+              <a:rPr lang="en-US" dirty="0" smtClean="0"/>
+              <a:t>For Mobile Application GUI Mockups: </a:t>
+            </a:r>
+          </a:p>
+        </p:txBody>
+      </p:sp>
+      <p:sp>
+        <p:nvSpPr>
+          <p:cNvPr id="4" name="TextBox 3"/>
+          <p:cNvSpPr txBox="1"/>
+          <p:nvPr/>
+        </p:nvSpPr>
         <p:spPr>
           <a:xfrm>
-            <a:off x="3133543" y="2246130"/>
-            <a:ext cx="3306511" cy="2365739"/>
-          </a:xfrm>
-        </p:spPr>
-        <p:txBody>
-          <a:bodyPr>
-            <a:normAutofit/>
-          </a:bodyPr>
-          <a:lstStyle/>
-          <a:p>
-            <a:r>
-              <a:rPr lang="en-US" sz="1600" dirty="0"/>
-              <a:t>Screens for Mobile App:</a:t>
-            </a:r>
-            <a:endParaRPr lang="en-US" sz="1600" dirty="0">
-              <a:effectLst/>
-            </a:endParaRPr>
-          </a:p>
-          <a:p>
-            <a:r>
-              <a:rPr lang="en-US" sz="1600" dirty="0">
-                <a:effectLst/>
-              </a:rPr>
-              <a:t>Login Page</a:t>
-            </a:r>
-          </a:p>
-          <a:p>
-            <a:r>
-              <a:rPr lang="en-US" sz="1600" dirty="0">
-                <a:effectLst/>
-              </a:rPr>
-              <a:t>Home Screen</a:t>
-            </a:r>
-          </a:p>
-          <a:p>
-            <a:r>
-              <a:rPr lang="en-US" sz="1600" dirty="0">
-                <a:effectLst/>
-              </a:rPr>
-              <a:t>Shop Page</a:t>
-            </a:r>
-          </a:p>
-          <a:p>
-            <a:r>
-              <a:rPr lang="en-US" sz="1600" dirty="0">
-                <a:effectLst/>
-              </a:rPr>
-              <a:t>Upload Items Page</a:t>
-            </a:r>
-          </a:p>
-          <a:p>
-            <a:pPr marL="0" indent="0">
-              <a:buNone/>
-            </a:pPr>
-            <a:endParaRPr lang="en-US" sz="1600" dirty="0">
-              <a:effectLst/>
-            </a:endParaRPr>
-          </a:p>
-          <a:p>
-            <a:endParaRPr lang="en-US" sz="1600" dirty="0"/>
-          </a:p>
-          <a:p>
-            <a:endParaRPr lang="en-US" sz="1600" dirty="0"/>
-          </a:p>
-        </p:txBody>
-      </p:sp>
-      <p:sp>
-        <p:nvSpPr>
-          <p:cNvPr id="5" name="Content Placeholder 2">
-            <a:extLst>
-              <a:ext uri="{FF2B5EF4-FFF2-40B4-BE49-F238E27FC236}">
-                <a16:creationId xmlns:a16="http://schemas.microsoft.com/office/drawing/2014/main" id="{05DAFD06-8B9C-4ADE-8FB7-2C564401EE39}"/>
-              </a:ext>
-            </a:extLst>
-          </p:cNvPr>
-          <p:cNvSpPr txBox="1">
-            <a:spLocks/>
-          </p:cNvSpPr>
-          <p:nvPr/>
-        </p:nvSpPr>
-        <p:spPr>
-          <a:xfrm>
-            <a:off x="562973" y="2246130"/>
-            <a:ext cx="3475325" cy="3695136"/>
+            <a:off x="913795" y="5951343"/>
+            <a:ext cx="1742400" cy="307777"/>
           </a:xfrm>
           <a:prstGeom prst="rect">
             <a:avLst/>
           </a:prstGeom>
+          <a:noFill/>
         </p:spPr>
         <p:txBody>
-          <a:bodyPr vert="horz" lIns="91440" tIns="45720" rIns="91440" bIns="45720" rtlCol="0">
-            <a:normAutofit fontScale="77500" lnSpcReduction="20000"/>
+          <a:bodyPr wrap="none" rtlCol="0">
+            <a:spAutoFit/>
           </a:bodyPr>
-          <a:lstStyle>
-            <a:lvl1pPr marL="228600" indent="-228600" algn="l" defTabSz="914400" rtl="0" eaLnBrk="1" latinLnBrk="0" hangingPunct="1">
-              <a:lnSpc>
-                <a:spcPct val="120000"/>
-              </a:lnSpc>
-              <a:spcBef>
-                <a:spcPts val="1000"/>
-              </a:spcBef>
-              <a:buFont typeface="Arial" panose="020B0604020202020204" pitchFamily="34" charset="0"/>
-              <a:buChar char="•"/>
-              <a:defRPr sz="2000" kern="1200">
-                <a:solidFill>
-                  <a:schemeClr val="tx1"/>
-                </a:solidFill>
-                <a:effectLst>
-                  <a:outerShdw blurRad="50800" dist="38100" dir="2700000" algn="tl" rotWithShape="0">
-                    <a:srgbClr val="000000">
-                      <a:alpha val="48000"/>
-                    </a:srgbClr>
-                  </a:outerShdw>
-                </a:effectLst>
-                <a:latin typeface="+mn-lt"/>
-                <a:ea typeface="+mn-ea"/>
-                <a:cs typeface="+mn-cs"/>
-              </a:defRPr>
-            </a:lvl1pPr>
-            <a:lvl2pPr marL="685800" indent="-228600" algn="l" defTabSz="914400" rtl="0" eaLnBrk="1" latinLnBrk="0" hangingPunct="1">
-              <a:lnSpc>
-                <a:spcPct val="120000"/>
-              </a:lnSpc>
-              <a:spcBef>
-                <a:spcPts val="500"/>
-              </a:spcBef>
-              <a:buFont typeface="Arial" panose="020B0604020202020204" pitchFamily="34" charset="0"/>
-              <a:buChar char="•"/>
-              <a:defRPr sz="1800" kern="1200">
-                <a:solidFill>
-                  <a:schemeClr val="tx1"/>
-                </a:solidFill>
-                <a:effectLst>
-                  <a:outerShdw blurRad="50800" dist="38100" dir="2700000" algn="tl" rotWithShape="0">
-                    <a:srgbClr val="000000">
-                      <a:alpha val="48000"/>
-                    </a:srgbClr>
-                  </a:outerShdw>
-                </a:effectLst>
-                <a:latin typeface="+mn-lt"/>
-                <a:ea typeface="+mn-ea"/>
-                <a:cs typeface="+mn-cs"/>
-              </a:defRPr>
-            </a:lvl2pPr>
-            <a:lvl3pPr marL="1143000" indent="-228600" algn="l" defTabSz="914400" rtl="0" eaLnBrk="1" latinLnBrk="0" hangingPunct="1">
-              <a:lnSpc>
-                <a:spcPct val="120000"/>
-              </a:lnSpc>
-              <a:spcBef>
-                <a:spcPts val="500"/>
-              </a:spcBef>
-              <a:buFont typeface="Arial" panose="020B0604020202020204" pitchFamily="34" charset="0"/>
-              <a:buChar char="•"/>
-              <a:defRPr sz="1600" kern="1200">
-                <a:solidFill>
-                  <a:schemeClr val="tx1"/>
-                </a:solidFill>
-                <a:effectLst>
-                  <a:outerShdw blurRad="50800" dist="38100" dir="2700000" algn="tl" rotWithShape="0">
-                    <a:srgbClr val="000000">
-                      <a:alpha val="48000"/>
-                    </a:srgbClr>
-                  </a:outerShdw>
-                </a:effectLst>
-                <a:latin typeface="+mn-lt"/>
-                <a:ea typeface="+mn-ea"/>
-                <a:cs typeface="+mn-cs"/>
-              </a:defRPr>
-            </a:lvl3pPr>
-            <a:lvl4pPr marL="1600200" indent="-228600" algn="l" defTabSz="914400" rtl="0" eaLnBrk="1" latinLnBrk="0" hangingPunct="1">
-              <a:lnSpc>
-                <a:spcPct val="120000"/>
-              </a:lnSpc>
-              <a:spcBef>
-                <a:spcPts val="500"/>
-              </a:spcBef>
-              <a:buFont typeface="Arial" panose="020B0604020202020204" pitchFamily="34" charset="0"/>
-              <a:buChar char="•"/>
-              <a:defRPr sz="1400" kern="1200">
-                <a:solidFill>
-                  <a:schemeClr val="tx1"/>
-                </a:solidFill>
-                <a:effectLst>
-                  <a:outerShdw blurRad="50800" dist="38100" dir="2700000" algn="tl" rotWithShape="0">
-                    <a:srgbClr val="000000">
-                      <a:alpha val="48000"/>
-                    </a:srgbClr>
-                  </a:outerShdw>
-                </a:effectLst>
-                <a:latin typeface="+mn-lt"/>
-                <a:ea typeface="+mn-ea"/>
-                <a:cs typeface="+mn-cs"/>
-              </a:defRPr>
-            </a:lvl4pPr>
-            <a:lvl5pPr marL="2057400" indent="-228600" algn="l" defTabSz="914400" rtl="0" eaLnBrk="1" latinLnBrk="0" hangingPunct="1">
-              <a:lnSpc>
-                <a:spcPct val="120000"/>
-              </a:lnSpc>
-              <a:spcBef>
-                <a:spcPts val="500"/>
-              </a:spcBef>
-              <a:buFont typeface="Arial" panose="020B0604020202020204" pitchFamily="34" charset="0"/>
-              <a:buChar char="•"/>
-              <a:defRPr sz="1200" kern="1200">
-                <a:solidFill>
-                  <a:schemeClr val="tx1"/>
-                </a:solidFill>
-                <a:effectLst>
-                  <a:outerShdw blurRad="50800" dist="38100" dir="2700000" algn="tl" rotWithShape="0">
-                    <a:srgbClr val="000000">
-                      <a:alpha val="48000"/>
-                    </a:srgbClr>
-                  </a:outerShdw>
-                </a:effectLst>
-                <a:latin typeface="+mn-lt"/>
-                <a:ea typeface="+mn-ea"/>
-                <a:cs typeface="+mn-cs"/>
-              </a:defRPr>
-            </a:lvl5pPr>
-            <a:lvl6pPr marL="2514600" indent="-228600" algn="l" defTabSz="914400" rtl="0" eaLnBrk="1" latinLnBrk="0" hangingPunct="1">
-              <a:lnSpc>
-                <a:spcPct val="120000"/>
-              </a:lnSpc>
-              <a:spcBef>
-                <a:spcPts val="500"/>
-              </a:spcBef>
-              <a:buFont typeface="Arial" panose="020B0604020202020204" pitchFamily="34" charset="0"/>
-              <a:buChar char="•"/>
-              <a:defRPr sz="1200" kern="1200">
-                <a:solidFill>
-                  <a:schemeClr val="tx1"/>
-                </a:solidFill>
-                <a:effectLst>
-                  <a:outerShdw blurRad="50800" dist="38100" dir="2700000" algn="tl" rotWithShape="0">
-                    <a:srgbClr val="000000">
-                      <a:alpha val="48000"/>
-                    </a:srgbClr>
-                  </a:outerShdw>
-                </a:effectLst>
-                <a:latin typeface="+mn-lt"/>
-                <a:ea typeface="+mn-ea"/>
-                <a:cs typeface="+mn-cs"/>
-              </a:defRPr>
-            </a:lvl6pPr>
-            <a:lvl7pPr marL="2971800" indent="-228600" algn="l" defTabSz="914400" rtl="0" eaLnBrk="1" latinLnBrk="0" hangingPunct="1">
-              <a:lnSpc>
-                <a:spcPct val="120000"/>
-              </a:lnSpc>
-              <a:spcBef>
-                <a:spcPts val="500"/>
-              </a:spcBef>
-              <a:buFont typeface="Arial" panose="020B0604020202020204" pitchFamily="34" charset="0"/>
-              <a:buChar char="•"/>
-              <a:defRPr sz="1200" kern="1200">
-                <a:solidFill>
-                  <a:schemeClr val="tx1"/>
-                </a:solidFill>
-                <a:effectLst>
-                  <a:outerShdw blurRad="50800" dist="38100" dir="2700000" algn="tl" rotWithShape="0">
-                    <a:srgbClr val="000000">
-                      <a:alpha val="48000"/>
-                    </a:srgbClr>
-                  </a:outerShdw>
-                </a:effectLst>
-                <a:latin typeface="+mn-lt"/>
-                <a:ea typeface="+mn-ea"/>
-                <a:cs typeface="+mn-cs"/>
-              </a:defRPr>
-            </a:lvl7pPr>
-            <a:lvl8pPr marL="3429000" indent="-228600" algn="l" defTabSz="914400" rtl="0" eaLnBrk="1" latinLnBrk="0" hangingPunct="1">
-              <a:lnSpc>
-                <a:spcPct val="120000"/>
-              </a:lnSpc>
-              <a:spcBef>
-                <a:spcPts val="500"/>
-              </a:spcBef>
-              <a:buFont typeface="Arial" panose="020B0604020202020204" pitchFamily="34" charset="0"/>
-              <a:buChar char="•"/>
-              <a:defRPr sz="1200" kern="1200">
-                <a:solidFill>
-                  <a:schemeClr val="tx1"/>
-                </a:solidFill>
-                <a:effectLst>
-                  <a:outerShdw blurRad="50800" dist="38100" dir="2700000" algn="tl" rotWithShape="0">
-                    <a:srgbClr val="000000">
-                      <a:alpha val="48000"/>
-                    </a:srgbClr>
-                  </a:outerShdw>
-                </a:effectLst>
-                <a:latin typeface="+mn-lt"/>
-                <a:ea typeface="+mn-ea"/>
-                <a:cs typeface="+mn-cs"/>
-              </a:defRPr>
-            </a:lvl8pPr>
-            <a:lvl9pPr marL="3886200" indent="-228600" algn="l" defTabSz="914400" rtl="0" eaLnBrk="1" latinLnBrk="0" hangingPunct="1">
-              <a:lnSpc>
-                <a:spcPct val="120000"/>
-              </a:lnSpc>
-              <a:spcBef>
-                <a:spcPts val="500"/>
-              </a:spcBef>
-              <a:buFont typeface="Arial" panose="020B0604020202020204" pitchFamily="34" charset="0"/>
-              <a:buChar char="•"/>
-              <a:defRPr sz="1200" kern="1200">
-                <a:solidFill>
-                  <a:schemeClr val="tx1"/>
-                </a:solidFill>
-                <a:effectLst>
-                  <a:outerShdw blurRad="50800" dist="38100" dir="2700000" algn="tl" rotWithShape="0">
-                    <a:srgbClr val="000000">
-                      <a:alpha val="48000"/>
-                    </a:srgbClr>
-                  </a:outerShdw>
-                </a:effectLst>
-                <a:latin typeface="+mn-lt"/>
-                <a:ea typeface="+mn-ea"/>
-                <a:cs typeface="+mn-cs"/>
-              </a:defRPr>
-            </a:lvl9pPr>
-          </a:lstStyle>
-          <a:p>
-            <a:r>
-              <a:rPr lang="en-US" dirty="0"/>
-              <a:t>Screens for Website:</a:t>
-            </a:r>
-            <a:endParaRPr lang="en-US" dirty="0">
-              <a:effectLst/>
-            </a:endParaRPr>
-          </a:p>
-          <a:p>
-            <a:r>
-              <a:rPr lang="en-US" dirty="0">
-                <a:effectLst/>
-              </a:rPr>
-              <a:t>Login Page/ Sign Up</a:t>
-            </a:r>
-          </a:p>
-          <a:p>
-            <a:r>
-              <a:rPr lang="en-US" dirty="0">
-                <a:effectLst/>
-              </a:rPr>
-              <a:t>Home Screen</a:t>
-            </a:r>
-          </a:p>
-          <a:p>
-            <a:r>
-              <a:rPr lang="en-US" dirty="0">
-                <a:effectLst/>
-              </a:rPr>
-              <a:t>User Profile</a:t>
-            </a:r>
-          </a:p>
-          <a:p>
-            <a:r>
-              <a:rPr lang="en-US" dirty="0">
-                <a:effectLst/>
-              </a:rPr>
-              <a:t>Shop Page</a:t>
-            </a:r>
-          </a:p>
-          <a:p>
-            <a:r>
-              <a:rPr lang="en-US" dirty="0">
-                <a:effectLst/>
-              </a:rPr>
-              <a:t>Items Page</a:t>
-            </a:r>
-          </a:p>
-          <a:p>
-            <a:r>
-              <a:rPr lang="en-US" dirty="0">
-                <a:effectLst/>
-              </a:rPr>
-              <a:t>Blog Page</a:t>
-            </a:r>
-          </a:p>
-          <a:p>
-            <a:r>
-              <a:rPr lang="en-US" dirty="0">
-                <a:effectLst/>
-              </a:rPr>
-              <a:t>About Page</a:t>
-            </a:r>
-          </a:p>
-          <a:p>
-            <a:r>
-              <a:rPr lang="en-US" dirty="0">
-                <a:effectLst/>
-              </a:rPr>
-              <a:t>Shopping Cart</a:t>
-            </a:r>
-          </a:p>
-          <a:p>
-            <a:r>
-              <a:rPr lang="en-US" dirty="0">
-                <a:effectLst/>
-              </a:rPr>
-              <a:t>User Guide</a:t>
-            </a:r>
-          </a:p>
-          <a:p>
-            <a:endParaRPr lang="en-US" dirty="0"/>
-          </a:p>
-          <a:p>
-            <a:endParaRPr lang="en-US" dirty="0"/>
-          </a:p>
-        </p:txBody>
-      </p:sp>
-      <p:sp>
-        <p:nvSpPr>
-          <p:cNvPr id="6" name="Content Placeholder 2">
-            <a:extLst>
-              <a:ext uri="{FF2B5EF4-FFF2-40B4-BE49-F238E27FC236}">
-                <a16:creationId xmlns:a16="http://schemas.microsoft.com/office/drawing/2014/main" id="{7903F2BE-7579-4945-83AA-38EEC0E21785}"/>
-              </a:ext>
-            </a:extLst>
-          </p:cNvPr>
-          <p:cNvSpPr txBox="1">
-            <a:spLocks/>
-          </p:cNvSpPr>
-          <p:nvPr/>
-        </p:nvSpPr>
-        <p:spPr>
-          <a:xfrm>
-            <a:off x="5975597" y="2246129"/>
-            <a:ext cx="3306511" cy="2365739"/>
-          </a:xfrm>
-          <a:prstGeom prst="rect">
-            <a:avLst/>
-          </a:prstGeom>
-        </p:spPr>
-        <p:txBody>
-          <a:bodyPr vert="horz" lIns="91440" tIns="45720" rIns="91440" bIns="45720" rtlCol="0">
-            <a:normAutofit/>
-          </a:bodyPr>
-          <a:lstStyle>
-            <a:lvl1pPr marL="228600" indent="-228600" algn="l" defTabSz="914400" rtl="0" eaLnBrk="1" latinLnBrk="0" hangingPunct="1">
-              <a:lnSpc>
-                <a:spcPct val="120000"/>
-              </a:lnSpc>
-              <a:spcBef>
-                <a:spcPts val="1000"/>
-              </a:spcBef>
-              <a:buFont typeface="Arial" panose="020B0604020202020204" pitchFamily="34" charset="0"/>
-              <a:buChar char="•"/>
-              <a:defRPr sz="2000" kern="1200">
-                <a:solidFill>
-                  <a:schemeClr val="tx1"/>
-                </a:solidFill>
-                <a:effectLst>
-                  <a:outerShdw blurRad="50800" dist="38100" dir="2700000" algn="tl" rotWithShape="0">
-                    <a:srgbClr val="000000">
-                      <a:alpha val="48000"/>
-                    </a:srgbClr>
-                  </a:outerShdw>
-                </a:effectLst>
-                <a:latin typeface="+mn-lt"/>
-                <a:ea typeface="+mn-ea"/>
-                <a:cs typeface="+mn-cs"/>
-              </a:defRPr>
-            </a:lvl1pPr>
-            <a:lvl2pPr marL="685800" indent="-228600" algn="l" defTabSz="914400" rtl="0" eaLnBrk="1" latinLnBrk="0" hangingPunct="1">
-              <a:lnSpc>
-                <a:spcPct val="120000"/>
-              </a:lnSpc>
-              <a:spcBef>
-                <a:spcPts val="500"/>
-              </a:spcBef>
-              <a:buFont typeface="Arial" panose="020B0604020202020204" pitchFamily="34" charset="0"/>
-              <a:buChar char="•"/>
-              <a:defRPr sz="1800" kern="1200">
-                <a:solidFill>
-                  <a:schemeClr val="tx1"/>
-                </a:solidFill>
-                <a:effectLst>
-                  <a:outerShdw blurRad="50800" dist="38100" dir="2700000" algn="tl" rotWithShape="0">
-                    <a:srgbClr val="000000">
-                      <a:alpha val="48000"/>
-                    </a:srgbClr>
-                  </a:outerShdw>
-                </a:effectLst>
-                <a:latin typeface="+mn-lt"/>
-                <a:ea typeface="+mn-ea"/>
-                <a:cs typeface="+mn-cs"/>
-              </a:defRPr>
-            </a:lvl2pPr>
-            <a:lvl3pPr marL="1143000" indent="-228600" algn="l" defTabSz="914400" rtl="0" eaLnBrk="1" latinLnBrk="0" hangingPunct="1">
-              <a:lnSpc>
-                <a:spcPct val="120000"/>
-              </a:lnSpc>
-              <a:spcBef>
-                <a:spcPts val="500"/>
-              </a:spcBef>
-              <a:buFont typeface="Arial" panose="020B0604020202020204" pitchFamily="34" charset="0"/>
-              <a:buChar char="•"/>
-              <a:defRPr sz="1600" kern="1200">
-                <a:solidFill>
-                  <a:schemeClr val="tx1"/>
-                </a:solidFill>
-                <a:effectLst>
-                  <a:outerShdw blurRad="50800" dist="38100" dir="2700000" algn="tl" rotWithShape="0">
-                    <a:srgbClr val="000000">
-                      <a:alpha val="48000"/>
-                    </a:srgbClr>
-                  </a:outerShdw>
-                </a:effectLst>
-                <a:latin typeface="+mn-lt"/>
-                <a:ea typeface="+mn-ea"/>
-                <a:cs typeface="+mn-cs"/>
-              </a:defRPr>
-            </a:lvl3pPr>
-            <a:lvl4pPr marL="1600200" indent="-228600" algn="l" defTabSz="914400" rtl="0" eaLnBrk="1" latinLnBrk="0" hangingPunct="1">
-              <a:lnSpc>
-                <a:spcPct val="120000"/>
-              </a:lnSpc>
-              <a:spcBef>
-                <a:spcPts val="500"/>
-              </a:spcBef>
-              <a:buFont typeface="Arial" panose="020B0604020202020204" pitchFamily="34" charset="0"/>
-              <a:buChar char="•"/>
-              <a:defRPr sz="1400" kern="1200">
-                <a:solidFill>
-                  <a:schemeClr val="tx1"/>
-                </a:solidFill>
-                <a:effectLst>
-                  <a:outerShdw blurRad="50800" dist="38100" dir="2700000" algn="tl" rotWithShape="0">
-                    <a:srgbClr val="000000">
-                      <a:alpha val="48000"/>
-                    </a:srgbClr>
-                  </a:outerShdw>
-                </a:effectLst>
-                <a:latin typeface="+mn-lt"/>
-                <a:ea typeface="+mn-ea"/>
-                <a:cs typeface="+mn-cs"/>
-              </a:defRPr>
-            </a:lvl4pPr>
-            <a:lvl5pPr marL="2057400" indent="-228600" algn="l" defTabSz="914400" rtl="0" eaLnBrk="1" latinLnBrk="0" hangingPunct="1">
-              <a:lnSpc>
-                <a:spcPct val="120000"/>
-              </a:lnSpc>
-              <a:spcBef>
-                <a:spcPts val="500"/>
-              </a:spcBef>
-              <a:buFont typeface="Arial" panose="020B0604020202020204" pitchFamily="34" charset="0"/>
-              <a:buChar char="•"/>
-              <a:defRPr sz="1200" kern="1200">
-                <a:solidFill>
-                  <a:schemeClr val="tx1"/>
-                </a:solidFill>
-                <a:effectLst>
-                  <a:outerShdw blurRad="50800" dist="38100" dir="2700000" algn="tl" rotWithShape="0">
-                    <a:srgbClr val="000000">
-                      <a:alpha val="48000"/>
-                    </a:srgbClr>
-                  </a:outerShdw>
-                </a:effectLst>
-                <a:latin typeface="+mn-lt"/>
-                <a:ea typeface="+mn-ea"/>
-                <a:cs typeface="+mn-cs"/>
-              </a:defRPr>
-            </a:lvl5pPr>
-            <a:lvl6pPr marL="2514600" indent="-228600" algn="l" defTabSz="914400" rtl="0" eaLnBrk="1" latinLnBrk="0" hangingPunct="1">
-              <a:lnSpc>
-                <a:spcPct val="120000"/>
-              </a:lnSpc>
-              <a:spcBef>
-                <a:spcPts val="500"/>
-              </a:spcBef>
-              <a:buFont typeface="Arial" panose="020B0604020202020204" pitchFamily="34" charset="0"/>
-              <a:buChar char="•"/>
-              <a:defRPr sz="1200" kern="1200">
-                <a:solidFill>
-                  <a:schemeClr val="tx1"/>
-                </a:solidFill>
-                <a:effectLst>
-                  <a:outerShdw blurRad="50800" dist="38100" dir="2700000" algn="tl" rotWithShape="0">
-                    <a:srgbClr val="000000">
-                      <a:alpha val="48000"/>
-                    </a:srgbClr>
-                  </a:outerShdw>
-                </a:effectLst>
-                <a:latin typeface="+mn-lt"/>
-                <a:ea typeface="+mn-ea"/>
-                <a:cs typeface="+mn-cs"/>
-              </a:defRPr>
-            </a:lvl6pPr>
-            <a:lvl7pPr marL="2971800" indent="-228600" algn="l" defTabSz="914400" rtl="0" eaLnBrk="1" latinLnBrk="0" hangingPunct="1">
-              <a:lnSpc>
-                <a:spcPct val="120000"/>
-              </a:lnSpc>
-              <a:spcBef>
-                <a:spcPts val="500"/>
-              </a:spcBef>
-              <a:buFont typeface="Arial" panose="020B0604020202020204" pitchFamily="34" charset="0"/>
-              <a:buChar char="•"/>
-              <a:defRPr sz="1200" kern="1200">
-                <a:solidFill>
-                  <a:schemeClr val="tx1"/>
-                </a:solidFill>
-                <a:effectLst>
-                  <a:outerShdw blurRad="50800" dist="38100" dir="2700000" algn="tl" rotWithShape="0">
-                    <a:srgbClr val="000000">
-                      <a:alpha val="48000"/>
-                    </a:srgbClr>
-                  </a:outerShdw>
-                </a:effectLst>
-                <a:latin typeface="+mn-lt"/>
-                <a:ea typeface="+mn-ea"/>
-                <a:cs typeface="+mn-cs"/>
-              </a:defRPr>
-            </a:lvl7pPr>
-            <a:lvl8pPr marL="3429000" indent="-228600" algn="l" defTabSz="914400" rtl="0" eaLnBrk="1" latinLnBrk="0" hangingPunct="1">
-              <a:lnSpc>
-                <a:spcPct val="120000"/>
-              </a:lnSpc>
-              <a:spcBef>
-                <a:spcPts val="500"/>
-              </a:spcBef>
-              <a:buFont typeface="Arial" panose="020B0604020202020204" pitchFamily="34" charset="0"/>
-              <a:buChar char="•"/>
-              <a:defRPr sz="1200" kern="1200">
-                <a:solidFill>
-                  <a:schemeClr val="tx1"/>
-                </a:solidFill>
-                <a:effectLst>
-                  <a:outerShdw blurRad="50800" dist="38100" dir="2700000" algn="tl" rotWithShape="0">
-                    <a:srgbClr val="000000">
-                      <a:alpha val="48000"/>
-                    </a:srgbClr>
-                  </a:outerShdw>
-                </a:effectLst>
-                <a:latin typeface="+mn-lt"/>
-                <a:ea typeface="+mn-ea"/>
-                <a:cs typeface="+mn-cs"/>
-              </a:defRPr>
-            </a:lvl8pPr>
-            <a:lvl9pPr marL="3886200" indent="-228600" algn="l" defTabSz="914400" rtl="0" eaLnBrk="1" latinLnBrk="0" hangingPunct="1">
-              <a:lnSpc>
-                <a:spcPct val="120000"/>
-              </a:lnSpc>
-              <a:spcBef>
-                <a:spcPts val="500"/>
-              </a:spcBef>
-              <a:buFont typeface="Arial" panose="020B0604020202020204" pitchFamily="34" charset="0"/>
-              <a:buChar char="•"/>
-              <a:defRPr sz="1200" kern="1200">
-                <a:solidFill>
-                  <a:schemeClr val="tx1"/>
-                </a:solidFill>
-                <a:effectLst>
-                  <a:outerShdw blurRad="50800" dist="38100" dir="2700000" algn="tl" rotWithShape="0">
-                    <a:srgbClr val="000000">
-                      <a:alpha val="48000"/>
-                    </a:srgbClr>
-                  </a:outerShdw>
-                </a:effectLst>
-                <a:latin typeface="+mn-lt"/>
-                <a:ea typeface="+mn-ea"/>
-                <a:cs typeface="+mn-cs"/>
-              </a:defRPr>
-            </a:lvl9pPr>
-          </a:lstStyle>
-          <a:p>
-            <a:r>
-              <a:rPr lang="en-US" sz="1600" dirty="0"/>
-              <a:t>Databases:</a:t>
-            </a:r>
-            <a:endParaRPr lang="en-US" sz="1600" dirty="0">
-              <a:effectLst/>
-            </a:endParaRPr>
-          </a:p>
-          <a:p>
-            <a:r>
-              <a:rPr lang="en-US" sz="1600" dirty="0">
-                <a:effectLst/>
-              </a:rPr>
-              <a:t>ERDs</a:t>
-            </a:r>
-          </a:p>
-          <a:p>
-            <a:r>
-              <a:rPr lang="en-US" sz="1600" dirty="0">
-                <a:effectLst/>
-              </a:rPr>
-              <a:t>Normalization of tables</a:t>
-            </a:r>
-          </a:p>
-          <a:p>
-            <a:r>
-              <a:rPr lang="en-US" sz="1600" dirty="0">
-                <a:effectLst/>
-              </a:rPr>
-              <a:t>Dummy data</a:t>
-            </a:r>
-          </a:p>
-          <a:p>
-            <a:pPr marL="0" indent="0">
-              <a:buFont typeface="Arial" panose="020B0604020202020204" pitchFamily="34" charset="0"/>
-              <a:buNone/>
-            </a:pPr>
-            <a:endParaRPr lang="en-US" sz="1600" dirty="0">
-              <a:effectLst/>
-            </a:endParaRPr>
-          </a:p>
-          <a:p>
-            <a:endParaRPr lang="en-US" sz="1600" dirty="0"/>
-          </a:p>
-          <a:p>
-            <a:endParaRPr lang="en-US" sz="1600" dirty="0"/>
-          </a:p>
-        </p:txBody>
-      </p:sp>
-      <p:sp>
-        <p:nvSpPr>
-          <p:cNvPr id="8" name="Content Placeholder 2">
-            <a:extLst>
-              <a:ext uri="{FF2B5EF4-FFF2-40B4-BE49-F238E27FC236}">
-                <a16:creationId xmlns:a16="http://schemas.microsoft.com/office/drawing/2014/main" id="{989DB679-570B-4339-932E-3FAF74A1C94F}"/>
-              </a:ext>
-            </a:extLst>
-          </p:cNvPr>
-          <p:cNvSpPr txBox="1">
-            <a:spLocks/>
-          </p:cNvSpPr>
-          <p:nvPr/>
-        </p:nvSpPr>
-        <p:spPr>
-          <a:xfrm>
-            <a:off x="8885489" y="2246129"/>
-            <a:ext cx="3306511" cy="2365739"/>
-          </a:xfrm>
-          <a:prstGeom prst="rect">
-            <a:avLst/>
-          </a:prstGeom>
-        </p:spPr>
-        <p:txBody>
-          <a:bodyPr vert="horz" lIns="91440" tIns="45720" rIns="91440" bIns="45720" rtlCol="0">
-            <a:normAutofit/>
-          </a:bodyPr>
-          <a:lstStyle>
-            <a:lvl1pPr marL="228600" indent="-228600" algn="l" defTabSz="914400" rtl="0" eaLnBrk="1" latinLnBrk="0" hangingPunct="1">
-              <a:lnSpc>
-                <a:spcPct val="120000"/>
-              </a:lnSpc>
-              <a:spcBef>
-                <a:spcPts val="1000"/>
-              </a:spcBef>
-              <a:buFont typeface="Arial" panose="020B0604020202020204" pitchFamily="34" charset="0"/>
-              <a:buChar char="•"/>
-              <a:defRPr sz="2000" kern="1200">
-                <a:solidFill>
-                  <a:schemeClr val="tx1"/>
-                </a:solidFill>
-                <a:effectLst>
-                  <a:outerShdw blurRad="50800" dist="38100" dir="2700000" algn="tl" rotWithShape="0">
-                    <a:srgbClr val="000000">
-                      <a:alpha val="48000"/>
-                    </a:srgbClr>
-                  </a:outerShdw>
-                </a:effectLst>
-                <a:latin typeface="+mn-lt"/>
-                <a:ea typeface="+mn-ea"/>
-                <a:cs typeface="+mn-cs"/>
-              </a:defRPr>
-            </a:lvl1pPr>
-            <a:lvl2pPr marL="685800" indent="-228600" algn="l" defTabSz="914400" rtl="0" eaLnBrk="1" latinLnBrk="0" hangingPunct="1">
-              <a:lnSpc>
-                <a:spcPct val="120000"/>
-              </a:lnSpc>
-              <a:spcBef>
-                <a:spcPts val="500"/>
-              </a:spcBef>
-              <a:buFont typeface="Arial" panose="020B0604020202020204" pitchFamily="34" charset="0"/>
-              <a:buChar char="•"/>
-              <a:defRPr sz="1800" kern="1200">
-                <a:solidFill>
-                  <a:schemeClr val="tx1"/>
-                </a:solidFill>
-                <a:effectLst>
-                  <a:outerShdw blurRad="50800" dist="38100" dir="2700000" algn="tl" rotWithShape="0">
-                    <a:srgbClr val="000000">
-                      <a:alpha val="48000"/>
-                    </a:srgbClr>
-                  </a:outerShdw>
-                </a:effectLst>
-                <a:latin typeface="+mn-lt"/>
-                <a:ea typeface="+mn-ea"/>
-                <a:cs typeface="+mn-cs"/>
-              </a:defRPr>
-            </a:lvl2pPr>
-            <a:lvl3pPr marL="1143000" indent="-228600" algn="l" defTabSz="914400" rtl="0" eaLnBrk="1" latinLnBrk="0" hangingPunct="1">
-              <a:lnSpc>
-                <a:spcPct val="120000"/>
-              </a:lnSpc>
-              <a:spcBef>
-                <a:spcPts val="500"/>
-              </a:spcBef>
-              <a:buFont typeface="Arial" panose="020B0604020202020204" pitchFamily="34" charset="0"/>
-              <a:buChar char="•"/>
-              <a:defRPr sz="1600" kern="1200">
-                <a:solidFill>
-                  <a:schemeClr val="tx1"/>
-                </a:solidFill>
-                <a:effectLst>
-                  <a:outerShdw blurRad="50800" dist="38100" dir="2700000" algn="tl" rotWithShape="0">
-                    <a:srgbClr val="000000">
-                      <a:alpha val="48000"/>
-                    </a:srgbClr>
-                  </a:outerShdw>
-                </a:effectLst>
-                <a:latin typeface="+mn-lt"/>
-                <a:ea typeface="+mn-ea"/>
-                <a:cs typeface="+mn-cs"/>
-              </a:defRPr>
-            </a:lvl3pPr>
-            <a:lvl4pPr marL="1600200" indent="-228600" algn="l" defTabSz="914400" rtl="0" eaLnBrk="1" latinLnBrk="0" hangingPunct="1">
-              <a:lnSpc>
-                <a:spcPct val="120000"/>
-              </a:lnSpc>
-              <a:spcBef>
-                <a:spcPts val="500"/>
-              </a:spcBef>
-              <a:buFont typeface="Arial" panose="020B0604020202020204" pitchFamily="34" charset="0"/>
-              <a:buChar char="•"/>
-              <a:defRPr sz="1400" kern="1200">
-                <a:solidFill>
-                  <a:schemeClr val="tx1"/>
-                </a:solidFill>
-                <a:effectLst>
-                  <a:outerShdw blurRad="50800" dist="38100" dir="2700000" algn="tl" rotWithShape="0">
-                    <a:srgbClr val="000000">
-                      <a:alpha val="48000"/>
-                    </a:srgbClr>
-                  </a:outerShdw>
-                </a:effectLst>
-                <a:latin typeface="+mn-lt"/>
-                <a:ea typeface="+mn-ea"/>
-                <a:cs typeface="+mn-cs"/>
-              </a:defRPr>
-            </a:lvl4pPr>
-            <a:lvl5pPr marL="2057400" indent="-228600" algn="l" defTabSz="914400" rtl="0" eaLnBrk="1" latinLnBrk="0" hangingPunct="1">
-              <a:lnSpc>
-                <a:spcPct val="120000"/>
-              </a:lnSpc>
-              <a:spcBef>
-                <a:spcPts val="500"/>
-              </a:spcBef>
-              <a:buFont typeface="Arial" panose="020B0604020202020204" pitchFamily="34" charset="0"/>
-              <a:buChar char="•"/>
-              <a:defRPr sz="1200" kern="1200">
-                <a:solidFill>
-                  <a:schemeClr val="tx1"/>
-                </a:solidFill>
-                <a:effectLst>
-                  <a:outerShdw blurRad="50800" dist="38100" dir="2700000" algn="tl" rotWithShape="0">
-                    <a:srgbClr val="000000">
-                      <a:alpha val="48000"/>
-                    </a:srgbClr>
-                  </a:outerShdw>
-                </a:effectLst>
-                <a:latin typeface="+mn-lt"/>
-                <a:ea typeface="+mn-ea"/>
-                <a:cs typeface="+mn-cs"/>
-              </a:defRPr>
-            </a:lvl5pPr>
-            <a:lvl6pPr marL="2514600" indent="-228600" algn="l" defTabSz="914400" rtl="0" eaLnBrk="1" latinLnBrk="0" hangingPunct="1">
-              <a:lnSpc>
-                <a:spcPct val="120000"/>
-              </a:lnSpc>
-              <a:spcBef>
-                <a:spcPts val="500"/>
-              </a:spcBef>
-              <a:buFont typeface="Arial" panose="020B0604020202020204" pitchFamily="34" charset="0"/>
-              <a:buChar char="•"/>
-              <a:defRPr sz="1200" kern="1200">
-                <a:solidFill>
-                  <a:schemeClr val="tx1"/>
-                </a:solidFill>
-                <a:effectLst>
-                  <a:outerShdw blurRad="50800" dist="38100" dir="2700000" algn="tl" rotWithShape="0">
-                    <a:srgbClr val="000000">
-                      <a:alpha val="48000"/>
-                    </a:srgbClr>
-                  </a:outerShdw>
-                </a:effectLst>
-                <a:latin typeface="+mn-lt"/>
-                <a:ea typeface="+mn-ea"/>
-                <a:cs typeface="+mn-cs"/>
-              </a:defRPr>
-            </a:lvl6pPr>
-            <a:lvl7pPr marL="2971800" indent="-228600" algn="l" defTabSz="914400" rtl="0" eaLnBrk="1" latinLnBrk="0" hangingPunct="1">
-              <a:lnSpc>
-                <a:spcPct val="120000"/>
-              </a:lnSpc>
-              <a:spcBef>
-                <a:spcPts val="500"/>
-              </a:spcBef>
-              <a:buFont typeface="Arial" panose="020B0604020202020204" pitchFamily="34" charset="0"/>
-              <a:buChar char="•"/>
-              <a:defRPr sz="1200" kern="1200">
-                <a:solidFill>
-                  <a:schemeClr val="tx1"/>
-                </a:solidFill>
-                <a:effectLst>
-                  <a:outerShdw blurRad="50800" dist="38100" dir="2700000" algn="tl" rotWithShape="0">
-                    <a:srgbClr val="000000">
-                      <a:alpha val="48000"/>
-                    </a:srgbClr>
-                  </a:outerShdw>
-                </a:effectLst>
-                <a:latin typeface="+mn-lt"/>
-                <a:ea typeface="+mn-ea"/>
-                <a:cs typeface="+mn-cs"/>
-              </a:defRPr>
-            </a:lvl7pPr>
-            <a:lvl8pPr marL="3429000" indent="-228600" algn="l" defTabSz="914400" rtl="0" eaLnBrk="1" latinLnBrk="0" hangingPunct="1">
-              <a:lnSpc>
-                <a:spcPct val="120000"/>
-              </a:lnSpc>
-              <a:spcBef>
-                <a:spcPts val="500"/>
-              </a:spcBef>
-              <a:buFont typeface="Arial" panose="020B0604020202020204" pitchFamily="34" charset="0"/>
-              <a:buChar char="•"/>
-              <a:defRPr sz="1200" kern="1200">
-                <a:solidFill>
-                  <a:schemeClr val="tx1"/>
-                </a:solidFill>
-                <a:effectLst>
-                  <a:outerShdw blurRad="50800" dist="38100" dir="2700000" algn="tl" rotWithShape="0">
-                    <a:srgbClr val="000000">
-                      <a:alpha val="48000"/>
-                    </a:srgbClr>
-                  </a:outerShdw>
-                </a:effectLst>
-                <a:latin typeface="+mn-lt"/>
-                <a:ea typeface="+mn-ea"/>
-                <a:cs typeface="+mn-cs"/>
-              </a:defRPr>
-            </a:lvl8pPr>
-            <a:lvl9pPr marL="3886200" indent="-228600" algn="l" defTabSz="914400" rtl="0" eaLnBrk="1" latinLnBrk="0" hangingPunct="1">
-              <a:lnSpc>
-                <a:spcPct val="120000"/>
-              </a:lnSpc>
-              <a:spcBef>
-                <a:spcPts val="500"/>
-              </a:spcBef>
-              <a:buFont typeface="Arial" panose="020B0604020202020204" pitchFamily="34" charset="0"/>
-              <a:buChar char="•"/>
-              <a:defRPr sz="1200" kern="1200">
-                <a:solidFill>
-                  <a:schemeClr val="tx1"/>
-                </a:solidFill>
-                <a:effectLst>
-                  <a:outerShdw blurRad="50800" dist="38100" dir="2700000" algn="tl" rotWithShape="0">
-                    <a:srgbClr val="000000">
-                      <a:alpha val="48000"/>
-                    </a:srgbClr>
-                  </a:outerShdw>
-                </a:effectLst>
-                <a:latin typeface="+mn-lt"/>
-                <a:ea typeface="+mn-ea"/>
-                <a:cs typeface="+mn-cs"/>
-              </a:defRPr>
-            </a:lvl9pPr>
-          </a:lstStyle>
-          <a:p>
-            <a:r>
-              <a:rPr lang="en-US" sz="1600" dirty="0">
-                <a:effectLst/>
-              </a:rPr>
-              <a:t>UML Diagram</a:t>
-            </a:r>
-          </a:p>
-          <a:p>
-            <a:r>
-              <a:rPr lang="en-US" sz="1600" dirty="0">
-                <a:effectLst/>
-              </a:rPr>
-              <a:t>User Stories</a:t>
-            </a:r>
-          </a:p>
-          <a:p>
-            <a:r>
-              <a:rPr lang="en-US" sz="1600" dirty="0">
-                <a:effectLst/>
-              </a:rPr>
-              <a:t>Use Cases</a:t>
-            </a:r>
-          </a:p>
-          <a:p>
-            <a:pPr marL="0" indent="0">
-              <a:buNone/>
-            </a:pPr>
-            <a:endParaRPr lang="en-US" sz="1600" dirty="0">
-              <a:effectLst/>
-            </a:endParaRPr>
-          </a:p>
-          <a:p>
-            <a:pPr marL="0" indent="0">
-              <a:buFont typeface="Arial" panose="020B0604020202020204" pitchFamily="34" charset="0"/>
-              <a:buNone/>
-            </a:pPr>
-            <a:endParaRPr lang="en-US" sz="1600" dirty="0">
-              <a:effectLst/>
-            </a:endParaRPr>
-          </a:p>
-          <a:p>
-            <a:endParaRPr lang="en-US" sz="1600" dirty="0"/>
-          </a:p>
-          <a:p>
-            <a:endParaRPr lang="en-US" sz="1600" dirty="0"/>
+          <a:lstStyle/>
+          <a:p>
+            <a:r>
+              <a:rPr lang="en-US" sz="1400" dirty="0" smtClean="0"/>
+              <a:t>*Subject to change</a:t>
+            </a:r>
+            <a:endParaRPr lang="en-US" sz="1400" dirty="0"/>
           </a:p>
         </p:txBody>
       </p:sp>
     </p:spTree>
     <p:extLst>
       <p:ext uri="{BB962C8B-B14F-4D97-AF65-F5344CB8AC3E}">
-        <p14:creationId xmlns:p14="http://schemas.microsoft.com/office/powerpoint/2010/main" val="386003673"/>
+        <p14:creationId xmlns:p14="http://schemas.microsoft.com/office/powerpoint/2010/main" val="3368211307"/>
       </p:ext>
     </p:extLst>
   </p:cSld>

</xml_diff>

<commit_message>
updated the technologies slide in ppt
</commit_message>
<xml_diff>
--- a/Kaavish Evaluation I/Evaluation I.pptx
+++ b/Kaavish Evaluation I/Evaluation I.pptx
@@ -258,7 +258,7 @@
           <a:p>
             <a:fld id="{964B77FC-11F0-435C-BF58-30F6E93FA138}" type="datetimeFigureOut">
               <a:rPr lang="en-US" smtClean="0"/>
-              <a:t>17-Oct-19</a:t>
+              <a:t>10/18/2019</a:t>
             </a:fld>
             <a:endParaRPr lang="en-US"/>
           </a:p>
@@ -545,7 +545,7 @@
           <a:p>
             <a:fld id="{964B77FC-11F0-435C-BF58-30F6E93FA138}" type="datetimeFigureOut">
               <a:rPr lang="en-US" smtClean="0"/>
-              <a:t>17-Oct-19</a:t>
+              <a:t>10/18/2019</a:t>
             </a:fld>
             <a:endParaRPr lang="en-US"/>
           </a:p>
@@ -737,7 +737,7 @@
           <a:p>
             <a:fld id="{964B77FC-11F0-435C-BF58-30F6E93FA138}" type="datetimeFigureOut">
               <a:rPr lang="en-US" smtClean="0"/>
-              <a:t>17-Oct-19</a:t>
+              <a:t>10/18/2019</a:t>
             </a:fld>
             <a:endParaRPr lang="en-US"/>
           </a:p>
@@ -998,7 +998,7 @@
           <a:p>
             <a:fld id="{964B77FC-11F0-435C-BF58-30F6E93FA138}" type="datetimeFigureOut">
               <a:rPr lang="en-US" smtClean="0"/>
-              <a:t>17-Oct-19</a:t>
+              <a:t>10/18/2019</a:t>
             </a:fld>
             <a:endParaRPr lang="en-US"/>
           </a:p>
@@ -1422,7 +1422,7 @@
           <a:p>
             <a:fld id="{964B77FC-11F0-435C-BF58-30F6E93FA138}" type="datetimeFigureOut">
               <a:rPr lang="en-US" smtClean="0"/>
-              <a:t>17-Oct-19</a:t>
+              <a:t>10/18/2019</a:t>
             </a:fld>
             <a:endParaRPr lang="en-US"/>
           </a:p>
@@ -1968,7 +1968,7 @@
           <a:p>
             <a:fld id="{964B77FC-11F0-435C-BF58-30F6E93FA138}" type="datetimeFigureOut">
               <a:rPr lang="en-US" smtClean="0"/>
-              <a:t>17-Oct-19</a:t>
+              <a:t>10/18/2019</a:t>
             </a:fld>
             <a:endParaRPr lang="en-US"/>
           </a:p>
@@ -2808,7 +2808,7 @@
           <a:p>
             <a:fld id="{964B77FC-11F0-435C-BF58-30F6E93FA138}" type="datetimeFigureOut">
               <a:rPr lang="en-US" smtClean="0"/>
-              <a:t>17-Oct-19</a:t>
+              <a:t>10/18/2019</a:t>
             </a:fld>
             <a:endParaRPr lang="en-US"/>
           </a:p>
@@ -2978,7 +2978,7 @@
           <a:p>
             <a:fld id="{964B77FC-11F0-435C-BF58-30F6E93FA138}" type="datetimeFigureOut">
               <a:rPr lang="en-US" smtClean="0"/>
-              <a:t>17-Oct-19</a:t>
+              <a:t>10/18/2019</a:t>
             </a:fld>
             <a:endParaRPr lang="en-US"/>
           </a:p>
@@ -3162,7 +3162,7 @@
           <a:p>
             <a:fld id="{964B77FC-11F0-435C-BF58-30F6E93FA138}" type="datetimeFigureOut">
               <a:rPr lang="en-US" smtClean="0"/>
-              <a:t>17-Oct-19</a:t>
+              <a:t>10/18/2019</a:t>
             </a:fld>
             <a:endParaRPr lang="en-US"/>
           </a:p>
@@ -3332,7 +3332,7 @@
           <a:p>
             <a:fld id="{964B77FC-11F0-435C-BF58-30F6E93FA138}" type="datetimeFigureOut">
               <a:rPr lang="en-US" smtClean="0"/>
-              <a:t>17-Oct-19</a:t>
+              <a:t>10/18/2019</a:t>
             </a:fld>
             <a:endParaRPr lang="en-US"/>
           </a:p>
@@ -3580,7 +3580,7 @@
           <a:p>
             <a:fld id="{964B77FC-11F0-435C-BF58-30F6E93FA138}" type="datetimeFigureOut">
               <a:rPr lang="en-US" smtClean="0"/>
-              <a:t>17-Oct-19</a:t>
+              <a:t>10/18/2019</a:t>
             </a:fld>
             <a:endParaRPr lang="en-US"/>
           </a:p>
@@ -3817,7 +3817,7 @@
           <a:p>
             <a:fld id="{964B77FC-11F0-435C-BF58-30F6E93FA138}" type="datetimeFigureOut">
               <a:rPr lang="en-US" smtClean="0"/>
-              <a:t>17-Oct-19</a:t>
+              <a:t>10/18/2019</a:t>
             </a:fld>
             <a:endParaRPr lang="en-US"/>
           </a:p>
@@ -4190,7 +4190,7 @@
           <a:p>
             <a:fld id="{964B77FC-11F0-435C-BF58-30F6E93FA138}" type="datetimeFigureOut">
               <a:rPr lang="en-US" smtClean="0"/>
-              <a:t>17-Oct-19</a:t>
+              <a:t>10/18/2019</a:t>
             </a:fld>
             <a:endParaRPr lang="en-US"/>
           </a:p>
@@ -4308,7 +4308,7 @@
           <a:p>
             <a:fld id="{964B77FC-11F0-435C-BF58-30F6E93FA138}" type="datetimeFigureOut">
               <a:rPr lang="en-US" smtClean="0"/>
-              <a:t>17-Oct-19</a:t>
+              <a:t>10/18/2019</a:t>
             </a:fld>
             <a:endParaRPr lang="en-US"/>
           </a:p>
@@ -4403,7 +4403,7 @@
           <a:p>
             <a:fld id="{964B77FC-11F0-435C-BF58-30F6E93FA138}" type="datetimeFigureOut">
               <a:rPr lang="en-US" smtClean="0"/>
-              <a:t>17-Oct-19</a:t>
+              <a:t>10/18/2019</a:t>
             </a:fld>
             <a:endParaRPr lang="en-US"/>
           </a:p>
@@ -4654,7 +4654,7 @@
           <a:p>
             <a:fld id="{964B77FC-11F0-435C-BF58-30F6E93FA138}" type="datetimeFigureOut">
               <a:rPr lang="en-US" smtClean="0"/>
-              <a:t>17-Oct-19</a:t>
+              <a:t>10/18/2019</a:t>
             </a:fld>
             <a:endParaRPr lang="en-US"/>
           </a:p>
@@ -4941,7 +4941,7 @@
           <a:p>
             <a:fld id="{964B77FC-11F0-435C-BF58-30F6E93FA138}" type="datetimeFigureOut">
               <a:rPr lang="en-US" smtClean="0"/>
-              <a:t>17-Oct-19</a:t>
+              <a:t>10/18/2019</a:t>
             </a:fld>
             <a:endParaRPr lang="en-US"/>
           </a:p>
@@ -5154,7 +5154,7 @@
           <a:p>
             <a:fld id="{964B77FC-11F0-435C-BF58-30F6E93FA138}" type="datetimeFigureOut">
               <a:rPr lang="en-US" smtClean="0"/>
-              <a:t>17-Oct-19</a:t>
+              <a:t>10/18/2019</a:t>
             </a:fld>
             <a:endParaRPr lang="en-US"/>
           </a:p>
@@ -7417,13 +7417,13 @@
           <a:lstStyle/>
           <a:p>
             <a:r>
-              <a:rPr lang="en-US" dirty="0" smtClean="0"/>
+              <a:rPr lang="en-US" dirty="0"/>
               <a:t>Most of the APIs are paid and we need funds (or alternative free APIs) for the execution of our project</a:t>
             </a:r>
           </a:p>
           <a:p>
             <a:r>
-              <a:rPr lang="en-US" dirty="0" smtClean="0"/>
+              <a:rPr lang="en-US" dirty="0"/>
               <a:t>To host our website and mobile app, we again need to generate funds or sponsorships. </a:t>
             </a:r>
           </a:p>
@@ -9885,40 +9885,8 @@
               <a:t> </a:t>
             </a:r>
             <a:r>
-              <a:rPr lang="en-US" dirty="0" smtClean="0"/>
-              <a:t>a Mobile and </a:t>
-            </a:r>
-            <a:r>
               <a:rPr lang="en-US" dirty="0"/>
-              <a:t>Web Application </a:t>
-            </a:r>
-            <a:r>
-              <a:rPr lang="en-US" dirty="0" smtClean="0"/>
-              <a:t>that will </a:t>
-            </a:r>
-            <a:r>
-              <a:rPr lang="en-US" dirty="0"/>
-              <a:t>support artists and artisans </a:t>
-            </a:r>
-            <a:r>
-              <a:rPr lang="en-US" dirty="0" smtClean="0"/>
-              <a:t>and </a:t>
-            </a:r>
-            <a:r>
-              <a:rPr lang="en-US" dirty="0" smtClean="0"/>
-              <a:t>promote </a:t>
-            </a:r>
-            <a:r>
-              <a:rPr lang="en-US" dirty="0"/>
-              <a:t>their work &amp; </a:t>
-            </a:r>
-            <a:r>
-              <a:rPr lang="en-US" dirty="0" smtClean="0"/>
-              <a:t>skills while also earning  them </a:t>
-            </a:r>
-            <a:r>
-              <a:rPr lang="en-US" dirty="0"/>
-              <a:t>a respectable living, regardless of any biases.</a:t>
+              <a:t>a Mobile and Web Application that will support artists and artisans and promote their work &amp; skills while also earning  them a respectable living, regardless of any biases.</a:t>
             </a:r>
           </a:p>
         </p:txBody>
@@ -10794,13 +10762,8 @@
           <a:p>
             <a:r>
               <a:rPr lang="en-US" dirty="0"/>
-              <a:t>Tools and </a:t>
-            </a:r>
-            <a:r>
-              <a:rPr lang="en-US" dirty="0" smtClean="0"/>
-              <a:t>Technologies*</a:t>
-            </a:r>
-            <a:endParaRPr lang="en-US" dirty="0"/>
+              <a:t>Tools and Technologies*</a:t>
+            </a:r>
           </a:p>
         </p:txBody>
       </p:sp>
@@ -10820,8 +10783,8 @@
         </p:nvSpPr>
         <p:spPr>
           <a:xfrm>
-            <a:off x="1518842" y="2243462"/>
-            <a:ext cx="2940149" cy="2841019"/>
+            <a:off x="971076" y="1768618"/>
+            <a:ext cx="1984866" cy="2370741"/>
           </a:xfrm>
           <a:prstGeom prst="rect">
             <a:avLst/>
@@ -11061,23 +11024,7 @@
           <a:p>
             <a:r>
               <a:rPr lang="en-US" dirty="0"/>
-              <a:t>We will be </a:t>
-            </a:r>
-            <a:r>
-              <a:rPr lang="en-US" dirty="0" smtClean="0"/>
-              <a:t>using these </a:t>
-            </a:r>
-            <a:r>
-              <a:rPr lang="en-US" dirty="0"/>
-              <a:t>technologies to </a:t>
-            </a:r>
-            <a:r>
-              <a:rPr lang="en-US" dirty="0" smtClean="0"/>
-              <a:t>build </a:t>
-            </a:r>
-            <a:r>
-              <a:rPr lang="en-US" dirty="0"/>
-              <a:t>our website, maintain our repository and design our user interface.</a:t>
+              <a:t>We will be using these technologies to build our website, maintain our repository and design our user interface.</a:t>
             </a:r>
           </a:p>
         </p:txBody>
@@ -11118,60 +11065,13 @@
         </p:blipFill>
         <p:spPr bwMode="auto">
           <a:xfrm>
-            <a:off x="4884080" y="1540727"/>
-            <a:ext cx="2727614" cy="1600200"/>
+            <a:off x="6861216" y="1273281"/>
+            <a:ext cx="1984866" cy="1164455"/>
           </a:xfrm>
           <a:prstGeom prst="rect">
             <a:avLst/>
           </a:prstGeom>
           <a:noFill/>
-          <a:extLst/>
-        </p:spPr>
-      </p:pic>
-      <p:pic>
-        <p:nvPicPr>
-          <p:cNvPr id="6" name="Picture 10" descr="Image result for mysql png">
-            <a:extLst>
-              <a:ext uri="{FF2B5EF4-FFF2-40B4-BE49-F238E27FC236}">
-                <a16:creationId xmlns:a16="http://schemas.microsoft.com/office/drawing/2014/main" id="{F63574C0-6872-4D12-A41A-5FA7A5A51105}"/>
-              </a:ext>
-            </a:extLst>
-          </p:cNvPr>
-          <p:cNvPicPr>
-            <a:picLocks noChangeAspect="1" noChangeArrowheads="1"/>
-          </p:cNvPicPr>
-          <p:nvPr/>
-        </p:nvPicPr>
-        <p:blipFill>
-          <a:blip r:embed="rId3" cstate="print">
-            <a:duotone>
-              <a:schemeClr val="accent2">
-                <a:shade val="45000"/>
-                <a:satMod val="135000"/>
-              </a:schemeClr>
-              <a:prstClr val="white"/>
-            </a:duotone>
-            <a:extLst>
-              <a:ext uri="{28A0092B-C50C-407E-A947-70E740481C1C}">
-                <a14:useLocalDpi xmlns:a14="http://schemas.microsoft.com/office/drawing/2010/main" val="0"/>
-              </a:ext>
-            </a:extLst>
-          </a:blip>
-          <a:srcRect/>
-          <a:stretch>
-            <a:fillRect/>
-          </a:stretch>
-        </p:blipFill>
-        <p:spPr bwMode="auto">
-          <a:xfrm>
-            <a:off x="7733934" y="1813218"/>
-            <a:ext cx="1218130" cy="1218130"/>
-          </a:xfrm>
-          <a:prstGeom prst="rect">
-            <a:avLst/>
-          </a:prstGeom>
-          <a:noFill/>
-          <a:extLst/>
         </p:spPr>
       </p:pic>
       <p:pic>
@@ -11189,7 +11089,7 @@
           <p:nvPr/>
         </p:nvPicPr>
         <p:blipFill>
-          <a:blip r:embed="rId4" cstate="print">
+          <a:blip r:embed="rId3" cstate="print">
             <a:duotone>
               <a:schemeClr val="accent2">
                 <a:shade val="45000"/>
@@ -11209,8 +11109,8 @@
         </p:blipFill>
         <p:spPr>
           <a:xfrm>
-            <a:off x="8995235" y="2053506"/>
-            <a:ext cx="1336246" cy="1336246"/>
+            <a:off x="5370110" y="5732400"/>
+            <a:ext cx="979919" cy="979919"/>
           </a:xfrm>
           <a:prstGeom prst="rect">
             <a:avLst/>
@@ -11233,7 +11133,7 @@
           <p:nvPr/>
         </p:nvPicPr>
         <p:blipFill>
-          <a:blip r:embed="rId5" cstate="hqprint">
+          <a:blip r:embed="rId4" cstate="hqprint">
             <a:duotone>
               <a:schemeClr val="accent2">
                 <a:shade val="45000"/>
@@ -11254,14 +11154,13 @@
         </p:blipFill>
         <p:spPr bwMode="auto">
           <a:xfrm>
-            <a:off x="5838337" y="5068302"/>
-            <a:ext cx="2496834" cy="910355"/>
+            <a:off x="7679075" y="4034952"/>
+            <a:ext cx="2113596" cy="770626"/>
           </a:xfrm>
           <a:prstGeom prst="rect">
             <a:avLst/>
           </a:prstGeom>
           <a:noFill/>
-          <a:extLst/>
         </p:spPr>
       </p:pic>
       <p:pic>
@@ -11270,6 +11169,51 @@
             <a:extLst>
               <a:ext uri="{FF2B5EF4-FFF2-40B4-BE49-F238E27FC236}">
                 <a16:creationId xmlns:a16="http://schemas.microsoft.com/office/drawing/2014/main" id="{BCC58C82-436B-4002-BE74-F1C75AD95A8C}"/>
+              </a:ext>
+            </a:extLst>
+          </p:cNvPr>
+          <p:cNvPicPr>
+            <a:picLocks noChangeAspect="1" noChangeArrowheads="1"/>
+          </p:cNvPicPr>
+          <p:nvPr/>
+        </p:nvPicPr>
+        <p:blipFill>
+          <a:blip r:embed="rId5">
+            <a:duotone>
+              <a:schemeClr val="accent2">
+                <a:shade val="45000"/>
+                <a:satMod val="135000"/>
+              </a:schemeClr>
+              <a:prstClr val="white"/>
+            </a:duotone>
+            <a:extLst>
+              <a:ext uri="{28A0092B-C50C-407E-A947-70E740481C1C}">
+                <a14:useLocalDpi xmlns:a14="http://schemas.microsoft.com/office/drawing/2010/main" val="0"/>
+              </a:ext>
+            </a:extLst>
+          </a:blip>
+          <a:srcRect/>
+          <a:stretch>
+            <a:fillRect/>
+          </a:stretch>
+        </p:blipFill>
+        <p:spPr bwMode="auto">
+          <a:xfrm>
+            <a:off x="9792671" y="1306367"/>
+            <a:ext cx="1211171" cy="1211171"/>
+          </a:xfrm>
+          <a:prstGeom prst="rect">
+            <a:avLst/>
+          </a:prstGeom>
+          <a:noFill/>
+        </p:spPr>
+      </p:pic>
+      <p:pic>
+        <p:nvPicPr>
+          <p:cNvPr id="1034" name="Picture 10" descr="Image result for jquery png">
+            <a:extLst>
+              <a:ext uri="{FF2B5EF4-FFF2-40B4-BE49-F238E27FC236}">
+                <a16:creationId xmlns:a16="http://schemas.microsoft.com/office/drawing/2014/main" id="{A36873BE-24EF-4255-BE1E-98681B4495D8}"/>
               </a:ext>
             </a:extLst>
           </p:cNvPr>
@@ -11300,22 +11244,21 @@
         </p:blipFill>
         <p:spPr bwMode="auto">
           <a:xfrm>
-            <a:off x="9207785" y="4023362"/>
-            <a:ext cx="1447636" cy="1447636"/>
+            <a:off x="6636181" y="2282164"/>
+            <a:ext cx="1596602" cy="1596602"/>
           </a:xfrm>
           <a:prstGeom prst="rect">
             <a:avLst/>
           </a:prstGeom>
           <a:noFill/>
-          <a:extLst/>
         </p:spPr>
       </p:pic>
       <p:pic>
         <p:nvPicPr>
-          <p:cNvPr id="1034" name="Picture 10" descr="Image result for jquery png">
+          <p:cNvPr id="1046" name="Picture 22" descr="Image result for react framework  png">
             <a:extLst>
               <a:ext uri="{FF2B5EF4-FFF2-40B4-BE49-F238E27FC236}">
-                <a16:creationId xmlns:a16="http://schemas.microsoft.com/office/drawing/2014/main" id="{A36873BE-24EF-4255-BE1E-98681B4495D8}"/>
+                <a16:creationId xmlns:a16="http://schemas.microsoft.com/office/drawing/2014/main" id="{58C94A6F-669B-48FF-93CC-6A9C0A64F6E7}"/>
               </a:ext>
             </a:extLst>
           </p:cNvPr>
@@ -11346,136 +11289,13 @@
         </p:blipFill>
         <p:spPr bwMode="auto">
           <a:xfrm>
-            <a:off x="4684286" y="2304000"/>
-            <a:ext cx="2422341" cy="2422341"/>
+            <a:off x="8906027" y="1288639"/>
+            <a:ext cx="1058668" cy="1020762"/>
           </a:xfrm>
           <a:prstGeom prst="rect">
             <a:avLst/>
           </a:prstGeom>
           <a:noFill/>
-          <a:extLst/>
-        </p:spPr>
-      </p:pic>
-      <p:pic>
-        <p:nvPicPr>
-          <p:cNvPr id="1040" name="Picture 16" descr="Image result for express framework  png">
-            <a:extLst>
-              <a:ext uri="{FF2B5EF4-FFF2-40B4-BE49-F238E27FC236}">
-                <a16:creationId xmlns:a16="http://schemas.microsoft.com/office/drawing/2014/main" id="{F8E8744E-D4BD-4808-9333-40DA0062A1E7}"/>
-              </a:ext>
-            </a:extLst>
-          </p:cNvPr>
-          <p:cNvPicPr>
-            <a:picLocks noChangeAspect="1" noChangeArrowheads="1"/>
-          </p:cNvPicPr>
-          <p:nvPr/>
-        </p:nvPicPr>
-        <p:blipFill>
-          <a:blip r:embed="rId8">
-            <a:duotone>
-              <a:schemeClr val="accent2">
-                <a:shade val="45000"/>
-                <a:satMod val="135000"/>
-              </a:schemeClr>
-              <a:prstClr val="white"/>
-            </a:duotone>
-            <a:extLst>
-              <a:ext uri="{28A0092B-C50C-407E-A947-70E740481C1C}">
-                <a14:useLocalDpi xmlns:a14="http://schemas.microsoft.com/office/drawing/2010/main" val="0"/>
-              </a:ext>
-            </a:extLst>
-          </a:blip>
-          <a:srcRect/>
-          <a:stretch>
-            <a:fillRect/>
-          </a:stretch>
-        </p:blipFill>
-        <p:spPr bwMode="auto">
-          <a:xfrm>
-            <a:off x="8541750" y="5427328"/>
-            <a:ext cx="2050884" cy="849998"/>
-          </a:xfrm>
-          <a:prstGeom prst="rect">
-            <a:avLst/>
-          </a:prstGeom>
-          <a:noFill/>
-          <a:ln>
-            <a:gradFill>
-              <a:gsLst>
-                <a:gs pos="100000">
-                  <a:schemeClr val="accent1">
-                    <a:lumMod val="5000"/>
-                    <a:lumOff val="95000"/>
-                  </a:schemeClr>
-                </a:gs>
-                <a:gs pos="74000">
-                  <a:schemeClr val="accent1">
-                    <a:lumMod val="45000"/>
-                    <a:lumOff val="55000"/>
-                  </a:schemeClr>
-                </a:gs>
-                <a:gs pos="83000">
-                  <a:schemeClr val="accent1">
-                    <a:lumMod val="45000"/>
-                    <a:lumOff val="55000"/>
-                  </a:schemeClr>
-                </a:gs>
-                <a:gs pos="100000">
-                  <a:schemeClr val="accent1">
-                    <a:lumMod val="30000"/>
-                    <a:lumOff val="70000"/>
-                  </a:schemeClr>
-                </a:gs>
-              </a:gsLst>
-              <a:lin ang="5400000" scaled="1"/>
-            </a:gradFill>
-          </a:ln>
-        </p:spPr>
-      </p:pic>
-      <p:pic>
-        <p:nvPicPr>
-          <p:cNvPr id="1046" name="Picture 22" descr="Image result for react framework  png">
-            <a:extLst>
-              <a:ext uri="{FF2B5EF4-FFF2-40B4-BE49-F238E27FC236}">
-                <a16:creationId xmlns:a16="http://schemas.microsoft.com/office/drawing/2014/main" id="{58C94A6F-669B-48FF-93CC-6A9C0A64F6E7}"/>
-              </a:ext>
-            </a:extLst>
-          </p:cNvPr>
-          <p:cNvPicPr>
-            <a:picLocks noChangeAspect="1" noChangeArrowheads="1"/>
-          </p:cNvPicPr>
-          <p:nvPr/>
-        </p:nvPicPr>
-        <p:blipFill>
-          <a:blip r:embed="rId9">
-            <a:duotone>
-              <a:schemeClr val="accent2">
-                <a:shade val="45000"/>
-                <a:satMod val="135000"/>
-              </a:schemeClr>
-              <a:prstClr val="white"/>
-            </a:duotone>
-            <a:extLst>
-              <a:ext uri="{28A0092B-C50C-407E-A947-70E740481C1C}">
-                <a14:useLocalDpi xmlns:a14="http://schemas.microsoft.com/office/drawing/2010/main" val="0"/>
-              </a:ext>
-            </a:extLst>
-          </a:blip>
-          <a:srcRect/>
-          <a:stretch>
-            <a:fillRect/>
-          </a:stretch>
-        </p:blipFill>
-        <p:spPr bwMode="auto">
-          <a:xfrm>
-            <a:off x="5839414" y="3652445"/>
-            <a:ext cx="1408304" cy="1357879"/>
-          </a:xfrm>
-          <a:prstGeom prst="rect">
-            <a:avLst/>
-          </a:prstGeom>
-          <a:noFill/>
-          <a:extLst/>
         </p:spPr>
       </p:pic>
       <p:pic>
@@ -11493,7 +11313,7 @@
           <p:nvPr/>
         </p:nvPicPr>
         <p:blipFill>
-          <a:blip r:embed="rId10">
+          <a:blip r:embed="rId8">
             <a:duotone>
               <a:prstClr val="black"/>
               <a:schemeClr val="accent2">
@@ -11514,8 +11334,8 @@
         </p:blipFill>
         <p:spPr bwMode="auto">
           <a:xfrm>
-            <a:off x="4168638" y="4023362"/>
-            <a:ext cx="1905000" cy="1905000"/>
+            <a:off x="10394949" y="2721883"/>
+            <a:ext cx="1020762" cy="1020762"/>
           </a:xfrm>
           <a:prstGeom prst="rect">
             <a:avLst/>
@@ -11547,7 +11367,7 @@
           <p:nvPr/>
         </p:nvPicPr>
         <p:blipFill>
-          <a:blip r:embed="rId11" cstate="hqprint">
+          <a:blip r:embed="rId9" cstate="hqprint">
             <a:duotone>
               <a:schemeClr val="accent2">
                 <a:shade val="45000"/>
@@ -11568,22 +11388,158 @@
         </p:blipFill>
         <p:spPr bwMode="auto">
           <a:xfrm>
-            <a:off x="7815321" y="4121460"/>
-            <a:ext cx="1523089" cy="1152608"/>
+            <a:off x="5881194" y="4868678"/>
+            <a:ext cx="937670" cy="709588"/>
           </a:xfrm>
           <a:prstGeom prst="rect">
             <a:avLst/>
           </a:prstGeom>
           <a:noFill/>
-          <a:extLst/>
+        </p:spPr>
+      </p:pic>
+      <p:sp>
+        <p:nvSpPr>
+          <p:cNvPr id="17" name="TextBox 16"/>
+          <p:cNvSpPr txBox="1"/>
+          <p:nvPr/>
+        </p:nvSpPr>
+        <p:spPr>
+          <a:xfrm>
+            <a:off x="818793" y="5966916"/>
+            <a:ext cx="1742400" cy="307777"/>
+          </a:xfrm>
+          <a:prstGeom prst="rect">
+            <a:avLst/>
+          </a:prstGeom>
+          <a:noFill/>
+        </p:spPr>
+        <p:txBody>
+          <a:bodyPr wrap="none" rtlCol="0">
+            <a:spAutoFit/>
+          </a:bodyPr>
+          <a:lstStyle/>
+          <a:p>
+            <a:r>
+              <a:rPr lang="en-US" sz="1400" dirty="0"/>
+              <a:t>*Subject to change</a:t>
+            </a:r>
+          </a:p>
+        </p:txBody>
+      </p:sp>
+      <p:pic>
+        <p:nvPicPr>
+          <p:cNvPr id="1026" name="Picture 2" descr="Image result for nodejs">
+            <a:extLst>
+              <a:ext uri="{FF2B5EF4-FFF2-40B4-BE49-F238E27FC236}">
+                <a16:creationId xmlns:a16="http://schemas.microsoft.com/office/drawing/2014/main" id="{332CD132-5034-40DF-93E1-BFAD4E6334FC}"/>
+              </a:ext>
+            </a:extLst>
+          </p:cNvPr>
+          <p:cNvPicPr>
+            <a:picLocks noChangeAspect="1" noChangeArrowheads="1"/>
+          </p:cNvPicPr>
+          <p:nvPr/>
+        </p:nvPicPr>
+        <p:blipFill>
+          <a:blip r:embed="rId10">
+            <a:duotone>
+              <a:schemeClr val="accent2">
+                <a:shade val="45000"/>
+                <a:satMod val="135000"/>
+              </a:schemeClr>
+              <a:prstClr val="white"/>
+            </a:duotone>
+            <a:extLst>
+              <a:ext uri="{28A0092B-C50C-407E-A947-70E740481C1C}">
+                <a14:useLocalDpi xmlns:a14="http://schemas.microsoft.com/office/drawing/2010/main" val="0"/>
+              </a:ext>
+            </a:extLst>
+          </a:blip>
+          <a:srcRect/>
+          <a:stretch>
+            <a:fillRect/>
+          </a:stretch>
+        </p:blipFill>
+        <p:spPr bwMode="auto">
+          <a:xfrm>
+            <a:off x="4992309" y="2759561"/>
+            <a:ext cx="1324895" cy="810357"/>
+          </a:xfrm>
+          <a:prstGeom prst="rect">
+            <a:avLst/>
+          </a:prstGeom>
+          <a:noFill/>
+          <a:extLst>
+            <a:ext uri="{909E8E84-426E-40DD-AFC4-6F175D3DCCD1}">
+              <a14:hiddenFill xmlns:a14="http://schemas.microsoft.com/office/drawing/2010/main">
+                <a:solidFill>
+                  <a:srgbClr val="FFFFFF"/>
+                </a:solidFill>
+              </a14:hiddenFill>
+            </a:ext>
+          </a:extLst>
         </p:spPr>
       </p:pic>
       <p:pic>
         <p:nvPicPr>
-          <p:cNvPr id="1058" name="Picture 34" descr="Image result for javascript png">
+          <p:cNvPr id="1030" name="Picture 6" descr="Image result for express js">
             <a:extLst>
               <a:ext uri="{FF2B5EF4-FFF2-40B4-BE49-F238E27FC236}">
-                <a16:creationId xmlns:a16="http://schemas.microsoft.com/office/drawing/2014/main" id="{0C4EDEA4-00F4-461D-BB45-5438943896B3}"/>
+                <a16:creationId xmlns:a16="http://schemas.microsoft.com/office/drawing/2014/main" id="{1623F1FA-9CD0-47DA-B14A-C7AC0D304046}"/>
+              </a:ext>
+            </a:extLst>
+          </p:cNvPr>
+          <p:cNvPicPr>
+            <a:picLocks noChangeAspect="1" noChangeArrowheads="1"/>
+          </p:cNvPicPr>
+          <p:nvPr/>
+        </p:nvPicPr>
+        <p:blipFill>
+          <a:blip r:embed="rId11">
+            <a:duotone>
+              <a:schemeClr val="accent2">
+                <a:shade val="45000"/>
+                <a:satMod val="135000"/>
+              </a:schemeClr>
+              <a:prstClr val="white"/>
+            </a:duotone>
+            <a:extLst>
+              <a:ext uri="{28A0092B-C50C-407E-A947-70E740481C1C}">
+                <a14:useLocalDpi xmlns:a14="http://schemas.microsoft.com/office/drawing/2010/main" val="0"/>
+              </a:ext>
+            </a:extLst>
+          </a:blip>
+          <a:srcRect/>
+          <a:stretch>
+            <a:fillRect/>
+          </a:stretch>
+        </p:blipFill>
+        <p:spPr bwMode="auto">
+          <a:xfrm>
+            <a:off x="8481232" y="2919332"/>
+            <a:ext cx="1665268" cy="690177"/>
+          </a:xfrm>
+          <a:prstGeom prst="rect">
+            <a:avLst/>
+          </a:prstGeom>
+          <a:noFill/>
+          <a:extLst>
+            <a:ext uri="{909E8E84-426E-40DD-AFC4-6F175D3DCCD1}">
+              <a14:hiddenFill xmlns:a14="http://schemas.microsoft.com/office/drawing/2010/main">
+                <a:solidFill>
+                  <a:srgbClr val="FFFFFF"/>
+                </a:solidFill>
+              </a14:hiddenFill>
+            </a:ext>
+          </a:extLst>
+        </p:spPr>
+      </p:pic>
+      <p:pic>
+        <p:nvPicPr>
+          <p:cNvPr id="1032" name="Picture 8" descr="Image result for mongo db">
+            <a:extLst>
+              <a:ext uri="{FF2B5EF4-FFF2-40B4-BE49-F238E27FC236}">
+                <a16:creationId xmlns:a16="http://schemas.microsoft.com/office/drawing/2014/main" id="{E78A24CB-9139-4F03-BB13-312210FD6F50}"/>
               </a:ext>
             </a:extLst>
           </p:cNvPr>
@@ -11614,22 +11570,30 @@
         </p:blipFill>
         <p:spPr bwMode="auto">
           <a:xfrm>
-            <a:off x="6935744" y="3035708"/>
-            <a:ext cx="1419169" cy="1419169"/>
+            <a:off x="5555820" y="3817558"/>
+            <a:ext cx="2350660" cy="1229576"/>
           </a:xfrm>
           <a:prstGeom prst="rect">
             <a:avLst/>
           </a:prstGeom>
           <a:noFill/>
-          <a:extLst/>
+          <a:extLst>
+            <a:ext uri="{909E8E84-426E-40DD-AFC4-6F175D3DCCD1}">
+              <a14:hiddenFill xmlns:a14="http://schemas.microsoft.com/office/drawing/2010/main">
+                <a:solidFill>
+                  <a:srgbClr val="FFFFFF"/>
+                </a:solidFill>
+              </a14:hiddenFill>
+            </a:ext>
+          </a:extLst>
         </p:spPr>
       </p:pic>
       <p:pic>
         <p:nvPicPr>
-          <p:cNvPr id="1062" name="Picture 38" descr="Image result for google translate api png">
+          <p:cNvPr id="7" name="Picture 10" descr="Image result for google translate api">
             <a:extLst>
               <a:ext uri="{FF2B5EF4-FFF2-40B4-BE49-F238E27FC236}">
-                <a16:creationId xmlns:a16="http://schemas.microsoft.com/office/drawing/2014/main" id="{C0E767CA-D29E-47F1-A8E5-6B955DFF15DF}"/>
+                <a16:creationId xmlns:a16="http://schemas.microsoft.com/office/drawing/2014/main" id="{3DC7DD23-B756-4AE1-95B5-AB599B63A10E}"/>
               </a:ext>
             </a:extLst>
           </p:cNvPr>
@@ -11660,26 +11624,40 @@
         </p:blipFill>
         <p:spPr bwMode="auto">
           <a:xfrm>
-            <a:off x="8549226" y="3310989"/>
-            <a:ext cx="1218130" cy="889235"/>
+            <a:off x="6592117" y="5754298"/>
+            <a:ext cx="842365" cy="842365"/>
           </a:xfrm>
           <a:prstGeom prst="rect">
             <a:avLst/>
           </a:prstGeom>
           <a:noFill/>
-          <a:extLst/>
+          <a:extLst>
+            <a:ext uri="{909E8E84-426E-40DD-AFC4-6F175D3DCCD1}">
+              <a14:hiddenFill xmlns:a14="http://schemas.microsoft.com/office/drawing/2010/main">
+                <a:solidFill>
+                  <a:srgbClr val="FFFFFF"/>
+                </a:solidFill>
+              </a14:hiddenFill>
+            </a:ext>
+          </a:extLst>
         </p:spPr>
       </p:pic>
       <p:sp>
         <p:nvSpPr>
-          <p:cNvPr id="17" name="TextBox 16"/>
+          <p:cNvPr id="9" name="TextBox 8">
+            <a:extLst>
+              <a:ext uri="{FF2B5EF4-FFF2-40B4-BE49-F238E27FC236}">
+                <a16:creationId xmlns:a16="http://schemas.microsoft.com/office/drawing/2014/main" id="{A9E90EF7-492D-46FA-AB8F-6BE62E86B2A7}"/>
+              </a:ext>
+            </a:extLst>
+          </p:cNvPr>
           <p:cNvSpPr txBox="1"/>
           <p:nvPr/>
         </p:nvSpPr>
         <p:spPr>
           <a:xfrm>
-            <a:off x="818793" y="5966916"/>
-            <a:ext cx="1742400" cy="307777"/>
+            <a:off x="3094743" y="1717948"/>
+            <a:ext cx="3736920" cy="369332"/>
           </a:xfrm>
           <a:prstGeom prst="rect">
             <a:avLst/>
@@ -11693,10 +11671,169 @@
           <a:lstStyle/>
           <a:p>
             <a:r>
-              <a:rPr lang="en-US" sz="1400" dirty="0" smtClean="0"/>
-              <a:t>*Subject to change</a:t>
-            </a:r>
-            <a:endParaRPr lang="en-US" sz="1400" dirty="0"/>
+              <a:rPr lang="en-US" b="1" dirty="0">
+                <a:latin typeface="Arial" panose="020B0604020202020204" pitchFamily="34" charset="0"/>
+                <a:ea typeface="Roboto Th" pitchFamily="2" charset="0"/>
+                <a:cs typeface="Arial" panose="020B0604020202020204" pitchFamily="34" charset="0"/>
+              </a:rPr>
+              <a:t>Front End Frameworks/Libraries</a:t>
+            </a:r>
+          </a:p>
+        </p:txBody>
+      </p:sp>
+      <p:sp>
+        <p:nvSpPr>
+          <p:cNvPr id="23" name="TextBox 22">
+            <a:extLst>
+              <a:ext uri="{FF2B5EF4-FFF2-40B4-BE49-F238E27FC236}">
+                <a16:creationId xmlns:a16="http://schemas.microsoft.com/office/drawing/2014/main" id="{CE59D022-A918-4281-AFEE-7FE60944E115}"/>
+              </a:ext>
+            </a:extLst>
+          </p:cNvPr>
+          <p:cNvSpPr txBox="1"/>
+          <p:nvPr/>
+        </p:nvSpPr>
+        <p:spPr>
+          <a:xfrm>
+            <a:off x="3204390" y="2705827"/>
+            <a:ext cx="1596603" cy="923330"/>
+          </a:xfrm>
+          <a:prstGeom prst="rect">
+            <a:avLst/>
+          </a:prstGeom>
+          <a:noFill/>
+        </p:spPr>
+        <p:txBody>
+          <a:bodyPr wrap="square" rtlCol="0">
+            <a:spAutoFit/>
+          </a:bodyPr>
+          <a:lstStyle/>
+          <a:p>
+            <a:r>
+              <a:rPr lang="en-US" b="1" dirty="0">
+                <a:latin typeface="Arial" panose="020B0604020202020204" pitchFamily="34" charset="0"/>
+                <a:ea typeface="Roboto Th" pitchFamily="2" charset="0"/>
+                <a:cs typeface="Arial" panose="020B0604020202020204" pitchFamily="34" charset="0"/>
+              </a:rPr>
+              <a:t>Back End Frameworks/Libraries</a:t>
+            </a:r>
+          </a:p>
+        </p:txBody>
+      </p:sp>
+      <p:sp>
+        <p:nvSpPr>
+          <p:cNvPr id="24" name="TextBox 23">
+            <a:extLst>
+              <a:ext uri="{FF2B5EF4-FFF2-40B4-BE49-F238E27FC236}">
+                <a16:creationId xmlns:a16="http://schemas.microsoft.com/office/drawing/2014/main" id="{ADD92435-30FB-4733-BB88-4D286F495BE9}"/>
+              </a:ext>
+            </a:extLst>
+          </p:cNvPr>
+          <p:cNvSpPr txBox="1"/>
+          <p:nvPr/>
+        </p:nvSpPr>
+        <p:spPr>
+          <a:xfrm>
+            <a:off x="3149836" y="4207290"/>
+            <a:ext cx="2608406" cy="369332"/>
+          </a:xfrm>
+          <a:prstGeom prst="rect">
+            <a:avLst/>
+          </a:prstGeom>
+          <a:noFill/>
+        </p:spPr>
+        <p:txBody>
+          <a:bodyPr wrap="none" rtlCol="0">
+            <a:spAutoFit/>
+          </a:bodyPr>
+          <a:lstStyle/>
+          <a:p>
+            <a:r>
+              <a:rPr lang="en-US" b="1" dirty="0">
+                <a:latin typeface="Arial" panose="020B0604020202020204" pitchFamily="34" charset="0"/>
+                <a:ea typeface="Roboto Th" pitchFamily="2" charset="0"/>
+                <a:cs typeface="Arial" panose="020B0604020202020204" pitchFamily="34" charset="0"/>
+              </a:rPr>
+              <a:t>Database and Hosting</a:t>
+            </a:r>
+          </a:p>
+        </p:txBody>
+      </p:sp>
+      <p:sp>
+        <p:nvSpPr>
+          <p:cNvPr id="25" name="TextBox 24">
+            <a:extLst>
+              <a:ext uri="{FF2B5EF4-FFF2-40B4-BE49-F238E27FC236}">
+                <a16:creationId xmlns:a16="http://schemas.microsoft.com/office/drawing/2014/main" id="{607DE0D3-8587-4214-A6D5-92E8525F44EF}"/>
+              </a:ext>
+            </a:extLst>
+          </p:cNvPr>
+          <p:cNvSpPr txBox="1"/>
+          <p:nvPr/>
+        </p:nvSpPr>
+        <p:spPr>
+          <a:xfrm>
+            <a:off x="3148008" y="6163265"/>
+            <a:ext cx="2069797" cy="369332"/>
+          </a:xfrm>
+          <a:prstGeom prst="rect">
+            <a:avLst/>
+          </a:prstGeom>
+          <a:noFill/>
+        </p:spPr>
+        <p:txBody>
+          <a:bodyPr wrap="none" rtlCol="0">
+            <a:spAutoFit/>
+          </a:bodyPr>
+          <a:lstStyle/>
+          <a:p>
+            <a:r>
+              <a:rPr lang="en-US" b="1" dirty="0">
+                <a:latin typeface="Arial" panose="020B0604020202020204" pitchFamily="34" charset="0"/>
+                <a:ea typeface="Roboto Th" pitchFamily="2" charset="0"/>
+                <a:cs typeface="Arial" panose="020B0604020202020204" pitchFamily="34" charset="0"/>
+              </a:rPr>
+              <a:t>Special Mentions</a:t>
+            </a:r>
+          </a:p>
+        </p:txBody>
+      </p:sp>
+      <p:sp>
+        <p:nvSpPr>
+          <p:cNvPr id="26" name="TextBox 25">
+            <a:extLst>
+              <a:ext uri="{FF2B5EF4-FFF2-40B4-BE49-F238E27FC236}">
+                <a16:creationId xmlns:a16="http://schemas.microsoft.com/office/drawing/2014/main" id="{624C1974-C914-4B8A-8E0E-89C48320DFED}"/>
+              </a:ext>
+            </a:extLst>
+          </p:cNvPr>
+          <p:cNvSpPr txBox="1"/>
+          <p:nvPr/>
+        </p:nvSpPr>
+        <p:spPr>
+          <a:xfrm>
+            <a:off x="3148008" y="5078926"/>
+            <a:ext cx="2582758" cy="369332"/>
+          </a:xfrm>
+          <a:prstGeom prst="rect">
+            <a:avLst/>
+          </a:prstGeom>
+          <a:noFill/>
+        </p:spPr>
+        <p:txBody>
+          <a:bodyPr wrap="none" rtlCol="0">
+            <a:spAutoFit/>
+          </a:bodyPr>
+          <a:lstStyle/>
+          <a:p>
+            <a:r>
+              <a:rPr lang="en-US" b="1" dirty="0">
+                <a:latin typeface="Arial" panose="020B0604020202020204" pitchFamily="34" charset="0"/>
+                <a:ea typeface="Roboto Th" pitchFamily="2" charset="0"/>
+                <a:cs typeface="Arial" panose="020B0604020202020204" pitchFamily="34" charset="0"/>
+              </a:rPr>
+              <a:t>Android Development</a:t>
+            </a:r>
           </a:p>
         </p:txBody>
       </p:sp>
@@ -11779,7 +11916,7 @@
                                           </p:stCondLst>
                                         </p:cTn>
                                         <p:tgtEl>
-                                          <p:spTgt spid="6"/>
+                                          <p:spTgt spid="8"/>
                                         </p:tgtEl>
                                         <p:attrNameLst>
                                           <p:attrName>style.visibility</p:attrName>
@@ -11793,7 +11930,7 @@
                                       <p:cBhvr>
                                         <p:cTn id="10" dur="500"/>
                                         <p:tgtEl>
-                                          <p:spTgt spid="6"/>
+                                          <p:spTgt spid="8"/>
                                         </p:tgtEl>
                                       </p:cBhvr>
                                     </p:animEffect>
@@ -11814,7 +11951,7 @@
                                           </p:stCondLst>
                                         </p:cTn>
                                         <p:tgtEl>
-                                          <p:spTgt spid="8"/>
+                                          <p:spTgt spid="10"/>
                                         </p:tgtEl>
                                         <p:attrNameLst>
                                           <p:attrName>style.visibility</p:attrName>
@@ -11827,41 +11964,6 @@
                                     <p:animEffect transition="in" filter="fade">
                                       <p:cBhvr>
                                         <p:cTn id="13" dur="500"/>
-                                        <p:tgtEl>
-                                          <p:spTgt spid="8"/>
-                                        </p:tgtEl>
-                                      </p:cBhvr>
-                                    </p:animEffect>
-                                  </p:childTnLst>
-                                </p:cTn>
-                              </p:par>
-                              <p:par>
-                                <p:cTn id="14" presetID="10" presetClass="entr" presetSubtype="0" fill="hold" nodeType="withEffect">
-                                  <p:stCondLst>
-                                    <p:cond delay="0"/>
-                                  </p:stCondLst>
-                                  <p:childTnLst>
-                                    <p:set>
-                                      <p:cBhvr>
-                                        <p:cTn id="15" dur="1" fill="hold">
-                                          <p:stCondLst>
-                                            <p:cond delay="0"/>
-                                          </p:stCondLst>
-                                        </p:cTn>
-                                        <p:tgtEl>
-                                          <p:spTgt spid="10"/>
-                                        </p:tgtEl>
-                                        <p:attrNameLst>
-                                          <p:attrName>style.visibility</p:attrName>
-                                        </p:attrNameLst>
-                                      </p:cBhvr>
-                                      <p:to>
-                                        <p:strVal val="visible"/>
-                                      </p:to>
-                                    </p:set>
-                                    <p:animEffect transition="in" filter="fade">
-                                      <p:cBhvr>
-                                        <p:cTn id="16" dur="500"/>
                                         <p:tgtEl>
                                           <p:spTgt spid="10"/>
                                         </p:tgtEl>
@@ -12775,13 +12877,8 @@
           <a:p>
             <a:r>
               <a:rPr lang="en-US" dirty="0"/>
-              <a:t>GUI </a:t>
-            </a:r>
-            <a:r>
-              <a:rPr lang="en-US" dirty="0" smtClean="0"/>
-              <a:t>mockups*</a:t>
-            </a:r>
-            <a:endParaRPr lang="en-US" dirty="0"/>
+              <a:t>GUI mockups*</a:t>
+            </a:r>
           </a:p>
         </p:txBody>
       </p:sp>
@@ -12807,7 +12904,7 @@
           <a:lstStyle/>
           <a:p>
             <a:r>
-              <a:rPr lang="en-US" dirty="0" smtClean="0"/>
+              <a:rPr lang="en-US" dirty="0"/>
               <a:t>For Web Application GUI Mockups: </a:t>
             </a:r>
             <a:r>
@@ -12816,11 +12913,11 @@
               </a:rPr>
               <a:t>https://app.moqups.com/crvs7Jw1Tr/view/page/a2a00afc0</a:t>
             </a:r>
-            <a:endParaRPr lang="en-US" dirty="0" smtClean="0"/>
-          </a:p>
-          <a:p>
-            <a:r>
-              <a:rPr lang="en-US" dirty="0" smtClean="0"/>
+            <a:endParaRPr lang="en-US" dirty="0"/>
+          </a:p>
+          <a:p>
+            <a:r>
+              <a:rPr lang="en-US" dirty="0"/>
               <a:t>For Mobile Application GUI Mockups: </a:t>
             </a:r>
           </a:p>
@@ -12849,10 +12946,9 @@
           <a:lstStyle/>
           <a:p>
             <a:r>
-              <a:rPr lang="en-US" sz="1400" dirty="0" smtClean="0"/>
+              <a:rPr lang="en-US" sz="1400" dirty="0"/>
               <a:t>*Subject to change</a:t>
             </a:r>
-            <a:endParaRPr lang="en-US" sz="1400" dirty="0"/>
           </a:p>
         </p:txBody>
       </p:sp>

</xml_diff>